<commit_message>
Added Predicate Spec blurb
</commit_message>
<xml_diff>
--- a/Poster/Poster.pptx
+++ b/Poster/Poster.pptx
@@ -3130,6 +3130,170 @@
               <a:t> </a:t>
             </a:r>
             <a:endParaRPr lang="en-US" dirty="0"/>
+          </a:p>
+        </p:txBody>
+      </p:sp>
+      <p:sp>
+        <p:nvSpPr>
+          <p:cNvPr id="5" name="TextBox 4"/>
+          <p:cNvSpPr txBox="1"/>
+          <p:nvPr/>
+        </p:nvSpPr>
+        <p:spPr>
+          <a:xfrm>
+            <a:off x="2934033" y="2977710"/>
+            <a:ext cx="19706191" cy="6247864"/>
+          </a:xfrm>
+          <a:prstGeom prst="rect">
+            <a:avLst/>
+          </a:prstGeom>
+          <a:noFill/>
+        </p:spPr>
+        <p:txBody>
+          <a:bodyPr wrap="square" rtlCol="0">
+            <a:spAutoFit/>
+          </a:bodyPr>
+          <a:lstStyle/>
+          <a:p>
+            <a:r>
+              <a:rPr lang="en-US" sz="2000" dirty="0"/>
+              <a:t>Predicate Specification</a:t>
+            </a:r>
+          </a:p>
+          <a:p>
+            <a:endParaRPr lang="en-US" sz="2000" dirty="0"/>
+          </a:p>
+          <a:p>
+            <a:r>
+              <a:rPr lang="en-US" sz="2000" dirty="0"/>
+              <a:t>We explored a variety of methods of specifying predicates for evaluation, with an aim to enable an expressive syntax, and flexibility with regards to deploying new predicates across the network at runtime.</a:t>
+            </a:r>
+          </a:p>
+          <a:p>
+            <a:endParaRPr lang="en-US" sz="2000" dirty="0"/>
+          </a:p>
+          <a:p>
+            <a:r>
+              <a:rPr lang="en-US" sz="2000" dirty="0"/>
+              <a:t>Existing literature seemed to primarily rely on specifying the predicates at compile-time [</a:t>
+            </a:r>
+            <a:r>
+              <a:rPr lang="en-US" sz="2000" dirty="0" err="1"/>
+              <a:t>hsend</a:t>
+            </a:r>
+            <a:r>
+              <a:rPr lang="en-US" sz="2000" dirty="0"/>
+              <a:t> paper], which was not a suitable approach for us, as it simultaneously prevented us from adding new predicates at runtime, and also constrained the predicate syntax to a format that was easily convertible to C.</a:t>
+            </a:r>
+          </a:p>
+          <a:p>
+            <a:endParaRPr lang="en-US" sz="2000" dirty="0"/>
+          </a:p>
+          <a:p>
+            <a:r>
+              <a:rPr lang="en-US" sz="2000" dirty="0"/>
+              <a:t>We explored options such as </a:t>
+            </a:r>
+            <a:r>
+              <a:rPr lang="en-US" sz="2000" dirty="0" err="1"/>
+              <a:t>eLua</a:t>
+            </a:r>
+            <a:r>
+              <a:rPr lang="en-US" sz="2000" dirty="0"/>
+              <a:t> (embedded </a:t>
+            </a:r>
+            <a:r>
+              <a:rPr lang="en-US" sz="2000" dirty="0" err="1"/>
+              <a:t>Lua</a:t>
+            </a:r>
+            <a:r>
+              <a:rPr lang="en-US" sz="2000" dirty="0"/>
+              <a:t>), however even with patches aimed at </a:t>
+            </a:r>
+            <a:r>
+              <a:rPr lang="en-US" sz="2000" dirty="0" err="1"/>
+              <a:t>minimising</a:t>
+            </a:r>
+            <a:r>
+              <a:rPr lang="en-US" sz="2000" dirty="0"/>
+              <a:t> RAM usage [</a:t>
+            </a:r>
+            <a:r>
+              <a:rPr lang="en-US" sz="2000" dirty="0" err="1"/>
+              <a:t>ltr</a:t>
+            </a:r>
+            <a:r>
+              <a:rPr lang="en-US" sz="2000" dirty="0"/>
+              <a:t>], this was still infeasible. Other lightweight scripting languages such as [wren] did not provide the expressive power we wanted.</a:t>
+            </a:r>
+          </a:p>
+          <a:p>
+            <a:endParaRPr lang="en-US" sz="2000" dirty="0"/>
+          </a:p>
+          <a:p>
+            <a:r>
+              <a:rPr lang="en-US" sz="2000" dirty="0"/>
+              <a:t>We eventually decided it would be easier to simply implement our own predicate-based scripting language that provided the features we wanted, and was able to run on the limited resources available. We designed a syntax that enabled us to target nodes and </a:t>
+            </a:r>
+            <a:r>
+              <a:rPr lang="en-US" sz="2000" dirty="0" err="1"/>
+              <a:t>utilise</a:t>
+            </a:r>
+            <a:r>
+              <a:rPr lang="en-US" sz="2000" dirty="0"/>
+              <a:t> built in functions to iterate over sets of nodes when evaluating first-order predicates.</a:t>
+            </a:r>
+          </a:p>
+          <a:p>
+            <a:endParaRPr lang="en-US" sz="2000" dirty="0"/>
+          </a:p>
+          <a:p>
+            <a:r>
+              <a:rPr lang="en-US" sz="2000" dirty="0"/>
+              <a:t>As an example of a predicate specified in our language, the following snippet will check no nodes within a two-hop </a:t>
+            </a:r>
+            <a:r>
+              <a:rPr lang="en-US" sz="2000" dirty="0" err="1"/>
+              <a:t>neighbourhood</a:t>
+            </a:r>
+            <a:r>
+              <a:rPr lang="en-US" sz="2000" dirty="0"/>
+              <a:t> have clashing addresses:</a:t>
+            </a:r>
+          </a:p>
+          <a:p>
+            <a:endParaRPr lang="en-US" sz="2000" dirty="0"/>
+          </a:p>
+          <a:p>
+            <a:r>
+              <a:rPr lang="en-US" sz="2000" dirty="0"/>
+              <a:t>[insert example here, can't find </a:t>
+            </a:r>
+            <a:r>
+              <a:rPr lang="en-US" sz="2000" dirty="0" err="1"/>
+              <a:t>bradbury's</a:t>
+            </a:r>
+            <a:r>
+              <a:rPr lang="en-US" sz="2000" dirty="0"/>
+              <a:t> file with them]</a:t>
+            </a:r>
+          </a:p>
+          <a:p>
+            <a:endParaRPr lang="en-US" sz="2000" dirty="0"/>
+          </a:p>
+          <a:p>
+            <a:r>
+              <a:rPr lang="en-US" sz="2000" dirty="0"/>
+              <a:t>In order to </a:t>
+            </a:r>
+            <a:r>
+              <a:rPr lang="en-US" sz="2000" dirty="0" err="1"/>
+              <a:t>realise</a:t>
+            </a:r>
+            <a:r>
+              <a:rPr lang="en-US" sz="2000" dirty="0"/>
+              <a:t> this, we have implemented a parser, assembler and virtual machine. The base application will compile new predicates and transmit the assembled code to nodes for execution.</a:t>
+            </a:r>
           </a:p>
         </p:txBody>
       </p:sp>

</xml_diff>

<commit_message>
Added some design and sections
</commit_message>
<xml_diff>
--- a/Poster/Poster.pptx
+++ b/Poster/Poster.pptx
@@ -3091,6 +3091,27 @@
 <file path=ppt/slides/slide1.xml><?xml version="1.0" encoding="utf-8"?>
 <p:sld xmlns:a="http://schemas.openxmlformats.org/drawingml/2006/main" xmlns:r="http://schemas.openxmlformats.org/officeDocument/2006/relationships" xmlns:p="http://schemas.openxmlformats.org/presentationml/2006/main">
   <p:cSld>
+    <p:bg>
+      <p:bgPr>
+        <a:gradFill flip="none" rotWithShape="1">
+          <a:gsLst>
+            <a:gs pos="24000">
+              <a:schemeClr val="bg1"/>
+            </a:gs>
+            <a:gs pos="100000">
+              <a:schemeClr val="accent5">
+                <a:alpha val="60000"/>
+              </a:schemeClr>
+            </a:gs>
+          </a:gsLst>
+          <a:path path="circle">
+            <a:fillToRect l="100000" t="100000"/>
+          </a:path>
+          <a:tileRect r="-100000" b="-100000"/>
+        </a:gradFill>
+        <a:effectLst/>
+      </p:bgPr>
+    </p:bg>
     <p:spTree>
       <p:nvGrpSpPr>
         <p:cNvPr id="1" name=""/>
@@ -3107,193 +3128,352 @@
       </p:grpSpPr>
       <p:sp>
         <p:nvSpPr>
-          <p:cNvPr id="2" name="Title 1"/>
-          <p:cNvSpPr>
-            <a:spLocks noGrp="1"/>
-          </p:cNvSpPr>
-          <p:nvPr>
-            <p:ph type="ctrTitle"/>
-          </p:nvPr>
+          <p:cNvPr id="6" name="Rounded Rectangle 5"/>
+          <p:cNvSpPr/>
+          <p:nvPr/>
         </p:nvSpPr>
         <p:spPr>
           <a:xfrm>
             <a:off x="0" y="3"/>
-            <a:ext cx="42811700" cy="30275210"/>
+            <a:ext cx="12115800" cy="11607191"/>
           </a:xfrm>
+          <a:prstGeom prst="roundRect">
+            <a:avLst/>
+          </a:prstGeom>
         </p:spPr>
-        <p:txBody>
-          <a:bodyPr/>
-          <a:lstStyle/>
-          <a:p>
-            <a:r>
-              <a:rPr lang="en-US" dirty="0" smtClean="0"/>
-              <a:t> </a:t>
-            </a:r>
-            <a:endParaRPr lang="en-US" dirty="0"/>
-          </a:p>
-        </p:txBody>
-      </p:sp>
-      <p:sp>
-        <p:nvSpPr>
-          <p:cNvPr id="5" name="TextBox 4"/>
-          <p:cNvSpPr txBox="1"/>
+        <p:style>
+          <a:lnRef idx="1">
+            <a:schemeClr val="accent1"/>
+          </a:lnRef>
+          <a:fillRef idx="3">
+            <a:schemeClr val="accent1"/>
+          </a:fillRef>
+          <a:effectRef idx="2">
+            <a:schemeClr val="accent1"/>
+          </a:effectRef>
+          <a:fontRef idx="minor">
+            <a:schemeClr val="lt1"/>
+          </a:fontRef>
+        </p:style>
+        <p:txBody>
+          <a:bodyPr rtlCol="0" anchor="ctr"/>
+          <a:lstStyle/>
+          <a:p>
+            <a:r>
+              <a:rPr lang="en-US" sz="2000" dirty="0"/>
+              <a:t>Predicate Specification</a:t>
+            </a:r>
+          </a:p>
+          <a:p>
+            <a:endParaRPr lang="en-US" sz="2000" dirty="0"/>
+          </a:p>
+          <a:p>
+            <a:r>
+              <a:rPr lang="en-US" sz="2000" dirty="0"/>
+              <a:t>We explored a variety of methods of specifying predicates for evaluation, with an aim to enable an expressive syntax, and flexibility with regards to deploying new predicates across the network at runtime.</a:t>
+            </a:r>
+          </a:p>
+          <a:p>
+            <a:endParaRPr lang="en-US" sz="2000" dirty="0"/>
+          </a:p>
+          <a:p>
+            <a:r>
+              <a:rPr lang="en-US" sz="2000" dirty="0"/>
+              <a:t>Existing literature seemed to primarily rely on specifying the predicates at compile-time [</a:t>
+            </a:r>
+            <a:r>
+              <a:rPr lang="en-US" sz="2000" dirty="0" err="1"/>
+              <a:t>hsend</a:t>
+            </a:r>
+            <a:r>
+              <a:rPr lang="en-US" sz="2000" dirty="0"/>
+              <a:t> paper], which was not a suitable approach for us, as it simultaneously prevented us from adding new predicates at runtime, and also constrained the predicate syntax to a format that was easily convertible to C.</a:t>
+            </a:r>
+          </a:p>
+          <a:p>
+            <a:endParaRPr lang="en-US" sz="2000" dirty="0"/>
+          </a:p>
+          <a:p>
+            <a:r>
+              <a:rPr lang="en-US" sz="2000" dirty="0"/>
+              <a:t>We explored options such as </a:t>
+            </a:r>
+            <a:r>
+              <a:rPr lang="en-US" sz="2000" dirty="0" err="1"/>
+              <a:t>eLua</a:t>
+            </a:r>
+            <a:r>
+              <a:rPr lang="en-US" sz="2000" dirty="0"/>
+              <a:t> (embedded </a:t>
+            </a:r>
+            <a:r>
+              <a:rPr lang="en-US" sz="2000" dirty="0" err="1"/>
+              <a:t>Lua</a:t>
+            </a:r>
+            <a:r>
+              <a:rPr lang="en-US" sz="2000" dirty="0"/>
+              <a:t>), however even with patches aimed at </a:t>
+            </a:r>
+            <a:r>
+              <a:rPr lang="en-US" sz="2000" dirty="0" err="1"/>
+              <a:t>minimising</a:t>
+            </a:r>
+            <a:r>
+              <a:rPr lang="en-US" sz="2000" dirty="0"/>
+              <a:t> RAM usage [</a:t>
+            </a:r>
+            <a:r>
+              <a:rPr lang="en-US" sz="2000" dirty="0" err="1"/>
+              <a:t>ltr</a:t>
+            </a:r>
+            <a:r>
+              <a:rPr lang="en-US" sz="2000" dirty="0"/>
+              <a:t>], this was still infeasible. Other lightweight scripting languages such as [wren] did not provide the expressive power we wanted.</a:t>
+            </a:r>
+          </a:p>
+          <a:p>
+            <a:endParaRPr lang="en-US" sz="2000" dirty="0"/>
+          </a:p>
+          <a:p>
+            <a:r>
+              <a:rPr lang="en-US" sz="2000" dirty="0"/>
+              <a:t>We eventually decided it would be easier to simply implement our own predicate-based scripting language that provided the features we wanted, and was able to run on the limited resources available. We designed a syntax that enabled us to target nodes and </a:t>
+            </a:r>
+            <a:r>
+              <a:rPr lang="en-US" sz="2000" dirty="0" err="1"/>
+              <a:t>utilise</a:t>
+            </a:r>
+            <a:r>
+              <a:rPr lang="en-US" sz="2000" dirty="0"/>
+              <a:t> built in functions to iterate over sets of nodes when evaluating first-order predicates.</a:t>
+            </a:r>
+          </a:p>
+          <a:p>
+            <a:endParaRPr lang="en-US" sz="2000" dirty="0"/>
+          </a:p>
+          <a:p>
+            <a:r>
+              <a:rPr lang="en-US" sz="2000" dirty="0"/>
+              <a:t>As an example of a predicate specified in our language, the following snippet will check no nodes within a two-hop </a:t>
+            </a:r>
+            <a:r>
+              <a:rPr lang="en-US" sz="2000" dirty="0" err="1"/>
+              <a:t>neighbourhood</a:t>
+            </a:r>
+            <a:r>
+              <a:rPr lang="en-US" sz="2000" dirty="0"/>
+              <a:t> have clashing addresses:</a:t>
+            </a:r>
+          </a:p>
+          <a:p>
+            <a:endParaRPr lang="en-US" sz="2000" dirty="0"/>
+          </a:p>
+          <a:p>
+            <a:r>
+              <a:rPr lang="en-US" sz="2000" dirty="0"/>
+              <a:t>[insert example here, can't find </a:t>
+            </a:r>
+            <a:r>
+              <a:rPr lang="en-US" sz="2000" dirty="0" err="1"/>
+              <a:t>bradbury's</a:t>
+            </a:r>
+            <a:r>
+              <a:rPr lang="en-US" sz="2000" dirty="0"/>
+              <a:t> file with them]</a:t>
+            </a:r>
+          </a:p>
+          <a:p>
+            <a:endParaRPr lang="en-US" sz="2000" dirty="0"/>
+          </a:p>
+          <a:p>
+            <a:r>
+              <a:rPr lang="en-US" sz="2000" dirty="0"/>
+              <a:t>In order to </a:t>
+            </a:r>
+            <a:r>
+              <a:rPr lang="en-US" sz="2000" dirty="0" err="1"/>
+              <a:t>realise</a:t>
+            </a:r>
+            <a:r>
+              <a:rPr lang="en-US" sz="2000" dirty="0"/>
+              <a:t> this, we have implemented a parser, assembler and virtual machine. The base application will compile new predicates and transmit the assembled code to nodes for execution.</a:t>
+            </a:r>
+          </a:p>
+          <a:p>
+            <a:pPr algn="ctr"/>
+            <a:endParaRPr lang="en-US" sz="2000" dirty="0"/>
+          </a:p>
+        </p:txBody>
+      </p:sp>
+      <p:sp>
+        <p:nvSpPr>
+          <p:cNvPr id="7" name="Rounded Rectangle 6"/>
+          <p:cNvSpPr/>
           <p:nvPr/>
         </p:nvSpPr>
         <p:spPr>
           <a:xfrm>
-            <a:off x="2934033" y="2977710"/>
-            <a:ext cx="19706191" cy="6247864"/>
+            <a:off x="12496800" y="152403"/>
+            <a:ext cx="12115800" cy="11607191"/>
           </a:xfrm>
-          <a:prstGeom prst="rect">
+          <a:prstGeom prst="roundRect">
             <a:avLst/>
           </a:prstGeom>
-          <a:noFill/>
         </p:spPr>
-        <p:txBody>
-          <a:bodyPr wrap="square" rtlCol="0">
-            <a:spAutoFit/>
-          </a:bodyPr>
-          <a:lstStyle/>
-          <a:p>
-            <a:r>
-              <a:rPr lang="en-US" sz="2000" dirty="0"/>
-              <a:t>Predicate Specification</a:t>
+        <p:style>
+          <a:lnRef idx="1">
+            <a:schemeClr val="accent1"/>
+          </a:lnRef>
+          <a:fillRef idx="3">
+            <a:schemeClr val="accent1"/>
+          </a:fillRef>
+          <a:effectRef idx="2">
+            <a:schemeClr val="accent1"/>
+          </a:effectRef>
+          <a:fontRef idx="minor">
+            <a:schemeClr val="lt1"/>
+          </a:fontRef>
+        </p:style>
+        <p:txBody>
+          <a:bodyPr rtlCol="0" anchor="ctr"/>
+          <a:lstStyle/>
+          <a:p>
+            <a:r>
+              <a:rPr lang="en-US" sz="2000" dirty="0" smtClean="0"/>
+              <a:t>Project Management</a:t>
             </a:r>
           </a:p>
           <a:p>
             <a:endParaRPr lang="en-US" sz="2000" dirty="0"/>
           </a:p>
-          <a:p>
-            <a:r>
-              <a:rPr lang="en-US" sz="2000" dirty="0"/>
-              <a:t>We explored a variety of methods of specifying predicates for evaluation, with an aim to enable an expressive syntax, and flexibility with regards to deploying new predicates across the network at runtime.</a:t>
+        </p:txBody>
+      </p:sp>
+      <p:sp>
+        <p:nvSpPr>
+          <p:cNvPr id="8" name="Rounded Rectangle 7"/>
+          <p:cNvSpPr/>
+          <p:nvPr/>
+        </p:nvSpPr>
+        <p:spPr>
+          <a:xfrm>
+            <a:off x="25984200" y="584188"/>
+            <a:ext cx="12115800" cy="11607191"/>
+          </a:xfrm>
+          <a:prstGeom prst="roundRect">
+            <a:avLst/>
+          </a:prstGeom>
+        </p:spPr>
+        <p:style>
+          <a:lnRef idx="1">
+            <a:schemeClr val="accent1"/>
+          </a:lnRef>
+          <a:fillRef idx="3">
+            <a:schemeClr val="accent1"/>
+          </a:fillRef>
+          <a:effectRef idx="2">
+            <a:schemeClr val="accent1"/>
+          </a:effectRef>
+          <a:fontRef idx="minor">
+            <a:schemeClr val="lt1"/>
+          </a:fontRef>
+        </p:style>
+        <p:txBody>
+          <a:bodyPr rtlCol="0" anchor="ctr"/>
+          <a:lstStyle/>
+          <a:p>
+            <a:r>
+              <a:rPr lang="en-US" sz="2000" dirty="0" smtClean="0"/>
+              <a:t>Problems</a:t>
             </a:r>
           </a:p>
           <a:p>
             <a:endParaRPr lang="en-US" sz="2000" dirty="0"/>
           </a:p>
-          <a:p>
-            <a:r>
-              <a:rPr lang="en-US" sz="2000" dirty="0"/>
-              <a:t>Existing literature seemed to primarily rely on specifying the predicates at compile-time [</a:t>
-            </a:r>
-            <a:r>
-              <a:rPr lang="en-US" sz="2000" dirty="0" err="1"/>
-              <a:t>hsend</a:t>
-            </a:r>
-            <a:r>
-              <a:rPr lang="en-US" sz="2000" dirty="0"/>
-              <a:t> paper], which was not a suitable approach for us, as it simultaneously prevented us from adding new predicates at runtime, and also constrained the predicate syntax to a format that was easily convertible to C.</a:t>
+        </p:txBody>
+      </p:sp>
+      <p:sp>
+        <p:nvSpPr>
+          <p:cNvPr id="9" name="Rounded Rectangle 8"/>
+          <p:cNvSpPr/>
+          <p:nvPr/>
+        </p:nvSpPr>
+        <p:spPr>
+          <a:xfrm>
+            <a:off x="2895600" y="12191379"/>
+            <a:ext cx="12115800" cy="11607191"/>
+          </a:xfrm>
+          <a:prstGeom prst="roundRect">
+            <a:avLst/>
+          </a:prstGeom>
+        </p:spPr>
+        <p:style>
+          <a:lnRef idx="1">
+            <a:schemeClr val="accent1"/>
+          </a:lnRef>
+          <a:fillRef idx="3">
+            <a:schemeClr val="accent1"/>
+          </a:fillRef>
+          <a:effectRef idx="2">
+            <a:schemeClr val="accent1"/>
+          </a:effectRef>
+          <a:fontRef idx="minor">
+            <a:schemeClr val="lt1"/>
+          </a:fontRef>
+        </p:style>
+        <p:txBody>
+          <a:bodyPr rtlCol="0" anchor="ctr"/>
+          <a:lstStyle/>
+          <a:p>
+            <a:r>
+              <a:rPr lang="en-US" sz="2000" dirty="0" smtClean="0"/>
+              <a:t>Second term plans</a:t>
             </a:r>
           </a:p>
           <a:p>
             <a:endParaRPr lang="en-US" sz="2000" dirty="0"/>
           </a:p>
-          <a:p>
-            <a:r>
-              <a:rPr lang="en-US" sz="2000" dirty="0"/>
-              <a:t>We explored options such as </a:t>
-            </a:r>
-            <a:r>
-              <a:rPr lang="en-US" sz="2000" dirty="0" err="1"/>
-              <a:t>eLua</a:t>
-            </a:r>
-            <a:r>
-              <a:rPr lang="en-US" sz="2000" dirty="0"/>
-              <a:t> (embedded </a:t>
-            </a:r>
-            <a:r>
-              <a:rPr lang="en-US" sz="2000" dirty="0" err="1"/>
-              <a:t>Lua</a:t>
-            </a:r>
-            <a:r>
-              <a:rPr lang="en-US" sz="2000" dirty="0"/>
-              <a:t>), however even with patches aimed at </a:t>
-            </a:r>
-            <a:r>
-              <a:rPr lang="en-US" sz="2000" dirty="0" err="1"/>
-              <a:t>minimising</a:t>
-            </a:r>
-            <a:r>
-              <a:rPr lang="en-US" sz="2000" dirty="0"/>
-              <a:t> RAM usage [</a:t>
-            </a:r>
-            <a:r>
-              <a:rPr lang="en-US" sz="2000" dirty="0" err="1"/>
-              <a:t>ltr</a:t>
-            </a:r>
-            <a:r>
-              <a:rPr lang="en-US" sz="2000" dirty="0"/>
-              <a:t>], this was still infeasible. Other lightweight scripting languages such as [wren] did not provide the expressive power we wanted.</a:t>
+        </p:txBody>
+      </p:sp>
+      <p:sp>
+        <p:nvSpPr>
+          <p:cNvPr id="10" name="Rounded Rectangle 9"/>
+          <p:cNvSpPr/>
+          <p:nvPr/>
+        </p:nvSpPr>
+        <p:spPr>
+          <a:xfrm>
+            <a:off x="25247600" y="11048440"/>
+            <a:ext cx="12115800" cy="11607191"/>
+          </a:xfrm>
+          <a:prstGeom prst="roundRect">
+            <a:avLst/>
+          </a:prstGeom>
+        </p:spPr>
+        <p:style>
+          <a:lnRef idx="1">
+            <a:schemeClr val="accent1"/>
+          </a:lnRef>
+          <a:fillRef idx="3">
+            <a:schemeClr val="accent1"/>
+          </a:fillRef>
+          <a:effectRef idx="2">
+            <a:schemeClr val="accent1"/>
+          </a:effectRef>
+          <a:fontRef idx="minor">
+            <a:schemeClr val="lt1"/>
+          </a:fontRef>
+        </p:style>
+        <p:txBody>
+          <a:bodyPr rtlCol="0" anchor="ctr"/>
+          <a:lstStyle/>
+          <a:p>
+            <a:r>
+              <a:rPr lang="en-US" sz="2000" dirty="0" smtClean="0"/>
+              <a:t>Algorithms</a:t>
             </a:r>
           </a:p>
           <a:p>
             <a:endParaRPr lang="en-US" sz="2000" dirty="0"/>
-          </a:p>
-          <a:p>
-            <a:r>
-              <a:rPr lang="en-US" sz="2000" dirty="0"/>
-              <a:t>We eventually decided it would be easier to simply implement our own predicate-based scripting language that provided the features we wanted, and was able to run on the limited resources available. We designed a syntax that enabled us to target nodes and </a:t>
-            </a:r>
-            <a:r>
-              <a:rPr lang="en-US" sz="2000" dirty="0" err="1"/>
-              <a:t>utilise</a:t>
-            </a:r>
-            <a:r>
-              <a:rPr lang="en-US" sz="2000" dirty="0"/>
-              <a:t> built in functions to iterate over sets of nodes when evaluating first-order predicates.</a:t>
-            </a:r>
-          </a:p>
-          <a:p>
-            <a:endParaRPr lang="en-US" sz="2000" dirty="0"/>
-          </a:p>
-          <a:p>
-            <a:r>
-              <a:rPr lang="en-US" sz="2000" dirty="0"/>
-              <a:t>As an example of a predicate specified in our language, the following snippet will check no nodes within a two-hop </a:t>
-            </a:r>
-            <a:r>
-              <a:rPr lang="en-US" sz="2000" dirty="0" err="1"/>
-              <a:t>neighbourhood</a:t>
-            </a:r>
-            <a:r>
-              <a:rPr lang="en-US" sz="2000" dirty="0"/>
-              <a:t> have clashing addresses:</a:t>
-            </a:r>
-          </a:p>
-          <a:p>
-            <a:endParaRPr lang="en-US" sz="2000" dirty="0"/>
-          </a:p>
-          <a:p>
-            <a:r>
-              <a:rPr lang="en-US" sz="2000" dirty="0"/>
-              <a:t>[insert example here, can't find </a:t>
-            </a:r>
-            <a:r>
-              <a:rPr lang="en-US" sz="2000" dirty="0" err="1"/>
-              <a:t>bradbury's</a:t>
-            </a:r>
-            <a:r>
-              <a:rPr lang="en-US" sz="2000" dirty="0"/>
-              <a:t> file with them]</a:t>
-            </a:r>
-          </a:p>
-          <a:p>
-            <a:endParaRPr lang="en-US" sz="2000" dirty="0"/>
-          </a:p>
-          <a:p>
-            <a:r>
-              <a:rPr lang="en-US" sz="2000" dirty="0"/>
-              <a:t>In order to </a:t>
-            </a:r>
-            <a:r>
-              <a:rPr lang="en-US" sz="2000" dirty="0" err="1"/>
-              <a:t>realise</a:t>
-            </a:r>
-            <a:r>
-              <a:rPr lang="en-US" sz="2000" dirty="0"/>
-              <a:t> this, we have implemented a parser, assembler and virtual machine. The base application will compile new predicates and transmit the assembled code to nodes for execution.</a:t>
-            </a:r>
           </a:p>
         </p:txBody>
       </p:sp>

</xml_diff>

<commit_message>
Added introduction from report - Need to add references
</commit_message>
<xml_diff>
--- a/Poster/Poster.pptx
+++ b/Poster/Poster.pptx
@@ -3365,7 +3365,7 @@
         </p:nvSpPr>
         <p:spPr>
           <a:xfrm>
-            <a:off x="18591356" y="8458104"/>
+            <a:off x="22579156" y="7264367"/>
             <a:ext cx="12115800" cy="11607191"/>
           </a:xfrm>
           <a:prstGeom prst="roundRect">
@@ -3948,6 +3948,87 @@
           </a:prstGeom>
         </p:spPr>
       </p:pic>
+      <p:sp>
+        <p:nvSpPr>
+          <p:cNvPr id="23" name="Rounded Rectangle 22"/>
+          <p:cNvSpPr/>
+          <p:nvPr/>
+        </p:nvSpPr>
+        <p:spPr>
+          <a:xfrm>
+            <a:off x="5547677" y="13283512"/>
+            <a:ext cx="12115800" cy="11607191"/>
+          </a:xfrm>
+          <a:prstGeom prst="roundRect">
+            <a:avLst/>
+          </a:prstGeom>
+        </p:spPr>
+        <p:style>
+          <a:lnRef idx="1">
+            <a:schemeClr val="accent1"/>
+          </a:lnRef>
+          <a:fillRef idx="3">
+            <a:schemeClr val="accent1"/>
+          </a:fillRef>
+          <a:effectRef idx="2">
+            <a:schemeClr val="accent1"/>
+          </a:effectRef>
+          <a:fontRef idx="minor">
+            <a:schemeClr val="lt1"/>
+          </a:fontRef>
+        </p:style>
+        <p:txBody>
+          <a:bodyPr rtlCol="0" anchor="ctr"/>
+          <a:lstStyle/>
+          <a:p>
+            <a:r>
+              <a:rPr lang="en-US" sz="2000" dirty="0" smtClean="0"/>
+              <a:t>Background</a:t>
+            </a:r>
+          </a:p>
+          <a:p>
+            <a:r>
+              <a:rPr lang="en-US" sz="2000" dirty="0" smtClean="0"/>
+              <a:t>Wireless Sensor </a:t>
+            </a:r>
+            <a:r>
+              <a:rPr lang="en-US" sz="2000" dirty="0"/>
+              <a:t>N</a:t>
+            </a:r>
+            <a:r>
+              <a:rPr lang="en-US" sz="2000" dirty="0" smtClean="0"/>
+              <a:t>etworks (WSNs) are becoming increasingly prevalent due to decreasing hardware costs and </a:t>
+            </a:r>
+            <a:r>
+              <a:rPr lang="en-US" sz="2000" dirty="0"/>
+              <a:t>hardware size. Therefore, it is important that we consider issues with them now, so we are prepared for when they become widely used. A major issue with any system is that it may contain bugs, fortunately, there are many well known methodologies for detecting and eliminating </a:t>
+            </a:r>
+            <a:r>
+              <a:rPr lang="en-US" sz="2000" dirty="0" smtClean="0"/>
+              <a:t>bugs. </a:t>
+            </a:r>
+            <a:r>
+              <a:rPr lang="en-US" sz="2000" dirty="0"/>
+              <a:t>However, in distributed systems there are additional challenges to </a:t>
+            </a:r>
+            <a:r>
+              <a:rPr lang="en-US" sz="2000" dirty="0" smtClean="0"/>
+              <a:t>overcome </a:t>
+            </a:r>
+            <a:r>
+              <a:rPr lang="en-US" sz="2000" dirty="0"/>
+              <a:t>and there are additional challenges to overcome with WSNs due to the energy constrained environment they work </a:t>
+            </a:r>
+            <a:r>
+              <a:rPr lang="en-US" sz="2000" dirty="0" smtClean="0"/>
+              <a:t>in.</a:t>
+            </a:r>
+          </a:p>
+          <a:p>
+            <a:endParaRPr lang="en-US" sz="2000" dirty="0"/>
+          </a:p>
+        </p:txBody>
+      </p:sp>
     </p:spTree>
     <p:extLst>
       <p:ext uri="{BB962C8B-B14F-4D97-AF65-F5344CB8AC3E}">

</xml_diff>

<commit_message>
Improve poster layout and increase font sizes. Also add examples to predicate specification
</commit_message>
<xml_diff>
--- a/Poster/Poster.pptx
+++ b/Poster/Poster.pptx
@@ -7,7 +7,7 @@
   <p:sldIdLst>
     <p:sldId id="256" r:id="rId5"/>
   </p:sldIdLst>
-  <p:sldSz cx="42811700" cy="30275213"/>
+  <p:sldSz cx="42808525" cy="30279975"/>
   <p:notesSz cx="6858000" cy="9144000"/>
   <p:defaultTextStyle>
     <a:defPPr>
@@ -136,8 +136,8 @@
         </p:nvSpPr>
         <p:spPr>
           <a:xfrm>
-            <a:off x="3210878" y="9404955"/>
-            <a:ext cx="36389945" cy="6489549"/>
+            <a:off x="3210640" y="9406435"/>
+            <a:ext cx="36387246" cy="6490570"/>
           </a:xfrm>
         </p:spPr>
         <p:txBody>
@@ -164,8 +164,8 @@
         </p:nvSpPr>
         <p:spPr>
           <a:xfrm>
-            <a:off x="6421755" y="17155954"/>
-            <a:ext cx="29968190" cy="7736999"/>
+            <a:off x="6421279" y="17158653"/>
+            <a:ext cx="29965968" cy="7738216"/>
           </a:xfrm>
         </p:spPr>
         <p:txBody>
@@ -289,7 +289,7 @@
             <a:fld id="{8ACDB3CC-F982-40F9-8DD6-BCC9AFBF44BD}" type="datetime1">
               <a:rPr lang="en-US" smtClean="0"/>
               <a:pPr/>
-              <a:t>27/11/2012</a:t>
+              <a:t>11/27/2012</a:t>
             </a:fld>
             <a:endParaRPr lang="en-US" dirty="0"/>
           </a:p>
@@ -459,7 +459,7 @@
           <a:p>
             <a:fld id="{68C2560D-EC28-3B41-86E8-18F1CE0113B4}" type="datetimeFigureOut">
               <a:rPr lang="en-US" smtClean="0"/>
-              <a:t>27/11/2012</a:t>
+              <a:t>11/27/2012</a:t>
             </a:fld>
             <a:endParaRPr lang="en-US"/>
           </a:p>
@@ -549,8 +549,8 @@
         </p:nvSpPr>
         <p:spPr>
           <a:xfrm>
-            <a:off x="31038482" y="1212421"/>
-            <a:ext cx="9632633" cy="25832047"/>
+            <a:off x="31036180" y="1212612"/>
+            <a:ext cx="9631919" cy="25836110"/>
           </a:xfrm>
         </p:spPr>
         <p:txBody>
@@ -577,8 +577,8 @@
         </p:nvSpPr>
         <p:spPr>
           <a:xfrm>
-            <a:off x="2140585" y="1212421"/>
-            <a:ext cx="28184369" cy="25832047"/>
+            <a:off x="2140427" y="1212612"/>
+            <a:ext cx="28182279" cy="25836110"/>
           </a:xfrm>
         </p:spPr>
         <p:txBody>
@@ -639,7 +639,7 @@
           <a:p>
             <a:fld id="{68C2560D-EC28-3B41-86E8-18F1CE0113B4}" type="datetimeFigureOut">
               <a:rPr lang="en-US" smtClean="0"/>
-              <a:t>27/11/2012</a:t>
+              <a:t>11/27/2012</a:t>
             </a:fld>
             <a:endParaRPr lang="en-US"/>
           </a:p>
@@ -809,7 +809,7 @@
           <a:p>
             <a:fld id="{68C2560D-EC28-3B41-86E8-18F1CE0113B4}" type="datetimeFigureOut">
               <a:rPr lang="en-US" smtClean="0"/>
-              <a:t>27/11/2012</a:t>
+              <a:t>11/27/2012</a:t>
             </a:fld>
             <a:endParaRPr lang="en-US"/>
           </a:p>
@@ -899,8 +899,8 @@
         </p:nvSpPr>
         <p:spPr>
           <a:xfrm>
-            <a:off x="3381829" y="19454634"/>
-            <a:ext cx="36389945" cy="6012992"/>
+            <a:off x="3381579" y="19457694"/>
+            <a:ext cx="36387246" cy="6013938"/>
           </a:xfrm>
         </p:spPr>
         <p:txBody>
@@ -931,8 +931,8 @@
         </p:nvSpPr>
         <p:spPr>
           <a:xfrm>
-            <a:off x="3381829" y="12831929"/>
-            <a:ext cx="36389945" cy="6622699"/>
+            <a:off x="3381579" y="12833948"/>
+            <a:ext cx="36387246" cy="6623741"/>
           </a:xfrm>
         </p:spPr>
         <p:txBody>
@@ -1056,7 +1056,7 @@
             <a:fld id="{4A9E7B99-7C3F-4BC3-B7B8-7E1F8C620B24}" type="datetime1">
               <a:rPr lang="en-US" smtClean="0"/>
               <a:pPr/>
-              <a:t>27/11/2012</a:t>
+              <a:t>11/27/2012</a:t>
             </a:fld>
             <a:endParaRPr lang="en-US"/>
           </a:p>
@@ -1170,8 +1170,8 @@
         </p:nvSpPr>
         <p:spPr>
           <a:xfrm>
-            <a:off x="2140585" y="7064222"/>
-            <a:ext cx="18908501" cy="19980240"/>
+            <a:off x="2140427" y="7065333"/>
+            <a:ext cx="18907099" cy="19983383"/>
           </a:xfrm>
         </p:spPr>
         <p:txBody>
@@ -1255,8 +1255,8 @@
         </p:nvSpPr>
         <p:spPr>
           <a:xfrm>
-            <a:off x="21762614" y="7064222"/>
-            <a:ext cx="18908501" cy="19980240"/>
+            <a:off x="21761000" y="7065333"/>
+            <a:ext cx="18907099" cy="19983383"/>
           </a:xfrm>
         </p:spPr>
         <p:txBody>
@@ -1345,7 +1345,7 @@
           <a:p>
             <a:fld id="{68C2560D-EC28-3B41-86E8-18F1CE0113B4}" type="datetimeFigureOut">
               <a:rPr lang="en-US" smtClean="0"/>
-              <a:t>27/11/2012</a:t>
+              <a:t>11/27/2012</a:t>
             </a:fld>
             <a:endParaRPr lang="en-US"/>
           </a:p>
@@ -1462,8 +1462,8 @@
         </p:nvSpPr>
         <p:spPr>
           <a:xfrm>
-            <a:off x="2140585" y="6776886"/>
-            <a:ext cx="18915936" cy="2824286"/>
+            <a:off x="2140426" y="6777952"/>
+            <a:ext cx="18914533" cy="2824730"/>
           </a:xfrm>
         </p:spPr>
         <p:txBody>
@@ -1527,8 +1527,8 @@
         </p:nvSpPr>
         <p:spPr>
           <a:xfrm>
-            <a:off x="2140585" y="9601166"/>
-            <a:ext cx="18915936" cy="17443290"/>
+            <a:off x="2140426" y="9602676"/>
+            <a:ext cx="18914533" cy="17446034"/>
           </a:xfrm>
         </p:spPr>
         <p:txBody>
@@ -1612,8 +1612,8 @@
         </p:nvSpPr>
         <p:spPr>
           <a:xfrm>
-            <a:off x="21747770" y="6776886"/>
-            <a:ext cx="18923366" cy="2824286"/>
+            <a:off x="21746157" y="6777952"/>
+            <a:ext cx="18921963" cy="2824730"/>
           </a:xfrm>
         </p:spPr>
         <p:txBody>
@@ -1677,8 +1677,8 @@
         </p:nvSpPr>
         <p:spPr>
           <a:xfrm>
-            <a:off x="21747770" y="9601166"/>
-            <a:ext cx="18923366" cy="17443290"/>
+            <a:off x="21746157" y="9602676"/>
+            <a:ext cx="18921963" cy="17446034"/>
           </a:xfrm>
         </p:spPr>
         <p:txBody>
@@ -1767,7 +1767,7 @@
           <a:p>
             <a:fld id="{68C2560D-EC28-3B41-86E8-18F1CE0113B4}" type="datetimeFigureOut">
               <a:rPr lang="en-US" smtClean="0"/>
-              <a:t>27/11/2012</a:t>
+              <a:t>11/27/2012</a:t>
             </a:fld>
             <a:endParaRPr lang="en-US"/>
           </a:p>
@@ -1885,7 +1885,7 @@
           <a:p>
             <a:fld id="{68C2560D-EC28-3B41-86E8-18F1CE0113B4}" type="datetimeFigureOut">
               <a:rPr lang="en-US" smtClean="0"/>
-              <a:t>27/11/2012</a:t>
+              <a:t>11/27/2012</a:t>
             </a:fld>
             <a:endParaRPr lang="en-US"/>
           </a:p>
@@ -1980,7 +1980,7 @@
           <a:p>
             <a:fld id="{68C2560D-EC28-3B41-86E8-18F1CE0113B4}" type="datetimeFigureOut">
               <a:rPr lang="en-US" smtClean="0"/>
-              <a:t>27/11/2012</a:t>
+              <a:t>11/27/2012</a:t>
             </a:fld>
             <a:endParaRPr lang="en-US"/>
           </a:p>
@@ -2070,8 +2070,8 @@
         </p:nvSpPr>
         <p:spPr>
           <a:xfrm>
-            <a:off x="2140606" y="1205399"/>
-            <a:ext cx="14084754" cy="5129970"/>
+            <a:off x="2140447" y="1205589"/>
+            <a:ext cx="14083709" cy="5130777"/>
           </a:xfrm>
         </p:spPr>
         <p:txBody>
@@ -2102,8 +2102,8 @@
         </p:nvSpPr>
         <p:spPr>
           <a:xfrm>
-            <a:off x="16738185" y="1205414"/>
-            <a:ext cx="23932930" cy="25839057"/>
+            <a:off x="16736944" y="1205604"/>
+            <a:ext cx="23931155" cy="25843121"/>
           </a:xfrm>
         </p:spPr>
         <p:txBody>
@@ -2187,8 +2187,8 @@
         </p:nvSpPr>
         <p:spPr>
           <a:xfrm>
-            <a:off x="2140606" y="6335384"/>
-            <a:ext cx="14084754" cy="20709087"/>
+            <a:off x="2140447" y="6336381"/>
+            <a:ext cx="14083709" cy="20712344"/>
           </a:xfrm>
         </p:spPr>
         <p:txBody>
@@ -2257,7 +2257,7 @@
           <a:p>
             <a:fld id="{68C2560D-EC28-3B41-86E8-18F1CE0113B4}" type="datetimeFigureOut">
               <a:rPr lang="en-US" smtClean="0"/>
-              <a:t>27/11/2012</a:t>
+              <a:t>11/27/2012</a:t>
             </a:fld>
             <a:endParaRPr lang="en-US"/>
           </a:p>
@@ -2354,8 +2354,8 @@
         </p:nvSpPr>
         <p:spPr>
           <a:xfrm>
-            <a:off x="8391393" y="21192649"/>
-            <a:ext cx="25687020" cy="2501915"/>
+            <a:off x="8390771" y="21195983"/>
+            <a:ext cx="25685115" cy="2502309"/>
           </a:xfrm>
         </p:spPr>
         <p:txBody>
@@ -2386,8 +2386,8 @@
         </p:nvSpPr>
         <p:spPr>
           <a:xfrm>
-            <a:off x="8391393" y="2705145"/>
-            <a:ext cx="25687020" cy="18165128"/>
+            <a:off x="8390771" y="2705571"/>
+            <a:ext cx="25685115" cy="18167985"/>
           </a:xfrm>
         </p:spPr>
         <p:txBody>
@@ -2447,8 +2447,8 @@
         </p:nvSpPr>
         <p:spPr>
           <a:xfrm>
-            <a:off x="8391393" y="23694573"/>
-            <a:ext cx="25687020" cy="3553133"/>
+            <a:off x="8390771" y="23698300"/>
+            <a:ext cx="25685115" cy="3553692"/>
           </a:xfrm>
         </p:spPr>
         <p:txBody>
@@ -2517,7 +2517,7 @@
           <a:p>
             <a:fld id="{68C2560D-EC28-3B41-86E8-18F1CE0113B4}" type="datetimeFigureOut">
               <a:rPr lang="en-US" smtClean="0"/>
-              <a:t>27/11/2012</a:t>
+              <a:t>11/27/2012</a:t>
             </a:fld>
             <a:endParaRPr lang="en-US"/>
           </a:p>
@@ -2612,8 +2612,8 @@
         </p:nvSpPr>
         <p:spPr>
           <a:xfrm>
-            <a:off x="2140585" y="1212415"/>
-            <a:ext cx="38530530" cy="5045869"/>
+            <a:off x="2140426" y="1212606"/>
+            <a:ext cx="38527673" cy="5046663"/>
           </a:xfrm>
           <a:prstGeom prst="rect">
             <a:avLst/>
@@ -2645,8 +2645,8 @@
         </p:nvSpPr>
         <p:spPr>
           <a:xfrm>
-            <a:off x="2140585" y="7064222"/>
-            <a:ext cx="38530530" cy="19980240"/>
+            <a:off x="2140426" y="7065333"/>
+            <a:ext cx="38527673" cy="19983383"/>
           </a:xfrm>
           <a:prstGeom prst="rect">
             <a:avLst/>
@@ -2707,8 +2707,8 @@
         </p:nvSpPr>
         <p:spPr>
           <a:xfrm>
-            <a:off x="2140585" y="28060646"/>
-            <a:ext cx="9989397" cy="1611876"/>
+            <a:off x="2140427" y="28065059"/>
+            <a:ext cx="9988656" cy="1612130"/>
           </a:xfrm>
           <a:prstGeom prst="rect">
             <a:avLst/>
@@ -2730,7 +2730,7 @@
           <a:p>
             <a:fld id="{68C2560D-EC28-3B41-86E8-18F1CE0113B4}" type="datetimeFigureOut">
               <a:rPr lang="en-US" smtClean="0"/>
-              <a:t>27/11/2012</a:t>
+              <a:t>11/27/2012</a:t>
             </a:fld>
             <a:endParaRPr lang="en-US"/>
           </a:p>
@@ -2748,8 +2748,8 @@
         </p:nvSpPr>
         <p:spPr>
           <a:xfrm>
-            <a:off x="14627331" y="28060646"/>
-            <a:ext cx="13557038" cy="1611876"/>
+            <a:off x="14626246" y="28065059"/>
+            <a:ext cx="13556033" cy="1612130"/>
           </a:xfrm>
           <a:prstGeom prst="rect">
             <a:avLst/>
@@ -2785,8 +2785,8 @@
         </p:nvSpPr>
         <p:spPr>
           <a:xfrm>
-            <a:off x="30681718" y="28060646"/>
-            <a:ext cx="9989397" cy="1611876"/>
+            <a:off x="30679443" y="28065059"/>
+            <a:ext cx="9988656" cy="1612130"/>
           </a:xfrm>
           <a:prstGeom prst="rect">
             <a:avLst/>
@@ -3128,392 +3128,28 @@
       </p:grpSpPr>
       <p:sp>
         <p:nvSpPr>
-          <p:cNvPr id="6" name="Rounded Rectangle 5"/>
-          <p:cNvSpPr/>
-          <p:nvPr/>
-        </p:nvSpPr>
-        <p:spPr>
-          <a:xfrm>
-            <a:off x="597655" y="6140942"/>
-            <a:ext cx="12115800" cy="11607191"/>
-          </a:xfrm>
-          <a:prstGeom prst="roundRect">
-            <a:avLst/>
-          </a:prstGeom>
-        </p:spPr>
-        <p:style>
-          <a:lnRef idx="1">
-            <a:schemeClr val="accent1"/>
-          </a:lnRef>
-          <a:fillRef idx="3">
-            <a:schemeClr val="accent1"/>
-          </a:fillRef>
-          <a:effectRef idx="2">
-            <a:schemeClr val="accent1"/>
-          </a:effectRef>
-          <a:fontRef idx="minor">
-            <a:schemeClr val="lt1"/>
-          </a:fontRef>
-        </p:style>
-        <p:txBody>
-          <a:bodyPr rtlCol="0" anchor="ctr"/>
-          <a:lstStyle/>
-          <a:p>
-            <a:r>
-              <a:rPr lang="en-US" sz="2000" dirty="0"/>
-              <a:t>Predicate Specification</a:t>
-            </a:r>
-          </a:p>
-          <a:p>
-            <a:endParaRPr lang="en-US" sz="2000" dirty="0"/>
-          </a:p>
-          <a:p>
-            <a:r>
-              <a:rPr lang="en-US" sz="2000" dirty="0"/>
-              <a:t>We explored a variety of methods of specifying predicates for evaluation, with an aim to enable an expressive syntax, and flexibility with regards to deploying new predicates across the network at runtime.</a:t>
-            </a:r>
-          </a:p>
-          <a:p>
-            <a:endParaRPr lang="en-US" sz="2000" dirty="0"/>
-          </a:p>
-          <a:p>
-            <a:r>
-              <a:rPr lang="en-US" sz="2000" dirty="0"/>
-              <a:t>Existing literature seemed to primarily rely on specifying the predicates at compile-time [</a:t>
-            </a:r>
-            <a:r>
-              <a:rPr lang="en-US" sz="2000" dirty="0" err="1"/>
-              <a:t>hsend</a:t>
-            </a:r>
-            <a:r>
-              <a:rPr lang="en-US" sz="2000" dirty="0"/>
-              <a:t> paper], which was not a suitable approach for us, as it simultaneously prevented us from adding new predicates at runtime, and also constrained the predicate syntax to a format that was easily convertible to C.</a:t>
-            </a:r>
-          </a:p>
-          <a:p>
-            <a:endParaRPr lang="en-US" sz="2000" dirty="0"/>
-          </a:p>
-          <a:p>
-            <a:r>
-              <a:rPr lang="en-US" sz="2000" dirty="0"/>
-              <a:t>We explored options such as </a:t>
-            </a:r>
-            <a:r>
-              <a:rPr lang="en-US" sz="2000" dirty="0" err="1"/>
-              <a:t>eLua</a:t>
-            </a:r>
-            <a:r>
-              <a:rPr lang="en-US" sz="2000" dirty="0"/>
-              <a:t> (embedded </a:t>
-            </a:r>
-            <a:r>
-              <a:rPr lang="en-US" sz="2000" dirty="0" err="1"/>
-              <a:t>Lua</a:t>
-            </a:r>
-            <a:r>
-              <a:rPr lang="en-US" sz="2000" dirty="0"/>
-              <a:t>), however even with patches aimed at </a:t>
-            </a:r>
-            <a:r>
-              <a:rPr lang="en-US" sz="2000" dirty="0" err="1"/>
-              <a:t>minimising</a:t>
-            </a:r>
-            <a:r>
-              <a:rPr lang="en-US" sz="2000" dirty="0"/>
-              <a:t> RAM usage [</a:t>
-            </a:r>
-            <a:r>
-              <a:rPr lang="en-US" sz="2000" dirty="0" err="1"/>
-              <a:t>ltr</a:t>
-            </a:r>
-            <a:r>
-              <a:rPr lang="en-US" sz="2000" dirty="0"/>
-              <a:t>], this was still infeasible. Other lightweight scripting languages such as [wren] did not provide the expressive power we wanted.</a:t>
-            </a:r>
-          </a:p>
-          <a:p>
-            <a:endParaRPr lang="en-US" sz="2000" dirty="0"/>
-          </a:p>
-          <a:p>
-            <a:r>
-              <a:rPr lang="en-US" sz="2000" dirty="0"/>
-              <a:t>We eventually decided it would be easier to simply implement our own predicate-based scripting language that provided the features we wanted, and was able to run on the limited resources available. We designed a syntax that enabled us to target nodes and </a:t>
-            </a:r>
-            <a:r>
-              <a:rPr lang="en-US" sz="2000" dirty="0" err="1"/>
-              <a:t>utilise</a:t>
-            </a:r>
-            <a:r>
-              <a:rPr lang="en-US" sz="2000" dirty="0"/>
-              <a:t> built in functions to iterate over sets of nodes when evaluating first-order predicates.</a:t>
-            </a:r>
-          </a:p>
-          <a:p>
-            <a:endParaRPr lang="en-US" sz="2000" dirty="0"/>
-          </a:p>
-          <a:p>
-            <a:r>
-              <a:rPr lang="en-US" sz="2000" dirty="0"/>
-              <a:t>As an example of a predicate specified in our language, the following snippet will check no nodes within a two-hop </a:t>
-            </a:r>
-            <a:r>
-              <a:rPr lang="en-US" sz="2000" dirty="0" err="1"/>
-              <a:t>neighbourhood</a:t>
-            </a:r>
-            <a:r>
-              <a:rPr lang="en-US" sz="2000" dirty="0"/>
-              <a:t> have clashing addresses:</a:t>
-            </a:r>
-          </a:p>
-          <a:p>
-            <a:endParaRPr lang="en-US" sz="2000" dirty="0"/>
-          </a:p>
-          <a:p>
-            <a:r>
-              <a:rPr lang="en-US" sz="2000" dirty="0"/>
-              <a:t>[insert example here, can't find </a:t>
-            </a:r>
-            <a:r>
-              <a:rPr lang="en-US" sz="2000" dirty="0" err="1"/>
-              <a:t>bradbury's</a:t>
-            </a:r>
-            <a:r>
-              <a:rPr lang="en-US" sz="2000" dirty="0"/>
-              <a:t> file with them]</a:t>
-            </a:r>
-          </a:p>
-          <a:p>
-            <a:endParaRPr lang="en-US" sz="2000" dirty="0"/>
-          </a:p>
-          <a:p>
-            <a:r>
-              <a:rPr lang="en-US" sz="2000" dirty="0"/>
-              <a:t>In order to </a:t>
-            </a:r>
-            <a:r>
-              <a:rPr lang="en-US" sz="2000" dirty="0" err="1"/>
-              <a:t>realise</a:t>
-            </a:r>
-            <a:r>
-              <a:rPr lang="en-US" sz="2000" dirty="0"/>
-              <a:t> this, we have implemented a parser, assembler and virtual machine. The base application will compile new predicates and transmit the assembled code to nodes for execution.</a:t>
-            </a:r>
-          </a:p>
-          <a:p>
-            <a:pPr algn="ctr"/>
-            <a:endParaRPr lang="en-US" sz="2000" dirty="0"/>
-          </a:p>
-        </p:txBody>
-      </p:sp>
-      <p:sp>
-        <p:nvSpPr>
-          <p:cNvPr id="7" name="Rounded Rectangle 6"/>
-          <p:cNvSpPr/>
-          <p:nvPr/>
-        </p:nvSpPr>
-        <p:spPr>
-          <a:xfrm>
-            <a:off x="14097000" y="6140942"/>
-            <a:ext cx="12115800" cy="11607191"/>
-          </a:xfrm>
-          <a:prstGeom prst="roundRect">
-            <a:avLst/>
-          </a:prstGeom>
-        </p:spPr>
-        <p:style>
-          <a:lnRef idx="1">
-            <a:schemeClr val="accent1"/>
-          </a:lnRef>
-          <a:fillRef idx="3">
-            <a:schemeClr val="accent1"/>
-          </a:fillRef>
-          <a:effectRef idx="2">
-            <a:schemeClr val="accent1"/>
-          </a:effectRef>
-          <a:fontRef idx="minor">
-            <a:schemeClr val="lt1"/>
-          </a:fontRef>
-        </p:style>
-        <p:txBody>
-          <a:bodyPr rtlCol="0" anchor="ctr"/>
-          <a:lstStyle/>
-          <a:p>
-            <a:r>
-              <a:rPr lang="en-US" sz="2000" dirty="0" smtClean="0"/>
-              <a:t>Project Management</a:t>
-            </a:r>
-          </a:p>
-          <a:p>
-            <a:endParaRPr lang="en-US" sz="2000" dirty="0" smtClean="0"/>
-          </a:p>
-          <a:p>
-            <a:endParaRPr lang="en-US" sz="2000" dirty="0"/>
-          </a:p>
-          <a:p>
-            <a:endParaRPr lang="en-US" sz="2000" dirty="0" smtClean="0"/>
-          </a:p>
-          <a:p>
-            <a:endParaRPr lang="en-US" sz="2000" dirty="0"/>
-          </a:p>
-        </p:txBody>
-      </p:sp>
-      <p:sp>
-        <p:nvSpPr>
-          <p:cNvPr id="8" name="Rounded Rectangle 7"/>
-          <p:cNvSpPr/>
-          <p:nvPr/>
-        </p:nvSpPr>
-        <p:spPr>
-          <a:xfrm>
-            <a:off x="26985277" y="5763355"/>
-            <a:ext cx="12115800" cy="11607191"/>
-          </a:xfrm>
-          <a:prstGeom prst="roundRect">
-            <a:avLst/>
-          </a:prstGeom>
-        </p:spPr>
-        <p:style>
-          <a:lnRef idx="1">
-            <a:schemeClr val="accent1"/>
-          </a:lnRef>
-          <a:fillRef idx="3">
-            <a:schemeClr val="accent1"/>
-          </a:fillRef>
-          <a:effectRef idx="2">
-            <a:schemeClr val="accent1"/>
-          </a:effectRef>
-          <a:fontRef idx="minor">
-            <a:schemeClr val="lt1"/>
-          </a:fontRef>
-        </p:style>
-        <p:txBody>
-          <a:bodyPr rtlCol="0" anchor="ctr"/>
-          <a:lstStyle/>
-          <a:p>
-            <a:r>
-              <a:rPr lang="en-US" sz="2000" dirty="0" smtClean="0"/>
-              <a:t>Problems</a:t>
-            </a:r>
-          </a:p>
-          <a:p>
-            <a:endParaRPr lang="en-US" sz="2000" dirty="0"/>
-          </a:p>
-        </p:txBody>
-      </p:sp>
-      <p:sp>
-        <p:nvSpPr>
-          <p:cNvPr id="9" name="Rounded Rectangle 8"/>
-          <p:cNvSpPr/>
-          <p:nvPr/>
-        </p:nvSpPr>
-        <p:spPr>
-          <a:xfrm>
-            <a:off x="14869477" y="17982258"/>
-            <a:ext cx="12115800" cy="11607191"/>
-          </a:xfrm>
-          <a:prstGeom prst="roundRect">
-            <a:avLst/>
-          </a:prstGeom>
-        </p:spPr>
-        <p:style>
-          <a:lnRef idx="1">
-            <a:schemeClr val="accent1"/>
-          </a:lnRef>
-          <a:fillRef idx="3">
-            <a:schemeClr val="accent1"/>
-          </a:fillRef>
-          <a:effectRef idx="2">
-            <a:schemeClr val="accent1"/>
-          </a:effectRef>
-          <a:fontRef idx="minor">
-            <a:schemeClr val="lt1"/>
-          </a:fontRef>
-        </p:style>
-        <p:txBody>
-          <a:bodyPr rtlCol="0" anchor="ctr"/>
-          <a:lstStyle/>
-          <a:p>
-            <a:r>
-              <a:rPr lang="en-US" sz="2000" dirty="0" smtClean="0"/>
-              <a:t>Second term plans</a:t>
-            </a:r>
-          </a:p>
-          <a:p>
-            <a:endParaRPr lang="en-US" sz="2000" dirty="0"/>
-          </a:p>
-        </p:txBody>
-      </p:sp>
-      <p:sp>
-        <p:nvSpPr>
-          <p:cNvPr id="10" name="Rounded Rectangle 9"/>
-          <p:cNvSpPr/>
-          <p:nvPr/>
-        </p:nvSpPr>
-        <p:spPr>
-          <a:xfrm>
-            <a:off x="30695900" y="14826583"/>
-            <a:ext cx="12115800" cy="11607191"/>
-          </a:xfrm>
-          <a:prstGeom prst="roundRect">
-            <a:avLst/>
-          </a:prstGeom>
-        </p:spPr>
-        <p:style>
-          <a:lnRef idx="1">
-            <a:schemeClr val="accent1"/>
-          </a:lnRef>
-          <a:fillRef idx="3">
-            <a:schemeClr val="accent1"/>
-          </a:fillRef>
-          <a:effectRef idx="2">
-            <a:schemeClr val="accent1"/>
-          </a:effectRef>
-          <a:fontRef idx="minor">
-            <a:schemeClr val="lt1"/>
-          </a:fontRef>
-        </p:style>
-        <p:txBody>
-          <a:bodyPr rtlCol="0" anchor="ctr"/>
-          <a:lstStyle/>
-          <a:p>
-            <a:r>
-              <a:rPr lang="en-US" sz="2000" dirty="0" smtClean="0"/>
-              <a:t>Algorithms</a:t>
-            </a:r>
-          </a:p>
-          <a:p>
-            <a:r>
-              <a:rPr lang="en-US" sz="2000" dirty="0" smtClean="0"/>
-              <a:t>HSEND - </a:t>
-            </a:r>
-            <a:endParaRPr lang="en-US" sz="2000" dirty="0"/>
-          </a:p>
-        </p:txBody>
-      </p:sp>
-      <p:sp>
-        <p:nvSpPr>
           <p:cNvPr id="12" name="Rectangle 11"/>
           <p:cNvSpPr/>
           <p:nvPr/>
         </p:nvSpPr>
         <p:spPr>
           <a:xfrm>
-            <a:off x="8785352" y="246738"/>
-            <a:ext cx="25233591" cy="1569660"/>
+            <a:off x="0" y="0"/>
+            <a:ext cx="42808525" cy="2646878"/>
           </a:xfrm>
           <a:prstGeom prst="rect">
             <a:avLst/>
           </a:prstGeom>
         </p:spPr>
         <p:txBody>
-          <a:bodyPr wrap="none">
+          <a:bodyPr wrap="square">
             <a:spAutoFit/>
           </a:bodyPr>
           <a:lstStyle/>
           <a:p>
             <a:pPr lvl="0" algn="ctr"/>
             <a:r>
-              <a:rPr lang="en-GB" sz="9600" b="1" dirty="0" smtClean="0">
+              <a:rPr lang="en-GB" sz="16600" b="1" dirty="0" smtClean="0">
                 <a:ln w="17780" cmpd="sng">
                   <a:solidFill>
                     <a:srgbClr val="FFFFFF"/>
@@ -3531,7 +3167,7 @@
               </a:rPr>
               <a:t>Towards Debugging of Wireless Sensor Networks</a:t>
             </a:r>
-            <a:endParaRPr lang="en-GB" sz="9600" b="1" dirty="0">
+            <a:endParaRPr lang="en-GB" sz="16600" b="1" dirty="0">
               <a:ln w="17780" cmpd="sng">
                 <a:solidFill>
                   <a:srgbClr val="FFFFFF"/>
@@ -3572,8 +3208,8 @@
         </p:blipFill>
         <p:spPr>
           <a:xfrm>
-            <a:off x="32982580" y="26433774"/>
-            <a:ext cx="9881596" cy="3841439"/>
+            <a:off x="32927662" y="26437931"/>
+            <a:ext cx="9880863" cy="3842043"/>
           </a:xfrm>
           <a:prstGeom prst="rect">
             <a:avLst/>
@@ -3588,8 +3224,8 @@
         </p:nvSpPr>
         <p:spPr>
           <a:xfrm>
-            <a:off x="1712277" y="1988452"/>
-            <a:ext cx="12115800" cy="3113836"/>
+            <a:off x="1140534" y="2942543"/>
+            <a:ext cx="12114901" cy="3750865"/>
           </a:xfrm>
           <a:prstGeom prst="roundRect">
             <a:avLst/>
@@ -3613,281 +3249,31 @@
           <a:bodyPr rtlCol="0" anchor="ctr"/>
           <a:lstStyle/>
           <a:p>
-            <a:r>
-              <a:rPr lang="en-US" sz="2000" dirty="0" smtClean="0"/>
+            <a:pPr algn="ctr"/>
+            <a:r>
+              <a:rPr lang="en-US" sz="4800" b="1" dirty="0" smtClean="0"/>
               <a:t>Abstract</a:t>
             </a:r>
           </a:p>
           <a:p>
             <a:r>
-              <a:rPr lang="en-US" sz="2000" dirty="0"/>
+              <a:rPr lang="en-US" sz="2400" dirty="0"/>
               <a:t>Debugging tools are vital for developers to produce reliable software, however traditional tools are less useful when developing software for new system paradigms such as wireless </a:t>
             </a:r>
             <a:r>
-              <a:rPr lang="en-US" sz="2000" dirty="0" smtClean="0"/>
+              <a:rPr lang="en-US" sz="2400" dirty="0" smtClean="0"/>
               <a:t>sensor </a:t>
             </a:r>
             <a:r>
-              <a:rPr lang="en-US" sz="2000" dirty="0"/>
+              <a:rPr lang="en-US" sz="2400" dirty="0"/>
               <a:t>networks. As wireless sensor networks become increasing prevalent in our lives it will become ever more important that the software they are running works reliably and to do this debugging tools will be required. This project investigates how predicates can be specified and checked on wireless sensor node and how errors can be reported to a base station. </a:t>
             </a:r>
+          </a:p>
+          <a:p>
             <a:endParaRPr lang="en-US" sz="2000" dirty="0"/>
           </a:p>
-          <a:p>
-            <a:endParaRPr lang="en-US" sz="2000" dirty="0"/>
-          </a:p>
-        </p:txBody>
-      </p:sp>
-      <p:graphicFrame>
-        <p:nvGraphicFramePr>
-          <p:cNvPr id="16" name="Table 15"/>
-          <p:cNvGraphicFramePr>
-            <a:graphicFrameLocks noGrp="1"/>
-          </p:cNvGraphicFramePr>
-          <p:nvPr>
-            <p:extLst>
-              <p:ext uri="{D42A27DB-BD31-4B8C-83A1-F6EECF244321}">
-                <p14:modId xmlns:p14="http://schemas.microsoft.com/office/powerpoint/2010/main" val="1360343994"/>
-              </p:ext>
-            </p:extLst>
-          </p:nvPr>
-        </p:nvGraphicFramePr>
-        <p:xfrm>
-          <a:off x="14869477" y="12176751"/>
-          <a:ext cx="5132919" cy="2773680"/>
-        </p:xfrm>
-        <a:graphic>
-          <a:graphicData uri="http://schemas.openxmlformats.org/drawingml/2006/table">
-            <a:tbl>
-              <a:tblPr firstRow="1" bandRow="1">
-                <a:tableStyleId>{5C22544A-7EE6-4342-B048-85BDC9FD1C3A}</a:tableStyleId>
-              </a:tblPr>
-              <a:tblGrid>
-                <a:gridCol w="2135719"/>
-                <a:gridCol w="2997200"/>
-              </a:tblGrid>
-              <a:tr h="370840">
-                <a:tc>
-                  <a:txBody>
-                    <a:bodyPr/>
-                    <a:lstStyle/>
-                    <a:p>
-                      <a:r>
-                        <a:rPr lang="en-US" sz="2000" dirty="0" smtClean="0"/>
-                        <a:t>Name</a:t>
-                      </a:r>
-                      <a:endParaRPr lang="en-US" sz="2000" dirty="0"/>
-                    </a:p>
-                  </a:txBody>
-                  <a:tcPr/>
-                </a:tc>
-                <a:tc>
-                  <a:txBody>
-                    <a:bodyPr/>
-                    <a:lstStyle/>
-                    <a:p>
-                      <a:r>
-                        <a:rPr lang="en-US" sz="2000" dirty="0" smtClean="0"/>
-                        <a:t>Role</a:t>
-                      </a:r>
-                      <a:endParaRPr lang="en-US" sz="2000" dirty="0"/>
-                    </a:p>
-                  </a:txBody>
-                  <a:tcPr/>
-                </a:tc>
-              </a:tr>
-              <a:tr h="370840">
-                <a:tc>
-                  <a:txBody>
-                    <a:bodyPr/>
-                    <a:lstStyle/>
-                    <a:p>
-                      <a:r>
-                        <a:rPr lang="en-US" sz="2000" dirty="0" smtClean="0"/>
-                        <a:t>Matthew Bradbury</a:t>
-                      </a:r>
-                      <a:endParaRPr lang="en-US" sz="2000" dirty="0"/>
-                    </a:p>
-                  </a:txBody>
-                  <a:tcPr/>
-                </a:tc>
-                <a:tc>
-                  <a:txBody>
-                    <a:bodyPr/>
-                    <a:lstStyle/>
-                    <a:p>
-                      <a:r>
-                        <a:rPr lang="en-US" sz="2000" dirty="0" smtClean="0"/>
-                        <a:t>Group Leader</a:t>
-                      </a:r>
-                      <a:endParaRPr lang="en-US" sz="2000" dirty="0"/>
-                    </a:p>
-                  </a:txBody>
-                  <a:tcPr/>
-                </a:tc>
-              </a:tr>
-              <a:tr h="370840">
-                <a:tc>
-                  <a:txBody>
-                    <a:bodyPr/>
-                    <a:lstStyle/>
-                    <a:p>
-                      <a:r>
-                        <a:rPr lang="en-US" sz="2000" dirty="0" smtClean="0"/>
-                        <a:t>Tim Law</a:t>
-                      </a:r>
-                      <a:endParaRPr lang="en-US" sz="2000" dirty="0"/>
-                    </a:p>
-                  </a:txBody>
-                  <a:tcPr/>
-                </a:tc>
-                <a:tc>
-                  <a:txBody>
-                    <a:bodyPr/>
-                    <a:lstStyle/>
-                    <a:p>
-                      <a:r>
-                        <a:rPr lang="en-US" sz="2000" dirty="0" smtClean="0"/>
-                        <a:t>Developer and Researcher</a:t>
-                      </a:r>
-                      <a:endParaRPr lang="en-US" sz="2000" dirty="0"/>
-                    </a:p>
-                  </a:txBody>
-                  <a:tcPr/>
-                </a:tc>
-              </a:tr>
-              <a:tr h="370840">
-                <a:tc>
-                  <a:txBody>
-                    <a:bodyPr/>
-                    <a:lstStyle/>
-                    <a:p>
-                      <a:r>
-                        <a:rPr lang="en-US" sz="2000" dirty="0" smtClean="0"/>
-                        <a:t>Ivan Leong</a:t>
-                      </a:r>
-                      <a:endParaRPr lang="en-US" sz="2000" dirty="0"/>
-                    </a:p>
-                  </a:txBody>
-                  <a:tcPr/>
-                </a:tc>
-                <a:tc>
-                  <a:txBody>
-                    <a:bodyPr/>
-                    <a:lstStyle/>
-                    <a:p>
-                      <a:r>
-                        <a:rPr lang="en-US" sz="2000" dirty="0" smtClean="0"/>
-                        <a:t>Developer and Tester</a:t>
-                      </a:r>
-                      <a:endParaRPr lang="en-US" sz="2000" dirty="0"/>
-                    </a:p>
-                  </a:txBody>
-                  <a:tcPr/>
-                </a:tc>
-              </a:tr>
-              <a:tr h="370840">
-                <a:tc>
-                  <a:txBody>
-                    <a:bodyPr/>
-                    <a:lstStyle/>
-                    <a:p>
-                      <a:r>
-                        <a:rPr lang="en-US" sz="2000" dirty="0" smtClean="0"/>
-                        <a:t>Daniel Robertson</a:t>
-                      </a:r>
-                      <a:endParaRPr lang="en-US" sz="2000" dirty="0"/>
-                    </a:p>
-                  </a:txBody>
-                  <a:tcPr/>
-                </a:tc>
-                <a:tc>
-                  <a:txBody>
-                    <a:bodyPr/>
-                    <a:lstStyle/>
-                    <a:p>
-                      <a:r>
-                        <a:rPr lang="en-US" sz="2000" dirty="0" smtClean="0"/>
-                        <a:t>Project Manager</a:t>
-                      </a:r>
-                      <a:endParaRPr lang="en-US" sz="2000" dirty="0"/>
-                    </a:p>
-                  </a:txBody>
-                  <a:tcPr/>
-                </a:tc>
-              </a:tr>
-              <a:tr h="370840">
-                <a:tc>
-                  <a:txBody>
-                    <a:bodyPr/>
-                    <a:lstStyle/>
-                    <a:p>
-                      <a:r>
-                        <a:rPr lang="en-US" sz="2000" dirty="0" err="1" smtClean="0"/>
-                        <a:t>Amit</a:t>
-                      </a:r>
-                      <a:r>
-                        <a:rPr lang="en-US" sz="2000" dirty="0" smtClean="0"/>
-                        <a:t> Shah</a:t>
-                      </a:r>
-                      <a:endParaRPr lang="en-US" sz="2000" dirty="0"/>
-                    </a:p>
-                  </a:txBody>
-                  <a:tcPr/>
-                </a:tc>
-                <a:tc>
-                  <a:txBody>
-                    <a:bodyPr/>
-                    <a:lstStyle/>
-                    <a:p>
-                      <a:r>
-                        <a:rPr lang="en-US" sz="2000" dirty="0" smtClean="0"/>
-                        <a:t>Technical leader</a:t>
-                      </a:r>
-                      <a:endParaRPr lang="en-US" sz="2000" dirty="0"/>
-                    </a:p>
-                  </a:txBody>
-                  <a:tcPr/>
-                </a:tc>
-              </a:tr>
-              <a:tr h="370840">
-                <a:tc>
-                  <a:txBody>
-                    <a:bodyPr/>
-                    <a:lstStyle/>
-                    <a:p>
-                      <a:r>
-                        <a:rPr lang="en-US" sz="2000" dirty="0" smtClean="0"/>
-                        <a:t>Joe </a:t>
-                      </a:r>
-                      <a:r>
-                        <a:rPr lang="en-US" sz="2000" dirty="0" err="1" smtClean="0"/>
-                        <a:t>Yarnall</a:t>
-                      </a:r>
-                      <a:endParaRPr lang="en-US" sz="2000" dirty="0"/>
-                    </a:p>
-                  </a:txBody>
-                  <a:tcPr/>
-                </a:tc>
-                <a:tc>
-                  <a:txBody>
-                    <a:bodyPr/>
-                    <a:lstStyle/>
-                    <a:p>
-                      <a:r>
-                        <a:rPr lang="en-US" sz="2000" dirty="0" smtClean="0"/>
-                        <a:t>Developer and Tester</a:t>
-                      </a:r>
-                      <a:endParaRPr lang="en-US" sz="2000" dirty="0"/>
-                    </a:p>
-                  </a:txBody>
-                  <a:tcPr/>
-                </a:tc>
-              </a:tr>
-            </a:tbl>
-          </a:graphicData>
-        </a:graphic>
-      </p:graphicFrame>
+        </p:txBody>
+      </p:sp>
       <p:pic>
         <p:nvPicPr>
           <p:cNvPr id="21" name="Picture 20" descr="Screen Shot 2012-11-27 at 12.57.53.png"/>
@@ -3910,8 +3296,8 @@
         </p:blipFill>
         <p:spPr>
           <a:xfrm>
-            <a:off x="0" y="22881919"/>
-            <a:ext cx="10998200" cy="7393294"/>
+            <a:off x="15905569" y="2942543"/>
+            <a:ext cx="10997384" cy="7394457"/>
           </a:xfrm>
           <a:prstGeom prst="rect">
             <a:avLst/>
@@ -3926,7 +3312,7 @@
           </p:cNvPicPr>
           <p:nvPr/>
         </p:nvPicPr>
-        <p:blipFill>
+        <p:blipFill rotWithShape="1">
           <a:blip r:embed="rId4">
             <a:extLst>
               <a:ext uri="{28A0092B-C50C-407E-A947-70E740481C1C}">
@@ -3934,14 +3320,13 @@
               </a:ext>
             </a:extLst>
           </a:blip>
-          <a:stretch>
-            <a:fillRect/>
-          </a:stretch>
+          <a:srcRect b="5641"/>
+          <a:stretch/>
         </p:blipFill>
         <p:spPr>
           <a:xfrm>
-            <a:off x="35968076" y="-49305"/>
-            <a:ext cx="6896100" cy="4152490"/>
+            <a:off x="17956466" y="12390397"/>
+            <a:ext cx="6895589" cy="3918880"/>
           </a:xfrm>
           <a:prstGeom prst="rect">
             <a:avLst/>
@@ -3956,8 +3341,8 @@
         </p:nvSpPr>
         <p:spPr>
           <a:xfrm>
-            <a:off x="15761455" y="1988453"/>
-            <a:ext cx="12115800" cy="3113836"/>
+            <a:off x="29982019" y="2942544"/>
+            <a:ext cx="12114901" cy="3750864"/>
           </a:xfrm>
           <a:prstGeom prst="roundRect">
             <a:avLst/>
@@ -3981,54 +3366,981 @@
           <a:bodyPr rtlCol="0" anchor="ctr"/>
           <a:lstStyle/>
           <a:p>
+            <a:pPr algn="ctr"/>
+            <a:r>
+              <a:rPr lang="en-US" sz="4800" b="1" dirty="0" smtClean="0"/>
+              <a:t>Background</a:t>
+            </a:r>
+          </a:p>
+          <a:p>
+            <a:r>
+              <a:rPr lang="en-US" sz="2400" dirty="0" smtClean="0"/>
+              <a:t>Wireless Sensor </a:t>
+            </a:r>
+            <a:r>
+              <a:rPr lang="en-US" sz="2400" dirty="0"/>
+              <a:t>N</a:t>
+            </a:r>
+            <a:r>
+              <a:rPr lang="en-US" sz="2400" dirty="0" smtClean="0"/>
+              <a:t>etworks (WSNs) are becoming increasingly prevalent due to decreasing hardware costs and </a:t>
+            </a:r>
+            <a:r>
+              <a:rPr lang="en-US" sz="2400" dirty="0"/>
+              <a:t>hardware size. Therefore, it is important that we consider issues with them now, so we are prepared for when they become widely used. A major issue with any system is that it may contain bugs, fortunately, there are many well known methodologies for detecting and eliminating </a:t>
+            </a:r>
+            <a:r>
+              <a:rPr lang="en-US" sz="2400" dirty="0" smtClean="0"/>
+              <a:t>bugs. </a:t>
+            </a:r>
+            <a:r>
+              <a:rPr lang="en-US" sz="2400" dirty="0"/>
+              <a:t>However, in distributed systems there are additional challenges to </a:t>
+            </a:r>
+            <a:r>
+              <a:rPr lang="en-US" sz="2400" dirty="0" smtClean="0"/>
+              <a:t>overcome </a:t>
+            </a:r>
+            <a:r>
+              <a:rPr lang="en-US" sz="2400" dirty="0"/>
+              <a:t>and there are additional challenges to overcome with WSNs due to the energy constrained environment they work </a:t>
+            </a:r>
+            <a:r>
+              <a:rPr lang="en-US" sz="2400" dirty="0" smtClean="0"/>
+              <a:t>in.</a:t>
+            </a:r>
+          </a:p>
+          <a:p>
+            <a:endParaRPr lang="en-US" sz="2000" dirty="0"/>
+          </a:p>
+        </p:txBody>
+      </p:sp>
+      <p:sp>
+        <p:nvSpPr>
+          <p:cNvPr id="15" name="Rounded Rectangle 14"/>
+          <p:cNvSpPr/>
+          <p:nvPr/>
+        </p:nvSpPr>
+        <p:spPr>
+          <a:xfrm>
+            <a:off x="1140534" y="7465581"/>
+            <a:ext cx="12114901" cy="9849632"/>
+          </a:xfrm>
+          <a:prstGeom prst="roundRect">
+            <a:avLst/>
+          </a:prstGeom>
+        </p:spPr>
+        <p:style>
+          <a:lnRef idx="1">
+            <a:schemeClr val="accent1"/>
+          </a:lnRef>
+          <a:fillRef idx="3">
+            <a:schemeClr val="accent1"/>
+          </a:fillRef>
+          <a:effectRef idx="2">
+            <a:schemeClr val="accent1"/>
+          </a:effectRef>
+          <a:fontRef idx="minor">
+            <a:schemeClr val="lt1"/>
+          </a:fontRef>
+        </p:style>
+        <p:txBody>
+          <a:bodyPr rtlCol="0" anchor="ctr"/>
+          <a:lstStyle/>
+          <a:p>
+            <a:pPr algn="ctr"/>
+            <a:r>
+              <a:rPr lang="en-US" sz="4800" b="1" dirty="0"/>
+              <a:t>Predicate Specification</a:t>
+            </a:r>
+          </a:p>
+          <a:p>
+            <a:endParaRPr lang="en-US" sz="2000" dirty="0"/>
+          </a:p>
+          <a:p>
             <a:r>
               <a:rPr lang="en-US" sz="2000" dirty="0" smtClean="0"/>
-              <a:t>Background</a:t>
-            </a:r>
+              <a:t>One of the requirements of our project is that we wished to specify predicates to be checked, not just at compile time, but also at run time. The main reason is that the needs of a system will change over time.</a:t>
+            </a:r>
+          </a:p>
+          <a:p>
+            <a:endParaRPr lang="en-US" sz="2000" dirty="0"/>
           </a:p>
           <a:p>
             <a:r>
               <a:rPr lang="en-US" sz="2000" dirty="0" smtClean="0"/>
-              <a:t>Wireless Sensor </a:t>
+              <a:t>We </a:t>
             </a:r>
             <a:r>
               <a:rPr lang="en-US" sz="2000" dirty="0"/>
-              <a:t>N</a:t>
+              <a:t>explored a variety of methods of specifying predicates for evaluation, with an aim to enable an expressive </a:t>
             </a:r>
             <a:r>
               <a:rPr lang="en-US" sz="2000" dirty="0" smtClean="0"/>
-              <a:t>etworks (WSNs) are becoming increasingly prevalent due to decreasing hardware costs and </a:t>
+              <a:t>syntax. However, we found that existing solutions  </a:t>
             </a:r>
             <a:r>
               <a:rPr lang="en-US" sz="2000" dirty="0"/>
-              <a:t>hardware size. Therefore, it is important that we consider issues with them now, so we are prepared for when they become widely used. A major issue with any system is that it may contain bugs, fortunately, there are many well known methodologies for detecting and eliminating </a:t>
+              <a:t>– </a:t>
             </a:r>
             <a:r>
               <a:rPr lang="en-US" sz="2000" dirty="0" smtClean="0"/>
-              <a:t>bugs. </a:t>
+              <a:t> such as </a:t>
+            </a:r>
+            <a:r>
+              <a:rPr lang="en-US" sz="2000" dirty="0" err="1" smtClean="0"/>
+              <a:t>eLua</a:t>
+            </a:r>
+            <a:r>
+              <a:rPr lang="en-US" sz="2000" dirty="0" smtClean="0"/>
+              <a:t> (Embedded </a:t>
+            </a:r>
+            <a:r>
+              <a:rPr lang="en-US" sz="2000" dirty="0" err="1" smtClean="0"/>
+              <a:t>Lua</a:t>
+            </a:r>
+            <a:r>
+              <a:rPr lang="en-US" sz="2000" dirty="0" smtClean="0"/>
+              <a:t>) [CITE] and Wren [CITE] – were not suitable due to their high resource requirements or lack of desired features.</a:t>
+            </a:r>
+            <a:endParaRPr lang="en-US" sz="2000" dirty="0"/>
+          </a:p>
+          <a:p>
+            <a:endParaRPr lang="en-US" sz="2000" dirty="0"/>
+          </a:p>
+          <a:p>
+            <a:r>
+              <a:rPr lang="en-US" sz="2000" dirty="0" smtClean="0"/>
+              <a:t>Thus, we implemented our </a:t>
             </a:r>
             <a:r>
               <a:rPr lang="en-US" sz="2000" dirty="0"/>
-              <a:t>However, in distributed systems there are additional challenges to </a:t>
+              <a:t>own predicate-based scripting language that provided the features we wanted, and </a:t>
             </a:r>
             <a:r>
               <a:rPr lang="en-US" sz="2000" dirty="0" smtClean="0"/>
-              <a:t>overcome </a:t>
+              <a:t>the ability </a:t>
             </a:r>
             <a:r>
               <a:rPr lang="en-US" sz="2000" dirty="0"/>
-              <a:t>and there are additional challenges to overcome with WSNs due to the energy constrained environment they work </a:t>
+              <a:t>to run on the limited resources available. We designed a syntax that enabled us to target nodes and </a:t>
+            </a:r>
+            <a:r>
+              <a:rPr lang="en-US" sz="2000" dirty="0" err="1"/>
+              <a:t>utilise</a:t>
+            </a:r>
+            <a:r>
+              <a:rPr lang="en-US" sz="2000" dirty="0"/>
+              <a:t> built in functions to iterate over sets of nodes when evaluating first-order predicates</a:t>
             </a:r>
             <a:r>
               <a:rPr lang="en-US" sz="2000" dirty="0" smtClean="0"/>
-              <a:t>in.</a:t>
+              <a:t>.</a:t>
             </a:r>
           </a:p>
           <a:p>
             <a:endParaRPr lang="en-US" sz="2000" dirty="0"/>
           </a:p>
-        </p:txBody>
-      </p:sp>
+          <a:p>
+            <a:r>
+              <a:rPr lang="en-US" sz="2000" dirty="0"/>
+              <a:t>In order to </a:t>
+            </a:r>
+            <a:r>
+              <a:rPr lang="en-US" sz="2000" dirty="0" err="1"/>
+              <a:t>realise</a:t>
+            </a:r>
+            <a:r>
+              <a:rPr lang="en-US" sz="2000" dirty="0"/>
+              <a:t> this, we have implemented a parser, assembler and virtual machine. The base application will compile new predicates and transmit the assembled </a:t>
+            </a:r>
+            <a:r>
+              <a:rPr lang="en-US" sz="2000" dirty="0" smtClean="0"/>
+              <a:t> </a:t>
+            </a:r>
+            <a:r>
+              <a:rPr lang="en-US" sz="2000" dirty="0" err="1" smtClean="0"/>
+              <a:t>bytecode</a:t>
+            </a:r>
+            <a:r>
+              <a:rPr lang="en-US" sz="2000" dirty="0" smtClean="0"/>
+              <a:t> </a:t>
+            </a:r>
+            <a:r>
+              <a:rPr lang="en-US" sz="2000" dirty="0"/>
+              <a:t>to nodes for execution.</a:t>
+            </a:r>
+          </a:p>
+          <a:p>
+            <a:endParaRPr lang="en-US" sz="2000" dirty="0"/>
+          </a:p>
+          <a:p>
+            <a:r>
+              <a:rPr lang="en-US" sz="2000" dirty="0"/>
+              <a:t>As an example of a predicate specified in our language, the following snippet will check no nodes within a two-hop </a:t>
+            </a:r>
+            <a:r>
+              <a:rPr lang="en-US" sz="2000" dirty="0" err="1"/>
+              <a:t>neighbourhood</a:t>
+            </a:r>
+            <a:r>
+              <a:rPr lang="en-US" sz="2000" dirty="0"/>
+              <a:t> have clashing </a:t>
+            </a:r>
+            <a:r>
+              <a:rPr lang="en-US" sz="2000" dirty="0" smtClean="0"/>
+              <a:t>slots. This is a property that should hold in systems using the TDMA</a:t>
+            </a:r>
+            <a:r>
+              <a:rPr lang="en-US" sz="2000" dirty="0"/>
+              <a:t> </a:t>
+            </a:r>
+            <a:r>
+              <a:rPr lang="en-US" sz="2000" dirty="0" smtClean="0"/>
+              <a:t>(time division multiple access) MAC protocol.</a:t>
+            </a:r>
+          </a:p>
+          <a:p>
+            <a:endParaRPr lang="en-US" sz="2000" dirty="0"/>
+          </a:p>
+          <a:p>
+            <a:endParaRPr lang="en-US" sz="2000" dirty="0" smtClean="0"/>
+          </a:p>
+          <a:p>
+            <a:endParaRPr lang="en-US" sz="2000" dirty="0"/>
+          </a:p>
+          <a:p>
+            <a:endParaRPr lang="en-US" sz="2000" dirty="0" smtClean="0"/>
+          </a:p>
+          <a:p>
+            <a:endParaRPr lang="en-US" sz="2000" dirty="0" smtClean="0"/>
+          </a:p>
+          <a:p>
+            <a:endParaRPr lang="en-US" sz="2000" dirty="0" smtClean="0"/>
+          </a:p>
+          <a:p>
+            <a:endParaRPr lang="en-US" sz="2000" dirty="0"/>
+          </a:p>
+          <a:p>
+            <a:endParaRPr lang="en-US" sz="2000" dirty="0"/>
+          </a:p>
+          <a:p>
+            <a:pPr algn="ctr"/>
+            <a:endParaRPr lang="en-US" sz="2000" dirty="0"/>
+          </a:p>
+        </p:txBody>
+      </p:sp>
+      <p:sp>
+        <p:nvSpPr>
+          <p:cNvPr id="17" name="Rounded Rectangle 16"/>
+          <p:cNvSpPr/>
+          <p:nvPr/>
+        </p:nvSpPr>
+        <p:spPr>
+          <a:xfrm>
+            <a:off x="1140534" y="19042139"/>
+            <a:ext cx="12114901" cy="8782626"/>
+          </a:xfrm>
+          <a:prstGeom prst="roundRect">
+            <a:avLst/>
+          </a:prstGeom>
+        </p:spPr>
+        <p:style>
+          <a:lnRef idx="1">
+            <a:schemeClr val="accent1"/>
+          </a:lnRef>
+          <a:fillRef idx="3">
+            <a:schemeClr val="accent1"/>
+          </a:fillRef>
+          <a:effectRef idx="2">
+            <a:schemeClr val="accent1"/>
+          </a:effectRef>
+          <a:fontRef idx="minor">
+            <a:schemeClr val="lt1"/>
+          </a:fontRef>
+        </p:style>
+        <p:txBody>
+          <a:bodyPr rtlCol="0" anchor="ctr"/>
+          <a:lstStyle/>
+          <a:p>
+            <a:pPr algn="ctr"/>
+            <a:r>
+              <a:rPr lang="en-US" sz="4800" b="1" dirty="0" smtClean="0"/>
+              <a:t>Project Management</a:t>
+            </a:r>
+            <a:endParaRPr lang="en-US" sz="2400" dirty="0"/>
+          </a:p>
+        </p:txBody>
+      </p:sp>
+      <p:graphicFrame>
+        <p:nvGraphicFramePr>
+          <p:cNvPr id="16" name="Table 15"/>
+          <p:cNvGraphicFramePr>
+            <a:graphicFrameLocks noGrp="1"/>
+          </p:cNvGraphicFramePr>
+          <p:nvPr>
+            <p:extLst>
+              <p:ext uri="{D42A27DB-BD31-4B8C-83A1-F6EECF244321}">
+                <p14:modId xmlns:p14="http://schemas.microsoft.com/office/powerpoint/2010/main" val="2839538118"/>
+              </p:ext>
+            </p:extLst>
+          </p:nvPr>
+        </p:nvGraphicFramePr>
+        <p:xfrm>
+          <a:off x="4317391" y="24347852"/>
+          <a:ext cx="5132539" cy="2774114"/>
+        </p:xfrm>
+        <a:graphic>
+          <a:graphicData uri="http://schemas.openxmlformats.org/drawingml/2006/table">
+            <a:tbl>
+              <a:tblPr firstRow="1" bandRow="1">
+                <a:tableStyleId>{5C22544A-7EE6-4342-B048-85BDC9FD1C3A}</a:tableStyleId>
+              </a:tblPr>
+              <a:tblGrid>
+                <a:gridCol w="2135561"/>
+                <a:gridCol w="2996978"/>
+              </a:tblGrid>
+              <a:tr h="396302">
+                <a:tc>
+                  <a:txBody>
+                    <a:bodyPr/>
+                    <a:lstStyle/>
+                    <a:p>
+                      <a:r>
+                        <a:rPr lang="en-US" sz="2000" dirty="0" smtClean="0"/>
+                        <a:t>Name</a:t>
+                      </a:r>
+                      <a:endParaRPr lang="en-US" sz="2000" dirty="0"/>
+                    </a:p>
+                  </a:txBody>
+                  <a:tcPr marL="91433" marR="91433" marT="45727" marB="45727"/>
+                </a:tc>
+                <a:tc>
+                  <a:txBody>
+                    <a:bodyPr/>
+                    <a:lstStyle/>
+                    <a:p>
+                      <a:r>
+                        <a:rPr lang="en-US" sz="2000" dirty="0" smtClean="0"/>
+                        <a:t>Role</a:t>
+                      </a:r>
+                      <a:endParaRPr lang="en-US" sz="2000" dirty="0"/>
+                    </a:p>
+                  </a:txBody>
+                  <a:tcPr marL="91433" marR="91433" marT="45727" marB="45727"/>
+                </a:tc>
+              </a:tr>
+              <a:tr h="396302">
+                <a:tc>
+                  <a:txBody>
+                    <a:bodyPr/>
+                    <a:lstStyle/>
+                    <a:p>
+                      <a:r>
+                        <a:rPr lang="en-US" sz="2000" dirty="0" smtClean="0"/>
+                        <a:t>Matthew Bradbury</a:t>
+                      </a:r>
+                      <a:endParaRPr lang="en-US" sz="2000" dirty="0"/>
+                    </a:p>
+                  </a:txBody>
+                  <a:tcPr marL="91433" marR="91433" marT="45727" marB="45727"/>
+                </a:tc>
+                <a:tc>
+                  <a:txBody>
+                    <a:bodyPr/>
+                    <a:lstStyle/>
+                    <a:p>
+                      <a:r>
+                        <a:rPr lang="en-US" sz="2000" dirty="0" smtClean="0"/>
+                        <a:t>Group Leader</a:t>
+                      </a:r>
+                      <a:endParaRPr lang="en-US" sz="2000" dirty="0"/>
+                    </a:p>
+                  </a:txBody>
+                  <a:tcPr marL="91433" marR="91433" marT="45727" marB="45727"/>
+                </a:tc>
+              </a:tr>
+              <a:tr h="396302">
+                <a:tc>
+                  <a:txBody>
+                    <a:bodyPr/>
+                    <a:lstStyle/>
+                    <a:p>
+                      <a:r>
+                        <a:rPr lang="en-US" sz="2000" dirty="0" smtClean="0"/>
+                        <a:t>Tim Law</a:t>
+                      </a:r>
+                      <a:endParaRPr lang="en-US" sz="2000" dirty="0"/>
+                    </a:p>
+                  </a:txBody>
+                  <a:tcPr marL="91433" marR="91433" marT="45727" marB="45727"/>
+                </a:tc>
+                <a:tc>
+                  <a:txBody>
+                    <a:bodyPr/>
+                    <a:lstStyle/>
+                    <a:p>
+                      <a:r>
+                        <a:rPr lang="en-US" sz="2000" dirty="0" smtClean="0"/>
+                        <a:t>Developer and Researcher</a:t>
+                      </a:r>
+                      <a:endParaRPr lang="en-US" sz="2000" dirty="0"/>
+                    </a:p>
+                  </a:txBody>
+                  <a:tcPr marL="91433" marR="91433" marT="45727" marB="45727"/>
+                </a:tc>
+              </a:tr>
+              <a:tr h="396302">
+                <a:tc>
+                  <a:txBody>
+                    <a:bodyPr/>
+                    <a:lstStyle/>
+                    <a:p>
+                      <a:r>
+                        <a:rPr lang="en-US" sz="2000" dirty="0" smtClean="0"/>
+                        <a:t>Ivan Leong</a:t>
+                      </a:r>
+                      <a:endParaRPr lang="en-US" sz="2000" dirty="0"/>
+                    </a:p>
+                  </a:txBody>
+                  <a:tcPr marL="91433" marR="91433" marT="45727" marB="45727"/>
+                </a:tc>
+                <a:tc>
+                  <a:txBody>
+                    <a:bodyPr/>
+                    <a:lstStyle/>
+                    <a:p>
+                      <a:r>
+                        <a:rPr lang="en-US" sz="2000" dirty="0" smtClean="0"/>
+                        <a:t>Developer and Tester</a:t>
+                      </a:r>
+                      <a:endParaRPr lang="en-US" sz="2000" dirty="0"/>
+                    </a:p>
+                  </a:txBody>
+                  <a:tcPr marL="91433" marR="91433" marT="45727" marB="45727"/>
+                </a:tc>
+              </a:tr>
+              <a:tr h="396302">
+                <a:tc>
+                  <a:txBody>
+                    <a:bodyPr/>
+                    <a:lstStyle/>
+                    <a:p>
+                      <a:r>
+                        <a:rPr lang="en-US" sz="2000" dirty="0" smtClean="0"/>
+                        <a:t>Daniel Robertson</a:t>
+                      </a:r>
+                      <a:endParaRPr lang="en-US" sz="2000" dirty="0"/>
+                    </a:p>
+                  </a:txBody>
+                  <a:tcPr marL="91433" marR="91433" marT="45727" marB="45727"/>
+                </a:tc>
+                <a:tc>
+                  <a:txBody>
+                    <a:bodyPr/>
+                    <a:lstStyle/>
+                    <a:p>
+                      <a:r>
+                        <a:rPr lang="en-US" sz="2000" dirty="0" smtClean="0"/>
+                        <a:t>Project Manager</a:t>
+                      </a:r>
+                      <a:endParaRPr lang="en-US" sz="2000" dirty="0"/>
+                    </a:p>
+                  </a:txBody>
+                  <a:tcPr marL="91433" marR="91433" marT="45727" marB="45727"/>
+                </a:tc>
+              </a:tr>
+              <a:tr h="396302">
+                <a:tc>
+                  <a:txBody>
+                    <a:bodyPr/>
+                    <a:lstStyle/>
+                    <a:p>
+                      <a:r>
+                        <a:rPr lang="en-US" sz="2000" dirty="0" err="1" smtClean="0"/>
+                        <a:t>Amit</a:t>
+                      </a:r>
+                      <a:r>
+                        <a:rPr lang="en-US" sz="2000" dirty="0" smtClean="0"/>
+                        <a:t> Shah</a:t>
+                      </a:r>
+                      <a:endParaRPr lang="en-US" sz="2000" dirty="0"/>
+                    </a:p>
+                  </a:txBody>
+                  <a:tcPr marL="91433" marR="91433" marT="45727" marB="45727"/>
+                </a:tc>
+                <a:tc>
+                  <a:txBody>
+                    <a:bodyPr/>
+                    <a:lstStyle/>
+                    <a:p>
+                      <a:r>
+                        <a:rPr lang="en-US" sz="2000" dirty="0" smtClean="0"/>
+                        <a:t>Technical leader</a:t>
+                      </a:r>
+                      <a:endParaRPr lang="en-US" sz="2000" dirty="0"/>
+                    </a:p>
+                  </a:txBody>
+                  <a:tcPr marL="91433" marR="91433" marT="45727" marB="45727"/>
+                </a:tc>
+              </a:tr>
+              <a:tr h="396302">
+                <a:tc>
+                  <a:txBody>
+                    <a:bodyPr/>
+                    <a:lstStyle/>
+                    <a:p>
+                      <a:r>
+                        <a:rPr lang="en-US" sz="2000" dirty="0" smtClean="0"/>
+                        <a:t>Joe </a:t>
+                      </a:r>
+                      <a:r>
+                        <a:rPr lang="en-US" sz="2000" dirty="0" err="1" smtClean="0"/>
+                        <a:t>Yarnall</a:t>
+                      </a:r>
+                      <a:endParaRPr lang="en-US" sz="2000" dirty="0"/>
+                    </a:p>
+                  </a:txBody>
+                  <a:tcPr marL="91433" marR="91433" marT="45727" marB="45727"/>
+                </a:tc>
+                <a:tc>
+                  <a:txBody>
+                    <a:bodyPr/>
+                    <a:lstStyle/>
+                    <a:p>
+                      <a:r>
+                        <a:rPr lang="en-US" sz="2000" dirty="0" smtClean="0"/>
+                        <a:t>Developer and Tester</a:t>
+                      </a:r>
+                      <a:endParaRPr lang="en-US" sz="2000" dirty="0"/>
+                    </a:p>
+                  </a:txBody>
+                  <a:tcPr marL="91433" marR="91433" marT="45727" marB="45727"/>
+                </a:tc>
+              </a:tr>
+            </a:tbl>
+          </a:graphicData>
+        </a:graphic>
+      </p:graphicFrame>
+      <p:sp>
+        <p:nvSpPr>
+          <p:cNvPr id="18" name="Rounded Rectangle 17"/>
+          <p:cNvSpPr/>
+          <p:nvPr/>
+        </p:nvSpPr>
+        <p:spPr>
+          <a:xfrm>
+            <a:off x="29982019" y="17706645"/>
+            <a:ext cx="12114901" cy="8782626"/>
+          </a:xfrm>
+          <a:prstGeom prst="roundRect">
+            <a:avLst/>
+          </a:prstGeom>
+        </p:spPr>
+        <p:style>
+          <a:lnRef idx="1">
+            <a:schemeClr val="accent1"/>
+          </a:lnRef>
+          <a:fillRef idx="3">
+            <a:schemeClr val="accent1"/>
+          </a:fillRef>
+          <a:effectRef idx="2">
+            <a:schemeClr val="accent1"/>
+          </a:effectRef>
+          <a:fontRef idx="minor">
+            <a:schemeClr val="lt1"/>
+          </a:fontRef>
+        </p:style>
+        <p:txBody>
+          <a:bodyPr rtlCol="0" anchor="ctr"/>
+          <a:lstStyle/>
+          <a:p>
+            <a:pPr algn="ctr"/>
+            <a:r>
+              <a:rPr lang="en-US" sz="4800" b="1" dirty="0" smtClean="0"/>
+              <a:t>Second Term Plan</a:t>
+            </a:r>
+            <a:endParaRPr lang="en-US" sz="2400" dirty="0"/>
+          </a:p>
+        </p:txBody>
+      </p:sp>
+      <p:sp>
+        <p:nvSpPr>
+          <p:cNvPr id="19" name="Rounded Rectangle 18"/>
+          <p:cNvSpPr/>
+          <p:nvPr/>
+        </p:nvSpPr>
+        <p:spPr>
+          <a:xfrm>
+            <a:off x="15346811" y="17315212"/>
+            <a:ext cx="12114901" cy="8782626"/>
+          </a:xfrm>
+          <a:prstGeom prst="roundRect">
+            <a:avLst/>
+          </a:prstGeom>
+        </p:spPr>
+        <p:style>
+          <a:lnRef idx="1">
+            <a:schemeClr val="accent1"/>
+          </a:lnRef>
+          <a:fillRef idx="3">
+            <a:schemeClr val="accent1"/>
+          </a:fillRef>
+          <a:effectRef idx="2">
+            <a:schemeClr val="accent1"/>
+          </a:effectRef>
+          <a:fontRef idx="minor">
+            <a:schemeClr val="lt1"/>
+          </a:fontRef>
+        </p:style>
+        <p:txBody>
+          <a:bodyPr rtlCol="0" anchor="ctr"/>
+          <a:lstStyle/>
+          <a:p>
+            <a:pPr algn="ctr"/>
+            <a:r>
+              <a:rPr lang="en-US" sz="4800" b="1" dirty="0" smtClean="0"/>
+              <a:t>Algorithms</a:t>
+            </a:r>
+            <a:endParaRPr lang="en-US" sz="2000" dirty="0"/>
+          </a:p>
+        </p:txBody>
+      </p:sp>
+      <p:sp>
+        <p:nvSpPr>
+          <p:cNvPr id="20" name="Rounded Rectangle 19"/>
+          <p:cNvSpPr/>
+          <p:nvPr/>
+        </p:nvSpPr>
+        <p:spPr>
+          <a:xfrm>
+            <a:off x="29982017" y="7465581"/>
+            <a:ext cx="12114901" cy="8782626"/>
+          </a:xfrm>
+          <a:prstGeom prst="roundRect">
+            <a:avLst/>
+          </a:prstGeom>
+        </p:spPr>
+        <p:style>
+          <a:lnRef idx="1">
+            <a:schemeClr val="accent1"/>
+          </a:lnRef>
+          <a:fillRef idx="3">
+            <a:schemeClr val="accent1"/>
+          </a:fillRef>
+          <a:effectRef idx="2">
+            <a:schemeClr val="accent1"/>
+          </a:effectRef>
+          <a:fontRef idx="minor">
+            <a:schemeClr val="lt1"/>
+          </a:fontRef>
+        </p:style>
+        <p:txBody>
+          <a:bodyPr rtlCol="0" anchor="ctr"/>
+          <a:lstStyle/>
+          <a:p>
+            <a:pPr algn="ctr"/>
+            <a:r>
+              <a:rPr lang="en-US" sz="4800" b="1" dirty="0" smtClean="0"/>
+              <a:t>Issues Encountered</a:t>
+            </a:r>
+            <a:endParaRPr lang="en-US" sz="2400" dirty="0"/>
+          </a:p>
+        </p:txBody>
+      </p:sp>
+      <p:sp>
+        <p:nvSpPr>
+          <p:cNvPr id="25" name="Rounded Rectangle 24"/>
+          <p:cNvSpPr/>
+          <p:nvPr/>
+        </p:nvSpPr>
+        <p:spPr>
+          <a:xfrm>
+            <a:off x="19604735" y="27151267"/>
+            <a:ext cx="12951943" cy="2415370"/>
+          </a:xfrm>
+          <a:prstGeom prst="roundRect">
+            <a:avLst/>
+          </a:prstGeom>
+        </p:spPr>
+        <p:style>
+          <a:lnRef idx="1">
+            <a:schemeClr val="accent1"/>
+          </a:lnRef>
+          <a:fillRef idx="3">
+            <a:schemeClr val="accent1"/>
+          </a:fillRef>
+          <a:effectRef idx="2">
+            <a:schemeClr val="accent1"/>
+          </a:effectRef>
+          <a:fontRef idx="minor">
+            <a:schemeClr val="lt1"/>
+          </a:fontRef>
+        </p:style>
+        <p:txBody>
+          <a:bodyPr rtlCol="0" anchor="ctr"/>
+          <a:lstStyle/>
+          <a:p>
+            <a:pPr algn="ctr"/>
+            <a:r>
+              <a:rPr lang="en-US" sz="3600" b="1" dirty="0" smtClean="0"/>
+              <a:t>References</a:t>
+            </a:r>
+            <a:endParaRPr lang="en-US" sz="2000" b="1" dirty="0" smtClean="0"/>
+          </a:p>
+          <a:p>
+            <a:pPr algn="ctr"/>
+            <a:endParaRPr lang="en-US" sz="1400" b="1" dirty="0" smtClean="0"/>
+          </a:p>
+          <a:p>
+            <a:endParaRPr lang="en-US" sz="2000" dirty="0"/>
+          </a:p>
+        </p:txBody>
+      </p:sp>
+      <p:grpSp>
+        <p:nvGrpSpPr>
+          <p:cNvPr id="26" name="Group 25"/>
+          <p:cNvGrpSpPr/>
+          <p:nvPr/>
+        </p:nvGrpSpPr>
+        <p:grpSpPr>
+          <a:xfrm>
+            <a:off x="1716638" y="14515123"/>
+            <a:ext cx="10968796" cy="1661994"/>
+            <a:chOff x="14932760" y="11856894"/>
+            <a:chExt cx="10968796" cy="1661994"/>
+          </a:xfrm>
+        </p:grpSpPr>
+        <p:sp>
+          <p:nvSpPr>
+            <p:cNvPr id="2" name="TextBox 1"/>
+            <p:cNvSpPr txBox="1"/>
+            <p:nvPr/>
+          </p:nvSpPr>
+          <p:spPr>
+            <a:xfrm>
+              <a:off x="14935812" y="11856894"/>
+              <a:ext cx="5743128" cy="1200329"/>
+            </a:xfrm>
+            <a:prstGeom prst="rect">
+              <a:avLst/>
+            </a:prstGeom>
+            <a:noFill/>
+            <a:ln>
+              <a:noFill/>
+            </a:ln>
+          </p:spPr>
+          <p:txBody>
+            <a:bodyPr wrap="square" rtlCol="0">
+              <a:spAutoFit/>
+            </a:bodyPr>
+            <a:lstStyle/>
+            <a:p>
+              <a:r>
+                <a:rPr lang="en-GB" sz="2400" dirty="0">
+                  <a:solidFill>
+                    <a:schemeClr val="bg1"/>
+                  </a:solidFill>
+                  <a:latin typeface="Consolas" pitchFamily="49" charset="0"/>
+                  <a:cs typeface="Consolas" pitchFamily="49" charset="0"/>
+                </a:rPr>
+                <a:t>using Neighbours(2) as </a:t>
+              </a:r>
+              <a:r>
+                <a:rPr lang="en-GB" sz="2400" dirty="0" err="1">
+                  <a:solidFill>
+                    <a:schemeClr val="bg1"/>
+                  </a:solidFill>
+                  <a:latin typeface="Consolas" pitchFamily="49" charset="0"/>
+                  <a:cs typeface="Consolas" pitchFamily="49" charset="0"/>
+                </a:rPr>
+                <a:t>twohopn</a:t>
+              </a:r>
+              <a:r>
+                <a:rPr lang="en-GB" sz="2400" dirty="0">
+                  <a:solidFill>
+                    <a:schemeClr val="bg1"/>
+                  </a:solidFill>
+                  <a:latin typeface="Consolas" pitchFamily="49" charset="0"/>
+                  <a:cs typeface="Consolas" pitchFamily="49" charset="0"/>
+                </a:rPr>
+                <a:t> in</a:t>
+              </a:r>
+            </a:p>
+            <a:p>
+              <a:r>
+                <a:rPr lang="en-GB" sz="2400" dirty="0">
+                  <a:solidFill>
+                    <a:schemeClr val="bg1"/>
+                  </a:solidFill>
+                  <a:latin typeface="Consolas" pitchFamily="49" charset="0"/>
+                  <a:cs typeface="Consolas" pitchFamily="49" charset="0"/>
+                </a:rPr>
+                <a:t>    @(x : </a:t>
+              </a:r>
+              <a:r>
+                <a:rPr lang="en-GB" sz="2400" dirty="0" err="1">
+                  <a:solidFill>
+                    <a:schemeClr val="bg1"/>
+                  </a:solidFill>
+                  <a:latin typeface="Consolas" pitchFamily="49" charset="0"/>
+                  <a:cs typeface="Consolas" pitchFamily="49" charset="0"/>
+                </a:rPr>
+                <a:t>twohopn</a:t>
+              </a:r>
+              <a:r>
+                <a:rPr lang="en-GB" sz="2400" dirty="0">
+                  <a:solidFill>
+                    <a:schemeClr val="bg1"/>
+                  </a:solidFill>
+                  <a:latin typeface="Consolas" pitchFamily="49" charset="0"/>
+                  <a:cs typeface="Consolas" pitchFamily="49" charset="0"/>
+                </a:rPr>
+                <a:t> ~</a:t>
+              </a:r>
+            </a:p>
+            <a:p>
+              <a:r>
+                <a:rPr lang="en-GB" sz="2400" dirty="0" smtClean="0">
+                  <a:solidFill>
+                    <a:schemeClr val="bg1"/>
+                  </a:solidFill>
+                  <a:latin typeface="Consolas" pitchFamily="49" charset="0"/>
+                  <a:cs typeface="Consolas" pitchFamily="49" charset="0"/>
+                </a:rPr>
+                <a:t>        slot(x) != slot(this))</a:t>
+              </a:r>
+              <a:endParaRPr lang="en-US" sz="2400" dirty="0">
+                <a:solidFill>
+                  <a:schemeClr val="bg1"/>
+                </a:solidFill>
+                <a:latin typeface="Consolas" pitchFamily="49" charset="0"/>
+                <a:cs typeface="Consolas" pitchFamily="49" charset="0"/>
+              </a:endParaRPr>
+            </a:p>
+          </p:txBody>
+        </p:sp>
+        <p:sp>
+          <p:nvSpPr>
+            <p:cNvPr id="24" name="TextBox 23"/>
+            <p:cNvSpPr txBox="1"/>
+            <p:nvPr/>
+          </p:nvSpPr>
+          <p:spPr>
+            <a:xfrm>
+              <a:off x="21236962" y="11856894"/>
+              <a:ext cx="4664594" cy="1200329"/>
+            </a:xfrm>
+            <a:prstGeom prst="rect">
+              <a:avLst/>
+            </a:prstGeom>
+            <a:noFill/>
+            <a:ln>
+              <a:noFill/>
+            </a:ln>
+          </p:spPr>
+          <p:txBody>
+            <a:bodyPr wrap="square" rtlCol="0">
+              <a:spAutoFit/>
+            </a:bodyPr>
+            <a:lstStyle/>
+            <a:p>
+              <a:r>
+                <a:rPr lang="en-GB" sz="2400" dirty="0" smtClean="0">
+                  <a:solidFill>
+                    <a:schemeClr val="bg1"/>
+                  </a:solidFill>
+                  <a:latin typeface="Consolas" pitchFamily="49" charset="0"/>
+                  <a:cs typeface="Consolas" pitchFamily="49" charset="0"/>
+                </a:rPr>
+                <a:t>∀x </a:t>
+              </a:r>
+              <a:r>
+                <a:rPr lang="el-GR" sz="2400" dirty="0" smtClean="0">
+                  <a:solidFill>
+                    <a:schemeClr val="bg1"/>
+                  </a:solidFill>
+                  <a:latin typeface="Consolas" pitchFamily="49" charset="0"/>
+                  <a:cs typeface="Consolas" pitchFamily="49" charset="0"/>
+                </a:rPr>
+                <a:t>ϵ</a:t>
+              </a:r>
+              <a:r>
+                <a:rPr lang="en-GB" sz="2400" dirty="0" smtClean="0">
+                  <a:solidFill>
+                    <a:schemeClr val="bg1"/>
+                  </a:solidFill>
+                  <a:latin typeface="Consolas" pitchFamily="49" charset="0"/>
+                  <a:cs typeface="Consolas" pitchFamily="49" charset="0"/>
+                </a:rPr>
+                <a:t> Neighbours(2) ⋅ </a:t>
+              </a:r>
+            </a:p>
+            <a:p>
+              <a:r>
+                <a:rPr lang="en-GB" sz="2400" dirty="0" smtClean="0">
+                  <a:solidFill>
+                    <a:schemeClr val="bg1"/>
+                  </a:solidFill>
+                  <a:latin typeface="Consolas" pitchFamily="49" charset="0"/>
+                  <a:cs typeface="Consolas" pitchFamily="49" charset="0"/>
+                </a:rPr>
+                <a:t>    slot(x) ≠ slot(this)</a:t>
+              </a:r>
+            </a:p>
+            <a:p>
+              <a:endParaRPr lang="en-GB" sz="2400" dirty="0">
+                <a:solidFill>
+                  <a:schemeClr val="bg1"/>
+                </a:solidFill>
+                <a:latin typeface="Consolas" pitchFamily="49" charset="0"/>
+                <a:cs typeface="Consolas" pitchFamily="49" charset="0"/>
+              </a:endParaRPr>
+            </a:p>
+          </p:txBody>
+        </p:sp>
+        <p:sp>
+          <p:nvSpPr>
+            <p:cNvPr id="5" name="TextBox 4"/>
+            <p:cNvSpPr txBox="1"/>
+            <p:nvPr/>
+          </p:nvSpPr>
+          <p:spPr>
+            <a:xfrm>
+              <a:off x="14932760" y="13057223"/>
+              <a:ext cx="10965744" cy="461665"/>
+            </a:xfrm>
+            <a:prstGeom prst="rect">
+              <a:avLst/>
+            </a:prstGeom>
+            <a:noFill/>
+            <a:ln>
+              <a:noFill/>
+            </a:ln>
+          </p:spPr>
+          <p:txBody>
+            <a:bodyPr wrap="square" rtlCol="0">
+              <a:spAutoFit/>
+            </a:bodyPr>
+            <a:lstStyle/>
+            <a:p>
+              <a:r>
+                <a:rPr lang="en-GB" sz="2400" dirty="0" smtClean="0">
+                  <a:solidFill>
+                    <a:schemeClr val="bg1"/>
+                  </a:solidFill>
+                </a:rPr>
+                <a:t>Listing 1. A predicate in our custom language and the same predicate in first order logic</a:t>
+              </a:r>
+              <a:endParaRPr lang="en-GB" sz="2400" dirty="0">
+                <a:solidFill>
+                  <a:schemeClr val="bg1"/>
+                </a:solidFill>
+              </a:endParaRPr>
+            </a:p>
+          </p:txBody>
+        </p:sp>
+      </p:grpSp>
     </p:spTree>
     <p:extLst>
       <p:ext uri="{BB962C8B-B14F-4D97-AF65-F5344CB8AC3E}">
@@ -4042,7 +4354,7 @@
   <p:timing>
     <p:tnLst>
       <p:par>
-        <p:cTn xmlns:p14="http://schemas.microsoft.com/office/powerpoint/2010/main" id="1" dur="indefinite" restart="never" nodeType="tmRoot"/>
+        <p:cTn id="1" dur="indefinite" restart="never" nodeType="tmRoot"/>
       </p:par>
     </p:tnLst>
   </p:timing>
@@ -4560,9 +4872,15 @@
 <file path=customXml/itemProps3.xml><?xml version="1.0" encoding="utf-8"?>
 <ds:datastoreItem xmlns:ds="http://schemas.openxmlformats.org/officeDocument/2006/customXml" ds:itemID="{7B6F2769-7194-4217-93D3-3AF3A4742282}">
   <ds:schemaRefs>
+    <ds:schemaRef ds:uri="http://schemas.microsoft.com/sharepoint/v3/fields"/>
+    <ds:schemaRef ds:uri="http://purl.org/dc/terms/"/>
+    <ds:schemaRef ds:uri="http://purl.org/dc/elements/1.1/"/>
+    <ds:schemaRef ds:uri="http://schemas.openxmlformats.org/package/2006/metadata/core-properties"/>
+    <ds:schemaRef ds:uri="http://purl.org/dc/dcmitype/"/>
+    <ds:schemaRef ds:uri="http://schemas.microsoft.com/office/2006/documentManagement/types"/>
+    <ds:schemaRef ds:uri="http://schemas.microsoft.com/office/infopath/2007/PartnerControls"/>
     <ds:schemaRef ds:uri="http://schemas.microsoft.com/office/2006/metadata/properties"/>
-    <ds:schemaRef ds:uri="http://schemas.microsoft.com/office/infopath/2007/PartnerControls"/>
-    <ds:schemaRef ds:uri="http://schemas.microsoft.com/sharepoint/v3/fields"/>
+    <ds:schemaRef ds:uri="http://www.w3.org/XML/1998/namespace"/>
   </ds:schemaRefs>
 </ds:datastoreItem>
 </file>
</xml_diff>

<commit_message>
Update Contiki image in poster
</commit_message>
<xml_diff>
--- a/Poster/Poster.pptx
+++ b/Poster/Poster.pptx
@@ -3134,8 +3134,8 @@
         </p:nvSpPr>
         <p:spPr>
           <a:xfrm>
-            <a:off x="0" y="0"/>
-            <a:ext cx="42808525" cy="2646878"/>
+            <a:off x="256033" y="0"/>
+            <a:ext cx="42281856" cy="2477601"/>
           </a:xfrm>
           <a:prstGeom prst="rect">
             <a:avLst/>
@@ -3149,7 +3149,7 @@
           <a:p>
             <a:pPr lvl="0" algn="ctr"/>
             <a:r>
-              <a:rPr lang="en-GB" sz="16600" b="1" dirty="0" smtClean="0">
+              <a:rPr lang="en-GB" sz="15500" b="1" dirty="0" smtClean="0">
                 <a:ln w="17780" cmpd="sng">
                   <a:solidFill>
                     <a:srgbClr val="FFFFFF"/>
@@ -3167,7 +3167,7 @@
               </a:rPr>
               <a:t>Towards Debugging of Wireless Sensor Networks</a:t>
             </a:r>
-            <a:endParaRPr lang="en-GB" sz="16600" b="1" dirty="0">
+            <a:endParaRPr lang="en-GB" sz="15500" b="1" dirty="0">
               <a:ln w="17780" cmpd="sng">
                 <a:solidFill>
                   <a:srgbClr val="FFFFFF"/>
@@ -3232,13 +3232,15 @@
           </a:prstGeom>
         </p:spPr>
         <p:style>
-          <a:lnRef idx="1">
-            <a:schemeClr val="accent1"/>
+          <a:lnRef idx="2">
+            <a:schemeClr val="accent1">
+              <a:shade val="50000"/>
+            </a:schemeClr>
           </a:lnRef>
-          <a:fillRef idx="3">
+          <a:fillRef idx="1">
             <a:schemeClr val="accent1"/>
           </a:fillRef>
-          <a:effectRef idx="2">
+          <a:effectRef idx="0">
             <a:schemeClr val="accent1"/>
           </a:effectRef>
           <a:fontRef idx="minor">
@@ -3274,36 +3276,6 @@
           </a:p>
         </p:txBody>
       </p:sp>
-      <p:pic>
-        <p:nvPicPr>
-          <p:cNvPr id="21" name="Picture 20" descr="Screen Shot 2012-11-27 at 12.57.53.png"/>
-          <p:cNvPicPr>
-            <a:picLocks noChangeAspect="1"/>
-          </p:cNvPicPr>
-          <p:nvPr/>
-        </p:nvPicPr>
-        <p:blipFill>
-          <a:blip r:embed="rId3">
-            <a:extLst>
-              <a:ext uri="{28A0092B-C50C-407E-A947-70E740481C1C}">
-                <a14:useLocalDpi xmlns:a14="http://schemas.microsoft.com/office/drawing/2010/main" val="0"/>
-              </a:ext>
-            </a:extLst>
-          </a:blip>
-          <a:stretch>
-            <a:fillRect/>
-          </a:stretch>
-        </p:blipFill>
-        <p:spPr>
-          <a:xfrm>
-            <a:off x="15905569" y="2942543"/>
-            <a:ext cx="10997384" cy="7394457"/>
-          </a:xfrm>
-          <a:prstGeom prst="rect">
-            <a:avLst/>
-          </a:prstGeom>
-        </p:spPr>
-      </p:pic>
       <p:pic>
         <p:nvPicPr>
           <p:cNvPr id="22" name="Picture 21" descr="CM5000.jpg"/>
@@ -3313,7 +3285,7 @@
           <p:nvPr/>
         </p:nvPicPr>
         <p:blipFill rotWithShape="1">
-          <a:blip r:embed="rId4">
+          <a:blip r:embed="rId3">
             <a:extLst>
               <a:ext uri="{28A0092B-C50C-407E-A947-70E740481C1C}">
                 <a14:useLocalDpi xmlns:a14="http://schemas.microsoft.com/office/drawing/2010/main" val="0"/>
@@ -3349,13 +3321,15 @@
           </a:prstGeom>
         </p:spPr>
         <p:style>
-          <a:lnRef idx="1">
-            <a:schemeClr val="accent1"/>
+          <a:lnRef idx="2">
+            <a:schemeClr val="accent1">
+              <a:shade val="50000"/>
+            </a:schemeClr>
           </a:lnRef>
-          <a:fillRef idx="3">
+          <a:fillRef idx="1">
             <a:schemeClr val="accent1"/>
           </a:fillRef>
-          <a:effectRef idx="2">
+          <a:effectRef idx="0">
             <a:schemeClr val="accent1"/>
           </a:effectRef>
           <a:fontRef idx="minor">
@@ -3431,13 +3405,15 @@
           </a:prstGeom>
         </p:spPr>
         <p:style>
-          <a:lnRef idx="1">
-            <a:schemeClr val="accent1"/>
+          <a:lnRef idx="2">
+            <a:schemeClr val="accent1">
+              <a:shade val="50000"/>
+            </a:schemeClr>
           </a:lnRef>
-          <a:fillRef idx="3">
+          <a:fillRef idx="1">
             <a:schemeClr val="accent1"/>
           </a:fillRef>
-          <a:effectRef idx="2">
+          <a:effectRef idx="0">
             <a:schemeClr val="accent1"/>
           </a:effectRef>
           <a:fontRef idx="minor">
@@ -3646,13 +3622,15 @@
           </a:prstGeom>
         </p:spPr>
         <p:style>
-          <a:lnRef idx="1">
-            <a:schemeClr val="accent1"/>
+          <a:lnRef idx="2">
+            <a:schemeClr val="accent1">
+              <a:shade val="50000"/>
+            </a:schemeClr>
           </a:lnRef>
-          <a:fillRef idx="3">
+          <a:fillRef idx="1">
             <a:schemeClr val="accent1"/>
           </a:fillRef>
-          <a:effectRef idx="2">
+          <a:effectRef idx="0">
             <a:schemeClr val="accent1"/>
           </a:effectRef>
           <a:fontRef idx="minor">
@@ -3938,13 +3916,15 @@
           </a:prstGeom>
         </p:spPr>
         <p:style>
-          <a:lnRef idx="1">
-            <a:schemeClr val="accent1"/>
+          <a:lnRef idx="2">
+            <a:schemeClr val="accent1">
+              <a:shade val="50000"/>
+            </a:schemeClr>
           </a:lnRef>
-          <a:fillRef idx="3">
+          <a:fillRef idx="1">
             <a:schemeClr val="accent1"/>
           </a:fillRef>
-          <a:effectRef idx="2">
+          <a:effectRef idx="0">
             <a:schemeClr val="accent1"/>
           </a:effectRef>
           <a:fontRef idx="minor">
@@ -3980,13 +3960,15 @@
           </a:prstGeom>
         </p:spPr>
         <p:style>
-          <a:lnRef idx="1">
-            <a:schemeClr val="accent1"/>
+          <a:lnRef idx="2">
+            <a:schemeClr val="accent1">
+              <a:shade val="50000"/>
+            </a:schemeClr>
           </a:lnRef>
-          <a:fillRef idx="3">
+          <a:fillRef idx="1">
             <a:schemeClr val="accent1"/>
           </a:fillRef>
-          <a:effectRef idx="2">
+          <a:effectRef idx="0">
             <a:schemeClr val="accent1"/>
           </a:effectRef>
           <a:fontRef idx="minor">
@@ -4022,13 +4004,15 @@
           </a:prstGeom>
         </p:spPr>
         <p:style>
-          <a:lnRef idx="1">
-            <a:schemeClr val="accent1"/>
+          <a:lnRef idx="2">
+            <a:schemeClr val="accent1">
+              <a:shade val="50000"/>
+            </a:schemeClr>
           </a:lnRef>
-          <a:fillRef idx="3">
+          <a:fillRef idx="1">
             <a:schemeClr val="accent1"/>
           </a:fillRef>
-          <a:effectRef idx="2">
+          <a:effectRef idx="0">
             <a:schemeClr val="accent1"/>
           </a:effectRef>
           <a:fontRef idx="minor">
@@ -4064,13 +4048,15 @@
           </a:prstGeom>
         </p:spPr>
         <p:style>
-          <a:lnRef idx="1">
-            <a:schemeClr val="accent1"/>
+          <a:lnRef idx="2">
+            <a:schemeClr val="accent1">
+              <a:shade val="50000"/>
+            </a:schemeClr>
           </a:lnRef>
-          <a:fillRef idx="3">
+          <a:fillRef idx="1">
             <a:schemeClr val="accent1"/>
           </a:fillRef>
-          <a:effectRef idx="2">
+          <a:effectRef idx="0">
             <a:schemeClr val="accent1"/>
           </a:effectRef>
           <a:fontRef idx="minor">
@@ -4341,6 +4327,70 @@
           </p:txBody>
         </p:sp>
       </p:grpSp>
+      <p:pic>
+        <p:nvPicPr>
+          <p:cNvPr id="1026" name="Picture 2"/>
+          <p:cNvPicPr>
+            <a:picLocks noChangeAspect="1" noChangeArrowheads="1"/>
+          </p:cNvPicPr>
+          <p:nvPr/>
+        </p:nvPicPr>
+        <p:blipFill>
+          <a:blip r:embed="rId4">
+            <a:extLst>
+              <a:ext uri="{28A0092B-C50C-407E-A947-70E740481C1C}">
+                <a14:useLocalDpi xmlns:a14="http://schemas.microsoft.com/office/drawing/2010/main" val="0"/>
+              </a:ext>
+            </a:extLst>
+          </a:blip>
+          <a:srcRect/>
+          <a:stretch>
+            <a:fillRect/>
+          </a:stretch>
+        </p:blipFill>
+        <p:spPr bwMode="auto">
+          <a:xfrm>
+            <a:off x="16029716" y="4039824"/>
+            <a:ext cx="10749090" cy="7403710"/>
+          </a:xfrm>
+          <a:prstGeom prst="rect">
+            <a:avLst/>
+          </a:prstGeom>
+          <a:noFill/>
+          <a:ln>
+            <a:noFill/>
+          </a:ln>
+          <a:effectLst/>
+          <a:extLst>
+            <a:ext uri="{909E8E84-426E-40DD-AFC4-6F175D3DCCD1}">
+              <a14:hiddenFill xmlns:a14="http://schemas.microsoft.com/office/drawing/2010/main">
+                <a:solidFill>
+                  <a:schemeClr val="accent1"/>
+                </a:solidFill>
+              </a14:hiddenFill>
+            </a:ext>
+            <a:ext uri="{91240B29-F687-4F45-9708-019B960494DF}">
+              <a14:hiddenLine xmlns:a14="http://schemas.microsoft.com/office/drawing/2010/main" w="9525">
+                <a:solidFill>
+                  <a:schemeClr val="tx1"/>
+                </a:solidFill>
+                <a:miter lim="800000"/>
+                <a:headEnd/>
+                <a:tailEnd/>
+              </a14:hiddenLine>
+            </a:ext>
+            <a:ext uri="{AF507438-7753-43E0-B8FC-AC1667EBCBE1}">
+              <a14:hiddenEffects xmlns:a14="http://schemas.microsoft.com/office/drawing/2010/main">
+                <a:effectLst>
+                  <a:outerShdw dist="35921" dir="2700000" algn="ctr" rotWithShape="0">
+                    <a:schemeClr val="bg2"/>
+                  </a:outerShdw>
+                </a:effectLst>
+              </a14:hiddenEffects>
+            </a:ext>
+          </a:extLst>
+        </p:spPr>
+      </p:pic>
     </p:spTree>
     <p:extLst>
       <p:ext uri="{BB962C8B-B14F-4D97-AF65-F5344CB8AC3E}">
@@ -4682,6 +4732,24 @@
 </file>
 
 <file path=customXml/item1.xml><?xml version="1.0" encoding="utf-8"?>
+<p:properties xmlns:p="http://schemas.microsoft.com/office/2006/metadata/properties" xmlns:xsi="http://www.w3.org/2001/XMLSchema-instance" xmlns:pc="http://schemas.microsoft.com/office/infopath/2007/PartnerControls">
+  <documentManagement>
+    <_Version xmlns="http://schemas.microsoft.com/sharepoint/v3/fields" xsi:nil="true"/>
+    <_Status xmlns="http://schemas.microsoft.com/sharepoint/v3/fields">Not Started</_Status>
+  </documentManagement>
+</p:properties>
+</file>
+
+<file path=customXml/item2.xml><?xml version="1.0" encoding="utf-8"?>
+<?mso-contentType ?>
+<FormTemplates xmlns="http://schemas.microsoft.com/sharepoint/v3/contenttype/forms">
+  <Display>DocumentLibraryForm</Display>
+  <Edit>DocumentLibraryForm</Edit>
+  <New>DocumentLibraryForm</New>
+</FormTemplates>
+</file>
+
+<file path=customXml/item3.xml><?xml version="1.0" encoding="utf-8"?>
 <ct:contentTypeSchema xmlns:ct="http://schemas.microsoft.com/office/2006/metadata/contentType" xmlns:ma="http://schemas.microsoft.com/office/2006/metadata/properties/metaAttributes" ct:_="" ma:_="" ma:contentTypeName="Document" ma:contentTypeID="0x0101000DE64AEEDD9B7A4D93545ACBE97D4615" ma:contentTypeVersion="2" ma:contentTypeDescription="Create a new document." ma:contentTypeScope="" ma:versionID="f49002b78e3a4a71b814eef46a983816">
   <xsd:schema xmlns:xsd="http://www.w3.org/2001/XMLSchema" xmlns:xs="http://www.w3.org/2001/XMLSchema" xmlns:p="http://schemas.microsoft.com/office/2006/metadata/properties" xmlns:ns2="http://schemas.microsoft.com/sharepoint/v3/fields" targetNamespace="http://schemas.microsoft.com/office/2006/metadata/properties" ma:root="true" ma:fieldsID="38f6db2dd0d9a0cf6a8dc37be32b365b" ns2:_="">
     <xsd:import namespace="http://schemas.microsoft.com/sharepoint/v3/fields"/>
@@ -4825,25 +4893,31 @@
 </ct:contentTypeSchema>
 </file>
 
-<file path=customXml/item2.xml><?xml version="1.0" encoding="utf-8"?>
-<?mso-contentType ?>
-<FormTemplates xmlns="http://schemas.microsoft.com/sharepoint/v3/contenttype/forms">
-  <Display>DocumentLibraryForm</Display>
-  <Edit>DocumentLibraryForm</Edit>
-  <New>DocumentLibraryForm</New>
-</FormTemplates>
+<file path=customXml/itemProps1.xml><?xml version="1.0" encoding="utf-8"?>
+<ds:datastoreItem xmlns:ds="http://schemas.openxmlformats.org/officeDocument/2006/customXml" ds:itemID="{7B6F2769-7194-4217-93D3-3AF3A4742282}">
+  <ds:schemaRefs>
+    <ds:schemaRef ds:uri="http://schemas.microsoft.com/sharepoint/v3/fields"/>
+    <ds:schemaRef ds:uri="http://purl.org/dc/terms/"/>
+    <ds:schemaRef ds:uri="http://purl.org/dc/elements/1.1/"/>
+    <ds:schemaRef ds:uri="http://schemas.openxmlformats.org/package/2006/metadata/core-properties"/>
+    <ds:schemaRef ds:uri="http://purl.org/dc/dcmitype/"/>
+    <ds:schemaRef ds:uri="http://schemas.microsoft.com/office/2006/documentManagement/types"/>
+    <ds:schemaRef ds:uri="http://schemas.microsoft.com/office/infopath/2007/PartnerControls"/>
+    <ds:schemaRef ds:uri="http://schemas.microsoft.com/office/2006/metadata/properties"/>
+    <ds:schemaRef ds:uri="http://www.w3.org/XML/1998/namespace"/>
+  </ds:schemaRefs>
+</ds:datastoreItem>
 </file>
 
-<file path=customXml/item3.xml><?xml version="1.0" encoding="utf-8"?>
-<p:properties xmlns:p="http://schemas.microsoft.com/office/2006/metadata/properties" xmlns:xsi="http://www.w3.org/2001/XMLSchema-instance" xmlns:pc="http://schemas.microsoft.com/office/infopath/2007/PartnerControls">
-  <documentManagement>
-    <_Version xmlns="http://schemas.microsoft.com/sharepoint/v3/fields" xsi:nil="true"/>
-    <_Status xmlns="http://schemas.microsoft.com/sharepoint/v3/fields">Not Started</_Status>
-  </documentManagement>
-</p:properties>
+<file path=customXml/itemProps2.xml><?xml version="1.0" encoding="utf-8"?>
+<ds:datastoreItem xmlns:ds="http://schemas.openxmlformats.org/officeDocument/2006/customXml" ds:itemID="{87D2A1B0-FF3E-4009-940D-AED0EB70AA20}">
+  <ds:schemaRefs>
+    <ds:schemaRef ds:uri="http://schemas.microsoft.com/sharepoint/v3/contenttype/forms"/>
+  </ds:schemaRefs>
+</ds:datastoreItem>
 </file>
 
-<file path=customXml/itemProps1.xml><?xml version="1.0" encoding="utf-8"?>
+<file path=customXml/itemProps3.xml><?xml version="1.0" encoding="utf-8"?>
 <ds:datastoreItem xmlns:ds="http://schemas.openxmlformats.org/officeDocument/2006/customXml" ds:itemID="{E4214858-785C-42F7-BE66-6D0E79395FC8}">
   <ds:schemaRefs>
     <ds:schemaRef ds:uri="http://schemas.microsoft.com/office/2006/metadata/contentType"/>
@@ -4859,28 +4933,4 @@
     <ds:schemaRef ds:uri="http://schemas.microsoft.com/internal/obd"/>
   </ds:schemaRefs>
 </ds:datastoreItem>
-</file>
-
-<file path=customXml/itemProps2.xml><?xml version="1.0" encoding="utf-8"?>
-<ds:datastoreItem xmlns:ds="http://schemas.openxmlformats.org/officeDocument/2006/customXml" ds:itemID="{87D2A1B0-FF3E-4009-940D-AED0EB70AA20}">
-  <ds:schemaRefs>
-    <ds:schemaRef ds:uri="http://schemas.microsoft.com/sharepoint/v3/contenttype/forms"/>
-  </ds:schemaRefs>
-</ds:datastoreItem>
-</file>
-
-<file path=customXml/itemProps3.xml><?xml version="1.0" encoding="utf-8"?>
-<ds:datastoreItem xmlns:ds="http://schemas.openxmlformats.org/officeDocument/2006/customXml" ds:itemID="{7B6F2769-7194-4217-93D3-3AF3A4742282}">
-  <ds:schemaRefs>
-    <ds:schemaRef ds:uri="http://schemas.microsoft.com/sharepoint/v3/fields"/>
-    <ds:schemaRef ds:uri="http://purl.org/dc/terms/"/>
-    <ds:schemaRef ds:uri="http://purl.org/dc/elements/1.1/"/>
-    <ds:schemaRef ds:uri="http://schemas.openxmlformats.org/package/2006/metadata/core-properties"/>
-    <ds:schemaRef ds:uri="http://purl.org/dc/dcmitype/"/>
-    <ds:schemaRef ds:uri="http://schemas.microsoft.com/office/2006/documentManagement/types"/>
-    <ds:schemaRef ds:uri="http://schemas.microsoft.com/office/infopath/2007/PartnerControls"/>
-    <ds:schemaRef ds:uri="http://schemas.microsoft.com/office/2006/metadata/properties"/>
-    <ds:schemaRef ds:uri="http://www.w3.org/XML/1998/namespace"/>
-  </ds:schemaRefs>
-</ds:datastoreItem>
 </file>
</xml_diff>

<commit_message>
Add the second term plan
</commit_message>
<xml_diff>
--- a/Poster/Poster.pptx
+++ b/Poster/Poster.pptx
@@ -3908,8 +3908,8 @@
         </p:nvSpPr>
         <p:spPr>
           <a:xfrm>
-            <a:off x="29982019" y="17706645"/>
-            <a:ext cx="12114901" cy="8782626"/>
+            <a:off x="29982019" y="21089256"/>
+            <a:ext cx="12114901" cy="5400013"/>
           </a:xfrm>
           <a:prstGeom prst="roundRect">
             <a:avLst/>
@@ -3937,10 +3937,203 @@
           <a:p>
             <a:pPr algn="ctr"/>
             <a:r>
-              <a:rPr lang="en-US" sz="4800" b="1" dirty="0" smtClean="0"/>
-              <a:t>Second Term Plan</a:t>
-            </a:r>
-            <a:endParaRPr lang="en-US" sz="2400" dirty="0"/>
+              <a:rPr lang="en-US" sz="4800" b="1" dirty="0" smtClean="0">
+                <a:solidFill>
+                  <a:schemeClr val="bg1"/>
+                </a:solidFill>
+              </a:rPr>
+              <a:t>Second Term </a:t>
+            </a:r>
+            <a:r>
+              <a:rPr lang="en-US" sz="4800" b="1" dirty="0" smtClean="0">
+                <a:solidFill>
+                  <a:schemeClr val="bg1"/>
+                </a:solidFill>
+              </a:rPr>
+              <a:t>Plan</a:t>
+            </a:r>
+            <a:endParaRPr lang="en-US" sz="4800" b="1" dirty="0">
+              <a:solidFill>
+                <a:schemeClr val="bg1"/>
+              </a:solidFill>
+            </a:endParaRPr>
+          </a:p>
+          <a:p>
+            <a:pPr marL="457200" indent="-457200">
+              <a:buFont typeface="+mj-lt"/>
+              <a:buAutoNum type="arabicPeriod"/>
+            </a:pPr>
+            <a:endParaRPr lang="en-US" sz="2400" dirty="0" smtClean="0">
+              <a:solidFill>
+                <a:schemeClr val="bg1"/>
+              </a:solidFill>
+            </a:endParaRPr>
+          </a:p>
+          <a:p>
+            <a:pPr marL="457200" indent="-457200">
+              <a:buFont typeface="+mj-lt"/>
+              <a:buAutoNum type="arabicPeriod"/>
+            </a:pPr>
+            <a:r>
+              <a:rPr lang="en-US" sz="2400" dirty="0" smtClean="0">
+                <a:solidFill>
+                  <a:schemeClr val="bg1"/>
+                </a:solidFill>
+              </a:rPr>
+              <a:t>Predicate Specification</a:t>
+            </a:r>
+          </a:p>
+          <a:p>
+            <a:pPr marL="2795961" lvl="1" indent="-457200">
+              <a:buFont typeface="+mj-lt"/>
+              <a:buAutoNum type="arabicPeriod"/>
+            </a:pPr>
+            <a:r>
+              <a:rPr lang="en-US" sz="2400" dirty="0" smtClean="0">
+                <a:solidFill>
+                  <a:schemeClr val="bg1"/>
+                </a:solidFill>
+              </a:rPr>
+              <a:t>Improve dynamic specification</a:t>
+            </a:r>
+          </a:p>
+          <a:p>
+            <a:pPr marL="2795961" lvl="1" indent="-457200">
+              <a:buFont typeface="+mj-lt"/>
+              <a:buAutoNum type="arabicPeriod"/>
+            </a:pPr>
+            <a:r>
+              <a:rPr lang="en-US" sz="2400" dirty="0" smtClean="0">
+                <a:solidFill>
+                  <a:schemeClr val="bg1"/>
+                </a:solidFill>
+              </a:rPr>
+              <a:t>Reduce energy usage</a:t>
+            </a:r>
+          </a:p>
+          <a:p>
+            <a:pPr marL="457200" indent="-457200">
+              <a:buFont typeface="+mj-lt"/>
+              <a:buAutoNum type="arabicPeriod"/>
+            </a:pPr>
+            <a:r>
+              <a:rPr lang="en-US" sz="2400" dirty="0" err="1" smtClean="0">
+                <a:solidFill>
+                  <a:schemeClr val="bg1"/>
+                </a:solidFill>
+              </a:rPr>
+              <a:t>Visualisation</a:t>
+            </a:r>
+            <a:r>
+              <a:rPr lang="en-US" sz="2400" dirty="0" smtClean="0">
+                <a:solidFill>
+                  <a:schemeClr val="bg1"/>
+                </a:solidFill>
+              </a:rPr>
+              <a:t> Tool</a:t>
+            </a:r>
+          </a:p>
+          <a:p>
+            <a:pPr marL="2795961" lvl="1" indent="-457200">
+              <a:buFont typeface="+mj-lt"/>
+              <a:buAutoNum type="arabicPeriod"/>
+            </a:pPr>
+            <a:r>
+              <a:rPr lang="en-US" sz="2400" dirty="0" smtClean="0">
+                <a:solidFill>
+                  <a:schemeClr val="bg1"/>
+                </a:solidFill>
+              </a:rPr>
+              <a:t>Provide more information</a:t>
+            </a:r>
+          </a:p>
+          <a:p>
+            <a:pPr marL="2795961" lvl="1" indent="-457200">
+              <a:buFont typeface="+mj-lt"/>
+              <a:buAutoNum type="arabicPeriod"/>
+            </a:pPr>
+            <a:r>
+              <a:rPr lang="en-US" sz="2400" dirty="0" smtClean="0">
+                <a:solidFill>
+                  <a:schemeClr val="bg1"/>
+                </a:solidFill>
+              </a:rPr>
+              <a:t>Better predicate checking integration</a:t>
+            </a:r>
+          </a:p>
+          <a:p>
+            <a:pPr marL="457200" indent="-457200">
+              <a:buFont typeface="+mj-lt"/>
+              <a:buAutoNum type="arabicPeriod"/>
+            </a:pPr>
+            <a:r>
+              <a:rPr lang="en-US" sz="2400" dirty="0" smtClean="0">
+                <a:solidFill>
+                  <a:schemeClr val="bg1"/>
+                </a:solidFill>
+              </a:rPr>
+              <a:t>Performance</a:t>
+            </a:r>
+          </a:p>
+          <a:p>
+            <a:pPr marL="2795961" lvl="1" indent="-457200">
+              <a:buFont typeface="+mj-lt"/>
+              <a:buAutoNum type="arabicPeriod"/>
+            </a:pPr>
+            <a:r>
+              <a:rPr lang="en-US" sz="2400" dirty="0" smtClean="0">
+                <a:solidFill>
+                  <a:schemeClr val="bg1"/>
+                </a:solidFill>
+              </a:rPr>
+              <a:t>Investigate </a:t>
+            </a:r>
+            <a:r>
+              <a:rPr lang="en-US" sz="2400" u="sng" dirty="0" smtClean="0">
+                <a:solidFill>
+                  <a:schemeClr val="bg1"/>
+                </a:solidFill>
+              </a:rPr>
+              <a:t>where</a:t>
+            </a:r>
+            <a:r>
+              <a:rPr lang="en-US" sz="2400" dirty="0" smtClean="0">
+                <a:solidFill>
+                  <a:schemeClr val="bg1"/>
+                </a:solidFill>
+              </a:rPr>
+              <a:t> the best place to evaluate a predicate is</a:t>
+            </a:r>
+          </a:p>
+          <a:p>
+            <a:pPr marL="2795961" lvl="1" indent="-457200">
+              <a:buFont typeface="+mj-lt"/>
+              <a:buAutoNum type="arabicPeriod"/>
+            </a:pPr>
+            <a:r>
+              <a:rPr lang="en-US" sz="2400" dirty="0" smtClean="0">
+                <a:solidFill>
+                  <a:schemeClr val="bg1"/>
+                </a:solidFill>
+              </a:rPr>
+              <a:t>Perform performance testing using physical nodes</a:t>
+            </a:r>
+            <a:endParaRPr lang="en-US" sz="2400" dirty="0" smtClean="0">
+              <a:solidFill>
+                <a:schemeClr val="bg1"/>
+              </a:solidFill>
+            </a:endParaRPr>
+          </a:p>
+          <a:p>
+            <a:pPr marL="457200" indent="-457200">
+              <a:buFont typeface="+mj-lt"/>
+              <a:buAutoNum type="arabicPeriod"/>
+            </a:pPr>
+            <a:endParaRPr lang="en-US" sz="2400" dirty="0" smtClean="0">
+              <a:solidFill>
+                <a:schemeClr val="bg1"/>
+              </a:solidFill>
+            </a:endParaRPr>
           </a:p>
         </p:txBody>
       </p:sp>

</xml_diff>

<commit_message>
Add Aggregation Tree and Clustering diagrams to the poster
</commit_message>
<xml_diff>
--- a/Poster/Poster.pptx
+++ b/Poster/Poster.pptx
@@ -3984,9 +3984,9 @@
             </a:r>
           </a:p>
           <a:p>
-            <a:pPr marL="2795961" lvl="1" indent="-457200">
+            <a:pPr marL="2853111" lvl="1" indent="-514350">
               <a:buFont typeface="+mj-lt"/>
-              <a:buAutoNum type="arabicPeriod"/>
+              <a:buAutoNum type="romanLcPeriod"/>
             </a:pPr>
             <a:r>
               <a:rPr lang="en-US" sz="2400" dirty="0" smtClean="0">
@@ -3998,9 +3998,9 @@
             </a:r>
           </a:p>
           <a:p>
-            <a:pPr marL="2795961" lvl="1" indent="-457200">
+            <a:pPr marL="2853111" lvl="1" indent="-514350">
               <a:buFont typeface="+mj-lt"/>
-              <a:buAutoNum type="arabicPeriod"/>
+              <a:buAutoNum type="romanLcPeriod"/>
             </a:pPr>
             <a:r>
               <a:rPr lang="en-US" sz="2400" dirty="0" smtClean="0">
@@ -4034,9 +4034,9 @@
             </a:r>
           </a:p>
           <a:p>
-            <a:pPr marL="2795961" lvl="1" indent="-457200">
+            <a:pPr marL="2853111" lvl="1" indent="-514350">
               <a:buFont typeface="+mj-lt"/>
-              <a:buAutoNum type="arabicPeriod"/>
+              <a:buAutoNum type="romanLcPeriod"/>
             </a:pPr>
             <a:r>
               <a:rPr lang="en-US" sz="2400" dirty="0" smtClean="0">
@@ -4048,9 +4048,9 @@
             </a:r>
           </a:p>
           <a:p>
-            <a:pPr marL="2795961" lvl="1" indent="-457200">
+            <a:pPr marL="2853111" lvl="1" indent="-514350">
               <a:buFont typeface="+mj-lt"/>
-              <a:buAutoNum type="arabicPeriod"/>
+              <a:buAutoNum type="romanLcPeriod"/>
             </a:pPr>
             <a:r>
               <a:rPr lang="en-US" sz="2400" dirty="0" smtClean="0">
@@ -4076,9 +4076,9 @@
             </a:r>
           </a:p>
           <a:p>
-            <a:pPr marL="2795961" lvl="1" indent="-457200">
+            <a:pPr marL="2853111" lvl="1" indent="-514350">
               <a:buFont typeface="+mj-lt"/>
-              <a:buAutoNum type="arabicPeriod"/>
+              <a:buAutoNum type="romanLcPeriod"/>
             </a:pPr>
             <a:r>
               <a:rPr lang="en-US" sz="2400" dirty="0" smtClean="0">
@@ -4106,9 +4106,9 @@
             </a:r>
           </a:p>
           <a:p>
-            <a:pPr marL="2795961" lvl="1" indent="-457200">
+            <a:pPr marL="2853111" lvl="1" indent="-514350">
               <a:buFont typeface="+mj-lt"/>
-              <a:buAutoNum type="arabicPeriod"/>
+              <a:buAutoNum type="romanLcPeriod"/>
             </a:pPr>
             <a:r>
               <a:rPr lang="en-US" sz="2400" dirty="0" smtClean="0">
@@ -4318,7 +4318,9 @@
               <a:r>
                 <a:rPr lang="en-GB" sz="2400" dirty="0">
                   <a:solidFill>
-                    <a:schemeClr val="bg1"/>
+                    <a:schemeClr val="bg1">
+                      <a:lumMod val="85000"/>
+                    </a:schemeClr>
                   </a:solidFill>
                   <a:latin typeface="Consolas" pitchFamily="49" charset="0"/>
                   <a:cs typeface="Consolas" pitchFamily="49" charset="0"/>
@@ -4328,7 +4330,9 @@
               <a:r>
                 <a:rPr lang="en-GB" sz="2400" dirty="0" err="1">
                   <a:solidFill>
-                    <a:schemeClr val="bg1"/>
+                    <a:schemeClr val="bg1">
+                      <a:lumMod val="85000"/>
+                    </a:schemeClr>
                   </a:solidFill>
                   <a:latin typeface="Consolas" pitchFamily="49" charset="0"/>
                   <a:cs typeface="Consolas" pitchFamily="49" charset="0"/>
@@ -4338,7 +4342,9 @@
               <a:r>
                 <a:rPr lang="en-GB" sz="2400" dirty="0">
                   <a:solidFill>
-                    <a:schemeClr val="bg1"/>
+                    <a:schemeClr val="bg1">
+                      <a:lumMod val="85000"/>
+                    </a:schemeClr>
                   </a:solidFill>
                   <a:latin typeface="Consolas" pitchFamily="49" charset="0"/>
                   <a:cs typeface="Consolas" pitchFamily="49" charset="0"/>
@@ -4350,7 +4356,9 @@
               <a:r>
                 <a:rPr lang="en-GB" sz="2400" dirty="0">
                   <a:solidFill>
-                    <a:schemeClr val="bg1"/>
+                    <a:schemeClr val="bg1">
+                      <a:lumMod val="85000"/>
+                    </a:schemeClr>
                   </a:solidFill>
                   <a:latin typeface="Consolas" pitchFamily="49" charset="0"/>
                   <a:cs typeface="Consolas" pitchFamily="49" charset="0"/>
@@ -4360,7 +4368,9 @@
               <a:r>
                 <a:rPr lang="en-GB" sz="2400" dirty="0" err="1">
                   <a:solidFill>
-                    <a:schemeClr val="bg1"/>
+                    <a:schemeClr val="bg1">
+                      <a:lumMod val="85000"/>
+                    </a:schemeClr>
                   </a:solidFill>
                   <a:latin typeface="Consolas" pitchFamily="49" charset="0"/>
                   <a:cs typeface="Consolas" pitchFamily="49" charset="0"/>
@@ -4370,7 +4380,9 @@
               <a:r>
                 <a:rPr lang="en-GB" sz="2400" dirty="0">
                   <a:solidFill>
-                    <a:schemeClr val="bg1"/>
+                    <a:schemeClr val="bg1">
+                      <a:lumMod val="85000"/>
+                    </a:schemeClr>
                   </a:solidFill>
                   <a:latin typeface="Consolas" pitchFamily="49" charset="0"/>
                   <a:cs typeface="Consolas" pitchFamily="49" charset="0"/>
@@ -4382,7 +4394,9 @@
               <a:r>
                 <a:rPr lang="en-GB" sz="2400" dirty="0" smtClean="0">
                   <a:solidFill>
-                    <a:schemeClr val="bg1"/>
+                    <a:schemeClr val="bg1">
+                      <a:lumMod val="85000"/>
+                    </a:schemeClr>
                   </a:solidFill>
                   <a:latin typeface="Consolas" pitchFamily="49" charset="0"/>
                   <a:cs typeface="Consolas" pitchFamily="49" charset="0"/>
@@ -4391,7 +4405,9 @@
               </a:r>
               <a:endParaRPr lang="en-US" sz="2400" dirty="0">
                 <a:solidFill>
-                  <a:schemeClr val="bg1"/>
+                  <a:schemeClr val="bg1">
+                    <a:lumMod val="85000"/>
+                  </a:schemeClr>
                 </a:solidFill>
                 <a:latin typeface="Consolas" pitchFamily="49" charset="0"/>
                 <a:cs typeface="Consolas" pitchFamily="49" charset="0"/>
@@ -4427,7 +4443,9 @@
               <a:r>
                 <a:rPr lang="en-GB" sz="2400" dirty="0" smtClean="0">
                   <a:solidFill>
-                    <a:schemeClr val="bg1"/>
+                    <a:schemeClr val="bg1">
+                      <a:lumMod val="85000"/>
+                    </a:schemeClr>
                   </a:solidFill>
                   <a:latin typeface="Consolas" pitchFamily="49" charset="0"/>
                   <a:cs typeface="Consolas" pitchFamily="49" charset="0"/>
@@ -4437,7 +4455,9 @@
               <a:r>
                 <a:rPr lang="el-GR" sz="2400" dirty="0" smtClean="0">
                   <a:solidFill>
-                    <a:schemeClr val="bg1"/>
+                    <a:schemeClr val="bg1">
+                      <a:lumMod val="85000"/>
+                    </a:schemeClr>
                   </a:solidFill>
                   <a:latin typeface="Consolas" pitchFamily="49" charset="0"/>
                   <a:cs typeface="Consolas" pitchFamily="49" charset="0"/>
@@ -4447,7 +4467,9 @@
               <a:r>
                 <a:rPr lang="en-GB" sz="2400" dirty="0" smtClean="0">
                   <a:solidFill>
-                    <a:schemeClr val="bg1"/>
+                    <a:schemeClr val="bg1">
+                      <a:lumMod val="85000"/>
+                    </a:schemeClr>
                   </a:solidFill>
                   <a:latin typeface="Consolas" pitchFamily="49" charset="0"/>
                   <a:cs typeface="Consolas" pitchFamily="49" charset="0"/>
@@ -4459,7 +4481,9 @@
               <a:r>
                 <a:rPr lang="en-GB" sz="2400" dirty="0" smtClean="0">
                   <a:solidFill>
-                    <a:schemeClr val="bg1"/>
+                    <a:schemeClr val="bg1">
+                      <a:lumMod val="85000"/>
+                    </a:schemeClr>
                   </a:solidFill>
                   <a:latin typeface="Consolas" pitchFamily="49" charset="0"/>
                   <a:cs typeface="Consolas" pitchFamily="49" charset="0"/>
@@ -4470,7 +4494,9 @@
             <a:p>
               <a:endParaRPr lang="en-GB" sz="2400" dirty="0">
                 <a:solidFill>
-                  <a:schemeClr val="bg1"/>
+                  <a:schemeClr val="bg1">
+                    <a:lumMod val="85000"/>
+                  </a:schemeClr>
                 </a:solidFill>
                 <a:latin typeface="Consolas" pitchFamily="49" charset="0"/>
                 <a:cs typeface="Consolas" pitchFamily="49" charset="0"/>

</xml_diff>

<commit_message>
Poster:  - Change background section  - Write project management  - Layout changes
References:
 - Add a reference to wren
</commit_message>
<xml_diff>
--- a/Poster/Poster.pptx
+++ b/Poster/Poster.pptx
@@ -289,7 +289,7 @@
             <a:fld id="{8ACDB3CC-F982-40F9-8DD6-BCC9AFBF44BD}" type="datetime1">
               <a:rPr lang="en-US" smtClean="0"/>
               <a:pPr/>
-              <a:t>11/27/2012</a:t>
+              <a:t>11/28/2012</a:t>
             </a:fld>
             <a:endParaRPr lang="en-US" dirty="0"/>
           </a:p>
@@ -459,7 +459,7 @@
           <a:p>
             <a:fld id="{68C2560D-EC28-3B41-86E8-18F1CE0113B4}" type="datetimeFigureOut">
               <a:rPr lang="en-US" smtClean="0"/>
-              <a:t>11/27/2012</a:t>
+              <a:t>11/28/2012</a:t>
             </a:fld>
             <a:endParaRPr lang="en-US"/>
           </a:p>
@@ -639,7 +639,7 @@
           <a:p>
             <a:fld id="{68C2560D-EC28-3B41-86E8-18F1CE0113B4}" type="datetimeFigureOut">
               <a:rPr lang="en-US" smtClean="0"/>
-              <a:t>11/27/2012</a:t>
+              <a:t>11/28/2012</a:t>
             </a:fld>
             <a:endParaRPr lang="en-US"/>
           </a:p>
@@ -809,7 +809,7 @@
           <a:p>
             <a:fld id="{68C2560D-EC28-3B41-86E8-18F1CE0113B4}" type="datetimeFigureOut">
               <a:rPr lang="en-US" smtClean="0"/>
-              <a:t>11/27/2012</a:t>
+              <a:t>11/28/2012</a:t>
             </a:fld>
             <a:endParaRPr lang="en-US"/>
           </a:p>
@@ -1056,7 +1056,7 @@
             <a:fld id="{4A9E7B99-7C3F-4BC3-B7B8-7E1F8C620B24}" type="datetime1">
               <a:rPr lang="en-US" smtClean="0"/>
               <a:pPr/>
-              <a:t>11/27/2012</a:t>
+              <a:t>11/28/2012</a:t>
             </a:fld>
             <a:endParaRPr lang="en-US"/>
           </a:p>
@@ -1345,7 +1345,7 @@
           <a:p>
             <a:fld id="{68C2560D-EC28-3B41-86E8-18F1CE0113B4}" type="datetimeFigureOut">
               <a:rPr lang="en-US" smtClean="0"/>
-              <a:t>11/27/2012</a:t>
+              <a:t>11/28/2012</a:t>
             </a:fld>
             <a:endParaRPr lang="en-US"/>
           </a:p>
@@ -1767,7 +1767,7 @@
           <a:p>
             <a:fld id="{68C2560D-EC28-3B41-86E8-18F1CE0113B4}" type="datetimeFigureOut">
               <a:rPr lang="en-US" smtClean="0"/>
-              <a:t>11/27/2012</a:t>
+              <a:t>11/28/2012</a:t>
             </a:fld>
             <a:endParaRPr lang="en-US"/>
           </a:p>
@@ -1885,7 +1885,7 @@
           <a:p>
             <a:fld id="{68C2560D-EC28-3B41-86E8-18F1CE0113B4}" type="datetimeFigureOut">
               <a:rPr lang="en-US" smtClean="0"/>
-              <a:t>11/27/2012</a:t>
+              <a:t>11/28/2012</a:t>
             </a:fld>
             <a:endParaRPr lang="en-US"/>
           </a:p>
@@ -1980,7 +1980,7 @@
           <a:p>
             <a:fld id="{68C2560D-EC28-3B41-86E8-18F1CE0113B4}" type="datetimeFigureOut">
               <a:rPr lang="en-US" smtClean="0"/>
-              <a:t>11/27/2012</a:t>
+              <a:t>11/28/2012</a:t>
             </a:fld>
             <a:endParaRPr lang="en-US"/>
           </a:p>
@@ -2257,7 +2257,7 @@
           <a:p>
             <a:fld id="{68C2560D-EC28-3B41-86E8-18F1CE0113B4}" type="datetimeFigureOut">
               <a:rPr lang="en-US" smtClean="0"/>
-              <a:t>11/27/2012</a:t>
+              <a:t>11/28/2012</a:t>
             </a:fld>
             <a:endParaRPr lang="en-US"/>
           </a:p>
@@ -2517,7 +2517,7 @@
           <a:p>
             <a:fld id="{68C2560D-EC28-3B41-86E8-18F1CE0113B4}" type="datetimeFigureOut">
               <a:rPr lang="en-US" smtClean="0"/>
-              <a:t>11/27/2012</a:t>
+              <a:t>11/28/2012</a:t>
             </a:fld>
             <a:endParaRPr lang="en-US"/>
           </a:p>
@@ -2730,7 +2730,7 @@
           <a:p>
             <a:fld id="{68C2560D-EC28-3B41-86E8-18F1CE0113B4}" type="datetimeFigureOut">
               <a:rPr lang="en-US" smtClean="0"/>
-              <a:t>11/27/2012</a:t>
+              <a:t>11/28/2012</a:t>
             </a:fld>
             <a:endParaRPr lang="en-US"/>
           </a:p>
@@ -3126,6 +3126,120 @@
           <a:chExt cx="0" cy="0"/>
         </a:xfrm>
       </p:grpSpPr>
+      <p:grpSp>
+        <p:nvGrpSpPr>
+          <p:cNvPr id="8" name="Group 7"/>
+          <p:cNvGrpSpPr/>
+          <p:nvPr/>
+        </p:nvGrpSpPr>
+        <p:grpSpPr>
+          <a:xfrm>
+            <a:off x="538932" y="21536248"/>
+            <a:ext cx="12114901" cy="5061414"/>
+            <a:chOff x="538932" y="20919157"/>
+            <a:chExt cx="12114901" cy="5061414"/>
+          </a:xfrm>
+        </p:grpSpPr>
+        <p:sp>
+          <p:nvSpPr>
+            <p:cNvPr id="17" name="Rounded Rectangle 16"/>
+            <p:cNvSpPr/>
+            <p:nvPr/>
+          </p:nvSpPr>
+          <p:spPr>
+            <a:xfrm>
+              <a:off x="538932" y="20919157"/>
+              <a:ext cx="12114901" cy="5061414"/>
+            </a:xfrm>
+            <a:prstGeom prst="roundRect">
+              <a:avLst>
+                <a:gd name="adj" fmla="val 8858"/>
+              </a:avLst>
+            </a:prstGeom>
+          </p:spPr>
+          <p:style>
+            <a:lnRef idx="2">
+              <a:schemeClr val="accent1">
+                <a:shade val="50000"/>
+              </a:schemeClr>
+            </a:lnRef>
+            <a:fillRef idx="1">
+              <a:schemeClr val="accent1"/>
+            </a:fillRef>
+            <a:effectRef idx="0">
+              <a:schemeClr val="accent1"/>
+            </a:effectRef>
+            <a:fontRef idx="minor">
+              <a:schemeClr val="lt1"/>
+            </a:fontRef>
+          </p:style>
+          <p:txBody>
+            <a:bodyPr rtlCol="0" anchor="t"/>
+            <a:lstStyle/>
+            <a:p>
+              <a:pPr algn="ctr"/>
+              <a:r>
+                <a:rPr lang="en-US" sz="4800" b="1" dirty="0" smtClean="0"/>
+                <a:t>Project </a:t>
+              </a:r>
+              <a:r>
+                <a:rPr lang="en-US" sz="4800" b="1" dirty="0" smtClean="0"/>
+                <a:t>Management</a:t>
+              </a:r>
+            </a:p>
+          </p:txBody>
+        </p:sp>
+        <p:sp>
+          <p:nvSpPr>
+            <p:cNvPr id="3" name="TextBox 2"/>
+            <p:cNvSpPr txBox="1"/>
+            <p:nvPr/>
+          </p:nvSpPr>
+          <p:spPr>
+            <a:xfrm>
+              <a:off x="1231900" y="22327809"/>
+              <a:ext cx="5067300" cy="2862322"/>
+            </a:xfrm>
+            <a:prstGeom prst="rect">
+              <a:avLst/>
+            </a:prstGeom>
+            <a:noFill/>
+          </p:spPr>
+          <p:txBody>
+            <a:bodyPr wrap="square" rtlCol="0">
+              <a:spAutoFit/>
+            </a:bodyPr>
+            <a:lstStyle/>
+            <a:p>
+              <a:r>
+                <a:rPr lang="en-GB" sz="2000" dirty="0" smtClean="0">
+                  <a:solidFill>
+                    <a:schemeClr val="bg1"/>
+                  </a:solidFill>
+                </a:rPr>
+                <a:t>For this project we allocated roles as shown in the table to the right. We met weekly to discus our progress as well as allocate tasks to each team member for the week.</a:t>
+              </a:r>
+            </a:p>
+            <a:p>
+              <a:endParaRPr lang="en-GB" sz="2000" dirty="0" smtClean="0">
+                <a:solidFill>
+                  <a:schemeClr val="bg1"/>
+                </a:solidFill>
+              </a:endParaRPr>
+            </a:p>
+            <a:p>
+              <a:r>
+                <a:rPr lang="en-GB" sz="2000" dirty="0" smtClean="0">
+                  <a:solidFill>
+                    <a:schemeClr val="bg1"/>
+                  </a:solidFill>
+                </a:rPr>
+                <a:t>We liaised with other academics and PhD students to assist in our project, and allocate time when we could have access to the wireless sensor nodes.</a:t>
+              </a:r>
+            </a:p>
+          </p:txBody>
+        </p:sp>
+      </p:grpSp>
       <p:sp>
         <p:nvSpPr>
           <p:cNvPr id="12" name="Rectangle 11"/>
@@ -3134,8 +3248,8 @@
         </p:nvSpPr>
         <p:spPr>
           <a:xfrm>
-            <a:off x="256033" y="0"/>
-            <a:ext cx="42281856" cy="2477601"/>
+            <a:off x="540459" y="0"/>
+            <a:ext cx="41699336" cy="2477601"/>
           </a:xfrm>
           <a:prstGeom prst="rect">
             <a:avLst/>
@@ -3208,7 +3322,7 @@
         </p:blipFill>
         <p:spPr>
           <a:xfrm>
-            <a:off x="30797132" y="26437930"/>
+            <a:off x="32358932" y="26489269"/>
             <a:ext cx="9880863" cy="3842043"/>
           </a:xfrm>
           <a:prstGeom prst="rect">
@@ -3224,8 +3338,8 @@
         </p:nvSpPr>
         <p:spPr>
           <a:xfrm>
-            <a:off x="1140534" y="2942543"/>
-            <a:ext cx="12114901" cy="3750865"/>
+            <a:off x="540459" y="2913969"/>
+            <a:ext cx="12114901" cy="3543982"/>
           </a:xfrm>
           <a:prstGeom prst="roundRect">
             <a:avLst/>
@@ -3297,7 +3411,7 @@
         </p:blipFill>
         <p:spPr>
           <a:xfrm>
-            <a:off x="17949166" y="2942543"/>
+            <a:off x="3073496" y="17361857"/>
             <a:ext cx="6895589" cy="3918880"/>
           </a:xfrm>
           <a:prstGeom prst="rect">
@@ -3313,8 +3427,8 @@
         </p:nvSpPr>
         <p:spPr>
           <a:xfrm>
-            <a:off x="29982019" y="2942544"/>
-            <a:ext cx="12114901" cy="3750864"/>
+            <a:off x="30124894" y="2894235"/>
+            <a:ext cx="12114900" cy="5192490"/>
           </a:xfrm>
           <a:prstGeom prst="roundRect">
             <a:avLst>
@@ -3359,35 +3473,39 @@
             </a:r>
             <a:r>
               <a:rPr lang="en-US" sz="2400" dirty="0" smtClean="0"/>
-              <a:t>etworks (WSNs) are becoming increasingly prevalent due to decreasing hardware costs and </a:t>
-            </a:r>
-            <a:r>
-              <a:rPr lang="en-US" sz="2400" dirty="0"/>
-              <a:t>hardware size. Therefore, it is important that we consider issues with them now, so we are prepared for when they become widely used. A major issue with any system is that it may contain bugs, fortunately, there are many well known methodologies for detecting and eliminating </a:t>
+              <a:t>etworks (WSNs) are </a:t>
             </a:r>
             <a:r>
               <a:rPr lang="en-US" sz="2400" dirty="0" smtClean="0"/>
-              <a:t>bugs. </a:t>
-            </a:r>
-            <a:r>
-              <a:rPr lang="en-US" sz="2400" dirty="0"/>
-              <a:t>However, in distributed systems there are additional challenges to </a:t>
-            </a:r>
+              <a:t>a collection of small computing devices equipped with a radio (for wireless communication), sensors (to get information on the environment) and a battery to power the device. </a:t>
+            </a:r>
+          </a:p>
+          <a:p>
+            <a:endParaRPr lang="en-US" sz="2400" dirty="0"/>
+          </a:p>
+          <a:p>
             <a:r>
               <a:rPr lang="en-US" sz="2400" dirty="0" smtClean="0"/>
-              <a:t>overcome </a:t>
-            </a:r>
-            <a:r>
-              <a:rPr lang="en-US" sz="2400" dirty="0"/>
-              <a:t>and there are additional challenges to overcome with WSNs due to the energy constrained environment they work </a:t>
+              <a:t>As these devices are not attached to the mains power we need to make sure that we do as little energy intensive work (</a:t>
+            </a:r>
+            <a:r>
+              <a:rPr lang="en-US" sz="2400" dirty="0" err="1" smtClean="0"/>
+              <a:t>eg</a:t>
             </a:r>
             <a:r>
               <a:rPr lang="en-US" sz="2400" dirty="0" smtClean="0"/>
-              <a:t>in.</a:t>
-            </a:r>
-          </a:p>
-          <a:p>
-            <a:endParaRPr lang="en-US" sz="2000" dirty="0"/>
+              <a:t>. Receiving/Transmitting data) as possible to lengthen the lifetime and usefulness of the network.</a:t>
+            </a:r>
+          </a:p>
+          <a:p>
+            <a:endParaRPr lang="en-US" sz="2400" dirty="0"/>
+          </a:p>
+          <a:p>
+            <a:r>
+              <a:rPr lang="en-US" sz="2400" dirty="0" smtClean="0"/>
+              <a:t>As energy is a limiting factor, the software developed for WSNs typically trade reliability for decreased energy usage. That means that very special care must be taken to develop programs that behave well and continue to behave well under real world conditions.</a:t>
+            </a:r>
+            <a:endParaRPr lang="en-US" sz="2400" dirty="0"/>
           </a:p>
         </p:txBody>
       </p:sp>
@@ -3399,7 +3517,7 @@
         </p:nvSpPr>
         <p:spPr>
           <a:xfrm>
-            <a:off x="1140534" y="7465581"/>
+            <a:off x="570533" y="7262556"/>
             <a:ext cx="12114901" cy="9849632"/>
           </a:xfrm>
           <a:prstGeom prst="roundRect">
@@ -3610,52 +3728,6 @@
           </a:p>
         </p:txBody>
       </p:sp>
-      <p:sp>
-        <p:nvSpPr>
-          <p:cNvPr id="17" name="Rounded Rectangle 16"/>
-          <p:cNvSpPr/>
-          <p:nvPr/>
-        </p:nvSpPr>
-        <p:spPr>
-          <a:xfrm>
-            <a:off x="1140534" y="19042139"/>
-            <a:ext cx="12114901" cy="8782626"/>
-          </a:xfrm>
-          <a:prstGeom prst="roundRect">
-            <a:avLst>
-              <a:gd name="adj" fmla="val 8858"/>
-            </a:avLst>
-          </a:prstGeom>
-        </p:spPr>
-        <p:style>
-          <a:lnRef idx="2">
-            <a:schemeClr val="accent1">
-              <a:shade val="50000"/>
-            </a:schemeClr>
-          </a:lnRef>
-          <a:fillRef idx="1">
-            <a:schemeClr val="accent1"/>
-          </a:fillRef>
-          <a:effectRef idx="0">
-            <a:schemeClr val="accent1"/>
-          </a:effectRef>
-          <a:fontRef idx="minor">
-            <a:schemeClr val="lt1"/>
-          </a:fontRef>
-        </p:style>
-        <p:txBody>
-          <a:bodyPr rtlCol="0" anchor="t"/>
-          <a:lstStyle/>
-          <a:p>
-            <a:pPr algn="ctr"/>
-            <a:r>
-              <a:rPr lang="en-US" sz="4800" b="1" dirty="0" smtClean="0"/>
-              <a:t>Project Management</a:t>
-            </a:r>
-            <a:endParaRPr lang="en-US" sz="2400" dirty="0"/>
-          </a:p>
-        </p:txBody>
-      </p:sp>
       <p:graphicFrame>
         <p:nvGraphicFramePr>
           <p:cNvPr id="16" name="Table 15"/>
@@ -3665,13 +3737,13 @@
           <p:nvPr>
             <p:extLst>
               <p:ext uri="{D42A27DB-BD31-4B8C-83A1-F6EECF244321}">
-                <p14:modId xmlns:p14="http://schemas.microsoft.com/office/powerpoint/2010/main" val="1839830533"/>
+                <p14:modId xmlns:p14="http://schemas.microsoft.com/office/powerpoint/2010/main" val="42115809"/>
               </p:ext>
             </p:extLst>
           </p:nvPr>
         </p:nvGraphicFramePr>
         <p:xfrm>
-          <a:off x="7549843" y="20202572"/>
+          <a:off x="6856040" y="23037711"/>
           <a:ext cx="5132539" cy="2774114"/>
         </p:xfrm>
         <a:graphic>
@@ -3914,8 +3986,8 @@
         </p:nvSpPr>
         <p:spPr>
           <a:xfrm>
-            <a:off x="29737917" y="21089256"/>
-            <a:ext cx="12114901" cy="5400013"/>
+            <a:off x="30124894" y="21665662"/>
+            <a:ext cx="12114900" cy="4932000"/>
           </a:xfrm>
           <a:prstGeom prst="roundRect">
             <a:avLst/>
@@ -4138,8 +4210,8 @@
         </p:nvSpPr>
         <p:spPr>
           <a:xfrm>
-            <a:off x="15339509" y="7465581"/>
-            <a:ext cx="12114901" cy="18972350"/>
+            <a:off x="14130709" y="2913968"/>
+            <a:ext cx="14518836" cy="23683693"/>
           </a:xfrm>
           <a:prstGeom prst="roundRect">
             <a:avLst>
@@ -4236,7 +4308,6 @@
               <a:rPr lang="en-US" sz="4000" b="1" dirty="0" smtClean="0"/>
               <a:t>Clustering</a:t>
             </a:r>
-            <a:endParaRPr lang="en-US" sz="4000" b="1" dirty="0" smtClean="0"/>
           </a:p>
           <a:p>
             <a:endParaRPr lang="en-US" sz="4000" b="1" dirty="0"/>
@@ -4281,8 +4352,8 @@
         </p:nvSpPr>
         <p:spPr>
           <a:xfrm>
-            <a:off x="29737918" y="15722074"/>
-            <a:ext cx="12114901" cy="4804673"/>
+            <a:off x="30124894" y="16602073"/>
+            <a:ext cx="12114900" cy="4230000"/>
           </a:xfrm>
           <a:prstGeom prst="roundRect">
             <a:avLst>
@@ -4327,8 +4398,8 @@
         </p:nvSpPr>
         <p:spPr>
           <a:xfrm>
-            <a:off x="15339509" y="27151267"/>
-            <a:ext cx="12951943" cy="2415370"/>
+            <a:off x="570534" y="27294724"/>
+            <a:ext cx="32164018" cy="2415370"/>
           </a:xfrm>
           <a:prstGeom prst="roundRect">
             <a:avLst/>
@@ -4378,7 +4449,7 @@
         </p:nvGrpSpPr>
         <p:grpSpPr>
           <a:xfrm>
-            <a:off x="1716638" y="14515123"/>
+            <a:off x="1113511" y="14869290"/>
             <a:ext cx="10968796" cy="1661994"/>
             <a:chOff x="14932760" y="11856894"/>
             <a:chExt cx="10968796" cy="1661994"/>
@@ -4663,7 +4734,7 @@
         </p:blipFill>
         <p:spPr bwMode="auto">
           <a:xfrm>
-            <a:off x="29982019" y="7465581"/>
+            <a:off x="30420823" y="8485517"/>
             <a:ext cx="10749090" cy="7403710"/>
           </a:xfrm>
           <a:prstGeom prst="rect">
@@ -4726,7 +4797,7 @@
         </p:blipFill>
         <p:spPr>
           <a:xfrm>
-            <a:off x="16719311" y="21141102"/>
+            <a:off x="16652543" y="20832073"/>
             <a:ext cx="9355295" cy="4584700"/>
           </a:xfrm>
           <a:prstGeom prst="rect">
@@ -4756,7 +4827,7 @@
         </p:blipFill>
         <p:spPr>
           <a:xfrm>
-            <a:off x="21815481" y="12491024"/>
+            <a:off x="23108769" y="10152434"/>
             <a:ext cx="4736584" cy="4756533"/>
           </a:xfrm>
           <a:prstGeom prst="rect">
@@ -5105,6 +5176,24 @@
 </file>
 
 <file path=customXml/item1.xml><?xml version="1.0" encoding="utf-8"?>
+<p:properties xmlns:p="http://schemas.microsoft.com/office/2006/metadata/properties" xmlns:xsi="http://www.w3.org/2001/XMLSchema-instance" xmlns:pc="http://schemas.microsoft.com/office/infopath/2007/PartnerControls">
+  <documentManagement>
+    <_Version xmlns="http://schemas.microsoft.com/sharepoint/v3/fields" xsi:nil="true"/>
+    <_Status xmlns="http://schemas.microsoft.com/sharepoint/v3/fields">Not Started</_Status>
+  </documentManagement>
+</p:properties>
+</file>
+
+<file path=customXml/item2.xml><?xml version="1.0" encoding="utf-8"?>
+<?mso-contentType ?>
+<FormTemplates xmlns="http://schemas.microsoft.com/sharepoint/v3/contenttype/forms">
+  <Display>DocumentLibraryForm</Display>
+  <Edit>DocumentLibraryForm</Edit>
+  <New>DocumentLibraryForm</New>
+</FormTemplates>
+</file>
+
+<file path=customXml/item3.xml><?xml version="1.0" encoding="utf-8"?>
 <ct:contentTypeSchema xmlns:ct="http://schemas.microsoft.com/office/2006/metadata/contentType" xmlns:ma="http://schemas.microsoft.com/office/2006/metadata/properties/metaAttributes" ct:_="" ma:_="" ma:contentTypeName="Document" ma:contentTypeID="0x0101000DE64AEEDD9B7A4D93545ACBE97D4615" ma:contentTypeVersion="2" ma:contentTypeDescription="Create a new document." ma:contentTypeScope="" ma:versionID="f49002b78e3a4a71b814eef46a983816">
   <xsd:schema xmlns:xsd="http://www.w3.org/2001/XMLSchema" xmlns:xs="http://www.w3.org/2001/XMLSchema" xmlns:p="http://schemas.microsoft.com/office/2006/metadata/properties" xmlns:ns2="http://schemas.microsoft.com/sharepoint/v3/fields" targetNamespace="http://schemas.microsoft.com/office/2006/metadata/properties" ma:root="true" ma:fieldsID="38f6db2dd0d9a0cf6a8dc37be32b365b" ns2:_="">
     <xsd:import namespace="http://schemas.microsoft.com/sharepoint/v3/fields"/>
@@ -5248,25 +5337,31 @@
 </ct:contentTypeSchema>
 </file>
 
-<file path=customXml/item2.xml><?xml version="1.0" encoding="utf-8"?>
-<?mso-contentType ?>
-<FormTemplates xmlns="http://schemas.microsoft.com/sharepoint/v3/contenttype/forms">
-  <Display>DocumentLibraryForm</Display>
-  <Edit>DocumentLibraryForm</Edit>
-  <New>DocumentLibraryForm</New>
-</FormTemplates>
+<file path=customXml/itemProps1.xml><?xml version="1.0" encoding="utf-8"?>
+<ds:datastoreItem xmlns:ds="http://schemas.openxmlformats.org/officeDocument/2006/customXml" ds:itemID="{7B6F2769-7194-4217-93D3-3AF3A4742282}">
+  <ds:schemaRefs>
+    <ds:schemaRef ds:uri="http://schemas.microsoft.com/sharepoint/v3/fields"/>
+    <ds:schemaRef ds:uri="http://purl.org/dc/terms/"/>
+    <ds:schemaRef ds:uri="http://purl.org/dc/elements/1.1/"/>
+    <ds:schemaRef ds:uri="http://schemas.openxmlformats.org/package/2006/metadata/core-properties"/>
+    <ds:schemaRef ds:uri="http://purl.org/dc/dcmitype/"/>
+    <ds:schemaRef ds:uri="http://schemas.microsoft.com/office/2006/documentManagement/types"/>
+    <ds:schemaRef ds:uri="http://schemas.microsoft.com/office/infopath/2007/PartnerControls"/>
+    <ds:schemaRef ds:uri="http://schemas.microsoft.com/office/2006/metadata/properties"/>
+    <ds:schemaRef ds:uri="http://www.w3.org/XML/1998/namespace"/>
+  </ds:schemaRefs>
+</ds:datastoreItem>
 </file>
 
-<file path=customXml/item3.xml><?xml version="1.0" encoding="utf-8"?>
-<p:properties xmlns:p="http://schemas.microsoft.com/office/2006/metadata/properties" xmlns:xsi="http://www.w3.org/2001/XMLSchema-instance" xmlns:pc="http://schemas.microsoft.com/office/infopath/2007/PartnerControls">
-  <documentManagement>
-    <_Version xmlns="http://schemas.microsoft.com/sharepoint/v3/fields" xsi:nil="true"/>
-    <_Status xmlns="http://schemas.microsoft.com/sharepoint/v3/fields">Not Started</_Status>
-  </documentManagement>
-</p:properties>
+<file path=customXml/itemProps2.xml><?xml version="1.0" encoding="utf-8"?>
+<ds:datastoreItem xmlns:ds="http://schemas.openxmlformats.org/officeDocument/2006/customXml" ds:itemID="{87D2A1B0-FF3E-4009-940D-AED0EB70AA20}">
+  <ds:schemaRefs>
+    <ds:schemaRef ds:uri="http://schemas.microsoft.com/sharepoint/v3/contenttype/forms"/>
+  </ds:schemaRefs>
+</ds:datastoreItem>
 </file>
 
-<file path=customXml/itemProps1.xml><?xml version="1.0" encoding="utf-8"?>
+<file path=customXml/itemProps3.xml><?xml version="1.0" encoding="utf-8"?>
 <ds:datastoreItem xmlns:ds="http://schemas.openxmlformats.org/officeDocument/2006/customXml" ds:itemID="{E4214858-785C-42F7-BE66-6D0E79395FC8}">
   <ds:schemaRefs>
     <ds:schemaRef ds:uri="http://schemas.microsoft.com/office/2006/metadata/contentType"/>
@@ -5282,28 +5377,4 @@
     <ds:schemaRef ds:uri="http://schemas.microsoft.com/internal/obd"/>
   </ds:schemaRefs>
 </ds:datastoreItem>
-</file>
-
-<file path=customXml/itemProps2.xml><?xml version="1.0" encoding="utf-8"?>
-<ds:datastoreItem xmlns:ds="http://schemas.openxmlformats.org/officeDocument/2006/customXml" ds:itemID="{87D2A1B0-FF3E-4009-940D-AED0EB70AA20}">
-  <ds:schemaRefs>
-    <ds:schemaRef ds:uri="http://schemas.microsoft.com/sharepoint/v3/contenttype/forms"/>
-  </ds:schemaRefs>
-</ds:datastoreItem>
-</file>
-
-<file path=customXml/itemProps3.xml><?xml version="1.0" encoding="utf-8"?>
-<ds:datastoreItem xmlns:ds="http://schemas.openxmlformats.org/officeDocument/2006/customXml" ds:itemID="{7B6F2769-7194-4217-93D3-3AF3A4742282}">
-  <ds:schemaRefs>
-    <ds:schemaRef ds:uri="http://schemas.microsoft.com/sharepoint/v3/fields"/>
-    <ds:schemaRef ds:uri="http://purl.org/dc/terms/"/>
-    <ds:schemaRef ds:uri="http://purl.org/dc/elements/1.1/"/>
-    <ds:schemaRef ds:uri="http://schemas.openxmlformats.org/package/2006/metadata/core-properties"/>
-    <ds:schemaRef ds:uri="http://purl.org/dc/dcmitype/"/>
-    <ds:schemaRef ds:uri="http://schemas.microsoft.com/office/2006/documentManagement/types"/>
-    <ds:schemaRef ds:uri="http://schemas.microsoft.com/office/infopath/2007/PartnerControls"/>
-    <ds:schemaRef ds:uri="http://schemas.microsoft.com/office/2006/metadata/properties"/>
-    <ds:schemaRef ds:uri="http://www.w3.org/XML/1998/namespace"/>
-  </ds:schemaRefs>
-</ds:datastoreItem>
 </file>
</xml_diff>

<commit_message>
Add a section on the visualisation tool and do a write up of aggregation tree. Also redo the clustering diagram to take up less space
</commit_message>
<xml_diff>
--- a/Poster/Poster.pptx
+++ b/Poster/Poster.pptx
@@ -3134,10 +3134,10 @@
         </p:nvGrpSpPr>
         <p:grpSpPr>
           <a:xfrm>
-            <a:off x="538932" y="21536248"/>
-            <a:ext cx="12114901" cy="5061414"/>
-            <a:chOff x="538932" y="20919157"/>
-            <a:chExt cx="12114901" cy="5061414"/>
+            <a:off x="538932" y="22440900"/>
+            <a:ext cx="12114901" cy="4156760"/>
+            <a:chOff x="538932" y="21879240"/>
+            <a:chExt cx="12114901" cy="4101331"/>
           </a:xfrm>
         </p:grpSpPr>
         <p:sp>
@@ -3148,8 +3148,8 @@
           </p:nvSpPr>
           <p:spPr>
             <a:xfrm>
-              <a:off x="538932" y="20919157"/>
-              <a:ext cx="12114901" cy="5061414"/>
+              <a:off x="538932" y="21879240"/>
+              <a:ext cx="12114901" cy="4101331"/>
             </a:xfrm>
             <a:prstGeom prst="roundRect">
               <a:avLst>
@@ -3193,8 +3193,8 @@
           </p:nvSpPr>
           <p:spPr>
             <a:xfrm>
-              <a:off x="1231900" y="22327809"/>
-              <a:ext cx="5067300" cy="2862322"/>
+              <a:off x="781050" y="22847333"/>
+              <a:ext cx="5676900" cy="2733440"/>
             </a:xfrm>
             <a:prstGeom prst="rect">
               <a:avLst/>
@@ -3407,7 +3407,7 @@
         </p:blipFill>
         <p:spPr>
           <a:xfrm>
-            <a:off x="3073496" y="17361857"/>
+            <a:off x="18503996" y="7639136"/>
             <a:ext cx="6895589" cy="3918880"/>
           </a:xfrm>
           <a:prstGeom prst="rect">
@@ -3550,7 +3550,7 @@
           <a:p>
             <a:r>
               <a:rPr lang="en-US" sz="2000" dirty="0" smtClean="0"/>
-              <a:t>One of the requirements of our project is that we wished to specify predicates to be checked, not just at compile time, but also at run time. The main reason is that the needs of a system will change over time.</a:t>
+              <a:t>One of the requirements of our project is that we wished to specify predicates to be checked, not just at compile-time, but also at run-time. The main reason is that the needs of a system will change over time.</a:t>
             </a:r>
           </a:p>
           <a:p>
@@ -3729,13 +3729,13 @@
           <p:nvPr>
             <p:extLst>
               <p:ext uri="{D42A27DB-BD31-4B8C-83A1-F6EECF244321}">
-                <p14:modId xmlns:p14="http://schemas.microsoft.com/office/powerpoint/2010/main" val="42115809"/>
+                <p14:modId xmlns:p14="http://schemas.microsoft.com/office/powerpoint/2010/main" val="2104098092"/>
               </p:ext>
             </p:extLst>
           </p:nvPr>
         </p:nvGraphicFramePr>
         <p:xfrm>
-          <a:off x="6856040" y="23037711"/>
+          <a:off x="6856040" y="23430863"/>
           <a:ext cx="5132539" cy="2774114"/>
         </p:xfrm>
         <a:graphic>
@@ -4056,7 +4056,7 @@
                   <a:schemeClr val="bg1"/>
                 </a:solidFill>
               </a:rPr>
-              <a:t>Improve dynamic specification</a:t>
+              <a:t>Improve run-time definition and evaluation</a:t>
             </a:r>
           </a:p>
           <a:p>
@@ -4202,8 +4202,8 @@
         </p:nvSpPr>
         <p:spPr>
           <a:xfrm>
-            <a:off x="14130709" y="2913968"/>
-            <a:ext cx="14518836" cy="23683693"/>
+            <a:off x="14130709" y="11925300"/>
+            <a:ext cx="14518836" cy="14672361"/>
           </a:xfrm>
           <a:prstGeom prst="roundRect">
             <a:avLst>
@@ -4238,21 +4238,22 @@
             </a:r>
           </a:p>
           <a:p>
-            <a:r>
-              <a:rPr lang="en-US" sz="4000" b="1" dirty="0" smtClean="0"/>
-              <a:t>HSEND</a:t>
-            </a:r>
-          </a:p>
-          <a:p>
-            <a:endParaRPr lang="en-US" sz="4000" b="1" dirty="0"/>
-          </a:p>
-          <a:p>
-            <a:r>
-              <a:rPr lang="en-US" sz="4000" b="1" dirty="0" smtClean="0"/>
+            <a:endParaRPr lang="en-US" sz="2400" b="1" dirty="0" smtClean="0"/>
+          </a:p>
+          <a:p>
+            <a:r>
+              <a:rPr lang="en-US" sz="2400" dirty="0" smtClean="0"/>
+              <a:t>When developing software for WSNs, there are several algorithms that are commonly used to perform certain tasks. So, in order to  test that our solution is applicable to real world code, we have developed some of these algorithms for us to specify and check predicates for.</a:t>
+            </a:r>
+            <a:endParaRPr lang="en-US" sz="2000" dirty="0" smtClean="0"/>
+          </a:p>
+          <a:p>
+            <a:r>
+              <a:rPr lang="en-US" sz="2000" b="1" dirty="0" smtClean="0"/>
               <a:t/>
             </a:r>
             <a:br>
-              <a:rPr lang="en-US" sz="4000" b="1" dirty="0" smtClean="0"/>
+              <a:rPr lang="en-US" sz="2000" b="1" dirty="0" smtClean="0"/>
             </a:br>
             <a:r>
               <a:rPr lang="en-US" sz="4000" b="1" dirty="0" smtClean="0"/>
@@ -4260,40 +4261,31 @@
             </a:r>
           </a:p>
           <a:p>
-            <a:endParaRPr lang="en-US" sz="4000" b="1" dirty="0"/>
-          </a:p>
-          <a:p>
-            <a:endParaRPr lang="en-US" sz="4000" b="1" dirty="0" smtClean="0"/>
-          </a:p>
-          <a:p>
-            <a:endParaRPr lang="en-US" sz="4000" b="1" dirty="0"/>
-          </a:p>
-          <a:p>
-            <a:endParaRPr lang="en-US" sz="4000" b="1" dirty="0" smtClean="0"/>
-          </a:p>
-          <a:p>
-            <a:endParaRPr lang="en-US" sz="4000" b="1" dirty="0"/>
-          </a:p>
-          <a:p>
-            <a:endParaRPr lang="en-US" sz="4000" b="1" dirty="0" smtClean="0"/>
-          </a:p>
-          <a:p>
-            <a:endParaRPr lang="en-US" sz="4000" b="1" dirty="0"/>
-          </a:p>
-          <a:p>
-            <a:endParaRPr lang="en-US" sz="4000" b="1" dirty="0" smtClean="0"/>
-          </a:p>
-          <a:p>
-            <a:endParaRPr lang="en-US" sz="4000" b="1" dirty="0"/>
-          </a:p>
-          <a:p>
-            <a:endParaRPr lang="en-US" sz="4000" b="1" dirty="0" smtClean="0"/>
-          </a:p>
-          <a:p>
-            <a:endParaRPr lang="en-US" sz="4000" b="1" dirty="0"/>
-          </a:p>
-          <a:p>
-            <a:endParaRPr lang="en-US" sz="4000" b="1" dirty="0" smtClean="0"/>
+            <a:endParaRPr lang="en-US" sz="2000" b="1" dirty="0" smtClean="0"/>
+          </a:p>
+          <a:p>
+            <a:endParaRPr lang="en-US" sz="2000" b="1" dirty="0" smtClean="0"/>
+          </a:p>
+          <a:p>
+            <a:endParaRPr lang="en-US" sz="2000" b="1" dirty="0"/>
+          </a:p>
+          <a:p>
+            <a:endParaRPr lang="en-US" sz="2000" b="1" dirty="0" smtClean="0"/>
+          </a:p>
+          <a:p>
+            <a:endParaRPr lang="en-US" sz="2000" b="1" dirty="0"/>
+          </a:p>
+          <a:p>
+            <a:endParaRPr lang="en-US" sz="2000" b="1" dirty="0" smtClean="0"/>
+          </a:p>
+          <a:p>
+            <a:endParaRPr lang="en-US" sz="2000" b="1" dirty="0" smtClean="0"/>
+          </a:p>
+          <a:p>
+            <a:endParaRPr lang="en-US" sz="2000" b="1" dirty="0" smtClean="0"/>
+          </a:p>
+          <a:p>
+            <a:endParaRPr lang="en-US" sz="2000" b="1" dirty="0" smtClean="0"/>
           </a:p>
           <a:p>
             <a:r>
@@ -4302,9 +4294,16 @@
             </a:r>
           </a:p>
           <a:p>
+            <a:endParaRPr lang="en-GB" sz="2000" dirty="0" smtClean="0"/>
+          </a:p>
+          <a:p>
+            <a:r>
+              <a:rPr lang="en-GB" sz="2000" dirty="0" smtClean="0"/>
+              <a:t>As </a:t>
+            </a:r>
             <a:r>
               <a:rPr lang="en-GB" sz="2000" dirty="0"/>
-              <a:t>As two of the key constraints in a WSN are energy consumption and bandwidth, we made it a priority to minimise the number of messages sent through the network; clustering is perhaps the most widely-used strategy for achieving this.</a:t>
+              <a:t>two of the key constraints in a WSN are energy consumption and bandwidth, we made it a priority to minimise the number of messages sent through the network; clustering is perhaps the most widely-used strategy for achieving this.</a:t>
             </a:r>
           </a:p>
           <a:p>
@@ -4378,64 +4377,10 @@
             <a:endParaRPr lang="en-GB" sz="2000" dirty="0"/>
           </a:p>
           <a:p>
-            <a:r>
-              <a:rPr lang="en-US" sz="2000" dirty="0" smtClean="0"/>
-              <a:t>Hierarchical clustering also begins by electing the nodes within range of the sink as CHs at level 1, but as the setup message spreads through the network nodes whose shortest path to their nearest leve</a:t>
-            </a:r>
-            <a:r>
-              <a:rPr lang="en-US" sz="2000" dirty="0" smtClean="0"/>
-              <a:t>l n</a:t>
-            </a:r>
-            <a:r>
-              <a:rPr lang="en-US" sz="2000" dirty="0" smtClean="0"/>
-              <a:t> </a:t>
-            </a:r>
-            <a:r>
-              <a:rPr lang="en-US" sz="2000" dirty="0" err="1" smtClean="0"/>
-              <a:t>clusterhead</a:t>
-            </a:r>
-            <a:r>
-              <a:rPr lang="en-US" sz="2000" dirty="0" smtClean="0"/>
-              <a:t> is  D hops (where D is specified in advance) also elect themselves as </a:t>
-            </a:r>
-            <a:r>
-              <a:rPr lang="en-US" sz="2000" dirty="0" err="1" smtClean="0"/>
-              <a:t>clusterheads</a:t>
-            </a:r>
-            <a:r>
-              <a:rPr lang="en-US" sz="2000" dirty="0" smtClean="0"/>
-              <a:t> and create a new cluster for level n+1. </a:t>
-            </a:r>
-            <a:r>
-              <a:rPr lang="en-US" sz="2000" dirty="0" smtClean="0"/>
-              <a:t>For D &gt; 1, nodes pass messages to their CH through the other nodes in their cluster, using </a:t>
-            </a:r>
-            <a:r>
-              <a:rPr lang="en-US" sz="2000" dirty="0" err="1" smtClean="0"/>
-              <a:t>Contiki’s</a:t>
-            </a:r>
-            <a:r>
-              <a:rPr lang="en-US" sz="2000" dirty="0" smtClean="0"/>
-              <a:t> low-overhead </a:t>
-            </a:r>
-            <a:r>
-              <a:rPr lang="en-US" sz="2000" smtClean="0"/>
-              <a:t>mesh messaging protocol</a:t>
-            </a:r>
-            <a:r>
-              <a:rPr lang="en-US" sz="2000" dirty="0" smtClean="0"/>
-              <a:t>.</a:t>
-            </a:r>
-            <a:endParaRPr lang="en-US" sz="2000" dirty="0"/>
-          </a:p>
-          <a:p>
             <a:endParaRPr lang="en-US" sz="4000" b="1" dirty="0"/>
           </a:p>
           <a:p>
             <a:endParaRPr lang="en-US" sz="4000" b="1" dirty="0" smtClean="0"/>
-          </a:p>
-          <a:p>
-            <a:endParaRPr lang="en-US" sz="4000" b="1" dirty="0"/>
           </a:p>
           <a:p>
             <a:endParaRPr lang="en-US" sz="4000" b="1" dirty="0" smtClean="0"/>
@@ -4459,8 +4404,8 @@
         </p:nvSpPr>
         <p:spPr>
           <a:xfrm>
-            <a:off x="30124894" y="16602073"/>
-            <a:ext cx="12114900" cy="4230000"/>
+            <a:off x="30124894" y="17958817"/>
+            <a:ext cx="12114900" cy="2873256"/>
           </a:xfrm>
           <a:prstGeom prst="roundRect">
             <a:avLst>
@@ -4556,7 +4501,7 @@
         </p:nvGrpSpPr>
         <p:grpSpPr>
           <a:xfrm>
-            <a:off x="1113511" y="14869290"/>
+            <a:off x="1110459" y="14638457"/>
             <a:ext cx="10968796" cy="1661994"/>
             <a:chOff x="14932760" y="11856894"/>
             <a:chExt cx="10968796" cy="1661994"/>
@@ -4590,9 +4535,7 @@
               <a:r>
                 <a:rPr lang="en-GB" sz="2400" dirty="0">
                   <a:solidFill>
-                    <a:schemeClr val="bg1">
-                      <a:lumMod val="85000"/>
-                    </a:schemeClr>
+                    <a:srgbClr val="FFFF00"/>
                   </a:solidFill>
                   <a:latin typeface="Consolas" pitchFamily="49" charset="0"/>
                   <a:cs typeface="Consolas" pitchFamily="49" charset="0"/>
@@ -4602,9 +4545,7 @@
               <a:r>
                 <a:rPr lang="en-GB" sz="2400" dirty="0" err="1">
                   <a:solidFill>
-                    <a:schemeClr val="bg1">
-                      <a:lumMod val="85000"/>
-                    </a:schemeClr>
+                    <a:srgbClr val="FFFF00"/>
                   </a:solidFill>
                   <a:latin typeface="Consolas" pitchFamily="49" charset="0"/>
                   <a:cs typeface="Consolas" pitchFamily="49" charset="0"/>
@@ -4614,9 +4555,7 @@
               <a:r>
                 <a:rPr lang="en-GB" sz="2400" dirty="0">
                   <a:solidFill>
-                    <a:schemeClr val="bg1">
-                      <a:lumMod val="85000"/>
-                    </a:schemeClr>
+                    <a:srgbClr val="FFFF00"/>
                   </a:solidFill>
                   <a:latin typeface="Consolas" pitchFamily="49" charset="0"/>
                   <a:cs typeface="Consolas" pitchFamily="49" charset="0"/>
@@ -4628,9 +4567,7 @@
               <a:r>
                 <a:rPr lang="en-GB" sz="2400" dirty="0">
                   <a:solidFill>
-                    <a:schemeClr val="bg1">
-                      <a:lumMod val="85000"/>
-                    </a:schemeClr>
+                    <a:srgbClr val="FFFF00"/>
                   </a:solidFill>
                   <a:latin typeface="Consolas" pitchFamily="49" charset="0"/>
                   <a:cs typeface="Consolas" pitchFamily="49" charset="0"/>
@@ -4640,9 +4577,7 @@
               <a:r>
                 <a:rPr lang="en-GB" sz="2400" dirty="0" err="1">
                   <a:solidFill>
-                    <a:schemeClr val="bg1">
-                      <a:lumMod val="85000"/>
-                    </a:schemeClr>
+                    <a:srgbClr val="FFFF00"/>
                   </a:solidFill>
                   <a:latin typeface="Consolas" pitchFamily="49" charset="0"/>
                   <a:cs typeface="Consolas" pitchFamily="49" charset="0"/>
@@ -4652,9 +4587,7 @@
               <a:r>
                 <a:rPr lang="en-GB" sz="2400" dirty="0">
                   <a:solidFill>
-                    <a:schemeClr val="bg1">
-                      <a:lumMod val="85000"/>
-                    </a:schemeClr>
+                    <a:srgbClr val="FFFF00"/>
                   </a:solidFill>
                   <a:latin typeface="Consolas" pitchFamily="49" charset="0"/>
                   <a:cs typeface="Consolas" pitchFamily="49" charset="0"/>
@@ -4666,9 +4599,7 @@
               <a:r>
                 <a:rPr lang="en-GB" sz="2400" dirty="0" smtClean="0">
                   <a:solidFill>
-                    <a:schemeClr val="bg1">
-                      <a:lumMod val="85000"/>
-                    </a:schemeClr>
+                    <a:srgbClr val="FFFF00"/>
                   </a:solidFill>
                   <a:latin typeface="Consolas" pitchFamily="49" charset="0"/>
                   <a:cs typeface="Consolas" pitchFamily="49" charset="0"/>
@@ -4677,9 +4608,7 @@
               </a:r>
               <a:endParaRPr lang="en-US" sz="2400" dirty="0">
                 <a:solidFill>
-                  <a:schemeClr val="bg1">
-                    <a:lumMod val="85000"/>
-                  </a:schemeClr>
+                  <a:srgbClr val="FFFF00"/>
                 </a:solidFill>
                 <a:latin typeface="Consolas" pitchFamily="49" charset="0"/>
                 <a:cs typeface="Consolas" pitchFamily="49" charset="0"/>
@@ -4715,9 +4644,7 @@
               <a:r>
                 <a:rPr lang="en-GB" sz="2400" dirty="0" smtClean="0">
                   <a:solidFill>
-                    <a:schemeClr val="bg1">
-                      <a:lumMod val="85000"/>
-                    </a:schemeClr>
+                    <a:srgbClr val="FFFF00"/>
                   </a:solidFill>
                   <a:latin typeface="Consolas" pitchFamily="49" charset="0"/>
                   <a:cs typeface="Consolas" pitchFamily="49" charset="0"/>
@@ -4727,9 +4654,7 @@
               <a:r>
                 <a:rPr lang="el-GR" sz="2400" dirty="0" smtClean="0">
                   <a:solidFill>
-                    <a:schemeClr val="bg1">
-                      <a:lumMod val="85000"/>
-                    </a:schemeClr>
+                    <a:srgbClr val="FFFF00"/>
                   </a:solidFill>
                   <a:latin typeface="Consolas" pitchFamily="49" charset="0"/>
                   <a:cs typeface="Consolas" pitchFamily="49" charset="0"/>
@@ -4739,9 +4664,7 @@
               <a:r>
                 <a:rPr lang="en-GB" sz="2400" dirty="0" smtClean="0">
                   <a:solidFill>
-                    <a:schemeClr val="bg1">
-                      <a:lumMod val="85000"/>
-                    </a:schemeClr>
+                    <a:srgbClr val="FFFF00"/>
                   </a:solidFill>
                   <a:latin typeface="Consolas" pitchFamily="49" charset="0"/>
                   <a:cs typeface="Consolas" pitchFamily="49" charset="0"/>
@@ -4753,9 +4676,7 @@
               <a:r>
                 <a:rPr lang="en-GB" sz="2400" dirty="0" smtClean="0">
                   <a:solidFill>
-                    <a:schemeClr val="bg1">
-                      <a:lumMod val="85000"/>
-                    </a:schemeClr>
+                    <a:srgbClr val="FFFF00"/>
                   </a:solidFill>
                   <a:latin typeface="Consolas" pitchFamily="49" charset="0"/>
                   <a:cs typeface="Consolas" pitchFamily="49" charset="0"/>
@@ -4766,9 +4687,7 @@
             <a:p>
               <a:endParaRPr lang="en-GB" sz="2400" dirty="0">
                 <a:solidFill>
-                  <a:schemeClr val="bg1">
-                    <a:lumMod val="85000"/>
-                  </a:schemeClr>
+                  <a:srgbClr val="FFFF00"/>
                 </a:solidFill>
                 <a:latin typeface="Consolas" pitchFamily="49" charset="0"/>
                 <a:cs typeface="Consolas" pitchFamily="49" charset="0"/>
@@ -4884,7 +4803,7 @@
       </p:pic>
       <p:pic>
         <p:nvPicPr>
-          <p:cNvPr id="4" name="Picture 3"/>
+          <p:cNvPr id="6" name="Picture 5"/>
           <p:cNvPicPr>
             <a:picLocks noChangeAspect="1"/>
           </p:cNvPicPr>
@@ -4904,17 +4823,128 @@
         </p:blipFill>
         <p:spPr>
           <a:xfrm>
-            <a:off x="16652543" y="20832073"/>
-            <a:ext cx="9355295" cy="4584700"/>
+            <a:off x="23580554" y="14504947"/>
+            <a:ext cx="4736584" cy="4756533"/>
           </a:xfrm>
           <a:prstGeom prst="rect">
             <a:avLst/>
           </a:prstGeom>
         </p:spPr>
       </p:pic>
+      <p:sp>
+        <p:nvSpPr>
+          <p:cNvPr id="27" name="Rounded Rectangle 26"/>
+          <p:cNvSpPr/>
+          <p:nvPr/>
+        </p:nvSpPr>
+        <p:spPr>
+          <a:xfrm>
+            <a:off x="15272739" y="2913969"/>
+            <a:ext cx="12114901" cy="3543982"/>
+          </a:xfrm>
+          <a:prstGeom prst="roundRect">
+            <a:avLst/>
+          </a:prstGeom>
+        </p:spPr>
+        <p:style>
+          <a:lnRef idx="2">
+            <a:schemeClr val="accent1">
+              <a:shade val="50000"/>
+            </a:schemeClr>
+          </a:lnRef>
+          <a:fillRef idx="1">
+            <a:schemeClr val="accent1"/>
+          </a:fillRef>
+          <a:effectRef idx="0">
+            <a:schemeClr val="accent1"/>
+          </a:effectRef>
+          <a:fontRef idx="minor">
+            <a:schemeClr val="lt1"/>
+          </a:fontRef>
+        </p:style>
+        <p:txBody>
+          <a:bodyPr rtlCol="0" anchor="ctr"/>
+          <a:lstStyle/>
+          <a:p>
+            <a:pPr algn="ctr"/>
+            <a:r>
+              <a:rPr lang="en-US" sz="4800" b="1" dirty="0" smtClean="0"/>
+              <a:t>HSEND</a:t>
+            </a:r>
+          </a:p>
+          <a:p>
+            <a:endParaRPr lang="en-US" sz="2000" dirty="0"/>
+          </a:p>
+        </p:txBody>
+      </p:sp>
+      <p:sp>
+        <p:nvSpPr>
+          <p:cNvPr id="7" name="TextBox 6"/>
+          <p:cNvSpPr txBox="1"/>
+          <p:nvPr/>
+        </p:nvSpPr>
+        <p:spPr>
+          <a:xfrm>
+            <a:off x="14401800" y="15694879"/>
+            <a:ext cx="8950154" cy="2554545"/>
+          </a:xfrm>
+          <a:prstGeom prst="rect">
+            <a:avLst/>
+          </a:prstGeom>
+          <a:noFill/>
+        </p:spPr>
+        <p:txBody>
+          <a:bodyPr wrap="square" rtlCol="0">
+            <a:spAutoFit/>
+          </a:bodyPr>
+          <a:lstStyle/>
+          <a:p>
+            <a:r>
+              <a:rPr lang="en-US" sz="2000" dirty="0">
+                <a:solidFill>
+                  <a:schemeClr val="bg1"/>
+                </a:solidFill>
+              </a:rPr>
+              <a:t>A common task is to have every node in a network send data to the sink, whilst having some aggregation function performed on that data. To </a:t>
+            </a:r>
+            <a:r>
+              <a:rPr lang="en-US" sz="2000" dirty="0" err="1">
+                <a:solidFill>
+                  <a:schemeClr val="bg1"/>
+                </a:solidFill>
+              </a:rPr>
+              <a:t>minimise</a:t>
+            </a:r>
+            <a:r>
+              <a:rPr lang="en-US" sz="2000" dirty="0">
+                <a:solidFill>
+                  <a:schemeClr val="bg1"/>
+                </a:solidFill>
+              </a:rPr>
+              <a:t> the number of retransmissions the network is </a:t>
+            </a:r>
+            <a:r>
+              <a:rPr lang="en-US" sz="2000" dirty="0" err="1">
+                <a:solidFill>
+                  <a:schemeClr val="bg1"/>
+                </a:solidFill>
+              </a:rPr>
+              <a:t>orangised</a:t>
+            </a:r>
+            <a:r>
+              <a:rPr lang="en-US" sz="2000" dirty="0">
+                <a:solidFill>
+                  <a:schemeClr val="bg1"/>
+                </a:solidFill>
+              </a:rPr>
+              <a:t> as a tree. In this tree a node will collect child node’s data and perform some function over that data , once all children’s information is received the aggregated result will be sent to the parent of that node. Eventually the sink will receive and aggregate information from its children. Common applications for this algorithm is to calculate the average temperature over the area monitored by the sensor network.</a:t>
+            </a:r>
+          </a:p>
+        </p:txBody>
+      </p:sp>
       <p:pic>
         <p:nvPicPr>
-          <p:cNvPr id="6" name="Picture 5"/>
+          <p:cNvPr id="9" name="Picture 8"/>
           <p:cNvPicPr>
             <a:picLocks noChangeAspect="1"/>
           </p:cNvPicPr>
@@ -4934,14 +4964,184 @@
         </p:blipFill>
         <p:spPr>
           <a:xfrm>
-            <a:off x="23108769" y="10152434"/>
-            <a:ext cx="4736584" cy="4756533"/>
+            <a:off x="19143577" y="21845662"/>
+            <a:ext cx="9355295" cy="4572000"/>
           </a:xfrm>
           <a:prstGeom prst="rect">
             <a:avLst/>
           </a:prstGeom>
         </p:spPr>
       </p:pic>
+      <p:sp>
+        <p:nvSpPr>
+          <p:cNvPr id="10" name="TextBox 9"/>
+          <p:cNvSpPr txBox="1"/>
+          <p:nvPr/>
+        </p:nvSpPr>
+        <p:spPr>
+          <a:xfrm>
+            <a:off x="14382750" y="22303472"/>
+            <a:ext cx="4741777" cy="3785652"/>
+          </a:xfrm>
+          <a:prstGeom prst="rect">
+            <a:avLst/>
+          </a:prstGeom>
+          <a:noFill/>
+        </p:spPr>
+        <p:txBody>
+          <a:bodyPr wrap="square" rtlCol="0">
+            <a:spAutoFit/>
+          </a:bodyPr>
+          <a:lstStyle/>
+          <a:p>
+            <a:r>
+              <a:rPr lang="en-US" sz="2000" dirty="0">
+                <a:solidFill>
+                  <a:schemeClr val="bg1"/>
+                </a:solidFill>
+              </a:rPr>
+              <a:t>Hierarchical clustering also begins by electing the nodes within range of the sink as CHs at level 1, but as the setup message spreads through the network nodes whose shortest path to their nearest level n </a:t>
+            </a:r>
+            <a:r>
+              <a:rPr lang="en-US" sz="2000" dirty="0" err="1">
+                <a:solidFill>
+                  <a:schemeClr val="bg1"/>
+                </a:solidFill>
+              </a:rPr>
+              <a:t>clusterhead</a:t>
+            </a:r>
+            <a:r>
+              <a:rPr lang="en-US" sz="2000" dirty="0">
+                <a:solidFill>
+                  <a:schemeClr val="bg1"/>
+                </a:solidFill>
+              </a:rPr>
+              <a:t> is  D hops (where D is specified in advance) also elect themselves as </a:t>
+            </a:r>
+            <a:r>
+              <a:rPr lang="en-US" sz="2000" dirty="0" err="1">
+                <a:solidFill>
+                  <a:schemeClr val="bg1"/>
+                </a:solidFill>
+              </a:rPr>
+              <a:t>clusterheads</a:t>
+            </a:r>
+            <a:r>
+              <a:rPr lang="en-US" sz="2000" dirty="0">
+                <a:solidFill>
+                  <a:schemeClr val="bg1"/>
+                </a:solidFill>
+              </a:rPr>
+              <a:t> and create a new cluster for level n+1. For D &gt; 1, nodes pass messages to their CH through the other nodes in their cluster, using </a:t>
+            </a:r>
+            <a:r>
+              <a:rPr lang="en-US" sz="2000" dirty="0" err="1">
+                <a:solidFill>
+                  <a:schemeClr val="bg1"/>
+                </a:solidFill>
+              </a:rPr>
+              <a:t>Contiki’s</a:t>
+            </a:r>
+            <a:r>
+              <a:rPr lang="en-US" sz="2000" dirty="0">
+                <a:solidFill>
+                  <a:schemeClr val="bg1"/>
+                </a:solidFill>
+              </a:rPr>
+              <a:t> low-overhead mesh messaging protocol.</a:t>
+            </a:r>
+          </a:p>
+        </p:txBody>
+      </p:sp>
+      <p:sp>
+        <p:nvSpPr>
+          <p:cNvPr id="28" name="Rounded Rectangle 27"/>
+          <p:cNvSpPr/>
+          <p:nvPr/>
+        </p:nvSpPr>
+        <p:spPr>
+          <a:xfrm>
+            <a:off x="535881" y="17958816"/>
+            <a:ext cx="12114900" cy="3706845"/>
+          </a:xfrm>
+          <a:prstGeom prst="roundRect">
+            <a:avLst>
+              <a:gd name="adj" fmla="val 11909"/>
+            </a:avLst>
+          </a:prstGeom>
+        </p:spPr>
+        <p:style>
+          <a:lnRef idx="2">
+            <a:schemeClr val="accent1">
+              <a:shade val="50000"/>
+            </a:schemeClr>
+          </a:lnRef>
+          <a:fillRef idx="1">
+            <a:schemeClr val="accent1"/>
+          </a:fillRef>
+          <a:effectRef idx="0">
+            <a:schemeClr val="accent1"/>
+          </a:effectRef>
+          <a:fontRef idx="minor">
+            <a:schemeClr val="lt1"/>
+          </a:fontRef>
+        </p:style>
+        <p:txBody>
+          <a:bodyPr rtlCol="0" anchor="ctr"/>
+          <a:lstStyle/>
+          <a:p>
+            <a:pPr algn="ctr"/>
+            <a:r>
+              <a:rPr lang="en-US" sz="4800" b="1" dirty="0" err="1" smtClean="0"/>
+              <a:t>Visualisation</a:t>
+            </a:r>
+            <a:r>
+              <a:rPr lang="en-US" sz="4800" b="1" dirty="0" smtClean="0"/>
+              <a:t> </a:t>
+            </a:r>
+            <a:r>
+              <a:rPr lang="en-US" sz="4800" b="1" smtClean="0"/>
+              <a:t>and Interface Tool</a:t>
+            </a:r>
+            <a:endParaRPr lang="en-US" sz="4800" b="1" dirty="0" smtClean="0"/>
+          </a:p>
+          <a:p>
+            <a:endParaRPr lang="en-US" sz="2000" dirty="0"/>
+          </a:p>
+          <a:p>
+            <a:r>
+              <a:rPr lang="en-US" sz="2000" dirty="0" smtClean="0"/>
+              <a:t>We are developing a </a:t>
+            </a:r>
+            <a:r>
+              <a:rPr lang="en-US" sz="2000" dirty="0" err="1" smtClean="0"/>
+              <a:t>visualisation</a:t>
+            </a:r>
+            <a:r>
+              <a:rPr lang="en-US" sz="2000" dirty="0" smtClean="0"/>
+              <a:t> tool that will be able to show what state the network is currently in. An example of this is displaying visually what node </a:t>
+            </a:r>
+            <a:r>
+              <a:rPr lang="en-US" sz="2000" dirty="0" err="1" smtClean="0"/>
+              <a:t>neighbour</a:t>
+            </a:r>
+            <a:r>
+              <a:rPr lang="en-US" sz="2000" dirty="0" smtClean="0"/>
+              <a:t> other nodes.</a:t>
+            </a:r>
+          </a:p>
+          <a:p>
+            <a:endParaRPr lang="en-US" sz="2000" dirty="0"/>
+          </a:p>
+          <a:p>
+            <a:r>
+              <a:rPr lang="en-US" sz="2000" dirty="0" smtClean="0"/>
+              <a:t>We also intend for this tool to act as an interface to specifying predicates, requesting that they be checked and viewing the results of such checking.</a:t>
+            </a:r>
+            <a:endParaRPr lang="en-US" sz="2000" dirty="0"/>
+          </a:p>
+        </p:txBody>
+      </p:sp>
     </p:spTree>
     <p:extLst>
       <p:ext uri="{BB962C8B-B14F-4D97-AF65-F5344CB8AC3E}">

</xml_diff>

<commit_message>
Add Tim's work on visualisation tool
</commit_message>
<xml_diff>
--- a/Poster/Poster.pptx
+++ b/Poster/Poster.pptx
@@ -3134,7 +3134,7 @@
         </p:nvGrpSpPr>
         <p:grpSpPr>
           <a:xfrm>
-            <a:off x="538932" y="22440900"/>
+            <a:off x="535880" y="22652688"/>
             <a:ext cx="12114901" cy="4156760"/>
             <a:chOff x="538932" y="21879240"/>
             <a:chExt cx="12114901" cy="4101331"/>
@@ -3509,8 +3509,8 @@
         </p:nvSpPr>
         <p:spPr>
           <a:xfrm>
-            <a:off x="570533" y="7262556"/>
-            <a:ext cx="12114901" cy="9849632"/>
+            <a:off x="570533" y="7033581"/>
+            <a:ext cx="12114901" cy="9082719"/>
           </a:xfrm>
           <a:prstGeom prst="roundRect">
             <a:avLst>
@@ -3729,13 +3729,13 @@
           <p:nvPr>
             <p:extLst>
               <p:ext uri="{D42A27DB-BD31-4B8C-83A1-F6EECF244321}">
-                <p14:modId xmlns:p14="http://schemas.microsoft.com/office/powerpoint/2010/main" val="2104098092"/>
+                <p14:modId xmlns:p14="http://schemas.microsoft.com/office/powerpoint/2010/main" val="1297749941"/>
               </p:ext>
             </p:extLst>
           </p:nvPr>
         </p:nvGraphicFramePr>
         <p:xfrm>
-          <a:off x="6856040" y="23430863"/>
+          <a:off x="6856040" y="23590517"/>
           <a:ext cx="5132539" cy="2774114"/>
         </p:xfrm>
         <a:graphic>
@@ -3978,7 +3978,7 @@
         </p:nvSpPr>
         <p:spPr>
           <a:xfrm>
-            <a:off x="30124894" y="21665662"/>
+            <a:off x="30124894" y="21877448"/>
             <a:ext cx="12114900" cy="4932000"/>
           </a:xfrm>
           <a:prstGeom prst="roundRect">
@@ -4191,208 +4191,6 @@
                 <a:schemeClr val="bg1"/>
               </a:solidFill>
             </a:endParaRPr>
-          </a:p>
-        </p:txBody>
-      </p:sp>
-      <p:sp>
-        <p:nvSpPr>
-          <p:cNvPr id="19" name="Rounded Rectangle 18"/>
-          <p:cNvSpPr/>
-          <p:nvPr/>
-        </p:nvSpPr>
-        <p:spPr>
-          <a:xfrm>
-            <a:off x="14130709" y="11925300"/>
-            <a:ext cx="14518836" cy="14672361"/>
-          </a:xfrm>
-          <a:prstGeom prst="roundRect">
-            <a:avLst>
-              <a:gd name="adj" fmla="val 5974"/>
-            </a:avLst>
-          </a:prstGeom>
-        </p:spPr>
-        <p:style>
-          <a:lnRef idx="2">
-            <a:schemeClr val="accent1">
-              <a:shade val="50000"/>
-            </a:schemeClr>
-          </a:lnRef>
-          <a:fillRef idx="1">
-            <a:schemeClr val="accent1"/>
-          </a:fillRef>
-          <a:effectRef idx="0">
-            <a:schemeClr val="accent1"/>
-          </a:effectRef>
-          <a:fontRef idx="minor">
-            <a:schemeClr val="lt1"/>
-          </a:fontRef>
-        </p:style>
-        <p:txBody>
-          <a:bodyPr rtlCol="0" anchor="ctr"/>
-          <a:lstStyle/>
-          <a:p>
-            <a:pPr algn="ctr"/>
-            <a:r>
-              <a:rPr lang="en-US" sz="4800" b="1" dirty="0" smtClean="0"/>
-              <a:t>Algorithms</a:t>
-            </a:r>
-          </a:p>
-          <a:p>
-            <a:endParaRPr lang="en-US" sz="2400" b="1" dirty="0" smtClean="0"/>
-          </a:p>
-          <a:p>
-            <a:r>
-              <a:rPr lang="en-US" sz="2400" dirty="0" smtClean="0"/>
-              <a:t>When developing software for WSNs, there are several algorithms that are commonly used to perform certain tasks. So, in order to  test that our solution is applicable to real world code, we have developed some of these algorithms for us to specify and check predicates for.</a:t>
-            </a:r>
-            <a:endParaRPr lang="en-US" sz="2000" dirty="0" smtClean="0"/>
-          </a:p>
-          <a:p>
-            <a:r>
-              <a:rPr lang="en-US" sz="2000" b="1" dirty="0" smtClean="0"/>
-              <a:t/>
-            </a:r>
-            <a:br>
-              <a:rPr lang="en-US" sz="2000" b="1" dirty="0" smtClean="0"/>
-            </a:br>
-            <a:r>
-              <a:rPr lang="en-US" sz="4000" b="1" dirty="0" smtClean="0"/>
-              <a:t>Tree Aggregation</a:t>
-            </a:r>
-          </a:p>
-          <a:p>
-            <a:endParaRPr lang="en-US" sz="2000" b="1" dirty="0" smtClean="0"/>
-          </a:p>
-          <a:p>
-            <a:endParaRPr lang="en-US" sz="2000" b="1" dirty="0" smtClean="0"/>
-          </a:p>
-          <a:p>
-            <a:endParaRPr lang="en-US" sz="2000" b="1" dirty="0"/>
-          </a:p>
-          <a:p>
-            <a:endParaRPr lang="en-US" sz="2000" b="1" dirty="0" smtClean="0"/>
-          </a:p>
-          <a:p>
-            <a:endParaRPr lang="en-US" sz="2000" b="1" dirty="0"/>
-          </a:p>
-          <a:p>
-            <a:endParaRPr lang="en-US" sz="2000" b="1" dirty="0" smtClean="0"/>
-          </a:p>
-          <a:p>
-            <a:endParaRPr lang="en-US" sz="2000" b="1" dirty="0" smtClean="0"/>
-          </a:p>
-          <a:p>
-            <a:endParaRPr lang="en-US" sz="2000" b="1" dirty="0" smtClean="0"/>
-          </a:p>
-          <a:p>
-            <a:endParaRPr lang="en-US" sz="2000" b="1" dirty="0" smtClean="0"/>
-          </a:p>
-          <a:p>
-            <a:r>
-              <a:rPr lang="en-US" sz="4000" b="1" dirty="0" smtClean="0"/>
-              <a:t>Clustering</a:t>
-            </a:r>
-          </a:p>
-          <a:p>
-            <a:endParaRPr lang="en-GB" sz="2000" dirty="0" smtClean="0"/>
-          </a:p>
-          <a:p>
-            <a:r>
-              <a:rPr lang="en-GB" sz="2000" dirty="0" smtClean="0"/>
-              <a:t>As </a:t>
-            </a:r>
-            <a:r>
-              <a:rPr lang="en-GB" sz="2000" dirty="0"/>
-              <a:t>two of the key constraints in a WSN are energy consumption and bandwidth, we made it a priority to minimise the number of messages sent through the network; clustering is perhaps the most widely-used strategy for achieving this.</a:t>
-            </a:r>
-          </a:p>
-          <a:p>
-            <a:r>
-              <a:rPr lang="en-GB" sz="2000" dirty="0" smtClean="0"/>
-              <a:t>Using features suggested by the </a:t>
-            </a:r>
-            <a:r>
-              <a:rPr lang="en-GB" sz="2000" dirty="0"/>
-              <a:t>Low-Energy Adaptive Clustering Hierarchy (LEACH</a:t>
-            </a:r>
-            <a:r>
-              <a:rPr lang="en-GB" sz="2000" dirty="0" smtClean="0"/>
-              <a:t>), we devised </a:t>
-            </a:r>
-            <a:r>
-              <a:rPr lang="en-GB" sz="2000" dirty="0"/>
-              <a:t>two clustering algorithms; a basic cluster for small </a:t>
-            </a:r>
-            <a:r>
-              <a:rPr lang="en-GB" sz="2000" dirty="0" smtClean="0"/>
-              <a:t>networks (cf. the diagram below), </a:t>
-            </a:r>
-            <a:r>
-              <a:rPr lang="en-GB" sz="2000" dirty="0"/>
-              <a:t>and a hierarchical cluster (with variable depth) which can be scaled up arbitrarily.</a:t>
-            </a:r>
-          </a:p>
-          <a:p>
-            <a:endParaRPr lang="en-GB" sz="2000" dirty="0"/>
-          </a:p>
-          <a:p>
-            <a:r>
-              <a:rPr lang="en-GB" sz="2000" dirty="0"/>
-              <a:t>The </a:t>
-            </a:r>
-            <a:r>
-              <a:rPr lang="en-GB" sz="2000" dirty="0" smtClean="0"/>
-              <a:t>basic </a:t>
-            </a:r>
-            <a:r>
-              <a:rPr lang="en-GB" sz="2000" dirty="0"/>
-              <a:t>clustering algorithm simply elects all nodes </a:t>
-            </a:r>
-            <a:r>
-              <a:rPr lang="en-GB" sz="2000" dirty="0" smtClean="0"/>
-              <a:t>within radio </a:t>
-            </a:r>
-            <a:r>
-              <a:rPr lang="en-GB" sz="2000" dirty="0"/>
-              <a:t>range of the sink as </a:t>
-            </a:r>
-            <a:r>
-              <a:rPr lang="en-GB" sz="2000" dirty="0" err="1"/>
-              <a:t>clusterheads</a:t>
-            </a:r>
-            <a:r>
-              <a:rPr lang="en-GB" sz="2000" dirty="0"/>
-              <a:t> (CHs); all other nodes send data to their closest CH which performs some application-dependent aggregation on these messages before forwarding them on to the </a:t>
-            </a:r>
-            <a:r>
-              <a:rPr lang="en-GB" sz="2000" dirty="0" smtClean="0"/>
-              <a:t>sink. This </a:t>
-            </a:r>
-            <a:r>
-              <a:rPr lang="en-GB" sz="2000" dirty="0"/>
-              <a:t>is only useful in small networks, as networks in which the majority of nodes aren't within range of the CHs would have to forward their messages through some path of regular nodes, thus removing the efficiency of clustering.</a:t>
-            </a:r>
-          </a:p>
-          <a:p>
-            <a:endParaRPr lang="en-GB" sz="2000" dirty="0"/>
-          </a:p>
-          <a:p>
-            <a:endParaRPr lang="en-US" sz="4000" b="1" dirty="0"/>
-          </a:p>
-          <a:p>
-            <a:endParaRPr lang="en-US" sz="4000" b="1" dirty="0" smtClean="0"/>
-          </a:p>
-          <a:p>
-            <a:endParaRPr lang="en-US" sz="4000" b="1" dirty="0" smtClean="0"/>
-          </a:p>
-          <a:p>
-            <a:endParaRPr lang="en-US" sz="4000" b="1" dirty="0"/>
-          </a:p>
-          <a:p>
-            <a:endParaRPr lang="en-US" sz="4000" b="1" dirty="0" smtClean="0"/>
-          </a:p>
-          <a:p>
-            <a:endParaRPr lang="en-US" sz="4000" b="1" dirty="0" smtClean="0"/>
           </a:p>
         </p:txBody>
       </p:sp>
@@ -4501,7 +4299,7 @@
         </p:nvGrpSpPr>
         <p:grpSpPr>
           <a:xfrm>
-            <a:off x="1110459" y="14638457"/>
+            <a:off x="970500" y="13665874"/>
             <a:ext cx="10968796" cy="1661994"/>
             <a:chOff x="14932760" y="11856894"/>
             <a:chExt cx="10968796" cy="1661994"/>
@@ -4801,36 +4599,6 @@
           </a:extLst>
         </p:spPr>
       </p:pic>
-      <p:pic>
-        <p:nvPicPr>
-          <p:cNvPr id="6" name="Picture 5"/>
-          <p:cNvPicPr>
-            <a:picLocks noChangeAspect="1"/>
-          </p:cNvPicPr>
-          <p:nvPr/>
-        </p:nvPicPr>
-        <p:blipFill>
-          <a:blip r:embed="rId5">
-            <a:extLst>
-              <a:ext uri="{28A0092B-C50C-407E-A947-70E740481C1C}">
-                <a14:useLocalDpi xmlns:a14="http://schemas.microsoft.com/office/drawing/2010/main" val="0"/>
-              </a:ext>
-            </a:extLst>
-          </a:blip>
-          <a:stretch>
-            <a:fillRect/>
-          </a:stretch>
-        </p:blipFill>
-        <p:spPr>
-          <a:xfrm>
-            <a:off x="23580554" y="14504947"/>
-            <a:ext cx="4736584" cy="4756533"/>
-          </a:xfrm>
-          <a:prstGeom prst="rect">
-            <a:avLst/>
-          </a:prstGeom>
-        </p:spPr>
-      </p:pic>
       <p:sp>
         <p:nvSpPr>
           <p:cNvPr id="27" name="Rounded Rectangle 26"/>
@@ -4879,79 +4647,216 @@
       </p:sp>
       <p:sp>
         <p:nvSpPr>
-          <p:cNvPr id="7" name="TextBox 6"/>
-          <p:cNvSpPr txBox="1"/>
+          <p:cNvPr id="19" name="Rounded Rectangle 18"/>
+          <p:cNvSpPr/>
           <p:nvPr/>
         </p:nvSpPr>
         <p:spPr>
           <a:xfrm>
-            <a:off x="14401800" y="15694879"/>
-            <a:ext cx="8950154" cy="2554545"/>
+            <a:off x="14070771" y="12137087"/>
+            <a:ext cx="14518836" cy="14672361"/>
           </a:xfrm>
-          <a:prstGeom prst="rect">
-            <a:avLst/>
+          <a:prstGeom prst="roundRect">
+            <a:avLst>
+              <a:gd name="adj" fmla="val 5974"/>
+            </a:avLst>
           </a:prstGeom>
-          <a:noFill/>
         </p:spPr>
-        <p:txBody>
-          <a:bodyPr wrap="square" rtlCol="0">
-            <a:spAutoFit/>
-          </a:bodyPr>
+        <p:style>
+          <a:lnRef idx="2">
+            <a:schemeClr val="accent1">
+              <a:shade val="50000"/>
+            </a:schemeClr>
+          </a:lnRef>
+          <a:fillRef idx="1">
+            <a:schemeClr val="accent1"/>
+          </a:fillRef>
+          <a:effectRef idx="0">
+            <a:schemeClr val="accent1"/>
+          </a:effectRef>
+          <a:fontRef idx="minor">
+            <a:schemeClr val="lt1"/>
+          </a:fontRef>
+        </p:style>
+        <p:txBody>
+          <a:bodyPr rtlCol="0" anchor="ctr"/>
           <a:lstStyle/>
           <a:p>
-            <a:r>
-              <a:rPr lang="en-US" sz="2000" dirty="0">
-                <a:solidFill>
-                  <a:schemeClr val="bg1"/>
-                </a:solidFill>
-              </a:rPr>
-              <a:t>A common task is to have every node in a network send data to the sink, whilst having some aggregation function performed on that data. To </a:t>
-            </a:r>
-            <a:r>
-              <a:rPr lang="en-US" sz="2000" dirty="0" err="1">
-                <a:solidFill>
-                  <a:schemeClr val="bg1"/>
-                </a:solidFill>
-              </a:rPr>
-              <a:t>minimise</a:t>
-            </a:r>
-            <a:r>
-              <a:rPr lang="en-US" sz="2000" dirty="0">
-                <a:solidFill>
-                  <a:schemeClr val="bg1"/>
-                </a:solidFill>
-              </a:rPr>
-              <a:t> the number of retransmissions the network is </a:t>
-            </a:r>
-            <a:r>
-              <a:rPr lang="en-US" sz="2000" dirty="0" err="1">
-                <a:solidFill>
-                  <a:schemeClr val="bg1"/>
-                </a:solidFill>
-              </a:rPr>
-              <a:t>orangised</a:t>
-            </a:r>
-            <a:r>
-              <a:rPr lang="en-US" sz="2000" dirty="0">
-                <a:solidFill>
-                  <a:schemeClr val="bg1"/>
-                </a:solidFill>
-              </a:rPr>
-              <a:t> as a tree. In this tree a node will collect child node’s data and perform some function over that data , once all children’s information is received the aggregated result will be sent to the parent of that node. Eventually the sink will receive and aggregate information from its children. Common applications for this algorithm is to calculate the average temperature over the area monitored by the sensor network.</a:t>
-            </a:r>
+            <a:pPr algn="ctr"/>
+            <a:r>
+              <a:rPr lang="en-US" sz="4800" b="1" dirty="0" smtClean="0"/>
+              <a:t>Algorithms</a:t>
+            </a:r>
+          </a:p>
+          <a:p>
+            <a:endParaRPr lang="en-US" sz="2400" b="1" dirty="0" smtClean="0"/>
+          </a:p>
+          <a:p>
+            <a:r>
+              <a:rPr lang="en-US" sz="2400" dirty="0" smtClean="0"/>
+              <a:t>When developing software for WSNs, there are several algorithms that are commonly used to perform certain tasks. So, in order to  test that our solution is applicable to real world code, we have developed some of these algorithms for us to specify and check predicates for.</a:t>
+            </a:r>
+            <a:endParaRPr lang="en-US" sz="2000" dirty="0" smtClean="0"/>
+          </a:p>
+          <a:p>
+            <a:r>
+              <a:rPr lang="en-US" sz="2000" b="1" dirty="0" smtClean="0"/>
+              <a:t/>
+            </a:r>
+            <a:br>
+              <a:rPr lang="en-US" sz="2000" b="1" dirty="0" smtClean="0"/>
+            </a:br>
+            <a:r>
+              <a:rPr lang="en-US" sz="4000" b="1" dirty="0" smtClean="0"/>
+              <a:t>Tree Aggregation</a:t>
+            </a:r>
+          </a:p>
+          <a:p>
+            <a:endParaRPr lang="en-US" sz="2000" b="1" dirty="0" smtClean="0"/>
+          </a:p>
+          <a:p>
+            <a:endParaRPr lang="en-US" sz="2000" b="1" dirty="0" smtClean="0"/>
+          </a:p>
+          <a:p>
+            <a:endParaRPr lang="en-US" sz="2000" b="1" dirty="0"/>
+          </a:p>
+          <a:p>
+            <a:endParaRPr lang="en-US" sz="2000" b="1" dirty="0" smtClean="0"/>
+          </a:p>
+          <a:p>
+            <a:endParaRPr lang="en-US" sz="2000" b="1" dirty="0"/>
+          </a:p>
+          <a:p>
+            <a:endParaRPr lang="en-US" sz="2000" b="1" dirty="0" smtClean="0"/>
+          </a:p>
+          <a:p>
+            <a:endParaRPr lang="en-US" sz="2000" b="1" dirty="0" smtClean="0"/>
+          </a:p>
+          <a:p>
+            <a:endParaRPr lang="en-US" sz="2000" b="1" dirty="0" smtClean="0"/>
+          </a:p>
+          <a:p>
+            <a:endParaRPr lang="en-US" sz="2000" b="1" dirty="0" smtClean="0"/>
+          </a:p>
+          <a:p>
+            <a:r>
+              <a:rPr lang="en-US" sz="4000" b="1" dirty="0" smtClean="0"/>
+              <a:t>Clustering</a:t>
+            </a:r>
+          </a:p>
+          <a:p>
+            <a:endParaRPr lang="en-GB" sz="2000" dirty="0" smtClean="0"/>
+          </a:p>
+          <a:p>
+            <a:r>
+              <a:rPr lang="en-GB" sz="2000" dirty="0" smtClean="0"/>
+              <a:t>As </a:t>
+            </a:r>
+            <a:r>
+              <a:rPr lang="en-GB" sz="2000" dirty="0"/>
+              <a:t>two of the key constraints in a WSN are energy consumption and bandwidth, we made it a priority to minimise the number of messages sent through the network; clustering is perhaps the most widely-used strategy for achieving this.</a:t>
+            </a:r>
+          </a:p>
+          <a:p>
+            <a:r>
+              <a:rPr lang="en-GB" sz="2000" dirty="0" smtClean="0"/>
+              <a:t>Using features suggested by the </a:t>
+            </a:r>
+            <a:r>
+              <a:rPr lang="en-GB" sz="2000" dirty="0"/>
+              <a:t>Low-Energy Adaptive Clustering Hierarchy (LEACH</a:t>
+            </a:r>
+            <a:r>
+              <a:rPr lang="en-GB" sz="2000" dirty="0" smtClean="0"/>
+              <a:t>), we devised </a:t>
+            </a:r>
+            <a:r>
+              <a:rPr lang="en-GB" sz="2000" dirty="0"/>
+              <a:t>two clustering algorithms; a basic cluster for small </a:t>
+            </a:r>
+            <a:r>
+              <a:rPr lang="en-GB" sz="2000" dirty="0" smtClean="0"/>
+              <a:t>networks (cf. the diagram below), </a:t>
+            </a:r>
+            <a:r>
+              <a:rPr lang="en-GB" sz="2000" dirty="0"/>
+              <a:t>and a hierarchical cluster (with variable depth) which can be scaled up arbitrarily.</a:t>
+            </a:r>
+          </a:p>
+          <a:p>
+            <a:endParaRPr lang="en-GB" sz="2000" dirty="0"/>
+          </a:p>
+          <a:p>
+            <a:r>
+              <a:rPr lang="en-GB" sz="2000" dirty="0"/>
+              <a:t>The </a:t>
+            </a:r>
+            <a:r>
+              <a:rPr lang="en-GB" sz="2000" dirty="0" smtClean="0"/>
+              <a:t>basic </a:t>
+            </a:r>
+            <a:r>
+              <a:rPr lang="en-GB" sz="2000" dirty="0"/>
+              <a:t>clustering algorithm simply elects all nodes </a:t>
+            </a:r>
+            <a:r>
+              <a:rPr lang="en-GB" sz="2000" dirty="0" smtClean="0"/>
+              <a:t>within radio </a:t>
+            </a:r>
+            <a:r>
+              <a:rPr lang="en-GB" sz="2000" dirty="0"/>
+              <a:t>range of the sink as </a:t>
+            </a:r>
+            <a:r>
+              <a:rPr lang="en-GB" sz="2000" dirty="0" err="1"/>
+              <a:t>clusterheads</a:t>
+            </a:r>
+            <a:r>
+              <a:rPr lang="en-GB" sz="2000" dirty="0"/>
+              <a:t> (CHs); all other nodes send data to their closest CH which performs some application-dependent aggregation on these messages before forwarding them on to the </a:t>
+            </a:r>
+            <a:r>
+              <a:rPr lang="en-GB" sz="2000" dirty="0" smtClean="0"/>
+              <a:t>sink. This </a:t>
+            </a:r>
+            <a:r>
+              <a:rPr lang="en-GB" sz="2000" dirty="0"/>
+              <a:t>is only useful in small networks, as networks in which the majority of nodes aren't within range of the CHs would have to forward their messages through some path of regular nodes, thus removing the efficiency of clustering.</a:t>
+            </a:r>
+          </a:p>
+          <a:p>
+            <a:endParaRPr lang="en-GB" sz="2000" dirty="0"/>
+          </a:p>
+          <a:p>
+            <a:endParaRPr lang="en-US" sz="4000" b="1" dirty="0"/>
+          </a:p>
+          <a:p>
+            <a:endParaRPr lang="en-US" sz="4000" b="1" dirty="0" smtClean="0"/>
+          </a:p>
+          <a:p>
+            <a:endParaRPr lang="en-US" sz="4000" b="1" dirty="0" smtClean="0"/>
+          </a:p>
+          <a:p>
+            <a:endParaRPr lang="en-US" sz="4000" b="1" dirty="0"/>
+          </a:p>
+          <a:p>
+            <a:endParaRPr lang="en-US" sz="4000" b="1" dirty="0" smtClean="0"/>
+          </a:p>
+          <a:p>
+            <a:endParaRPr lang="en-US" sz="4000" b="1" dirty="0" smtClean="0"/>
           </a:p>
         </p:txBody>
       </p:sp>
       <p:pic>
         <p:nvPicPr>
-          <p:cNvPr id="9" name="Picture 8"/>
+          <p:cNvPr id="6" name="Picture 5"/>
           <p:cNvPicPr>
             <a:picLocks noChangeAspect="1"/>
           </p:cNvPicPr>
           <p:nvPr/>
         </p:nvPicPr>
         <p:blipFill>
-          <a:blip r:embed="rId6">
+          <a:blip r:embed="rId5">
             <a:extLst>
               <a:ext uri="{28A0092B-C50C-407E-A947-70E740481C1C}">
                 <a14:useLocalDpi xmlns:a14="http://schemas.microsoft.com/office/drawing/2010/main" val="0"/>
@@ -4964,8 +4869,8 @@
         </p:blipFill>
         <p:spPr>
           <a:xfrm>
-            <a:off x="19143577" y="21845662"/>
-            <a:ext cx="9355295" cy="4572000"/>
+            <a:off x="23580554" y="14657347"/>
+            <a:ext cx="4736584" cy="4756533"/>
           </a:xfrm>
           <a:prstGeom prst="rect">
             <a:avLst/>
@@ -4974,13 +4879,78 @@
       </p:pic>
       <p:sp>
         <p:nvSpPr>
+          <p:cNvPr id="7" name="TextBox 6"/>
+          <p:cNvSpPr txBox="1"/>
+          <p:nvPr/>
+        </p:nvSpPr>
+        <p:spPr>
+          <a:xfrm>
+            <a:off x="14401800" y="15904429"/>
+            <a:ext cx="8950154" cy="2554545"/>
+          </a:xfrm>
+          <a:prstGeom prst="rect">
+            <a:avLst/>
+          </a:prstGeom>
+          <a:noFill/>
+        </p:spPr>
+        <p:txBody>
+          <a:bodyPr wrap="square" rtlCol="0">
+            <a:spAutoFit/>
+          </a:bodyPr>
+          <a:lstStyle/>
+          <a:p>
+            <a:r>
+              <a:rPr lang="en-US" sz="2000" dirty="0">
+                <a:solidFill>
+                  <a:schemeClr val="bg1"/>
+                </a:solidFill>
+              </a:rPr>
+              <a:t>A common task is to have every node in a network send data to the sink, whilst having some aggregation function performed on that data. To </a:t>
+            </a:r>
+            <a:r>
+              <a:rPr lang="en-US" sz="2000" dirty="0" err="1">
+                <a:solidFill>
+                  <a:schemeClr val="bg1"/>
+                </a:solidFill>
+              </a:rPr>
+              <a:t>minimise</a:t>
+            </a:r>
+            <a:r>
+              <a:rPr lang="en-US" sz="2000" dirty="0">
+                <a:solidFill>
+                  <a:schemeClr val="bg1"/>
+                </a:solidFill>
+              </a:rPr>
+              <a:t> the number of retransmissions the network is </a:t>
+            </a:r>
+            <a:r>
+              <a:rPr lang="en-US" sz="2000" dirty="0" err="1">
+                <a:solidFill>
+                  <a:schemeClr val="bg1"/>
+                </a:solidFill>
+              </a:rPr>
+              <a:t>orangised</a:t>
+            </a:r>
+            <a:r>
+              <a:rPr lang="en-US" sz="2000" dirty="0">
+                <a:solidFill>
+                  <a:schemeClr val="bg1"/>
+                </a:solidFill>
+              </a:rPr>
+              <a:t> as a tree. In this tree a node will collect child node’s data and perform some function over that data , once all children’s information is received the aggregated result will be sent to the parent of that node. Eventually the sink will receive and aggregate information from its children. Common applications for this algorithm is to calculate the average temperature over the area monitored by the sensor network.</a:t>
+            </a:r>
+          </a:p>
+        </p:txBody>
+      </p:sp>
+      <p:sp>
+        <p:nvSpPr>
           <p:cNvPr id="10" name="TextBox 9"/>
           <p:cNvSpPr txBox="1"/>
           <p:nvPr/>
         </p:nvSpPr>
         <p:spPr>
           <a:xfrm>
-            <a:off x="14382750" y="22303472"/>
+            <a:off x="14382750" y="22474922"/>
             <a:ext cx="4741777" cy="3785652"/>
           </a:xfrm>
           <a:prstGeom prst="rect">
@@ -5061,8 +5031,8 @@
         </p:nvSpPr>
         <p:spPr>
           <a:xfrm>
-            <a:off x="535881" y="17958816"/>
-            <a:ext cx="12114900" cy="3706845"/>
+            <a:off x="570533" y="16668750"/>
+            <a:ext cx="12114900" cy="5451021"/>
           </a:xfrm>
           <a:prstGeom prst="roundRect">
             <a:avLst>
@@ -5096,38 +5066,37 @@
               <a:t>Visualisation</a:t>
             </a:r>
             <a:r>
+              <a:rPr lang="en-US" sz="4800" b="1" dirty="0"/>
+              <a:t> </a:t>
+            </a:r>
+            <a:r>
               <a:rPr lang="en-US" sz="4800" b="1" dirty="0" smtClean="0"/>
-              <a:t> </a:t>
-            </a:r>
-            <a:r>
-              <a:rPr lang="en-US" sz="4800" b="1" smtClean="0"/>
-              <a:t>and Interface Tool</a:t>
-            </a:r>
-            <a:endParaRPr lang="en-US" sz="4800" b="1" dirty="0" smtClean="0"/>
+              <a:t>and </a:t>
+            </a:r>
+            <a:r>
+              <a:rPr lang="en-US" sz="4800" b="1" dirty="0" smtClean="0"/>
+              <a:t>Interface Tool</a:t>
+            </a:r>
           </a:p>
           <a:p>
             <a:endParaRPr lang="en-US" sz="2000" dirty="0"/>
           </a:p>
           <a:p>
             <a:r>
-              <a:rPr lang="en-US" sz="2000" dirty="0" smtClean="0"/>
-              <a:t>We are developing a </a:t>
-            </a:r>
-            <a:r>
-              <a:rPr lang="en-US" sz="2000" dirty="0" err="1" smtClean="0"/>
-              <a:t>visualisation</a:t>
-            </a:r>
-            <a:r>
-              <a:rPr lang="en-US" sz="2000" dirty="0" smtClean="0"/>
-              <a:t> tool that will be able to show what state the network is currently in. An example of this is displaying visually what node </a:t>
-            </a:r>
-            <a:r>
-              <a:rPr lang="en-US" sz="2000" dirty="0" err="1" smtClean="0"/>
-              <a:t>neighbour</a:t>
-            </a:r>
-            <a:r>
-              <a:rPr lang="en-US" sz="2000" dirty="0" smtClean="0"/>
-              <a:t> other nodes.</a:t>
+              <a:rPr lang="en-GB" sz="2000" dirty="0"/>
+              <a:t>We are developing a GUI </a:t>
+            </a:r>
+            <a:r>
+              <a:rPr lang="en-GB" sz="2000" dirty="0" smtClean="0"/>
+              <a:t>to </a:t>
+            </a:r>
+            <a:r>
+              <a:rPr lang="en-GB" sz="2000" dirty="0"/>
+              <a:t>control our project, which will run on a computer and interface with the base station. It's main features will be predicate creation and deployment, and network visualisation</a:t>
+            </a:r>
+            <a:r>
+              <a:rPr lang="en-GB" sz="2000" dirty="0" smtClean="0"/>
+              <a:t>.</a:t>
             </a:r>
           </a:p>
           <a:p>
@@ -5135,13 +5104,102 @@
           </a:p>
           <a:p>
             <a:r>
-              <a:rPr lang="en-US" sz="2000" dirty="0" smtClean="0"/>
-              <a:t>We also intend for this tool to act as an interface to specifying predicates, requesting that they be checked and viewing the results of such checking.</a:t>
+              <a:rPr lang="en-GB" sz="2000" dirty="0"/>
+              <a:t>Monitoring a new predicate will simply involve writing </a:t>
+            </a:r>
+            <a:r>
+              <a:rPr lang="en-GB" sz="2000" dirty="0" smtClean="0"/>
+              <a:t>a predicate in </a:t>
+            </a:r>
+            <a:r>
+              <a:rPr lang="en-GB" sz="2000" dirty="0"/>
+              <a:t>our </a:t>
+            </a:r>
+            <a:r>
+              <a:rPr lang="en-GB" sz="2000" dirty="0" smtClean="0"/>
+              <a:t>custom scripting language, </a:t>
+            </a:r>
+            <a:r>
+              <a:rPr lang="en-GB" sz="2000" dirty="0"/>
+              <a:t>and </a:t>
+            </a:r>
+            <a:r>
+              <a:rPr lang="en-GB" sz="2000" dirty="0" smtClean="0"/>
+              <a:t>submitting it using the GUI for evaluation in the network . </a:t>
+            </a:r>
+          </a:p>
+          <a:p>
+            <a:endParaRPr lang="en-GB" sz="2000" dirty="0" smtClean="0"/>
+          </a:p>
+          <a:p>
+            <a:r>
+              <a:rPr lang="en-GB" sz="2000" dirty="0"/>
+              <a:t>In order to visualise the WSN and the state of the attached predicates, we have two main views in mind. The first is simply a list of predicates, colour coded by their current status, enabling the user to see at a glance any problems that </a:t>
+            </a:r>
+            <a:r>
+              <a:rPr lang="en-GB" sz="2000" dirty="0" smtClean="0"/>
+              <a:t>arise.</a:t>
+            </a:r>
+            <a:r>
+              <a:rPr lang="en-GB" sz="2000" dirty="0"/>
+              <a:t/>
+            </a:r>
+            <a:br>
+              <a:rPr lang="en-GB" sz="2000" dirty="0"/>
+            </a:br>
+            <a:r>
+              <a:rPr lang="en-GB" sz="2000" dirty="0"/>
+              <a:t/>
+            </a:r>
+            <a:br>
+              <a:rPr lang="en-GB" sz="2000" dirty="0"/>
+            </a:br>
+            <a:r>
+              <a:rPr lang="en-GB" sz="2000" dirty="0"/>
+              <a:t>The second will be a network graph, </a:t>
+            </a:r>
+            <a:r>
+              <a:rPr lang="en-GB" sz="2000" dirty="0" smtClean="0"/>
+              <a:t>showing the </a:t>
+            </a:r>
+            <a:r>
+              <a:rPr lang="en-GB" sz="2000" dirty="0"/>
+              <a:t>spatial relationships between nodes, associated clustering hierarchies, and generally provide a more visual representation of the WSN and attached predicates.</a:t>
             </a:r>
             <a:endParaRPr lang="en-US" sz="2000" dirty="0"/>
           </a:p>
         </p:txBody>
       </p:sp>
+      <p:pic>
+        <p:nvPicPr>
+          <p:cNvPr id="21" name="Picture 20"/>
+          <p:cNvPicPr>
+            <a:picLocks noChangeAspect="1"/>
+          </p:cNvPicPr>
+          <p:nvPr/>
+        </p:nvPicPr>
+        <p:blipFill>
+          <a:blip r:embed="rId6">
+            <a:extLst>
+              <a:ext uri="{28A0092B-C50C-407E-A947-70E740481C1C}">
+                <a14:useLocalDpi xmlns:a14="http://schemas.microsoft.com/office/drawing/2010/main" val="0"/>
+              </a:ext>
+            </a:extLst>
+          </a:blip>
+          <a:stretch>
+            <a:fillRect/>
+          </a:stretch>
+        </p:blipFill>
+        <p:spPr>
+          <a:xfrm>
+            <a:off x="19216430" y="22421550"/>
+            <a:ext cx="9355295" cy="3975100"/>
+          </a:xfrm>
+          <a:prstGeom prst="rect">
+            <a:avLst/>
+          </a:prstGeom>
+        </p:spPr>
+      </p:pic>
     </p:spTree>
     <p:extLst>
       <p:ext uri="{BB962C8B-B14F-4D97-AF65-F5344CB8AC3E}">
@@ -5483,6 +5541,24 @@
 </file>
 
 <file path=customXml/item1.xml><?xml version="1.0" encoding="utf-8"?>
+<p:properties xmlns:p="http://schemas.microsoft.com/office/2006/metadata/properties" xmlns:xsi="http://www.w3.org/2001/XMLSchema-instance" xmlns:pc="http://schemas.microsoft.com/office/infopath/2007/PartnerControls">
+  <documentManagement>
+    <_Version xmlns="http://schemas.microsoft.com/sharepoint/v3/fields" xsi:nil="true"/>
+    <_Status xmlns="http://schemas.microsoft.com/sharepoint/v3/fields">Not Started</_Status>
+  </documentManagement>
+</p:properties>
+</file>
+
+<file path=customXml/item2.xml><?xml version="1.0" encoding="utf-8"?>
+<?mso-contentType ?>
+<FormTemplates xmlns="http://schemas.microsoft.com/sharepoint/v3/contenttype/forms">
+  <Display>DocumentLibraryForm</Display>
+  <Edit>DocumentLibraryForm</Edit>
+  <New>DocumentLibraryForm</New>
+</FormTemplates>
+</file>
+
+<file path=customXml/item3.xml><?xml version="1.0" encoding="utf-8"?>
 <ct:contentTypeSchema xmlns:ct="http://schemas.microsoft.com/office/2006/metadata/contentType" xmlns:ma="http://schemas.microsoft.com/office/2006/metadata/properties/metaAttributes" ct:_="" ma:_="" ma:contentTypeName="Document" ma:contentTypeID="0x0101000DE64AEEDD9B7A4D93545ACBE97D4615" ma:contentTypeVersion="2" ma:contentTypeDescription="Create a new document." ma:contentTypeScope="" ma:versionID="f49002b78e3a4a71b814eef46a983816">
   <xsd:schema xmlns:xsd="http://www.w3.org/2001/XMLSchema" xmlns:xs="http://www.w3.org/2001/XMLSchema" xmlns:p="http://schemas.microsoft.com/office/2006/metadata/properties" xmlns:ns2="http://schemas.microsoft.com/sharepoint/v3/fields" targetNamespace="http://schemas.microsoft.com/office/2006/metadata/properties" ma:root="true" ma:fieldsID="38f6db2dd0d9a0cf6a8dc37be32b365b" ns2:_="">
     <xsd:import namespace="http://schemas.microsoft.com/sharepoint/v3/fields"/>
@@ -5626,25 +5702,31 @@
 </ct:contentTypeSchema>
 </file>
 
-<file path=customXml/item2.xml><?xml version="1.0" encoding="utf-8"?>
-<?mso-contentType ?>
-<FormTemplates xmlns="http://schemas.microsoft.com/sharepoint/v3/contenttype/forms">
-  <Display>DocumentLibraryForm</Display>
-  <Edit>DocumentLibraryForm</Edit>
-  <New>DocumentLibraryForm</New>
-</FormTemplates>
+<file path=customXml/itemProps1.xml><?xml version="1.0" encoding="utf-8"?>
+<ds:datastoreItem xmlns:ds="http://schemas.openxmlformats.org/officeDocument/2006/customXml" ds:itemID="{7B6F2769-7194-4217-93D3-3AF3A4742282}">
+  <ds:schemaRefs>
+    <ds:schemaRef ds:uri="http://schemas.microsoft.com/sharepoint/v3/fields"/>
+    <ds:schemaRef ds:uri="http://purl.org/dc/terms/"/>
+    <ds:schemaRef ds:uri="http://purl.org/dc/elements/1.1/"/>
+    <ds:schemaRef ds:uri="http://schemas.openxmlformats.org/package/2006/metadata/core-properties"/>
+    <ds:schemaRef ds:uri="http://purl.org/dc/dcmitype/"/>
+    <ds:schemaRef ds:uri="http://schemas.microsoft.com/office/2006/documentManagement/types"/>
+    <ds:schemaRef ds:uri="http://schemas.microsoft.com/office/infopath/2007/PartnerControls"/>
+    <ds:schemaRef ds:uri="http://schemas.microsoft.com/office/2006/metadata/properties"/>
+    <ds:schemaRef ds:uri="http://www.w3.org/XML/1998/namespace"/>
+  </ds:schemaRefs>
+</ds:datastoreItem>
 </file>
 
-<file path=customXml/item3.xml><?xml version="1.0" encoding="utf-8"?>
-<p:properties xmlns:p="http://schemas.microsoft.com/office/2006/metadata/properties" xmlns:xsi="http://www.w3.org/2001/XMLSchema-instance" xmlns:pc="http://schemas.microsoft.com/office/infopath/2007/PartnerControls">
-  <documentManagement>
-    <_Version xmlns="http://schemas.microsoft.com/sharepoint/v3/fields" xsi:nil="true"/>
-    <_Status xmlns="http://schemas.microsoft.com/sharepoint/v3/fields">Not Started</_Status>
-  </documentManagement>
-</p:properties>
+<file path=customXml/itemProps2.xml><?xml version="1.0" encoding="utf-8"?>
+<ds:datastoreItem xmlns:ds="http://schemas.openxmlformats.org/officeDocument/2006/customXml" ds:itemID="{87D2A1B0-FF3E-4009-940D-AED0EB70AA20}">
+  <ds:schemaRefs>
+    <ds:schemaRef ds:uri="http://schemas.microsoft.com/sharepoint/v3/contenttype/forms"/>
+  </ds:schemaRefs>
+</ds:datastoreItem>
 </file>
 
-<file path=customXml/itemProps1.xml><?xml version="1.0" encoding="utf-8"?>
+<file path=customXml/itemProps3.xml><?xml version="1.0" encoding="utf-8"?>
 <ds:datastoreItem xmlns:ds="http://schemas.openxmlformats.org/officeDocument/2006/customXml" ds:itemID="{E4214858-785C-42F7-BE66-6D0E79395FC8}">
   <ds:schemaRefs>
     <ds:schemaRef ds:uri="http://schemas.microsoft.com/office/2006/metadata/contentType"/>
@@ -5660,28 +5742,4 @@
     <ds:schemaRef ds:uri="http://schemas.microsoft.com/internal/obd"/>
   </ds:schemaRefs>
 </ds:datastoreItem>
-</file>
-
-<file path=customXml/itemProps2.xml><?xml version="1.0" encoding="utf-8"?>
-<ds:datastoreItem xmlns:ds="http://schemas.openxmlformats.org/officeDocument/2006/customXml" ds:itemID="{87D2A1B0-FF3E-4009-940D-AED0EB70AA20}">
-  <ds:schemaRefs>
-    <ds:schemaRef ds:uri="http://schemas.microsoft.com/sharepoint/v3/contenttype/forms"/>
-  </ds:schemaRefs>
-</ds:datastoreItem>
-</file>
-
-<file path=customXml/itemProps3.xml><?xml version="1.0" encoding="utf-8"?>
-<ds:datastoreItem xmlns:ds="http://schemas.openxmlformats.org/officeDocument/2006/customXml" ds:itemID="{7B6F2769-7194-4217-93D3-3AF3A4742282}">
-  <ds:schemaRefs>
-    <ds:schemaRef ds:uri="http://schemas.microsoft.com/sharepoint/v3/fields"/>
-    <ds:schemaRef ds:uri="http://purl.org/dc/terms/"/>
-    <ds:schemaRef ds:uri="http://purl.org/dc/elements/1.1/"/>
-    <ds:schemaRef ds:uri="http://schemas.openxmlformats.org/package/2006/metadata/core-properties"/>
-    <ds:schemaRef ds:uri="http://purl.org/dc/dcmitype/"/>
-    <ds:schemaRef ds:uri="http://schemas.microsoft.com/office/2006/documentManagement/types"/>
-    <ds:schemaRef ds:uri="http://schemas.microsoft.com/office/infopath/2007/PartnerControls"/>
-    <ds:schemaRef ds:uri="http://schemas.microsoft.com/office/2006/metadata/properties"/>
-    <ds:schemaRef ds:uri="http://www.w3.org/XML/1998/namespace"/>
-  </ds:schemaRefs>
-</ds:datastoreItem>
 </file>
</xml_diff>

<commit_message>
Added HSEND to the poster
</commit_message>
<xml_diff>
--- a/Poster/Poster.pptx
+++ b/Poster/Poster.pptx
@@ -289,7 +289,7 @@
             <a:fld id="{8ACDB3CC-F982-40F9-8DD6-BCC9AFBF44BD}" type="datetime1">
               <a:rPr lang="en-US" smtClean="0"/>
               <a:pPr/>
-              <a:t>11/28/2012</a:t>
+              <a:t>28/11/2012</a:t>
             </a:fld>
             <a:endParaRPr lang="en-US" dirty="0"/>
           </a:p>
@@ -459,7 +459,7 @@
           <a:p>
             <a:fld id="{68C2560D-EC28-3B41-86E8-18F1CE0113B4}" type="datetimeFigureOut">
               <a:rPr lang="en-US" smtClean="0"/>
-              <a:t>11/28/2012</a:t>
+              <a:t>28/11/2012</a:t>
             </a:fld>
             <a:endParaRPr lang="en-US"/>
           </a:p>
@@ -639,7 +639,7 @@
           <a:p>
             <a:fld id="{68C2560D-EC28-3B41-86E8-18F1CE0113B4}" type="datetimeFigureOut">
               <a:rPr lang="en-US" smtClean="0"/>
-              <a:t>11/28/2012</a:t>
+              <a:t>28/11/2012</a:t>
             </a:fld>
             <a:endParaRPr lang="en-US"/>
           </a:p>
@@ -809,7 +809,7 @@
           <a:p>
             <a:fld id="{68C2560D-EC28-3B41-86E8-18F1CE0113B4}" type="datetimeFigureOut">
               <a:rPr lang="en-US" smtClean="0"/>
-              <a:t>11/28/2012</a:t>
+              <a:t>28/11/2012</a:t>
             </a:fld>
             <a:endParaRPr lang="en-US"/>
           </a:p>
@@ -1056,7 +1056,7 @@
             <a:fld id="{4A9E7B99-7C3F-4BC3-B7B8-7E1F8C620B24}" type="datetime1">
               <a:rPr lang="en-US" smtClean="0"/>
               <a:pPr/>
-              <a:t>11/28/2012</a:t>
+              <a:t>28/11/2012</a:t>
             </a:fld>
             <a:endParaRPr lang="en-US"/>
           </a:p>
@@ -1345,7 +1345,7 @@
           <a:p>
             <a:fld id="{68C2560D-EC28-3B41-86E8-18F1CE0113B4}" type="datetimeFigureOut">
               <a:rPr lang="en-US" smtClean="0"/>
-              <a:t>11/28/2012</a:t>
+              <a:t>28/11/2012</a:t>
             </a:fld>
             <a:endParaRPr lang="en-US"/>
           </a:p>
@@ -1767,7 +1767,7 @@
           <a:p>
             <a:fld id="{68C2560D-EC28-3B41-86E8-18F1CE0113B4}" type="datetimeFigureOut">
               <a:rPr lang="en-US" smtClean="0"/>
-              <a:t>11/28/2012</a:t>
+              <a:t>28/11/2012</a:t>
             </a:fld>
             <a:endParaRPr lang="en-US"/>
           </a:p>
@@ -1885,7 +1885,7 @@
           <a:p>
             <a:fld id="{68C2560D-EC28-3B41-86E8-18F1CE0113B4}" type="datetimeFigureOut">
               <a:rPr lang="en-US" smtClean="0"/>
-              <a:t>11/28/2012</a:t>
+              <a:t>28/11/2012</a:t>
             </a:fld>
             <a:endParaRPr lang="en-US"/>
           </a:p>
@@ -1980,7 +1980,7 @@
           <a:p>
             <a:fld id="{68C2560D-EC28-3B41-86E8-18F1CE0113B4}" type="datetimeFigureOut">
               <a:rPr lang="en-US" smtClean="0"/>
-              <a:t>11/28/2012</a:t>
+              <a:t>28/11/2012</a:t>
             </a:fld>
             <a:endParaRPr lang="en-US"/>
           </a:p>
@@ -2257,7 +2257,7 @@
           <a:p>
             <a:fld id="{68C2560D-EC28-3B41-86E8-18F1CE0113B4}" type="datetimeFigureOut">
               <a:rPr lang="en-US" smtClean="0"/>
-              <a:t>11/28/2012</a:t>
+              <a:t>28/11/2012</a:t>
             </a:fld>
             <a:endParaRPr lang="en-US"/>
           </a:p>
@@ -2517,7 +2517,7 @@
           <a:p>
             <a:fld id="{68C2560D-EC28-3B41-86E8-18F1CE0113B4}" type="datetimeFigureOut">
               <a:rPr lang="en-US" smtClean="0"/>
-              <a:t>11/28/2012</a:t>
+              <a:t>28/11/2012</a:t>
             </a:fld>
             <a:endParaRPr lang="en-US"/>
           </a:p>
@@ -2730,7 +2730,7 @@
           <a:p>
             <a:fld id="{68C2560D-EC28-3B41-86E8-18F1CE0113B4}" type="datetimeFigureOut">
               <a:rPr lang="en-US" smtClean="0"/>
-              <a:t>11/28/2012</a:t>
+              <a:t>28/11/2012</a:t>
             </a:fld>
             <a:endParaRPr lang="en-US"/>
           </a:p>
@@ -3407,7 +3407,7 @@
         </p:blipFill>
         <p:spPr>
           <a:xfrm>
-            <a:off x="18503996" y="7639136"/>
+            <a:off x="18398171" y="7921604"/>
             <a:ext cx="6895589" cy="3918880"/>
           </a:xfrm>
           <a:prstGeom prst="rect">
@@ -3423,7 +3423,7 @@
         </p:nvSpPr>
         <p:spPr>
           <a:xfrm>
-            <a:off x="30124894" y="2894235"/>
+            <a:off x="15864691" y="2477601"/>
             <a:ext cx="12114900" cy="5192490"/>
           </a:xfrm>
           <a:prstGeom prst="roundRect">
@@ -4558,8 +4558,8 @@
         </p:blipFill>
         <p:spPr bwMode="auto">
           <a:xfrm>
-            <a:off x="30420823" y="8485517"/>
-            <a:ext cx="10749090" cy="7403710"/>
+            <a:off x="31426215" y="11220333"/>
+            <a:ext cx="8524881" cy="5871729"/>
           </a:xfrm>
           <a:prstGeom prst="rect">
             <a:avLst/>
@@ -4570,14 +4570,14 @@
           </a:ln>
           <a:effectLst/>
           <a:extLst>
-            <a:ext uri="{909E8E84-426E-40DD-AFC4-6F175D3DCCD1}">
+            <a:ext uri="{909E8E84-426E-40dd-AFC4-6F175D3DCCD1}">
               <a14:hiddenFill xmlns:a14="http://schemas.microsoft.com/office/drawing/2010/main">
                 <a:solidFill>
                   <a:schemeClr val="accent1"/>
                 </a:solidFill>
               </a14:hiddenFill>
             </a:ext>
-            <a:ext uri="{91240B29-F687-4F45-9708-019B960494DF}">
+            <a:ext uri="{91240B29-F687-4f45-9708-019B960494DF}">
               <a14:hiddenLine xmlns:a14="http://schemas.microsoft.com/office/drawing/2010/main" w="9525">
                 <a:solidFill>
                   <a:schemeClr val="tx1"/>
@@ -4587,7 +4587,7 @@
                 <a:tailEnd/>
               </a14:hiddenLine>
             </a:ext>
-            <a:ext uri="{AF507438-7753-43E0-B8FC-AC1667EBCBE1}">
+            <a:ext uri="{AF507438-7753-43e0-B8FC-AC1667EBCBE1}">
               <a14:hiddenEffects xmlns:a14="http://schemas.microsoft.com/office/drawing/2010/main">
                 <a:effectLst>
                   <a:outerShdw dist="35921" dir="2700000" algn="ctr" rotWithShape="0">
@@ -4607,8 +4607,8 @@
         </p:nvSpPr>
         <p:spPr>
           <a:xfrm>
-            <a:off x="15272739" y="2913969"/>
-            <a:ext cx="12114901" cy="3543982"/>
+            <a:off x="29620222" y="2477601"/>
+            <a:ext cx="12114901" cy="7827552"/>
           </a:xfrm>
           <a:prstGeom prst="roundRect">
             <a:avLst/>
@@ -4641,7 +4641,64 @@
             </a:r>
           </a:p>
           <a:p>
-            <a:endParaRPr lang="en-US" sz="2000" dirty="0"/>
+            <a:pPr algn="ctr"/>
+            <a:r>
+              <a:rPr lang="en-US" sz="2400" b="1" dirty="0"/>
+              <a:t>H-SEND is a framework for detecting faults in WSNs, designed to </a:t>
+            </a:r>
+            <a:r>
+              <a:rPr lang="en-US" sz="2400" b="1" dirty="0" err="1"/>
+              <a:t>minimise</a:t>
+            </a:r>
+            <a:r>
+              <a:rPr lang="en-US" sz="2400" b="1" dirty="0"/>
+              <a:t> energy consumption. It differs from related algorithms by being capable of handling very large WSNs. </a:t>
+            </a:r>
+          </a:p>
+          <a:p>
+            <a:pPr algn="ctr"/>
+            <a:endParaRPr lang="en-US" sz="2400" b="1" dirty="0"/>
+          </a:p>
+          <a:p>
+            <a:pPr algn="ctr"/>
+            <a:r>
+              <a:rPr lang="en-US" sz="2400" b="1" dirty="0"/>
+              <a:t>Our implementation allows the sending of a predicate message on a sink node, who will then begin the evaluation process. This can involve several aspects, like local predicate checking, or the evaluation of predicates across multiple nodes (or hops). </a:t>
+            </a:r>
+          </a:p>
+          <a:p>
+            <a:pPr algn="ctr"/>
+            <a:endParaRPr lang="en-US" sz="2400" b="1" dirty="0"/>
+          </a:p>
+          <a:p>
+            <a:pPr algn="ctr"/>
+            <a:r>
+              <a:rPr lang="en-US" sz="2400" b="1" dirty="0"/>
+              <a:t>To start the creation of the implementation, we focused on fixed, compile time predicates, such as the temperature readings on a local node, and having them forwarded back. This was further expanded to allow multi-hop checking, of the same compile time predicates. Further abstractions of the framework will allow us to specify run time predicates, and have the information relayed using the same underlying network stack.</a:t>
+            </a:r>
+          </a:p>
+          <a:p>
+            <a:pPr algn="ctr"/>
+            <a:endParaRPr lang="en-US" sz="2400" b="1" dirty="0"/>
+          </a:p>
+          <a:p>
+            <a:pPr algn="ctr"/>
+            <a:r>
+              <a:rPr lang="en-US" sz="2400" b="1" dirty="0"/>
+              <a:t>Further work will involve integrating the message sending with </a:t>
+            </a:r>
+            <a:r>
+              <a:rPr lang="en-US" sz="2400" b="1" dirty="0" err="1"/>
+              <a:t>neighbour</a:t>
+            </a:r>
+            <a:r>
+              <a:rPr lang="en-US" sz="2400" b="1" dirty="0"/>
+              <a:t> detection algorithms (such as clustering) will allow for much more efficient message sending, saving both energy and time.</a:t>
+            </a:r>
+            <a:endParaRPr lang="en-US" sz="2400" b="1" dirty="0" smtClean="0"/>
+          </a:p>
+          <a:p>
+            <a:endParaRPr lang="en-US" sz="2400" dirty="0"/>
           </a:p>
         </p:txBody>
       </p:sp>
@@ -5071,11 +5128,7 @@
             </a:r>
             <a:r>
               <a:rPr lang="en-US" sz="4800" b="1" dirty="0" smtClean="0"/>
-              <a:t>and </a:t>
-            </a:r>
-            <a:r>
-              <a:rPr lang="en-US" sz="4800" b="1" dirty="0" smtClean="0"/>
-              <a:t>Interface Tool</a:t>
+              <a:t>and Interface Tool</a:t>
             </a:r>
           </a:p>
           <a:p>
@@ -5213,7 +5266,7 @@
   <p:timing>
     <p:tnLst>
       <p:par>
-        <p:cTn id="1" dur="indefinite" restart="never" nodeType="tmRoot"/>
+        <p:cTn xmlns:p14="http://schemas.microsoft.com/office/powerpoint/2010/main" id="1" dur="indefinite" restart="never" nodeType="tmRoot"/>
       </p:par>
     </p:tnLst>
   </p:timing>
@@ -5541,24 +5594,6 @@
 </file>
 
 <file path=customXml/item1.xml><?xml version="1.0" encoding="utf-8"?>
-<p:properties xmlns:p="http://schemas.microsoft.com/office/2006/metadata/properties" xmlns:xsi="http://www.w3.org/2001/XMLSchema-instance" xmlns:pc="http://schemas.microsoft.com/office/infopath/2007/PartnerControls">
-  <documentManagement>
-    <_Version xmlns="http://schemas.microsoft.com/sharepoint/v3/fields" xsi:nil="true"/>
-    <_Status xmlns="http://schemas.microsoft.com/sharepoint/v3/fields">Not Started</_Status>
-  </documentManagement>
-</p:properties>
-</file>
-
-<file path=customXml/item2.xml><?xml version="1.0" encoding="utf-8"?>
-<?mso-contentType ?>
-<FormTemplates xmlns="http://schemas.microsoft.com/sharepoint/v3/contenttype/forms">
-  <Display>DocumentLibraryForm</Display>
-  <Edit>DocumentLibraryForm</Edit>
-  <New>DocumentLibraryForm</New>
-</FormTemplates>
-</file>
-
-<file path=customXml/item3.xml><?xml version="1.0" encoding="utf-8"?>
 <ct:contentTypeSchema xmlns:ct="http://schemas.microsoft.com/office/2006/metadata/contentType" xmlns:ma="http://schemas.microsoft.com/office/2006/metadata/properties/metaAttributes" ct:_="" ma:_="" ma:contentTypeName="Document" ma:contentTypeID="0x0101000DE64AEEDD9B7A4D93545ACBE97D4615" ma:contentTypeVersion="2" ma:contentTypeDescription="Create a new document." ma:contentTypeScope="" ma:versionID="f49002b78e3a4a71b814eef46a983816">
   <xsd:schema xmlns:xsd="http://www.w3.org/2001/XMLSchema" xmlns:xs="http://www.w3.org/2001/XMLSchema" xmlns:p="http://schemas.microsoft.com/office/2006/metadata/properties" xmlns:ns2="http://schemas.microsoft.com/sharepoint/v3/fields" targetNamespace="http://schemas.microsoft.com/office/2006/metadata/properties" ma:root="true" ma:fieldsID="38f6db2dd0d9a0cf6a8dc37be32b365b" ns2:_="">
     <xsd:import namespace="http://schemas.microsoft.com/sharepoint/v3/fields"/>
@@ -5702,7 +5737,43 @@
 </ct:contentTypeSchema>
 </file>
 
+<file path=customXml/item2.xml><?xml version="1.0" encoding="utf-8"?>
+<p:properties xmlns:p="http://schemas.microsoft.com/office/2006/metadata/properties" xmlns:xsi="http://www.w3.org/2001/XMLSchema-instance" xmlns:pc="http://schemas.microsoft.com/office/infopath/2007/PartnerControls">
+  <documentManagement>
+    <_Version xmlns="http://schemas.microsoft.com/sharepoint/v3/fields" xsi:nil="true"/>
+    <_Status xmlns="http://schemas.microsoft.com/sharepoint/v3/fields">Not Started</_Status>
+  </documentManagement>
+</p:properties>
+</file>
+
+<file path=customXml/item3.xml><?xml version="1.0" encoding="utf-8"?>
+<?mso-contentType ?>
+<FormTemplates xmlns="http://schemas.microsoft.com/sharepoint/v3/contenttype/forms">
+  <Display>DocumentLibraryForm</Display>
+  <Edit>DocumentLibraryForm</Edit>
+  <New>DocumentLibraryForm</New>
+</FormTemplates>
+</file>
+
 <file path=customXml/itemProps1.xml><?xml version="1.0" encoding="utf-8"?>
+<ds:datastoreItem xmlns:ds="http://schemas.openxmlformats.org/officeDocument/2006/customXml" ds:itemID="{E4214858-785C-42F7-BE66-6D0E79395FC8}">
+  <ds:schemaRefs>
+    <ds:schemaRef ds:uri="http://schemas.microsoft.com/office/2006/metadata/contentType"/>
+    <ds:schemaRef ds:uri="http://schemas.microsoft.com/office/2006/metadata/properties/metaAttributes"/>
+    <ds:schemaRef ds:uri="http://www.w3.org/2001/XMLSchema"/>
+    <ds:schemaRef ds:uri="http://schemas.microsoft.com/office/2006/metadata/properties"/>
+    <ds:schemaRef ds:uri="http://schemas.microsoft.com/sharepoint/v3/fields"/>
+    <ds:schemaRef ds:uri="http://schemas.microsoft.com/office/2006/documentManagement/types"/>
+    <ds:schemaRef ds:uri="http://schemas.microsoft.com/office/infopath/2007/PartnerControls"/>
+    <ds:schemaRef ds:uri="http://schemas.openxmlformats.org/package/2006/metadata/core-properties"/>
+    <ds:schemaRef ds:uri="http://purl.org/dc/elements/1.1/"/>
+    <ds:schemaRef ds:uri="http://purl.org/dc/terms/"/>
+    <ds:schemaRef ds:uri="http://schemas.microsoft.com/internal/obd"/>
+  </ds:schemaRefs>
+</ds:datastoreItem>
+</file>
+
+<file path=customXml/itemProps2.xml><?xml version="1.0" encoding="utf-8"?>
 <ds:datastoreItem xmlns:ds="http://schemas.openxmlformats.org/officeDocument/2006/customXml" ds:itemID="{7B6F2769-7194-4217-93D3-3AF3A4742282}">
   <ds:schemaRefs>
     <ds:schemaRef ds:uri="http://schemas.microsoft.com/sharepoint/v3/fields"/>
@@ -5718,28 +5789,10 @@
 </ds:datastoreItem>
 </file>
 
-<file path=customXml/itemProps2.xml><?xml version="1.0" encoding="utf-8"?>
+<file path=customXml/itemProps3.xml><?xml version="1.0" encoding="utf-8"?>
 <ds:datastoreItem xmlns:ds="http://schemas.openxmlformats.org/officeDocument/2006/customXml" ds:itemID="{87D2A1B0-FF3E-4009-940D-AED0EB70AA20}">
   <ds:schemaRefs>
     <ds:schemaRef ds:uri="http://schemas.microsoft.com/sharepoint/v3/contenttype/forms"/>
   </ds:schemaRefs>
 </ds:datastoreItem>
-</file>
-
-<file path=customXml/itemProps3.xml><?xml version="1.0" encoding="utf-8"?>
-<ds:datastoreItem xmlns:ds="http://schemas.openxmlformats.org/officeDocument/2006/customXml" ds:itemID="{E4214858-785C-42F7-BE66-6D0E79395FC8}">
-  <ds:schemaRefs>
-    <ds:schemaRef ds:uri="http://schemas.microsoft.com/office/2006/metadata/contentType"/>
-    <ds:schemaRef ds:uri="http://schemas.microsoft.com/office/2006/metadata/properties/metaAttributes"/>
-    <ds:schemaRef ds:uri="http://www.w3.org/2001/XMLSchema"/>
-    <ds:schemaRef ds:uri="http://schemas.microsoft.com/office/2006/metadata/properties"/>
-    <ds:schemaRef ds:uri="http://schemas.microsoft.com/sharepoint/v3/fields"/>
-    <ds:schemaRef ds:uri="http://schemas.microsoft.com/office/2006/documentManagement/types"/>
-    <ds:schemaRef ds:uri="http://schemas.microsoft.com/office/infopath/2007/PartnerControls"/>
-    <ds:schemaRef ds:uri="http://schemas.openxmlformats.org/package/2006/metadata/core-properties"/>
-    <ds:schemaRef ds:uri="http://purl.org/dc/elements/1.1/"/>
-    <ds:schemaRef ds:uri="http://purl.org/dc/terms/"/>
-    <ds:schemaRef ds:uri="http://schemas.microsoft.com/internal/obd"/>
-  </ds:schemaRefs>
-</ds:datastoreItem>
 </file>
</xml_diff>

<commit_message>
Poster reorganising to make it flow between sections better. Minor changes to HSEND
</commit_message>
<xml_diff>
--- a/Poster/Poster.pptx
+++ b/Poster/Poster.pptx
@@ -289,7 +289,7 @@
             <a:fld id="{8ACDB3CC-F982-40F9-8DD6-BCC9AFBF44BD}" type="datetime1">
               <a:rPr lang="en-US" smtClean="0"/>
               <a:pPr/>
-              <a:t>28/11/2012</a:t>
+              <a:t>11/28/2012</a:t>
             </a:fld>
             <a:endParaRPr lang="en-US" dirty="0"/>
           </a:p>
@@ -459,7 +459,7 @@
           <a:p>
             <a:fld id="{68C2560D-EC28-3B41-86E8-18F1CE0113B4}" type="datetimeFigureOut">
               <a:rPr lang="en-US" smtClean="0"/>
-              <a:t>28/11/2012</a:t>
+              <a:t>11/28/2012</a:t>
             </a:fld>
             <a:endParaRPr lang="en-US"/>
           </a:p>
@@ -639,7 +639,7 @@
           <a:p>
             <a:fld id="{68C2560D-EC28-3B41-86E8-18F1CE0113B4}" type="datetimeFigureOut">
               <a:rPr lang="en-US" smtClean="0"/>
-              <a:t>28/11/2012</a:t>
+              <a:t>11/28/2012</a:t>
             </a:fld>
             <a:endParaRPr lang="en-US"/>
           </a:p>
@@ -809,7 +809,7 @@
           <a:p>
             <a:fld id="{68C2560D-EC28-3B41-86E8-18F1CE0113B4}" type="datetimeFigureOut">
               <a:rPr lang="en-US" smtClean="0"/>
-              <a:t>28/11/2012</a:t>
+              <a:t>11/28/2012</a:t>
             </a:fld>
             <a:endParaRPr lang="en-US"/>
           </a:p>
@@ -1056,7 +1056,7 @@
             <a:fld id="{4A9E7B99-7C3F-4BC3-B7B8-7E1F8C620B24}" type="datetime1">
               <a:rPr lang="en-US" smtClean="0"/>
               <a:pPr/>
-              <a:t>28/11/2012</a:t>
+              <a:t>11/28/2012</a:t>
             </a:fld>
             <a:endParaRPr lang="en-US"/>
           </a:p>
@@ -1345,7 +1345,7 @@
           <a:p>
             <a:fld id="{68C2560D-EC28-3B41-86E8-18F1CE0113B4}" type="datetimeFigureOut">
               <a:rPr lang="en-US" smtClean="0"/>
-              <a:t>28/11/2012</a:t>
+              <a:t>11/28/2012</a:t>
             </a:fld>
             <a:endParaRPr lang="en-US"/>
           </a:p>
@@ -1767,7 +1767,7 @@
           <a:p>
             <a:fld id="{68C2560D-EC28-3B41-86E8-18F1CE0113B4}" type="datetimeFigureOut">
               <a:rPr lang="en-US" smtClean="0"/>
-              <a:t>28/11/2012</a:t>
+              <a:t>11/28/2012</a:t>
             </a:fld>
             <a:endParaRPr lang="en-US"/>
           </a:p>
@@ -1885,7 +1885,7 @@
           <a:p>
             <a:fld id="{68C2560D-EC28-3B41-86E8-18F1CE0113B4}" type="datetimeFigureOut">
               <a:rPr lang="en-US" smtClean="0"/>
-              <a:t>28/11/2012</a:t>
+              <a:t>11/28/2012</a:t>
             </a:fld>
             <a:endParaRPr lang="en-US"/>
           </a:p>
@@ -1980,7 +1980,7 @@
           <a:p>
             <a:fld id="{68C2560D-EC28-3B41-86E8-18F1CE0113B4}" type="datetimeFigureOut">
               <a:rPr lang="en-US" smtClean="0"/>
-              <a:t>28/11/2012</a:t>
+              <a:t>11/28/2012</a:t>
             </a:fld>
             <a:endParaRPr lang="en-US"/>
           </a:p>
@@ -2257,7 +2257,7 @@
           <a:p>
             <a:fld id="{68C2560D-EC28-3B41-86E8-18F1CE0113B4}" type="datetimeFigureOut">
               <a:rPr lang="en-US" smtClean="0"/>
-              <a:t>28/11/2012</a:t>
+              <a:t>11/28/2012</a:t>
             </a:fld>
             <a:endParaRPr lang="en-US"/>
           </a:p>
@@ -2517,7 +2517,7 @@
           <a:p>
             <a:fld id="{68C2560D-EC28-3B41-86E8-18F1CE0113B4}" type="datetimeFigureOut">
               <a:rPr lang="en-US" smtClean="0"/>
-              <a:t>28/11/2012</a:t>
+              <a:t>11/28/2012</a:t>
             </a:fld>
             <a:endParaRPr lang="en-US"/>
           </a:p>
@@ -2730,7 +2730,7 @@
           <a:p>
             <a:fld id="{68C2560D-EC28-3B41-86E8-18F1CE0113B4}" type="datetimeFigureOut">
               <a:rPr lang="en-US" smtClean="0"/>
-              <a:t>28/11/2012</a:t>
+              <a:t>11/28/2012</a:t>
             </a:fld>
             <a:endParaRPr lang="en-US"/>
           </a:p>
@@ -3126,116 +3126,101 @@
           <a:chExt cx="0" cy="0"/>
         </a:xfrm>
       </p:grpSpPr>
-      <p:grpSp>
-        <p:nvGrpSpPr>
-          <p:cNvPr id="8" name="Group 7"/>
-          <p:cNvGrpSpPr/>
+      <p:sp>
+        <p:nvSpPr>
+          <p:cNvPr id="17" name="Rounded Rectangle 16"/>
+          <p:cNvSpPr/>
           <p:nvPr/>
-        </p:nvGrpSpPr>
-        <p:grpSpPr>
+        </p:nvSpPr>
+        <p:spPr>
           <a:xfrm>
-            <a:off x="535880" y="22652688"/>
+            <a:off x="656177" y="12935302"/>
             <a:ext cx="12114901" cy="4156760"/>
-            <a:chOff x="538932" y="21879240"/>
-            <a:chExt cx="12114901" cy="4101331"/>
           </a:xfrm>
-        </p:grpSpPr>
-        <p:sp>
-          <p:nvSpPr>
-            <p:cNvPr id="17" name="Rounded Rectangle 16"/>
-            <p:cNvSpPr/>
-            <p:nvPr/>
-          </p:nvSpPr>
-          <p:spPr>
-            <a:xfrm>
-              <a:off x="538932" y="21879240"/>
-              <a:ext cx="12114901" cy="4101331"/>
-            </a:xfrm>
-            <a:prstGeom prst="roundRect">
-              <a:avLst>
-                <a:gd name="adj" fmla="val 8858"/>
-              </a:avLst>
-            </a:prstGeom>
-          </p:spPr>
-          <p:style>
-            <a:lnRef idx="2">
-              <a:schemeClr val="accent1">
-                <a:shade val="50000"/>
-              </a:schemeClr>
-            </a:lnRef>
-            <a:fillRef idx="1">
-              <a:schemeClr val="accent1"/>
-            </a:fillRef>
-            <a:effectRef idx="0">
-              <a:schemeClr val="accent1"/>
-            </a:effectRef>
-            <a:fontRef idx="minor">
-              <a:schemeClr val="lt1"/>
-            </a:fontRef>
-          </p:style>
-          <p:txBody>
-            <a:bodyPr rtlCol="0" anchor="t"/>
-            <a:lstStyle/>
-            <a:p>
-              <a:pPr algn="ctr"/>
-              <a:r>
-                <a:rPr lang="en-US" sz="4800" b="1" dirty="0" smtClean="0"/>
-                <a:t>Project Management</a:t>
-              </a:r>
-            </a:p>
-          </p:txBody>
-        </p:sp>
-        <p:sp>
-          <p:nvSpPr>
-            <p:cNvPr id="3" name="TextBox 2"/>
-            <p:cNvSpPr txBox="1"/>
-            <p:nvPr/>
-          </p:nvSpPr>
-          <p:spPr>
-            <a:xfrm>
-              <a:off x="781050" y="22847333"/>
-              <a:ext cx="5676900" cy="2733440"/>
-            </a:xfrm>
-            <a:prstGeom prst="rect">
-              <a:avLst/>
-            </a:prstGeom>
-            <a:noFill/>
-          </p:spPr>
-          <p:txBody>
-            <a:bodyPr wrap="square" rtlCol="0">
-              <a:spAutoFit/>
-            </a:bodyPr>
-            <a:lstStyle/>
-            <a:p>
-              <a:r>
-                <a:rPr lang="en-GB" sz="2000" dirty="0" smtClean="0">
-                  <a:solidFill>
-                    <a:schemeClr val="bg1"/>
-                  </a:solidFill>
-                </a:rPr>
-                <a:t>For this project we allocated roles as shown in the table to the right. We met weekly to discus our progress as well as allocate tasks to each team member for the week.</a:t>
-              </a:r>
-            </a:p>
-            <a:p>
-              <a:endParaRPr lang="en-GB" sz="2000" dirty="0" smtClean="0">
+          <a:prstGeom prst="roundRect">
+            <a:avLst>
+              <a:gd name="adj" fmla="val 8858"/>
+            </a:avLst>
+          </a:prstGeom>
+        </p:spPr>
+        <p:style>
+          <a:lnRef idx="2">
+            <a:schemeClr val="accent1">
+              <a:shade val="50000"/>
+            </a:schemeClr>
+          </a:lnRef>
+          <a:fillRef idx="1">
+            <a:schemeClr val="accent1"/>
+          </a:fillRef>
+          <a:effectRef idx="0">
+            <a:schemeClr val="accent1"/>
+          </a:effectRef>
+          <a:fontRef idx="minor">
+            <a:schemeClr val="lt1"/>
+          </a:fontRef>
+        </p:style>
+        <p:txBody>
+          <a:bodyPr rtlCol="0" anchor="t"/>
+          <a:lstStyle/>
+          <a:p>
+            <a:pPr algn="ctr"/>
+            <a:r>
+              <a:rPr lang="en-US" sz="4800" b="1" dirty="0" smtClean="0"/>
+              <a:t>Project Management</a:t>
+            </a:r>
+          </a:p>
+        </p:txBody>
+      </p:sp>
+      <p:sp>
+        <p:nvSpPr>
+          <p:cNvPr id="3" name="TextBox 2"/>
+          <p:cNvSpPr txBox="1"/>
+          <p:nvPr/>
+        </p:nvSpPr>
+        <p:spPr>
+          <a:xfrm>
+            <a:off x="895499" y="14018028"/>
+            <a:ext cx="5676900" cy="2770382"/>
+          </a:xfrm>
+          <a:prstGeom prst="rect">
+            <a:avLst/>
+          </a:prstGeom>
+          <a:noFill/>
+        </p:spPr>
+        <p:txBody>
+          <a:bodyPr wrap="square" rtlCol="0">
+            <a:spAutoFit/>
+          </a:bodyPr>
+          <a:lstStyle/>
+          <a:p>
+            <a:r>
+              <a:rPr lang="en-GB" sz="2000" dirty="0" smtClean="0">
                 <a:solidFill>
                   <a:schemeClr val="bg1"/>
                 </a:solidFill>
-              </a:endParaRPr>
-            </a:p>
-            <a:p>
-              <a:r>
-                <a:rPr lang="en-GB" sz="2000" dirty="0" smtClean="0">
-                  <a:solidFill>
-                    <a:schemeClr val="bg1"/>
-                  </a:solidFill>
-                </a:rPr>
-                <a:t>We liaised with other academics and PhD students to assist in our project, and allocate time when we could have access to the wireless sensor nodes.</a:t>
-              </a:r>
-            </a:p>
-          </p:txBody>
-        </p:sp>
-      </p:grpSp>
+              </a:rPr>
+              <a:t>For this project we allocated roles as shown in the table to the right. We met weekly to discus our progress as well as allocate tasks to each team member for the week.</a:t>
+            </a:r>
+          </a:p>
+          <a:p>
+            <a:endParaRPr lang="en-GB" sz="2000" dirty="0" smtClean="0">
+              <a:solidFill>
+                <a:schemeClr val="bg1"/>
+              </a:solidFill>
+            </a:endParaRPr>
+          </a:p>
+          <a:p>
+            <a:r>
+              <a:rPr lang="en-GB" sz="2000" dirty="0" smtClean="0">
+                <a:solidFill>
+                  <a:schemeClr val="bg1"/>
+                </a:solidFill>
+              </a:rPr>
+              <a:t>We liaised with other academics and PhD students to assist in our project, and allocate time when we could have access to the wireless sensor nodes.</a:t>
+            </a:r>
+          </a:p>
+        </p:txBody>
+      </p:sp>
       <p:sp>
         <p:nvSpPr>
           <p:cNvPr id="12" name="Rectangle 11"/>
@@ -3407,8 +3392,8 @@
         </p:blipFill>
         <p:spPr>
           <a:xfrm>
-            <a:off x="18398171" y="7921604"/>
-            <a:ext cx="6895589" cy="3918880"/>
+            <a:off x="15668744" y="8704574"/>
+            <a:ext cx="4963209" cy="2820676"/>
           </a:xfrm>
           <a:prstGeom prst="rect">
             <a:avLst/>
@@ -3423,7 +3408,7 @@
         </p:nvSpPr>
         <p:spPr>
           <a:xfrm>
-            <a:off x="15864691" y="2477601"/>
+            <a:off x="540460" y="7215103"/>
             <a:ext cx="12114900" cy="5192490"/>
           </a:xfrm>
           <a:prstGeom prst="roundRect">
@@ -3501,225 +3486,6 @@
           </a:p>
         </p:txBody>
       </p:sp>
-      <p:sp>
-        <p:nvSpPr>
-          <p:cNvPr id="15" name="Rounded Rectangle 14"/>
-          <p:cNvSpPr/>
-          <p:nvPr/>
-        </p:nvSpPr>
-        <p:spPr>
-          <a:xfrm>
-            <a:off x="570533" y="7033581"/>
-            <a:ext cx="12114901" cy="9082719"/>
-          </a:xfrm>
-          <a:prstGeom prst="roundRect">
-            <a:avLst>
-              <a:gd name="adj" fmla="val 5836"/>
-            </a:avLst>
-          </a:prstGeom>
-        </p:spPr>
-        <p:style>
-          <a:lnRef idx="2">
-            <a:schemeClr val="accent1">
-              <a:shade val="50000"/>
-            </a:schemeClr>
-          </a:lnRef>
-          <a:fillRef idx="1">
-            <a:schemeClr val="accent1"/>
-          </a:fillRef>
-          <a:effectRef idx="0">
-            <a:schemeClr val="accent1"/>
-          </a:effectRef>
-          <a:fontRef idx="minor">
-            <a:schemeClr val="lt1"/>
-          </a:fontRef>
-        </p:style>
-        <p:txBody>
-          <a:bodyPr rtlCol="0" anchor="ctr"/>
-          <a:lstStyle/>
-          <a:p>
-            <a:pPr algn="ctr"/>
-            <a:r>
-              <a:rPr lang="en-US" sz="4800" b="1" dirty="0"/>
-              <a:t>Predicate Specification</a:t>
-            </a:r>
-          </a:p>
-          <a:p>
-            <a:endParaRPr lang="en-US" sz="2000" dirty="0"/>
-          </a:p>
-          <a:p>
-            <a:r>
-              <a:rPr lang="en-US" sz="2000" dirty="0" smtClean="0"/>
-              <a:t>One of the requirements of our project is that we wished to specify predicates to be checked, not just at compile-time, but also at run-time. The main reason is that the needs of a system will change over time.</a:t>
-            </a:r>
-          </a:p>
-          <a:p>
-            <a:endParaRPr lang="en-US" sz="2000" dirty="0"/>
-          </a:p>
-          <a:p>
-            <a:r>
-              <a:rPr lang="en-US" sz="2000" dirty="0" smtClean="0"/>
-              <a:t>We </a:t>
-            </a:r>
-            <a:r>
-              <a:rPr lang="en-US" sz="2000" dirty="0"/>
-              <a:t>explored a variety of methods of specifying predicates for evaluation, with an aim to enable an expressive </a:t>
-            </a:r>
-            <a:r>
-              <a:rPr lang="en-US" sz="2000" dirty="0" smtClean="0"/>
-              <a:t>syntax. However, we found that existing solutions  </a:t>
-            </a:r>
-            <a:r>
-              <a:rPr lang="en-US" sz="2000" dirty="0"/>
-              <a:t>– </a:t>
-            </a:r>
-            <a:r>
-              <a:rPr lang="en-US" sz="2000" dirty="0" smtClean="0"/>
-              <a:t> such as </a:t>
-            </a:r>
-            <a:r>
-              <a:rPr lang="en-US" sz="2000" dirty="0" err="1" smtClean="0"/>
-              <a:t>eLua</a:t>
-            </a:r>
-            <a:r>
-              <a:rPr lang="en-US" sz="2000" dirty="0" smtClean="0"/>
-              <a:t> (Embedded </a:t>
-            </a:r>
-            <a:r>
-              <a:rPr lang="en-US" sz="2000" dirty="0" err="1" smtClean="0"/>
-              <a:t>Lua</a:t>
-            </a:r>
-            <a:r>
-              <a:rPr lang="en-US" sz="2000" dirty="0" smtClean="0"/>
-              <a:t>) [CITE] and Wren [CITE] – were not suitable due to their high resource requirements or lack of desired features.</a:t>
-            </a:r>
-            <a:endParaRPr lang="en-US" sz="2000" dirty="0"/>
-          </a:p>
-          <a:p>
-            <a:endParaRPr lang="en-US" sz="2000" dirty="0"/>
-          </a:p>
-          <a:p>
-            <a:r>
-              <a:rPr lang="en-US" sz="2000" dirty="0" smtClean="0"/>
-              <a:t>Thus, we implemented our </a:t>
-            </a:r>
-            <a:r>
-              <a:rPr lang="en-US" sz="2000" dirty="0"/>
-              <a:t>own predicate-based scripting language that provided the features we wanted, and </a:t>
-            </a:r>
-            <a:r>
-              <a:rPr lang="en-US" sz="2000" dirty="0" smtClean="0"/>
-              <a:t>the ability </a:t>
-            </a:r>
-            <a:r>
-              <a:rPr lang="en-US" sz="2000" dirty="0"/>
-              <a:t>to run on the limited resources available. We designed a syntax that enabled us to target nodes and </a:t>
-            </a:r>
-            <a:r>
-              <a:rPr lang="en-US" sz="2000" dirty="0" err="1"/>
-              <a:t>utilise</a:t>
-            </a:r>
-            <a:r>
-              <a:rPr lang="en-US" sz="2000" dirty="0"/>
-              <a:t> built in functions to iterate over sets of nodes when evaluating first-order predicates</a:t>
-            </a:r>
-            <a:r>
-              <a:rPr lang="en-US" sz="2000" dirty="0" smtClean="0"/>
-              <a:t>.</a:t>
-            </a:r>
-          </a:p>
-          <a:p>
-            <a:endParaRPr lang="en-US" sz="2000" dirty="0"/>
-          </a:p>
-          <a:p>
-            <a:r>
-              <a:rPr lang="en-US" sz="2000" dirty="0"/>
-              <a:t>In order to </a:t>
-            </a:r>
-            <a:r>
-              <a:rPr lang="en-US" sz="2000" dirty="0" err="1"/>
-              <a:t>realise</a:t>
-            </a:r>
-            <a:r>
-              <a:rPr lang="en-US" sz="2000" dirty="0"/>
-              <a:t> this, we have implemented a parser, assembler and virtual machine. The base application will compile new predicates and transmit the assembled </a:t>
-            </a:r>
-            <a:r>
-              <a:rPr lang="en-US" sz="2000" dirty="0" smtClean="0"/>
-              <a:t> </a:t>
-            </a:r>
-            <a:r>
-              <a:rPr lang="en-US" sz="2000" dirty="0" err="1" smtClean="0"/>
-              <a:t>bytecode</a:t>
-            </a:r>
-            <a:r>
-              <a:rPr lang="en-US" sz="2000" dirty="0" smtClean="0"/>
-              <a:t> </a:t>
-            </a:r>
-            <a:r>
-              <a:rPr lang="en-US" sz="2000" dirty="0"/>
-              <a:t>to nodes for execution.</a:t>
-            </a:r>
-          </a:p>
-          <a:p>
-            <a:endParaRPr lang="en-US" sz="2000" dirty="0"/>
-          </a:p>
-          <a:p>
-            <a:r>
-              <a:rPr lang="en-US" sz="2000" dirty="0"/>
-              <a:t>As an example of a predicate specified in our language, the following snippet will check no nodes within a two-hop </a:t>
-            </a:r>
-            <a:r>
-              <a:rPr lang="en-US" sz="2000" dirty="0" err="1"/>
-              <a:t>neighbourhood</a:t>
-            </a:r>
-            <a:r>
-              <a:rPr lang="en-US" sz="2000" dirty="0"/>
-              <a:t> have clashing </a:t>
-            </a:r>
-            <a:r>
-              <a:rPr lang="en-US" sz="2000" dirty="0" smtClean="0"/>
-              <a:t>slots. This is a property that should hold in systems using the TDMA</a:t>
-            </a:r>
-            <a:r>
-              <a:rPr lang="en-US" sz="2000" dirty="0"/>
-              <a:t> </a:t>
-            </a:r>
-            <a:r>
-              <a:rPr lang="en-US" sz="2000" dirty="0" smtClean="0"/>
-              <a:t>(time division multiple access) MAC protocol.</a:t>
-            </a:r>
-          </a:p>
-          <a:p>
-            <a:endParaRPr lang="en-US" sz="2000" dirty="0"/>
-          </a:p>
-          <a:p>
-            <a:endParaRPr lang="en-US" sz="2000" dirty="0" smtClean="0"/>
-          </a:p>
-          <a:p>
-            <a:endParaRPr lang="en-US" sz="2000" dirty="0"/>
-          </a:p>
-          <a:p>
-            <a:endParaRPr lang="en-US" sz="2000" dirty="0" smtClean="0"/>
-          </a:p>
-          <a:p>
-            <a:endParaRPr lang="en-US" sz="2000" dirty="0" smtClean="0"/>
-          </a:p>
-          <a:p>
-            <a:endParaRPr lang="en-US" sz="2000" dirty="0" smtClean="0"/>
-          </a:p>
-          <a:p>
-            <a:endParaRPr lang="en-US" sz="2000" dirty="0"/>
-          </a:p>
-          <a:p>
-            <a:endParaRPr lang="en-US" sz="2000" dirty="0"/>
-          </a:p>
-          <a:p>
-            <a:pPr algn="ctr"/>
-            <a:endParaRPr lang="en-US" sz="2000" dirty="0"/>
-          </a:p>
-        </p:txBody>
-      </p:sp>
       <p:graphicFrame>
         <p:nvGraphicFramePr>
           <p:cNvPr id="16" name="Table 15"/>
@@ -3729,13 +3495,13 @@
           <p:nvPr>
             <p:extLst>
               <p:ext uri="{D42A27DB-BD31-4B8C-83A1-F6EECF244321}">
-                <p14:modId xmlns:p14="http://schemas.microsoft.com/office/powerpoint/2010/main" val="1297749941"/>
+                <p14:modId xmlns:p14="http://schemas.microsoft.com/office/powerpoint/2010/main" val="2628983731"/>
               </p:ext>
             </p:extLst>
           </p:nvPr>
         </p:nvGraphicFramePr>
         <p:xfrm>
-          <a:off x="6856040" y="23590517"/>
+          <a:off x="6803704" y="14018028"/>
           <a:ext cx="5132539" cy="2774114"/>
         </p:xfrm>
         <a:graphic>
@@ -4203,7 +3969,7 @@
         <p:spPr>
           <a:xfrm>
             <a:off x="30124894" y="17958817"/>
-            <a:ext cx="12114900" cy="2873256"/>
+            <a:ext cx="12114900" cy="3215258"/>
           </a:xfrm>
           <a:prstGeom prst="roundRect">
             <a:avLst>
@@ -4234,9 +4000,45 @@
             <a:pPr algn="ctr"/>
             <a:r>
               <a:rPr lang="en-US" sz="4800" b="1" dirty="0" smtClean="0"/>
-              <a:t>Issues Encountered</a:t>
-            </a:r>
-            <a:endParaRPr lang="en-US" sz="2400" dirty="0"/>
+              <a:t>Issues </a:t>
+            </a:r>
+            <a:r>
+              <a:rPr lang="en-US" sz="4800" b="1" dirty="0" smtClean="0"/>
+              <a:t>Encountered</a:t>
+            </a:r>
+          </a:p>
+          <a:p>
+            <a:endParaRPr lang="en-US" sz="2000" b="1" dirty="0"/>
+          </a:p>
+          <a:p>
+            <a:r>
+              <a:rPr lang="en-US" sz="2000" dirty="0" smtClean="0"/>
+              <a:t>We have not encountered too many unforeseen issues with the project so far. However those we have encountered were more problematic than we originally thought they would be:</a:t>
+            </a:r>
+          </a:p>
+          <a:p>
+            <a:endParaRPr lang="en-US" sz="2000" dirty="0" smtClean="0"/>
+          </a:p>
+          <a:p>
+            <a:pPr marL="457200" indent="-457200">
+              <a:buFont typeface="+mj-lt"/>
+              <a:buAutoNum type="arabicPeriod"/>
+            </a:pPr>
+            <a:r>
+              <a:rPr lang="en-US" sz="2000" dirty="0" smtClean="0"/>
+              <a:t>Learning to work in a different development environment (different language, unfamiliar APIs)</a:t>
+            </a:r>
+          </a:p>
+          <a:p>
+            <a:pPr marL="457200" indent="-457200">
+              <a:buFont typeface="+mj-lt"/>
+              <a:buAutoNum type="arabicPeriod"/>
+            </a:pPr>
+            <a:r>
+              <a:rPr lang="en-US" sz="2000" dirty="0" smtClean="0"/>
+              <a:t>Difficulty thinking and develop in a distributed non-error free environment (where messages may be lost)</a:t>
+            </a:r>
+            <a:endParaRPr lang="en-US" sz="2000" dirty="0"/>
           </a:p>
         </p:txBody>
       </p:sp>
@@ -4291,6 +4093,225 @@
           </a:p>
         </p:txBody>
       </p:sp>
+      <p:sp>
+        <p:nvSpPr>
+          <p:cNvPr id="15" name="Rounded Rectangle 14"/>
+          <p:cNvSpPr/>
+          <p:nvPr/>
+        </p:nvSpPr>
+        <p:spPr>
+          <a:xfrm>
+            <a:off x="746254" y="17726729"/>
+            <a:ext cx="12114901" cy="9082719"/>
+          </a:xfrm>
+          <a:prstGeom prst="roundRect">
+            <a:avLst>
+              <a:gd name="adj" fmla="val 5836"/>
+            </a:avLst>
+          </a:prstGeom>
+        </p:spPr>
+        <p:style>
+          <a:lnRef idx="2">
+            <a:schemeClr val="accent1">
+              <a:shade val="50000"/>
+            </a:schemeClr>
+          </a:lnRef>
+          <a:fillRef idx="1">
+            <a:schemeClr val="accent1"/>
+          </a:fillRef>
+          <a:effectRef idx="0">
+            <a:schemeClr val="accent1"/>
+          </a:effectRef>
+          <a:fontRef idx="minor">
+            <a:schemeClr val="lt1"/>
+          </a:fontRef>
+        </p:style>
+        <p:txBody>
+          <a:bodyPr rtlCol="0" anchor="ctr"/>
+          <a:lstStyle/>
+          <a:p>
+            <a:pPr algn="ctr"/>
+            <a:r>
+              <a:rPr lang="en-US" sz="4800" b="1" dirty="0"/>
+              <a:t>Predicate Specification</a:t>
+            </a:r>
+          </a:p>
+          <a:p>
+            <a:endParaRPr lang="en-US" sz="2000" dirty="0"/>
+          </a:p>
+          <a:p>
+            <a:r>
+              <a:rPr lang="en-US" sz="2000" dirty="0" smtClean="0"/>
+              <a:t>One of the requirements of our project is that we wished to specify predicates to be checked, not just at compile-time, but also at run-time. The main reason is that the needs of a system will change over time.</a:t>
+            </a:r>
+          </a:p>
+          <a:p>
+            <a:endParaRPr lang="en-US" sz="2000" dirty="0"/>
+          </a:p>
+          <a:p>
+            <a:r>
+              <a:rPr lang="en-US" sz="2000" dirty="0" smtClean="0"/>
+              <a:t>We </a:t>
+            </a:r>
+            <a:r>
+              <a:rPr lang="en-US" sz="2000" dirty="0"/>
+              <a:t>explored a variety of methods of specifying predicates for evaluation, with an aim to enable an expressive </a:t>
+            </a:r>
+            <a:r>
+              <a:rPr lang="en-US" sz="2000" dirty="0" smtClean="0"/>
+              <a:t>syntax. However, we found that existing solutions  </a:t>
+            </a:r>
+            <a:r>
+              <a:rPr lang="en-US" sz="2000" dirty="0"/>
+              <a:t>– </a:t>
+            </a:r>
+            <a:r>
+              <a:rPr lang="en-US" sz="2000" dirty="0" smtClean="0"/>
+              <a:t> such as </a:t>
+            </a:r>
+            <a:r>
+              <a:rPr lang="en-US" sz="2000" dirty="0" err="1" smtClean="0"/>
+              <a:t>eLua</a:t>
+            </a:r>
+            <a:r>
+              <a:rPr lang="en-US" sz="2000" dirty="0" smtClean="0"/>
+              <a:t> (Embedded </a:t>
+            </a:r>
+            <a:r>
+              <a:rPr lang="en-US" sz="2000" dirty="0" err="1" smtClean="0"/>
+              <a:t>Lua</a:t>
+            </a:r>
+            <a:r>
+              <a:rPr lang="en-US" sz="2000" dirty="0" smtClean="0"/>
+              <a:t>) [CITE] and Wren [CITE] – were not suitable due to their high resource requirements or lack of desired features.</a:t>
+            </a:r>
+            <a:endParaRPr lang="en-US" sz="2000" dirty="0"/>
+          </a:p>
+          <a:p>
+            <a:endParaRPr lang="en-US" sz="2000" dirty="0"/>
+          </a:p>
+          <a:p>
+            <a:r>
+              <a:rPr lang="en-US" sz="2000" dirty="0" smtClean="0"/>
+              <a:t>Thus, we implemented our </a:t>
+            </a:r>
+            <a:r>
+              <a:rPr lang="en-US" sz="2000" dirty="0"/>
+              <a:t>own predicate-based scripting language that provided the features we wanted, and </a:t>
+            </a:r>
+            <a:r>
+              <a:rPr lang="en-US" sz="2000" dirty="0" smtClean="0"/>
+              <a:t>the ability </a:t>
+            </a:r>
+            <a:r>
+              <a:rPr lang="en-US" sz="2000" dirty="0"/>
+              <a:t>to run on the limited resources available. We designed a syntax that enabled us to target nodes and </a:t>
+            </a:r>
+            <a:r>
+              <a:rPr lang="en-US" sz="2000" dirty="0" err="1"/>
+              <a:t>utilise</a:t>
+            </a:r>
+            <a:r>
+              <a:rPr lang="en-US" sz="2000" dirty="0"/>
+              <a:t> built in functions to iterate over sets of nodes when evaluating first-order predicates</a:t>
+            </a:r>
+            <a:r>
+              <a:rPr lang="en-US" sz="2000" dirty="0" smtClean="0"/>
+              <a:t>.</a:t>
+            </a:r>
+          </a:p>
+          <a:p>
+            <a:endParaRPr lang="en-US" sz="2000" dirty="0"/>
+          </a:p>
+          <a:p>
+            <a:r>
+              <a:rPr lang="en-US" sz="2000" dirty="0"/>
+              <a:t>In order to </a:t>
+            </a:r>
+            <a:r>
+              <a:rPr lang="en-US" sz="2000" dirty="0" err="1"/>
+              <a:t>realise</a:t>
+            </a:r>
+            <a:r>
+              <a:rPr lang="en-US" sz="2000" dirty="0"/>
+              <a:t> this, we have implemented a parser, assembler and virtual machine. The base application will compile new predicates and transmit the assembled </a:t>
+            </a:r>
+            <a:r>
+              <a:rPr lang="en-US" sz="2000" dirty="0" smtClean="0"/>
+              <a:t> </a:t>
+            </a:r>
+            <a:r>
+              <a:rPr lang="en-US" sz="2000" dirty="0" err="1" smtClean="0"/>
+              <a:t>bytecode</a:t>
+            </a:r>
+            <a:r>
+              <a:rPr lang="en-US" sz="2000" dirty="0" smtClean="0"/>
+              <a:t> </a:t>
+            </a:r>
+            <a:r>
+              <a:rPr lang="en-US" sz="2000" dirty="0"/>
+              <a:t>to nodes for execution.</a:t>
+            </a:r>
+          </a:p>
+          <a:p>
+            <a:endParaRPr lang="en-US" sz="2000" dirty="0"/>
+          </a:p>
+          <a:p>
+            <a:r>
+              <a:rPr lang="en-US" sz="2000" dirty="0"/>
+              <a:t>As an example of a predicate specified in our language, the following snippet will check no nodes within a two-hop </a:t>
+            </a:r>
+            <a:r>
+              <a:rPr lang="en-US" sz="2000" dirty="0" err="1"/>
+              <a:t>neighbourhood</a:t>
+            </a:r>
+            <a:r>
+              <a:rPr lang="en-US" sz="2000" dirty="0"/>
+              <a:t> have clashing </a:t>
+            </a:r>
+            <a:r>
+              <a:rPr lang="en-US" sz="2000" dirty="0" smtClean="0"/>
+              <a:t>slots. This is a property that should hold in systems using the TDMA</a:t>
+            </a:r>
+            <a:r>
+              <a:rPr lang="en-US" sz="2000" dirty="0"/>
+              <a:t> </a:t>
+            </a:r>
+            <a:r>
+              <a:rPr lang="en-US" sz="2000" dirty="0" smtClean="0"/>
+              <a:t>(time division multiple access) MAC protocol.</a:t>
+            </a:r>
+          </a:p>
+          <a:p>
+            <a:endParaRPr lang="en-US" sz="2000" dirty="0"/>
+          </a:p>
+          <a:p>
+            <a:endParaRPr lang="en-US" sz="2000" dirty="0" smtClean="0"/>
+          </a:p>
+          <a:p>
+            <a:endParaRPr lang="en-US" sz="2000" dirty="0"/>
+          </a:p>
+          <a:p>
+            <a:endParaRPr lang="en-US" sz="2000" dirty="0" smtClean="0"/>
+          </a:p>
+          <a:p>
+            <a:endParaRPr lang="en-US" sz="2000" dirty="0" smtClean="0"/>
+          </a:p>
+          <a:p>
+            <a:endParaRPr lang="en-US" sz="2000" dirty="0" smtClean="0"/>
+          </a:p>
+          <a:p>
+            <a:endParaRPr lang="en-US" sz="2000" dirty="0"/>
+          </a:p>
+          <a:p>
+            <a:endParaRPr lang="en-US" sz="2000" dirty="0"/>
+          </a:p>
+          <a:p>
+            <a:pPr algn="ctr"/>
+            <a:endParaRPr lang="en-US" sz="2000" dirty="0"/>
+          </a:p>
+        </p:txBody>
+      </p:sp>
       <p:grpSp>
         <p:nvGrpSpPr>
           <p:cNvPr id="26" name="Group 25"/>
@@ -4299,7 +4320,7 @@
         </p:nvGrpSpPr>
         <p:grpSpPr>
           <a:xfrm>
-            <a:off x="970500" y="13665874"/>
+            <a:off x="1180016" y="24471500"/>
             <a:ext cx="10968796" cy="1661994"/>
             <a:chOff x="14932760" y="11856894"/>
             <a:chExt cx="10968796" cy="1661994"/>
@@ -4570,14 +4591,14 @@
           </a:ln>
           <a:effectLst/>
           <a:extLst>
-            <a:ext uri="{909E8E84-426E-40dd-AFC4-6F175D3DCCD1}">
+            <a:ext uri="{909E8E84-426E-40DD-AFC4-6F175D3DCCD1}">
               <a14:hiddenFill xmlns:a14="http://schemas.microsoft.com/office/drawing/2010/main">
                 <a:solidFill>
                   <a:schemeClr val="accent1"/>
                 </a:solidFill>
               </a14:hiddenFill>
             </a:ext>
-            <a:ext uri="{91240B29-F687-4f45-9708-019B960494DF}">
+            <a:ext uri="{91240B29-F687-4F45-9708-019B960494DF}">
               <a14:hiddenLine xmlns:a14="http://schemas.microsoft.com/office/drawing/2010/main" w="9525">
                 <a:solidFill>
                   <a:schemeClr val="tx1"/>
@@ -4587,7 +4608,7 @@
                 <a:tailEnd/>
               </a14:hiddenLine>
             </a:ext>
-            <a:ext uri="{AF507438-7753-43e0-B8FC-AC1667EBCBE1}">
+            <a:ext uri="{AF507438-7753-43E0-B8FC-AC1667EBCBE1}">
               <a14:hiddenEffects xmlns:a14="http://schemas.microsoft.com/office/drawing/2010/main">
                 <a:effectLst>
                   <a:outerShdw dist="35921" dir="2700000" algn="ctr" rotWithShape="0">
@@ -4607,8 +4628,8 @@
         </p:nvSpPr>
         <p:spPr>
           <a:xfrm>
-            <a:off x="29620222" y="2477601"/>
-            <a:ext cx="12114901" cy="7827552"/>
+            <a:off x="29346526" y="2896799"/>
+            <a:ext cx="12893270" cy="6393505"/>
           </a:xfrm>
           <a:prstGeom prst="roundRect">
             <a:avLst/>
@@ -4641,442 +4662,177 @@
             </a:r>
           </a:p>
           <a:p>
-            <a:pPr algn="ctr"/>
-            <a:r>
-              <a:rPr lang="en-US" sz="2400" b="1" dirty="0"/>
-              <a:t>H-SEND is a framework for detecting faults in WSNs, designed to </a:t>
-            </a:r>
-            <a:r>
-              <a:rPr lang="en-US" sz="2400" b="1" dirty="0" err="1"/>
+            <a:endParaRPr lang="en-US" sz="2000" dirty="0" smtClean="0"/>
+          </a:p>
+          <a:p>
+            <a:r>
+              <a:rPr lang="en-US" sz="2000" dirty="0" smtClean="0"/>
+              <a:t>H-SEND </a:t>
+            </a:r>
+            <a:r>
+              <a:rPr lang="en-US" sz="2000" dirty="0"/>
+              <a:t>is a framework for detecting faults in WSNs, designed to </a:t>
+            </a:r>
+            <a:r>
+              <a:rPr lang="en-US" sz="2000" dirty="0" err="1"/>
               <a:t>minimise</a:t>
             </a:r>
             <a:r>
-              <a:rPr lang="en-US" sz="2400" b="1" dirty="0"/>
+              <a:rPr lang="en-US" sz="2000" dirty="0"/>
               <a:t> energy consumption. It differs from related algorithms by being capable of handling very large WSNs. </a:t>
             </a:r>
           </a:p>
           <a:p>
-            <a:pPr algn="ctr"/>
-            <a:endParaRPr lang="en-US" sz="2400" b="1" dirty="0"/>
-          </a:p>
-          <a:p>
-            <a:pPr algn="ctr"/>
-            <a:r>
-              <a:rPr lang="en-US" sz="2400" b="1" dirty="0"/>
-              <a:t>Our implementation allows the sending of a predicate message on a sink node, who will then begin the evaluation process. This can involve several aspects, like local predicate checking, or the evaluation of predicates across multiple nodes (or hops). </a:t>
-            </a:r>
-          </a:p>
-          <a:p>
-            <a:pPr algn="ctr"/>
-            <a:endParaRPr lang="en-US" sz="2400" b="1" dirty="0"/>
-          </a:p>
-          <a:p>
-            <a:pPr algn="ctr"/>
-            <a:r>
-              <a:rPr lang="en-US" sz="2400" b="1" dirty="0"/>
-              <a:t>To start the creation of the implementation, we focused on fixed, compile time predicates, such as the temperature readings on a local node, and having them forwarded back. This was further expanded to allow multi-hop checking, of the same compile time predicates. Further abstractions of the framework will allow us to specify run time predicates, and have the information relayed using the same underlying network stack.</a:t>
-            </a:r>
-          </a:p>
-          <a:p>
-            <a:pPr algn="ctr"/>
-            <a:endParaRPr lang="en-US" sz="2400" b="1" dirty="0"/>
-          </a:p>
-          <a:p>
-            <a:pPr algn="ctr"/>
-            <a:r>
-              <a:rPr lang="en-US" sz="2400" b="1" dirty="0"/>
+            <a:endParaRPr lang="en-US" sz="2000" dirty="0"/>
+          </a:p>
+          <a:p>
+            <a:r>
+              <a:rPr lang="en-US" sz="2000" dirty="0"/>
+              <a:t>Our implementation allows the sending of a predicate message </a:t>
+            </a:r>
+            <a:r>
+              <a:rPr lang="en-US" sz="2000" dirty="0" smtClean="0"/>
+              <a:t>from a base station to a target node, </a:t>
+            </a:r>
+            <a:r>
+              <a:rPr lang="en-US" sz="2000" dirty="0"/>
+              <a:t>who will then begin the evaluation process. This can involve several aspects, </a:t>
+            </a:r>
+            <a:r>
+              <a:rPr lang="en-US" sz="2000" dirty="0" smtClean="0"/>
+              <a:t>such as local </a:t>
+            </a:r>
+            <a:r>
+              <a:rPr lang="en-US" sz="2000" dirty="0"/>
+              <a:t>predicate checking, or the evaluation of predicates </a:t>
+            </a:r>
+            <a:r>
+              <a:rPr lang="en-US" sz="2000" dirty="0" smtClean="0"/>
+              <a:t>the require information from multiple nodes. </a:t>
+            </a:r>
+            <a:endParaRPr lang="en-US" sz="2000" dirty="0"/>
+          </a:p>
+          <a:p>
+            <a:endParaRPr lang="en-US" sz="2000" dirty="0"/>
+          </a:p>
+          <a:p>
+            <a:r>
+              <a:rPr lang="en-US" sz="2000" dirty="0" smtClean="0"/>
+              <a:t>With our implementation</a:t>
+            </a:r>
+            <a:r>
+              <a:rPr lang="en-US" sz="2000" dirty="0"/>
+              <a:t>, we </a:t>
+            </a:r>
+            <a:r>
+              <a:rPr lang="en-US" sz="2000" dirty="0" smtClean="0"/>
+              <a:t>initially focused </a:t>
+            </a:r>
+            <a:r>
+              <a:rPr lang="en-US" sz="2000" dirty="0"/>
+              <a:t>on </a:t>
+            </a:r>
+            <a:r>
+              <a:rPr lang="en-US" sz="2000" dirty="0" smtClean="0"/>
+              <a:t>evaluating fixed</a:t>
+            </a:r>
+            <a:r>
+              <a:rPr lang="en-US" sz="2000" dirty="0"/>
+              <a:t>, compile time </a:t>
+            </a:r>
+            <a:r>
+              <a:rPr lang="en-US" sz="2000" dirty="0" smtClean="0"/>
+              <a:t>predicates and reporting the results back to the base station. </a:t>
+            </a:r>
+            <a:r>
+              <a:rPr lang="en-US" sz="2000" dirty="0"/>
+              <a:t>This was further expanded to allow </a:t>
+            </a:r>
+            <a:r>
+              <a:rPr lang="en-US" sz="2000" dirty="0" smtClean="0"/>
+              <a:t>checking compile-time predicates that require </a:t>
+            </a:r>
+            <a:r>
+              <a:rPr lang="en-US" sz="2000" dirty="0" err="1" smtClean="0"/>
+              <a:t>neighbour</a:t>
+            </a:r>
+            <a:r>
+              <a:rPr lang="en-US" sz="2000" dirty="0" smtClean="0"/>
+              <a:t> information. </a:t>
+            </a:r>
+            <a:r>
+              <a:rPr lang="en-US" sz="2000" dirty="0"/>
+              <a:t>Further abstractions of the framework will allow us to specify </a:t>
+            </a:r>
+            <a:r>
+              <a:rPr lang="en-US" sz="2000" dirty="0" smtClean="0"/>
+              <a:t>run-time </a:t>
+            </a:r>
+            <a:r>
+              <a:rPr lang="en-US" sz="2000" dirty="0"/>
+              <a:t>predicates, and have the information relayed using the same underlying network stack.</a:t>
+            </a:r>
+          </a:p>
+          <a:p>
+            <a:endParaRPr lang="en-US" sz="2000" dirty="0"/>
+          </a:p>
+          <a:p>
+            <a:r>
+              <a:rPr lang="en-US" sz="2000" dirty="0"/>
               <a:t>Further work will involve integrating the message sending with </a:t>
             </a:r>
             <a:r>
-              <a:rPr lang="en-US" sz="2400" b="1" dirty="0" err="1"/>
+              <a:rPr lang="en-US" sz="2000" dirty="0" err="1"/>
               <a:t>neighbour</a:t>
             </a:r>
             <a:r>
-              <a:rPr lang="en-US" sz="2400" b="1" dirty="0"/>
-              <a:t> detection algorithms (such as clustering) will allow for much more efficient message sending, saving both energy and time.</a:t>
-            </a:r>
-            <a:endParaRPr lang="en-US" sz="2400" b="1" dirty="0" smtClean="0"/>
+              <a:rPr lang="en-US" sz="2000" dirty="0"/>
+              <a:t> detection algorithms </a:t>
+            </a:r>
+            <a:r>
+              <a:rPr lang="en-US" sz="2000" dirty="0" smtClean="0"/>
+              <a:t>and clustering</a:t>
+            </a:r>
+            <a:r>
+              <a:rPr lang="en-US" sz="2000" dirty="0"/>
+              <a:t> </a:t>
+            </a:r>
+            <a:r>
+              <a:rPr lang="en-US" sz="2000" dirty="0" smtClean="0"/>
+              <a:t>to</a:t>
+            </a:r>
+            <a:r>
+              <a:rPr lang="en-US" sz="2000" dirty="0" smtClean="0"/>
+              <a:t> </a:t>
+            </a:r>
+            <a:r>
+              <a:rPr lang="en-US" sz="2000" dirty="0"/>
+              <a:t>allow for much more efficient message </a:t>
+            </a:r>
+            <a:r>
+              <a:rPr lang="en-US" sz="2000" dirty="0" smtClean="0"/>
+              <a:t>sending. This will involve researching where it is best to evaluate predicates in a network in order to </a:t>
+            </a:r>
+            <a:r>
+              <a:rPr lang="en-US" sz="2000" dirty="0" err="1" smtClean="0"/>
+              <a:t>minimise</a:t>
+            </a:r>
+            <a:r>
+              <a:rPr lang="en-US" sz="2000" dirty="0" smtClean="0"/>
+              <a:t> energy </a:t>
+            </a:r>
+            <a:r>
+              <a:rPr lang="en-US" sz="2000" dirty="0"/>
+              <a:t>and </a:t>
+            </a:r>
+            <a:r>
+              <a:rPr lang="en-US" sz="2000" dirty="0" smtClean="0"/>
+              <a:t>time usage.</a:t>
+            </a:r>
+            <a:endParaRPr lang="en-US" sz="2000" dirty="0" smtClean="0"/>
           </a:p>
           <a:p>
             <a:endParaRPr lang="en-US" sz="2400" dirty="0"/>
-          </a:p>
-        </p:txBody>
-      </p:sp>
-      <p:sp>
-        <p:nvSpPr>
-          <p:cNvPr id="19" name="Rounded Rectangle 18"/>
-          <p:cNvSpPr/>
-          <p:nvPr/>
-        </p:nvSpPr>
-        <p:spPr>
-          <a:xfrm>
-            <a:off x="14070771" y="12137087"/>
-            <a:ext cx="14518836" cy="14672361"/>
-          </a:xfrm>
-          <a:prstGeom prst="roundRect">
-            <a:avLst>
-              <a:gd name="adj" fmla="val 5974"/>
-            </a:avLst>
-          </a:prstGeom>
-        </p:spPr>
-        <p:style>
-          <a:lnRef idx="2">
-            <a:schemeClr val="accent1">
-              <a:shade val="50000"/>
-            </a:schemeClr>
-          </a:lnRef>
-          <a:fillRef idx="1">
-            <a:schemeClr val="accent1"/>
-          </a:fillRef>
-          <a:effectRef idx="0">
-            <a:schemeClr val="accent1"/>
-          </a:effectRef>
-          <a:fontRef idx="minor">
-            <a:schemeClr val="lt1"/>
-          </a:fontRef>
-        </p:style>
-        <p:txBody>
-          <a:bodyPr rtlCol="0" anchor="ctr"/>
-          <a:lstStyle/>
-          <a:p>
-            <a:pPr algn="ctr"/>
-            <a:r>
-              <a:rPr lang="en-US" sz="4800" b="1" dirty="0" smtClean="0"/>
-              <a:t>Algorithms</a:t>
-            </a:r>
-          </a:p>
-          <a:p>
-            <a:endParaRPr lang="en-US" sz="2400" b="1" dirty="0" smtClean="0"/>
-          </a:p>
-          <a:p>
-            <a:r>
-              <a:rPr lang="en-US" sz="2400" dirty="0" smtClean="0"/>
-              <a:t>When developing software for WSNs, there are several algorithms that are commonly used to perform certain tasks. So, in order to  test that our solution is applicable to real world code, we have developed some of these algorithms for us to specify and check predicates for.</a:t>
-            </a:r>
-            <a:endParaRPr lang="en-US" sz="2000" dirty="0" smtClean="0"/>
-          </a:p>
-          <a:p>
-            <a:r>
-              <a:rPr lang="en-US" sz="2000" b="1" dirty="0" smtClean="0"/>
-              <a:t/>
-            </a:r>
-            <a:br>
-              <a:rPr lang="en-US" sz="2000" b="1" dirty="0" smtClean="0"/>
-            </a:br>
-            <a:r>
-              <a:rPr lang="en-US" sz="4000" b="1" dirty="0" smtClean="0"/>
-              <a:t>Tree Aggregation</a:t>
-            </a:r>
-          </a:p>
-          <a:p>
-            <a:endParaRPr lang="en-US" sz="2000" b="1" dirty="0" smtClean="0"/>
-          </a:p>
-          <a:p>
-            <a:endParaRPr lang="en-US" sz="2000" b="1" dirty="0" smtClean="0"/>
-          </a:p>
-          <a:p>
-            <a:endParaRPr lang="en-US" sz="2000" b="1" dirty="0"/>
-          </a:p>
-          <a:p>
-            <a:endParaRPr lang="en-US" sz="2000" b="1" dirty="0" smtClean="0"/>
-          </a:p>
-          <a:p>
-            <a:endParaRPr lang="en-US" sz="2000" b="1" dirty="0"/>
-          </a:p>
-          <a:p>
-            <a:endParaRPr lang="en-US" sz="2000" b="1" dirty="0" smtClean="0"/>
-          </a:p>
-          <a:p>
-            <a:endParaRPr lang="en-US" sz="2000" b="1" dirty="0" smtClean="0"/>
-          </a:p>
-          <a:p>
-            <a:endParaRPr lang="en-US" sz="2000" b="1" dirty="0" smtClean="0"/>
-          </a:p>
-          <a:p>
-            <a:endParaRPr lang="en-US" sz="2000" b="1" dirty="0" smtClean="0"/>
-          </a:p>
-          <a:p>
-            <a:r>
-              <a:rPr lang="en-US" sz="4000" b="1" dirty="0" smtClean="0"/>
-              <a:t>Clustering</a:t>
-            </a:r>
-          </a:p>
-          <a:p>
-            <a:endParaRPr lang="en-GB" sz="2000" dirty="0" smtClean="0"/>
-          </a:p>
-          <a:p>
-            <a:r>
-              <a:rPr lang="en-GB" sz="2000" dirty="0" smtClean="0"/>
-              <a:t>As </a:t>
-            </a:r>
-            <a:r>
-              <a:rPr lang="en-GB" sz="2000" dirty="0"/>
-              <a:t>two of the key constraints in a WSN are energy consumption and bandwidth, we made it a priority to minimise the number of messages sent through the network; clustering is perhaps the most widely-used strategy for achieving this.</a:t>
-            </a:r>
-          </a:p>
-          <a:p>
-            <a:r>
-              <a:rPr lang="en-GB" sz="2000" dirty="0" smtClean="0"/>
-              <a:t>Using features suggested by the </a:t>
-            </a:r>
-            <a:r>
-              <a:rPr lang="en-GB" sz="2000" dirty="0"/>
-              <a:t>Low-Energy Adaptive Clustering Hierarchy (LEACH</a:t>
-            </a:r>
-            <a:r>
-              <a:rPr lang="en-GB" sz="2000" dirty="0" smtClean="0"/>
-              <a:t>), we devised </a:t>
-            </a:r>
-            <a:r>
-              <a:rPr lang="en-GB" sz="2000" dirty="0"/>
-              <a:t>two clustering algorithms; a basic cluster for small </a:t>
-            </a:r>
-            <a:r>
-              <a:rPr lang="en-GB" sz="2000" dirty="0" smtClean="0"/>
-              <a:t>networks (cf. the diagram below), </a:t>
-            </a:r>
-            <a:r>
-              <a:rPr lang="en-GB" sz="2000" dirty="0"/>
-              <a:t>and a hierarchical cluster (with variable depth) which can be scaled up arbitrarily.</a:t>
-            </a:r>
-          </a:p>
-          <a:p>
-            <a:endParaRPr lang="en-GB" sz="2000" dirty="0"/>
-          </a:p>
-          <a:p>
-            <a:r>
-              <a:rPr lang="en-GB" sz="2000" dirty="0"/>
-              <a:t>The </a:t>
-            </a:r>
-            <a:r>
-              <a:rPr lang="en-GB" sz="2000" dirty="0" smtClean="0"/>
-              <a:t>basic </a:t>
-            </a:r>
-            <a:r>
-              <a:rPr lang="en-GB" sz="2000" dirty="0"/>
-              <a:t>clustering algorithm simply elects all nodes </a:t>
-            </a:r>
-            <a:r>
-              <a:rPr lang="en-GB" sz="2000" dirty="0" smtClean="0"/>
-              <a:t>within radio </a:t>
-            </a:r>
-            <a:r>
-              <a:rPr lang="en-GB" sz="2000" dirty="0"/>
-              <a:t>range of the sink as </a:t>
-            </a:r>
-            <a:r>
-              <a:rPr lang="en-GB" sz="2000" dirty="0" err="1"/>
-              <a:t>clusterheads</a:t>
-            </a:r>
-            <a:r>
-              <a:rPr lang="en-GB" sz="2000" dirty="0"/>
-              <a:t> (CHs); all other nodes send data to their closest CH which performs some application-dependent aggregation on these messages before forwarding them on to the </a:t>
-            </a:r>
-            <a:r>
-              <a:rPr lang="en-GB" sz="2000" dirty="0" smtClean="0"/>
-              <a:t>sink. This </a:t>
-            </a:r>
-            <a:r>
-              <a:rPr lang="en-GB" sz="2000" dirty="0"/>
-              <a:t>is only useful in small networks, as networks in which the majority of nodes aren't within range of the CHs would have to forward their messages through some path of regular nodes, thus removing the efficiency of clustering.</a:t>
-            </a:r>
-          </a:p>
-          <a:p>
-            <a:endParaRPr lang="en-GB" sz="2000" dirty="0"/>
-          </a:p>
-          <a:p>
-            <a:endParaRPr lang="en-US" sz="4000" b="1" dirty="0"/>
-          </a:p>
-          <a:p>
-            <a:endParaRPr lang="en-US" sz="4000" b="1" dirty="0" smtClean="0"/>
-          </a:p>
-          <a:p>
-            <a:endParaRPr lang="en-US" sz="4000" b="1" dirty="0" smtClean="0"/>
-          </a:p>
-          <a:p>
-            <a:endParaRPr lang="en-US" sz="4000" b="1" dirty="0"/>
-          </a:p>
-          <a:p>
-            <a:endParaRPr lang="en-US" sz="4000" b="1" dirty="0" smtClean="0"/>
-          </a:p>
-          <a:p>
-            <a:endParaRPr lang="en-US" sz="4000" b="1" dirty="0" smtClean="0"/>
-          </a:p>
-        </p:txBody>
-      </p:sp>
-      <p:pic>
-        <p:nvPicPr>
-          <p:cNvPr id="6" name="Picture 5"/>
-          <p:cNvPicPr>
-            <a:picLocks noChangeAspect="1"/>
-          </p:cNvPicPr>
-          <p:nvPr/>
-        </p:nvPicPr>
-        <p:blipFill>
-          <a:blip r:embed="rId5">
-            <a:extLst>
-              <a:ext uri="{28A0092B-C50C-407E-A947-70E740481C1C}">
-                <a14:useLocalDpi xmlns:a14="http://schemas.microsoft.com/office/drawing/2010/main" val="0"/>
-              </a:ext>
-            </a:extLst>
-          </a:blip>
-          <a:stretch>
-            <a:fillRect/>
-          </a:stretch>
-        </p:blipFill>
-        <p:spPr>
-          <a:xfrm>
-            <a:off x="23580554" y="14657347"/>
-            <a:ext cx="4736584" cy="4756533"/>
-          </a:xfrm>
-          <a:prstGeom prst="rect">
-            <a:avLst/>
-          </a:prstGeom>
-        </p:spPr>
-      </p:pic>
-      <p:sp>
-        <p:nvSpPr>
-          <p:cNvPr id="7" name="TextBox 6"/>
-          <p:cNvSpPr txBox="1"/>
-          <p:nvPr/>
-        </p:nvSpPr>
-        <p:spPr>
-          <a:xfrm>
-            <a:off x="14401800" y="15904429"/>
-            <a:ext cx="8950154" cy="2554545"/>
-          </a:xfrm>
-          <a:prstGeom prst="rect">
-            <a:avLst/>
-          </a:prstGeom>
-          <a:noFill/>
-        </p:spPr>
-        <p:txBody>
-          <a:bodyPr wrap="square" rtlCol="0">
-            <a:spAutoFit/>
-          </a:bodyPr>
-          <a:lstStyle/>
-          <a:p>
-            <a:r>
-              <a:rPr lang="en-US" sz="2000" dirty="0">
-                <a:solidFill>
-                  <a:schemeClr val="bg1"/>
-                </a:solidFill>
-              </a:rPr>
-              <a:t>A common task is to have every node in a network send data to the sink, whilst having some aggregation function performed on that data. To </a:t>
-            </a:r>
-            <a:r>
-              <a:rPr lang="en-US" sz="2000" dirty="0" err="1">
-                <a:solidFill>
-                  <a:schemeClr val="bg1"/>
-                </a:solidFill>
-              </a:rPr>
-              <a:t>minimise</a:t>
-            </a:r>
-            <a:r>
-              <a:rPr lang="en-US" sz="2000" dirty="0">
-                <a:solidFill>
-                  <a:schemeClr val="bg1"/>
-                </a:solidFill>
-              </a:rPr>
-              <a:t> the number of retransmissions the network is </a:t>
-            </a:r>
-            <a:r>
-              <a:rPr lang="en-US" sz="2000" dirty="0" err="1">
-                <a:solidFill>
-                  <a:schemeClr val="bg1"/>
-                </a:solidFill>
-              </a:rPr>
-              <a:t>orangised</a:t>
-            </a:r>
-            <a:r>
-              <a:rPr lang="en-US" sz="2000" dirty="0">
-                <a:solidFill>
-                  <a:schemeClr val="bg1"/>
-                </a:solidFill>
-              </a:rPr>
-              <a:t> as a tree. In this tree a node will collect child node’s data and perform some function over that data , once all children’s information is received the aggregated result will be sent to the parent of that node. Eventually the sink will receive and aggregate information from its children. Common applications for this algorithm is to calculate the average temperature over the area monitored by the sensor network.</a:t>
-            </a:r>
-          </a:p>
-        </p:txBody>
-      </p:sp>
-      <p:sp>
-        <p:nvSpPr>
-          <p:cNvPr id="10" name="TextBox 9"/>
-          <p:cNvSpPr txBox="1"/>
-          <p:nvPr/>
-        </p:nvSpPr>
-        <p:spPr>
-          <a:xfrm>
-            <a:off x="14382750" y="22474922"/>
-            <a:ext cx="4741777" cy="3785652"/>
-          </a:xfrm>
-          <a:prstGeom prst="rect">
-            <a:avLst/>
-          </a:prstGeom>
-          <a:noFill/>
-        </p:spPr>
-        <p:txBody>
-          <a:bodyPr wrap="square" rtlCol="0">
-            <a:spAutoFit/>
-          </a:bodyPr>
-          <a:lstStyle/>
-          <a:p>
-            <a:r>
-              <a:rPr lang="en-US" sz="2000" dirty="0">
-                <a:solidFill>
-                  <a:schemeClr val="bg1"/>
-                </a:solidFill>
-              </a:rPr>
-              <a:t>Hierarchical clustering also begins by electing the nodes within range of the sink as CHs at level 1, but as the setup message spreads through the network nodes whose shortest path to their nearest level n </a:t>
-            </a:r>
-            <a:r>
-              <a:rPr lang="en-US" sz="2000" dirty="0" err="1">
-                <a:solidFill>
-                  <a:schemeClr val="bg1"/>
-                </a:solidFill>
-              </a:rPr>
-              <a:t>clusterhead</a:t>
-            </a:r>
-            <a:r>
-              <a:rPr lang="en-US" sz="2000" dirty="0">
-                <a:solidFill>
-                  <a:schemeClr val="bg1"/>
-                </a:solidFill>
-              </a:rPr>
-              <a:t> is  D hops (where D is specified in advance) also elect themselves as </a:t>
-            </a:r>
-            <a:r>
-              <a:rPr lang="en-US" sz="2000" dirty="0" err="1">
-                <a:solidFill>
-                  <a:schemeClr val="bg1"/>
-                </a:solidFill>
-              </a:rPr>
-              <a:t>clusterheads</a:t>
-            </a:r>
-            <a:r>
-              <a:rPr lang="en-US" sz="2000" dirty="0">
-                <a:solidFill>
-                  <a:schemeClr val="bg1"/>
-                </a:solidFill>
-              </a:rPr>
-              <a:t> and create a new cluster for level n+1. For D &gt; 1, nodes pass messages to their CH through the other nodes in their cluster, using </a:t>
-            </a:r>
-            <a:r>
-              <a:rPr lang="en-US" sz="2000" dirty="0" err="1">
-                <a:solidFill>
-                  <a:schemeClr val="bg1"/>
-                </a:solidFill>
-              </a:rPr>
-              <a:t>Contiki’s</a:t>
-            </a:r>
-            <a:r>
-              <a:rPr lang="en-US" sz="2000" dirty="0">
-                <a:solidFill>
-                  <a:schemeClr val="bg1"/>
-                </a:solidFill>
-              </a:rPr>
-              <a:t> low-overhead mesh messaging protocol.</a:t>
-            </a:r>
           </a:p>
         </p:txBody>
       </p:sp>
@@ -5088,8 +4844,8 @@
         </p:nvSpPr>
         <p:spPr>
           <a:xfrm>
-            <a:off x="570533" y="16668750"/>
-            <a:ext cx="12114900" cy="5451021"/>
+            <a:off x="14203440" y="2896799"/>
+            <a:ext cx="14518836" cy="5451021"/>
           </a:xfrm>
           <a:prstGeom prst="roundRect">
             <a:avLst>
@@ -5136,8 +4892,12 @@
           </a:p>
           <a:p>
             <a:r>
+              <a:rPr lang="en-GB" sz="2000" dirty="0" smtClean="0"/>
+              <a:t>We </a:t>
+            </a:r>
+            <a:r>
               <a:rPr lang="en-GB" sz="2000" dirty="0"/>
-              <a:t>We are developing a GUI </a:t>
+              <a:t>are developing a GUI </a:t>
             </a:r>
             <a:r>
               <a:rPr lang="en-GB" sz="2000" dirty="0" smtClean="0"/>
@@ -5223,34 +4983,466 @@
           </a:p>
         </p:txBody>
       </p:sp>
+      <p:grpSp>
+        <p:nvGrpSpPr>
+          <p:cNvPr id="4" name="Group 3"/>
+          <p:cNvGrpSpPr/>
+          <p:nvPr/>
+        </p:nvGrpSpPr>
+        <p:grpSpPr>
+          <a:xfrm>
+            <a:off x="14203440" y="12186949"/>
+            <a:ext cx="14518836" cy="14672361"/>
+            <a:chOff x="13798302" y="12137087"/>
+            <a:chExt cx="14518836" cy="14672361"/>
+          </a:xfrm>
+        </p:grpSpPr>
+        <p:sp>
+          <p:nvSpPr>
+            <p:cNvPr id="19" name="Rounded Rectangle 18"/>
+            <p:cNvSpPr/>
+            <p:nvPr/>
+          </p:nvSpPr>
+          <p:spPr>
+            <a:xfrm>
+              <a:off x="13798302" y="12137087"/>
+              <a:ext cx="14518836" cy="14672361"/>
+            </a:xfrm>
+            <a:prstGeom prst="roundRect">
+              <a:avLst>
+                <a:gd name="adj" fmla="val 5974"/>
+              </a:avLst>
+            </a:prstGeom>
+          </p:spPr>
+          <p:style>
+            <a:lnRef idx="2">
+              <a:schemeClr val="accent1">
+                <a:shade val="50000"/>
+              </a:schemeClr>
+            </a:lnRef>
+            <a:fillRef idx="1">
+              <a:schemeClr val="accent1"/>
+            </a:fillRef>
+            <a:effectRef idx="0">
+              <a:schemeClr val="accent1"/>
+            </a:effectRef>
+            <a:fontRef idx="minor">
+              <a:schemeClr val="lt1"/>
+            </a:fontRef>
+          </p:style>
+          <p:txBody>
+            <a:bodyPr rtlCol="0" anchor="ctr"/>
+            <a:lstStyle/>
+            <a:p>
+              <a:pPr algn="ctr"/>
+              <a:r>
+                <a:rPr lang="en-US" sz="4800" b="1" dirty="0" smtClean="0"/>
+                <a:t>Algorithms</a:t>
+              </a:r>
+            </a:p>
+            <a:p>
+              <a:endParaRPr lang="en-US" sz="2000" b="1" dirty="0" smtClean="0"/>
+            </a:p>
+            <a:p>
+              <a:r>
+                <a:rPr lang="en-US" sz="2400" dirty="0" smtClean="0"/>
+                <a:t>When developing software for WSNs, there are several algorithms that are commonly used to perform certain tasks. So, in order to  test that our solution is applicable to real world code, we have developed some of these algorithms for us to specify and check predicates for.</a:t>
+              </a:r>
+              <a:endParaRPr lang="en-US" sz="2000" dirty="0" smtClean="0"/>
+            </a:p>
+            <a:p>
+              <a:r>
+                <a:rPr lang="en-US" sz="2000" b="1" dirty="0" smtClean="0"/>
+                <a:t/>
+              </a:r>
+              <a:br>
+                <a:rPr lang="en-US" sz="2000" b="1" dirty="0" smtClean="0"/>
+              </a:br>
+              <a:r>
+                <a:rPr lang="en-US" sz="4000" b="1" dirty="0" smtClean="0"/>
+                <a:t>Tree Aggregation</a:t>
+              </a:r>
+            </a:p>
+            <a:p>
+              <a:endParaRPr lang="en-US" sz="2000" b="1" dirty="0" smtClean="0"/>
+            </a:p>
+            <a:p>
+              <a:endParaRPr lang="en-US" sz="2000" b="1" dirty="0" smtClean="0"/>
+            </a:p>
+            <a:p>
+              <a:endParaRPr lang="en-US" sz="2000" b="1" dirty="0"/>
+            </a:p>
+            <a:p>
+              <a:endParaRPr lang="en-US" sz="2000" b="1" dirty="0" smtClean="0"/>
+            </a:p>
+            <a:p>
+              <a:endParaRPr lang="en-US" sz="2000" b="1" dirty="0"/>
+            </a:p>
+            <a:p>
+              <a:endParaRPr lang="en-US" sz="2000" b="1" dirty="0" smtClean="0"/>
+            </a:p>
+            <a:p>
+              <a:endParaRPr lang="en-US" sz="2000" b="1" dirty="0" smtClean="0"/>
+            </a:p>
+            <a:p>
+              <a:endParaRPr lang="en-US" sz="2000" b="1" dirty="0" smtClean="0"/>
+            </a:p>
+            <a:p>
+              <a:endParaRPr lang="en-US" sz="2000" b="1" dirty="0" smtClean="0"/>
+            </a:p>
+            <a:p>
+              <a:r>
+                <a:rPr lang="en-US" sz="4000" b="1" dirty="0" smtClean="0"/>
+                <a:t>Clustering</a:t>
+              </a:r>
+            </a:p>
+            <a:p>
+              <a:endParaRPr lang="en-GB" sz="2000" dirty="0" smtClean="0"/>
+            </a:p>
+            <a:p>
+              <a:r>
+                <a:rPr lang="en-GB" sz="2000" dirty="0" smtClean="0"/>
+                <a:t>As </a:t>
+              </a:r>
+              <a:r>
+                <a:rPr lang="en-GB" sz="2000" dirty="0"/>
+                <a:t>two of the key constraints in a WSN are energy consumption and bandwidth, we made it a priority to minimise the number of messages sent through the network; clustering is perhaps the most widely-used strategy for achieving this.</a:t>
+              </a:r>
+            </a:p>
+            <a:p>
+              <a:r>
+                <a:rPr lang="en-GB" sz="2000" dirty="0" smtClean="0"/>
+                <a:t>Using features suggested by the </a:t>
+              </a:r>
+              <a:r>
+                <a:rPr lang="en-GB" sz="2000" dirty="0"/>
+                <a:t>Low-Energy Adaptive Clustering Hierarchy (LEACH</a:t>
+              </a:r>
+              <a:r>
+                <a:rPr lang="en-GB" sz="2000" dirty="0" smtClean="0"/>
+                <a:t>), we devised </a:t>
+              </a:r>
+              <a:r>
+                <a:rPr lang="en-GB" sz="2000" dirty="0"/>
+                <a:t>two clustering algorithms; a basic cluster for small </a:t>
+              </a:r>
+              <a:r>
+                <a:rPr lang="en-GB" sz="2000" dirty="0" smtClean="0"/>
+                <a:t>networks (cf. the diagram below), </a:t>
+              </a:r>
+              <a:r>
+                <a:rPr lang="en-GB" sz="2000" dirty="0"/>
+                <a:t>and a hierarchical cluster (with variable depth) which can be scaled up arbitrarily.</a:t>
+              </a:r>
+            </a:p>
+            <a:p>
+              <a:endParaRPr lang="en-GB" sz="2000" dirty="0"/>
+            </a:p>
+            <a:p>
+              <a:r>
+                <a:rPr lang="en-GB" sz="2000" dirty="0"/>
+                <a:t>The </a:t>
+              </a:r>
+              <a:r>
+                <a:rPr lang="en-GB" sz="2000" dirty="0" smtClean="0"/>
+                <a:t>basic </a:t>
+              </a:r>
+              <a:r>
+                <a:rPr lang="en-GB" sz="2000" dirty="0"/>
+                <a:t>clustering algorithm simply elects all nodes </a:t>
+              </a:r>
+              <a:r>
+                <a:rPr lang="en-GB" sz="2000" dirty="0" smtClean="0"/>
+                <a:t>within radio </a:t>
+              </a:r>
+              <a:r>
+                <a:rPr lang="en-GB" sz="2000" dirty="0"/>
+                <a:t>range of the sink as </a:t>
+              </a:r>
+              <a:r>
+                <a:rPr lang="en-GB" sz="2000" dirty="0" err="1"/>
+                <a:t>clusterheads</a:t>
+              </a:r>
+              <a:r>
+                <a:rPr lang="en-GB" sz="2000" dirty="0"/>
+                <a:t> (CHs); all other nodes send data to their closest CH which performs some application-dependent aggregation on these messages before forwarding them on to the </a:t>
+              </a:r>
+              <a:r>
+                <a:rPr lang="en-GB" sz="2000" dirty="0" smtClean="0"/>
+                <a:t>sink. This </a:t>
+              </a:r>
+              <a:r>
+                <a:rPr lang="en-GB" sz="2000" dirty="0"/>
+                <a:t>is only useful in small networks, as networks in which the majority of nodes aren't within range of the CHs would have to forward their messages through some path of regular nodes, thus removing the efficiency of clustering.</a:t>
+              </a:r>
+            </a:p>
+            <a:p>
+              <a:endParaRPr lang="en-GB" sz="2000" dirty="0"/>
+            </a:p>
+            <a:p>
+              <a:endParaRPr lang="en-US" sz="4000" b="1" dirty="0"/>
+            </a:p>
+            <a:p>
+              <a:endParaRPr lang="en-US" sz="4000" b="1" dirty="0" smtClean="0"/>
+            </a:p>
+            <a:p>
+              <a:endParaRPr lang="en-US" sz="4000" b="1" dirty="0" smtClean="0"/>
+            </a:p>
+            <a:p>
+              <a:endParaRPr lang="en-US" sz="4000" b="1" dirty="0"/>
+            </a:p>
+            <a:p>
+              <a:endParaRPr lang="en-US" sz="4000" b="1" dirty="0" smtClean="0"/>
+            </a:p>
+            <a:p>
+              <a:endParaRPr lang="en-US" sz="4000" b="1" dirty="0" smtClean="0"/>
+            </a:p>
+          </p:txBody>
+        </p:sp>
+        <p:pic>
+          <p:nvPicPr>
+            <p:cNvPr id="6" name="Picture 5"/>
+            <p:cNvPicPr>
+              <a:picLocks noChangeAspect="1"/>
+            </p:cNvPicPr>
+            <p:nvPr/>
+          </p:nvPicPr>
+          <p:blipFill>
+            <a:blip r:embed="rId5">
+              <a:extLst>
+                <a:ext uri="{28A0092B-C50C-407E-A947-70E740481C1C}">
+                  <a14:useLocalDpi xmlns:a14="http://schemas.microsoft.com/office/drawing/2010/main" val="0"/>
+                </a:ext>
+              </a:extLst>
+            </a:blip>
+            <a:stretch>
+              <a:fillRect/>
+            </a:stretch>
+          </p:blipFill>
+          <p:spPr>
+            <a:xfrm>
+              <a:off x="23351954" y="14657347"/>
+              <a:ext cx="4736584" cy="4756533"/>
+            </a:xfrm>
+            <a:prstGeom prst="rect">
+              <a:avLst/>
+            </a:prstGeom>
+          </p:spPr>
+        </p:pic>
+        <p:sp>
+          <p:nvSpPr>
+            <p:cNvPr id="7" name="TextBox 6"/>
+            <p:cNvSpPr txBox="1"/>
+            <p:nvPr/>
+          </p:nvSpPr>
+          <p:spPr>
+            <a:xfrm>
+              <a:off x="14058900" y="15904429"/>
+              <a:ext cx="8950154" cy="2554545"/>
+            </a:xfrm>
+            <a:prstGeom prst="rect">
+              <a:avLst/>
+            </a:prstGeom>
+            <a:noFill/>
+          </p:spPr>
+          <p:txBody>
+            <a:bodyPr wrap="square" rtlCol="0">
+              <a:spAutoFit/>
+            </a:bodyPr>
+            <a:lstStyle/>
+            <a:p>
+              <a:r>
+                <a:rPr lang="en-US" sz="2000" dirty="0">
+                  <a:solidFill>
+                    <a:schemeClr val="bg1"/>
+                  </a:solidFill>
+                </a:rPr>
+                <a:t>A common task is to have every node in a network send data to the sink, whilst having some aggregation function performed on that data. To </a:t>
+              </a:r>
+              <a:r>
+                <a:rPr lang="en-US" sz="2000" dirty="0" err="1">
+                  <a:solidFill>
+                    <a:schemeClr val="bg1"/>
+                  </a:solidFill>
+                </a:rPr>
+                <a:t>minimise</a:t>
+              </a:r>
+              <a:r>
+                <a:rPr lang="en-US" sz="2000" dirty="0">
+                  <a:solidFill>
+                    <a:schemeClr val="bg1"/>
+                  </a:solidFill>
+                </a:rPr>
+                <a:t> the number of retransmissions the network is </a:t>
+              </a:r>
+              <a:r>
+                <a:rPr lang="en-US" sz="2000" dirty="0" err="1">
+                  <a:solidFill>
+                    <a:schemeClr val="bg1"/>
+                  </a:solidFill>
+                </a:rPr>
+                <a:t>orangised</a:t>
+              </a:r>
+              <a:r>
+                <a:rPr lang="en-US" sz="2000" dirty="0">
+                  <a:solidFill>
+                    <a:schemeClr val="bg1"/>
+                  </a:solidFill>
+                </a:rPr>
+                <a:t> as a tree. In this tree a node will collect child node’s data and perform some function over that data , once all children’s information is received the aggregated result will be sent to the parent of that node. Eventually the sink will receive and aggregate information from its children. Common applications for this algorithm is to calculate the average temperature over the area monitored by the sensor network.</a:t>
+              </a:r>
+            </a:p>
+          </p:txBody>
+        </p:sp>
+        <p:sp>
+          <p:nvSpPr>
+            <p:cNvPr id="10" name="TextBox 9"/>
+            <p:cNvSpPr txBox="1"/>
+            <p:nvPr/>
+          </p:nvSpPr>
+          <p:spPr>
+            <a:xfrm>
+              <a:off x="14058900" y="22474922"/>
+              <a:ext cx="4741777" cy="3785652"/>
+            </a:xfrm>
+            <a:prstGeom prst="rect">
+              <a:avLst/>
+            </a:prstGeom>
+            <a:noFill/>
+          </p:spPr>
+          <p:txBody>
+            <a:bodyPr wrap="square" rtlCol="0">
+              <a:spAutoFit/>
+            </a:bodyPr>
+            <a:lstStyle/>
+            <a:p>
+              <a:r>
+                <a:rPr lang="en-US" sz="2000" dirty="0">
+                  <a:solidFill>
+                    <a:schemeClr val="bg1"/>
+                  </a:solidFill>
+                </a:rPr>
+                <a:t>Hierarchical clustering also begins by electing the nodes within range of the sink as CHs at level 1, but as the setup message spreads through the network nodes whose shortest path to their nearest level n </a:t>
+              </a:r>
+              <a:r>
+                <a:rPr lang="en-US" sz="2000" dirty="0" err="1">
+                  <a:solidFill>
+                    <a:schemeClr val="bg1"/>
+                  </a:solidFill>
+                </a:rPr>
+                <a:t>clusterhead</a:t>
+              </a:r>
+              <a:r>
+                <a:rPr lang="en-US" sz="2000" dirty="0">
+                  <a:solidFill>
+                    <a:schemeClr val="bg1"/>
+                  </a:solidFill>
+                </a:rPr>
+                <a:t> is  D hops (where D is specified in advance) also elect themselves as </a:t>
+              </a:r>
+              <a:r>
+                <a:rPr lang="en-US" sz="2000" dirty="0" err="1">
+                  <a:solidFill>
+                    <a:schemeClr val="bg1"/>
+                  </a:solidFill>
+                </a:rPr>
+                <a:t>clusterheads</a:t>
+              </a:r>
+              <a:r>
+                <a:rPr lang="en-US" sz="2000" dirty="0">
+                  <a:solidFill>
+                    <a:schemeClr val="bg1"/>
+                  </a:solidFill>
+                </a:rPr>
+                <a:t> and create a new cluster for level n+1. For D &gt; 1, nodes pass messages to their CH through the other nodes in their cluster, using </a:t>
+              </a:r>
+              <a:r>
+                <a:rPr lang="en-US" sz="2000" dirty="0" err="1">
+                  <a:solidFill>
+                    <a:schemeClr val="bg1"/>
+                  </a:solidFill>
+                </a:rPr>
+                <a:t>Contiki’s</a:t>
+              </a:r>
+              <a:r>
+                <a:rPr lang="en-US" sz="2000" dirty="0">
+                  <a:solidFill>
+                    <a:schemeClr val="bg1"/>
+                  </a:solidFill>
+                </a:rPr>
+                <a:t> low-overhead mesh messaging protocol.</a:t>
+              </a:r>
+            </a:p>
+          </p:txBody>
+        </p:sp>
+        <p:pic>
+          <p:nvPicPr>
+            <p:cNvPr id="21" name="Picture 20"/>
+            <p:cNvPicPr>
+              <a:picLocks noChangeAspect="1"/>
+            </p:cNvPicPr>
+            <p:nvPr/>
+          </p:nvPicPr>
+          <p:blipFill>
+            <a:blip r:embed="rId6">
+              <a:extLst>
+                <a:ext uri="{28A0092B-C50C-407E-A947-70E740481C1C}">
+                  <a14:useLocalDpi xmlns:a14="http://schemas.microsoft.com/office/drawing/2010/main" val="0"/>
+                </a:ext>
+              </a:extLst>
+            </a:blip>
+            <a:stretch>
+              <a:fillRect/>
+            </a:stretch>
+          </p:blipFill>
+          <p:spPr>
+            <a:xfrm>
+              <a:off x="18904693" y="22421550"/>
+              <a:ext cx="9355295" cy="3975100"/>
+            </a:xfrm>
+            <a:prstGeom prst="rect">
+              <a:avLst/>
+            </a:prstGeom>
+          </p:spPr>
+        </p:pic>
+      </p:grpSp>
       <p:pic>
         <p:nvPicPr>
-          <p:cNvPr id="21" name="Picture 20"/>
+          <p:cNvPr id="11" name="Picture 2" descr="http://www.advanticsys.com/wiki/images/6/6e/Ud1000.jpg"/>
           <p:cNvPicPr>
-            <a:picLocks noChangeAspect="1"/>
+            <a:picLocks noChangeAspect="1" noChangeArrowheads="1"/>
           </p:cNvPicPr>
           <p:nvPr/>
         </p:nvPicPr>
-        <p:blipFill>
-          <a:blip r:embed="rId6">
+        <p:blipFill rotWithShape="1">
+          <a:blip r:embed="rId7">
             <a:extLst>
               <a:ext uri="{28A0092B-C50C-407E-A947-70E740481C1C}">
                 <a14:useLocalDpi xmlns:a14="http://schemas.microsoft.com/office/drawing/2010/main" val="0"/>
               </a:ext>
             </a:extLst>
           </a:blip>
-          <a:stretch>
-            <a:fillRect/>
-          </a:stretch>
+          <a:srcRect b="5178"/>
+          <a:stretch/>
         </p:blipFill>
-        <p:spPr>
+        <p:spPr bwMode="auto">
           <a:xfrm>
-            <a:off x="19216430" y="22421550"/>
-            <a:ext cx="9355295" cy="3975100"/>
+            <a:off x="22242617" y="8704574"/>
+            <a:ext cx="4940129" cy="2820676"/>
           </a:xfrm>
           <a:prstGeom prst="rect">
             <a:avLst/>
           </a:prstGeom>
+          <a:noFill/>
+          <a:extLst>
+            <a:ext uri="{909E8E84-426E-40DD-AFC4-6F175D3DCCD1}">
+              <a14:hiddenFill xmlns:a14="http://schemas.microsoft.com/office/drawing/2010/main">
+                <a:solidFill>
+                  <a:srgbClr val="FFFFFF"/>
+                </a:solidFill>
+              </a14:hiddenFill>
+            </a:ext>
+          </a:extLst>
         </p:spPr>
       </p:pic>
     </p:spTree>
@@ -5266,7 +5458,7 @@
   <p:timing>
     <p:tnLst>
       <p:par>
-        <p:cTn xmlns:p14="http://schemas.microsoft.com/office/powerpoint/2010/main" id="1" dur="indefinite" restart="never" nodeType="tmRoot"/>
+        <p:cTn id="1" dur="indefinite" restart="never" nodeType="tmRoot"/>
       </p:par>
     </p:tnLst>
   </p:timing>
@@ -5594,6 +5786,24 @@
 </file>
 
 <file path=customXml/item1.xml><?xml version="1.0" encoding="utf-8"?>
+<?mso-contentType ?>
+<FormTemplates xmlns="http://schemas.microsoft.com/sharepoint/v3/contenttype/forms">
+  <Display>DocumentLibraryForm</Display>
+  <Edit>DocumentLibraryForm</Edit>
+  <New>DocumentLibraryForm</New>
+</FormTemplates>
+</file>
+
+<file path=customXml/item2.xml><?xml version="1.0" encoding="utf-8"?>
+<p:properties xmlns:p="http://schemas.microsoft.com/office/2006/metadata/properties" xmlns:xsi="http://www.w3.org/2001/XMLSchema-instance" xmlns:pc="http://schemas.microsoft.com/office/infopath/2007/PartnerControls">
+  <documentManagement>
+    <_Version xmlns="http://schemas.microsoft.com/sharepoint/v3/fields" xsi:nil="true"/>
+    <_Status xmlns="http://schemas.microsoft.com/sharepoint/v3/fields">Not Started</_Status>
+  </documentManagement>
+</p:properties>
+</file>
+
+<file path=customXml/item3.xml><?xml version="1.0" encoding="utf-8"?>
 <ct:contentTypeSchema xmlns:ct="http://schemas.microsoft.com/office/2006/metadata/contentType" xmlns:ma="http://schemas.microsoft.com/office/2006/metadata/properties/metaAttributes" ct:_="" ma:_="" ma:contentTypeName="Document" ma:contentTypeID="0x0101000DE64AEEDD9B7A4D93545ACBE97D4615" ma:contentTypeVersion="2" ma:contentTypeDescription="Create a new document." ma:contentTypeScope="" ma:versionID="f49002b78e3a4a71b814eef46a983816">
   <xsd:schema xmlns:xsd="http://www.w3.org/2001/XMLSchema" xmlns:xs="http://www.w3.org/2001/XMLSchema" xmlns:p="http://schemas.microsoft.com/office/2006/metadata/properties" xmlns:ns2="http://schemas.microsoft.com/sharepoint/v3/fields" targetNamespace="http://schemas.microsoft.com/office/2006/metadata/properties" ma:root="true" ma:fieldsID="38f6db2dd0d9a0cf6a8dc37be32b365b" ns2:_="">
     <xsd:import namespace="http://schemas.microsoft.com/sharepoint/v3/fields"/>
@@ -5737,38 +5947,10 @@
 </ct:contentTypeSchema>
 </file>
 
-<file path=customXml/item2.xml><?xml version="1.0" encoding="utf-8"?>
-<p:properties xmlns:p="http://schemas.microsoft.com/office/2006/metadata/properties" xmlns:xsi="http://www.w3.org/2001/XMLSchema-instance" xmlns:pc="http://schemas.microsoft.com/office/infopath/2007/PartnerControls">
-  <documentManagement>
-    <_Version xmlns="http://schemas.microsoft.com/sharepoint/v3/fields" xsi:nil="true"/>
-    <_Status xmlns="http://schemas.microsoft.com/sharepoint/v3/fields">Not Started</_Status>
-  </documentManagement>
-</p:properties>
-</file>
-
-<file path=customXml/item3.xml><?xml version="1.0" encoding="utf-8"?>
-<?mso-contentType ?>
-<FormTemplates xmlns="http://schemas.microsoft.com/sharepoint/v3/contenttype/forms">
-  <Display>DocumentLibraryForm</Display>
-  <Edit>DocumentLibraryForm</Edit>
-  <New>DocumentLibraryForm</New>
-</FormTemplates>
-</file>
-
 <file path=customXml/itemProps1.xml><?xml version="1.0" encoding="utf-8"?>
-<ds:datastoreItem xmlns:ds="http://schemas.openxmlformats.org/officeDocument/2006/customXml" ds:itemID="{E4214858-785C-42F7-BE66-6D0E79395FC8}">
+<ds:datastoreItem xmlns:ds="http://schemas.openxmlformats.org/officeDocument/2006/customXml" ds:itemID="{87D2A1B0-FF3E-4009-940D-AED0EB70AA20}">
   <ds:schemaRefs>
-    <ds:schemaRef ds:uri="http://schemas.microsoft.com/office/2006/metadata/contentType"/>
-    <ds:schemaRef ds:uri="http://schemas.microsoft.com/office/2006/metadata/properties/metaAttributes"/>
-    <ds:schemaRef ds:uri="http://www.w3.org/2001/XMLSchema"/>
-    <ds:schemaRef ds:uri="http://schemas.microsoft.com/office/2006/metadata/properties"/>
-    <ds:schemaRef ds:uri="http://schemas.microsoft.com/sharepoint/v3/fields"/>
-    <ds:schemaRef ds:uri="http://schemas.microsoft.com/office/2006/documentManagement/types"/>
-    <ds:schemaRef ds:uri="http://schemas.microsoft.com/office/infopath/2007/PartnerControls"/>
-    <ds:schemaRef ds:uri="http://schemas.openxmlformats.org/package/2006/metadata/core-properties"/>
-    <ds:schemaRef ds:uri="http://purl.org/dc/elements/1.1/"/>
-    <ds:schemaRef ds:uri="http://purl.org/dc/terms/"/>
-    <ds:schemaRef ds:uri="http://schemas.microsoft.com/internal/obd"/>
+    <ds:schemaRef ds:uri="http://schemas.microsoft.com/sharepoint/v3/contenttype/forms"/>
   </ds:schemaRefs>
 </ds:datastoreItem>
 </file>
@@ -5790,9 +5972,19 @@
 </file>
 
 <file path=customXml/itemProps3.xml><?xml version="1.0" encoding="utf-8"?>
-<ds:datastoreItem xmlns:ds="http://schemas.openxmlformats.org/officeDocument/2006/customXml" ds:itemID="{87D2A1B0-FF3E-4009-940D-AED0EB70AA20}">
+<ds:datastoreItem xmlns:ds="http://schemas.openxmlformats.org/officeDocument/2006/customXml" ds:itemID="{E4214858-785C-42F7-BE66-6D0E79395FC8}">
   <ds:schemaRefs>
-    <ds:schemaRef ds:uri="http://schemas.microsoft.com/sharepoint/v3/contenttype/forms"/>
+    <ds:schemaRef ds:uri="http://schemas.microsoft.com/office/2006/metadata/contentType"/>
+    <ds:schemaRef ds:uri="http://schemas.microsoft.com/office/2006/metadata/properties/metaAttributes"/>
+    <ds:schemaRef ds:uri="http://www.w3.org/2001/XMLSchema"/>
+    <ds:schemaRef ds:uri="http://schemas.microsoft.com/office/2006/metadata/properties"/>
+    <ds:schemaRef ds:uri="http://schemas.microsoft.com/sharepoint/v3/fields"/>
+    <ds:schemaRef ds:uri="http://schemas.microsoft.com/office/2006/documentManagement/types"/>
+    <ds:schemaRef ds:uri="http://schemas.microsoft.com/office/infopath/2007/PartnerControls"/>
+    <ds:schemaRef ds:uri="http://schemas.openxmlformats.org/package/2006/metadata/core-properties"/>
+    <ds:schemaRef ds:uri="http://purl.org/dc/elements/1.1/"/>
+    <ds:schemaRef ds:uri="http://purl.org/dc/terms/"/>
+    <ds:schemaRef ds:uri="http://schemas.microsoft.com/internal/obd"/>
   </ds:schemaRefs>
 </ds:datastoreItem>
 </file>
</xml_diff>

<commit_message>
Fixed Title Top Alignment, Converted to a pdf to send to Arshad
</commit_message>
<xml_diff>
--- a/Poster/Poster.pptx
+++ b/Poster/Poster.pptx
@@ -3343,7 +3343,7 @@
           </a:fontRef>
         </p:style>
         <p:txBody>
-          <a:bodyPr rtlCol="0" anchor="ctr"/>
+          <a:bodyPr rtlCol="0" anchor="t"/>
           <a:lstStyle/>
           <a:p>
             <a:pPr algn="ctr"/>
@@ -3770,7 +3770,7 @@
           </a:fontRef>
         </p:style>
         <p:txBody>
-          <a:bodyPr rtlCol="0" anchor="ctr"/>
+          <a:bodyPr rtlCol="0" anchor="t"/>
           <a:lstStyle/>
           <a:p>
             <a:pPr algn="ctr"/>
@@ -3996,7 +3996,7 @@
           </a:fontRef>
         </p:style>
         <p:txBody>
-          <a:bodyPr rtlCol="0" anchor="ctr"/>
+          <a:bodyPr rtlCol="0" anchor="t"/>
           <a:lstStyle/>
           <a:p>
             <a:pPr algn="ctr"/>
@@ -4129,6 +4129,10 @@
           <a:lstStyle/>
           <a:p>
             <a:pPr algn="ctr"/>
+            <a:endParaRPr lang="en-US" sz="4800" b="1" dirty="0" smtClean="0"/>
+          </a:p>
+          <a:p>
+            <a:pPr algn="ctr"/>
             <a:r>
               <a:rPr lang="en-US" sz="4800" b="1" dirty="0" smtClean="0"/>
               <a:t>Predicate </a:t>
@@ -4322,7 +4326,7 @@
         </p:nvGrpSpPr>
         <p:grpSpPr>
           <a:xfrm>
-            <a:off x="809774" y="24471500"/>
+            <a:off x="847874" y="24700100"/>
             <a:ext cx="11339038" cy="1600439"/>
             <a:chOff x="14562518" y="11856894"/>
             <a:chExt cx="11339038" cy="1600439"/>
@@ -4657,7 +4661,7 @@
           </a:fontRef>
         </p:style>
         <p:txBody>
-          <a:bodyPr rtlCol="0" anchor="ctr"/>
+          <a:bodyPr rtlCol="0" anchor="t"/>
           <a:lstStyle/>
           <a:p>
             <a:pPr algn="ctr"/>
@@ -4972,7 +4976,7 @@
           </a:fontRef>
         </p:style>
         <p:txBody>
-          <a:bodyPr rtlCol="0" anchor="ctr"/>
+          <a:bodyPr rtlCol="0" anchor="t"/>
           <a:lstStyle/>
           <a:p>
             <a:pPr algn="ctr"/>
@@ -5133,7 +5137,7 @@
             </a:fontRef>
           </p:style>
           <p:txBody>
-            <a:bodyPr rtlCol="0" anchor="ctr"/>
+            <a:bodyPr rtlCol="0" anchor="t"/>
             <a:lstStyle/>
             <a:p>
               <a:pPr algn="ctr"/>
@@ -5193,10 +5197,14 @@
               <a:endParaRPr lang="en-US" sz="2000" b="1" dirty="0" smtClean="0"/>
             </a:p>
             <a:p>
+              <a:endParaRPr lang="en-US" sz="4000" b="1" dirty="0" smtClean="0"/>
+            </a:p>
+            <a:p>
               <a:r>
                 <a:rPr lang="en-US" sz="4000" b="1" dirty="0" smtClean="0"/>
                 <a:t>Clustering</a:t>
               </a:r>
+              <a:endParaRPr lang="en-US" sz="4000" b="1" dirty="0" smtClean="0"/>
             </a:p>
             <a:p>
               <a:endParaRPr lang="en-GB" sz="2000" dirty="0" smtClean="0"/>
@@ -5332,7 +5340,7 @@
             <a:noFill/>
           </p:spPr>
           <p:txBody>
-            <a:bodyPr wrap="square" rtlCol="0">
+            <a:bodyPr wrap="square" rtlCol="0" anchor="t">
               <a:spAutoFit/>
             </a:bodyPr>
             <a:lstStyle/>
@@ -5388,7 +5396,7 @@
           </p:nvSpPr>
           <p:spPr>
             <a:xfrm>
-              <a:off x="14058900" y="22474922"/>
+              <a:off x="14058900" y="22935481"/>
               <a:ext cx="4741777" cy="3170099"/>
             </a:xfrm>
             <a:prstGeom prst="rect">
@@ -5397,7 +5405,7 @@
             <a:noFill/>
           </p:spPr>
           <p:txBody>
-            <a:bodyPr wrap="square" rtlCol="0">
+            <a:bodyPr wrap="square" rtlCol="0" anchor="t">
               <a:spAutoFit/>
             </a:bodyPr>
             <a:lstStyle/>
@@ -5456,7 +5464,7 @@
           </p:blipFill>
           <p:spPr>
             <a:xfrm>
-              <a:off x="18904693" y="22421550"/>
+              <a:off x="18847543" y="22709400"/>
               <a:ext cx="9355295" cy="3975100"/>
             </a:xfrm>
             <a:prstGeom prst="rect">
@@ -6020,12 +6028,12 @@
     <ds:schemaRef ds:uri="http://schemas.microsoft.com/sharepoint/v3/fields"/>
     <ds:schemaRef ds:uri="http://purl.org/dc/terms/"/>
     <ds:schemaRef ds:uri="http://purl.org/dc/elements/1.1/"/>
+    <ds:schemaRef ds:uri="http://www.w3.org/XML/1998/namespace"/>
     <ds:schemaRef ds:uri="http://schemas.openxmlformats.org/package/2006/metadata/core-properties"/>
     <ds:schemaRef ds:uri="http://purl.org/dc/dcmitype/"/>
     <ds:schemaRef ds:uri="http://schemas.microsoft.com/office/2006/documentManagement/types"/>
     <ds:schemaRef ds:uri="http://schemas.microsoft.com/office/infopath/2007/PartnerControls"/>
     <ds:schemaRef ds:uri="http://schemas.microsoft.com/office/2006/metadata/properties"/>
-    <ds:schemaRef ds:uri="http://www.w3.org/XML/1998/namespace"/>
   </ds:schemaRefs>
 </ds:datastoreItem>
 </file>

</xml_diff>

<commit_message>
Include Contiki diagram inside Neighbour Discovery box. Also add labels to the WSN node figures
</commit_message>
<xml_diff>
--- a/Poster/Poster.pptx
+++ b/Poster/Poster.pptx
@@ -289,7 +289,7 @@
             <a:fld id="{8ACDB3CC-F982-40F9-8DD6-BCC9AFBF44BD}" type="datetime1">
               <a:rPr lang="en-US" smtClean="0"/>
               <a:pPr/>
-              <a:t>11/28/2012</a:t>
+              <a:t>11/29/2012</a:t>
             </a:fld>
             <a:endParaRPr lang="en-US" dirty="0"/>
           </a:p>
@@ -459,7 +459,7 @@
           <a:p>
             <a:fld id="{68C2560D-EC28-3B41-86E8-18F1CE0113B4}" type="datetimeFigureOut">
               <a:rPr lang="en-US" smtClean="0"/>
-              <a:t>11/28/2012</a:t>
+              <a:t>11/29/2012</a:t>
             </a:fld>
             <a:endParaRPr lang="en-US"/>
           </a:p>
@@ -639,7 +639,7 @@
           <a:p>
             <a:fld id="{68C2560D-EC28-3B41-86E8-18F1CE0113B4}" type="datetimeFigureOut">
               <a:rPr lang="en-US" smtClean="0"/>
-              <a:t>11/28/2012</a:t>
+              <a:t>11/29/2012</a:t>
             </a:fld>
             <a:endParaRPr lang="en-US"/>
           </a:p>
@@ -809,7 +809,7 @@
           <a:p>
             <a:fld id="{68C2560D-EC28-3B41-86E8-18F1CE0113B4}" type="datetimeFigureOut">
               <a:rPr lang="en-US" smtClean="0"/>
-              <a:t>11/28/2012</a:t>
+              <a:t>11/29/2012</a:t>
             </a:fld>
             <a:endParaRPr lang="en-US"/>
           </a:p>
@@ -1056,7 +1056,7 @@
             <a:fld id="{4A9E7B99-7C3F-4BC3-B7B8-7E1F8C620B24}" type="datetime1">
               <a:rPr lang="en-US" smtClean="0"/>
               <a:pPr/>
-              <a:t>11/28/2012</a:t>
+              <a:t>11/29/2012</a:t>
             </a:fld>
             <a:endParaRPr lang="en-US"/>
           </a:p>
@@ -1345,7 +1345,7 @@
           <a:p>
             <a:fld id="{68C2560D-EC28-3B41-86E8-18F1CE0113B4}" type="datetimeFigureOut">
               <a:rPr lang="en-US" smtClean="0"/>
-              <a:t>11/28/2012</a:t>
+              <a:t>11/29/2012</a:t>
             </a:fld>
             <a:endParaRPr lang="en-US"/>
           </a:p>
@@ -1767,7 +1767,7 @@
           <a:p>
             <a:fld id="{68C2560D-EC28-3B41-86E8-18F1CE0113B4}" type="datetimeFigureOut">
               <a:rPr lang="en-US" smtClean="0"/>
-              <a:t>11/28/2012</a:t>
+              <a:t>11/29/2012</a:t>
             </a:fld>
             <a:endParaRPr lang="en-US"/>
           </a:p>
@@ -1885,7 +1885,7 @@
           <a:p>
             <a:fld id="{68C2560D-EC28-3B41-86E8-18F1CE0113B4}" type="datetimeFigureOut">
               <a:rPr lang="en-US" smtClean="0"/>
-              <a:t>11/28/2012</a:t>
+              <a:t>11/29/2012</a:t>
             </a:fld>
             <a:endParaRPr lang="en-US"/>
           </a:p>
@@ -1980,7 +1980,7 @@
           <a:p>
             <a:fld id="{68C2560D-EC28-3B41-86E8-18F1CE0113B4}" type="datetimeFigureOut">
               <a:rPr lang="en-US" smtClean="0"/>
-              <a:t>11/28/2012</a:t>
+              <a:t>11/29/2012</a:t>
             </a:fld>
             <a:endParaRPr lang="en-US"/>
           </a:p>
@@ -2257,7 +2257,7 @@
           <a:p>
             <a:fld id="{68C2560D-EC28-3B41-86E8-18F1CE0113B4}" type="datetimeFigureOut">
               <a:rPr lang="en-US" smtClean="0"/>
-              <a:t>11/28/2012</a:t>
+              <a:t>11/29/2012</a:t>
             </a:fld>
             <a:endParaRPr lang="en-US"/>
           </a:p>
@@ -2517,7 +2517,7 @@
           <a:p>
             <a:fld id="{68C2560D-EC28-3B41-86E8-18F1CE0113B4}" type="datetimeFigureOut">
               <a:rPr lang="en-US" smtClean="0"/>
-              <a:t>11/28/2012</a:t>
+              <a:t>11/29/2012</a:t>
             </a:fld>
             <a:endParaRPr lang="en-US"/>
           </a:p>
@@ -2730,7 +2730,7 @@
           <a:p>
             <a:fld id="{68C2560D-EC28-3B41-86E8-18F1CE0113B4}" type="datetimeFigureOut">
               <a:rPr lang="en-US" smtClean="0"/>
-              <a:t>11/28/2012</a:t>
+              <a:t>11/29/2012</a:t>
             </a:fld>
             <a:endParaRPr lang="en-US"/>
           </a:p>
@@ -3134,8 +3134,8 @@
         </p:nvSpPr>
         <p:spPr>
           <a:xfrm>
-            <a:off x="513302" y="12487275"/>
-            <a:ext cx="12114901" cy="4744288"/>
+            <a:off x="513302" y="13086163"/>
+            <a:ext cx="12288297" cy="4145399"/>
           </a:xfrm>
           <a:prstGeom prst="roundRect">
             <a:avLst>
@@ -3166,8 +3166,13 @@
             <a:pPr algn="ctr"/>
             <a:r>
               <a:rPr lang="en-US" sz="4800" b="1" dirty="0" smtClean="0"/>
-              <a:t>Project Management</a:t>
-            </a:r>
+              <a:t>Project </a:t>
+            </a:r>
+            <a:r>
+              <a:rPr lang="en-US" sz="4800" b="1" dirty="0" smtClean="0"/>
+              <a:t>Management</a:t>
+            </a:r>
+            <a:endParaRPr lang="en-US" sz="4800" b="1" dirty="0" smtClean="0"/>
           </a:p>
         </p:txBody>
       </p:sp>
@@ -3179,7 +3184,7 @@
         </p:nvSpPr>
         <p:spPr>
           <a:xfrm>
-            <a:off x="809774" y="13756384"/>
+            <a:off x="809774" y="14213584"/>
             <a:ext cx="5676900" cy="2770382"/>
           </a:xfrm>
           <a:prstGeom prst="rect">
@@ -3319,8 +3324,8 @@
         </p:nvSpPr>
         <p:spPr>
           <a:xfrm>
-            <a:off x="540459" y="2591999"/>
-            <a:ext cx="12116319" cy="3543982"/>
+            <a:off x="459233" y="8700117"/>
+            <a:ext cx="12342366" cy="3543982"/>
           </a:xfrm>
           <a:prstGeom prst="roundRect">
             <a:avLst/>
@@ -3349,57 +3354,59 @@
             <a:pPr algn="ctr"/>
             <a:r>
               <a:rPr lang="en-US" sz="4800" b="1" dirty="0" smtClean="0"/>
-              <a:t>Abstract</a:t>
-            </a:r>
-          </a:p>
-          <a:p>
-            <a:r>
-              <a:rPr lang="en-US" sz="2400" dirty="0"/>
-              <a:t>Debugging tools are vital for developers to produce reliable software, however traditional tools are less useful when developing software for new system paradigms such as wireless </a:t>
-            </a:r>
+              <a:t>Project Aims</a:t>
+            </a:r>
+          </a:p>
+          <a:p>
             <a:r>
               <a:rPr lang="en-US" sz="2400" dirty="0" smtClean="0"/>
-              <a:t>sensor </a:t>
-            </a:r>
-            <a:r>
-              <a:rPr lang="en-US" sz="2400" dirty="0"/>
-              <a:t>networks. As wireless sensor networks become increasing prevalent in our lives it will become ever more important that the software they are running works reliably and to do this debugging tools will be required. This project investigates how predicates can be specified and checked on wireless sensor node and how errors can be reported to a base station. </a:t>
-            </a:r>
+              <a:t>Due to the importance of debugging tools developing any software and the difficulty in developing distributed systems, we want to create a useful set of tools to assist in debugging WSN applications.  This includes:</a:t>
+            </a:r>
+          </a:p>
+          <a:p>
+            <a:pPr marL="457200" indent="-457200">
+              <a:buFont typeface="+mj-lt"/>
+              <a:buAutoNum type="arabicPeriod"/>
+            </a:pPr>
+            <a:r>
+              <a:rPr lang="en-US" sz="2400" dirty="0" smtClean="0"/>
+              <a:t>A way to check that certain properties in the network hold</a:t>
+            </a:r>
+          </a:p>
+          <a:p>
+            <a:pPr marL="457200" indent="-457200">
+              <a:buFont typeface="+mj-lt"/>
+              <a:buAutoNum type="arabicPeriod"/>
+            </a:pPr>
+            <a:r>
+              <a:rPr lang="en-US" sz="2400" dirty="0" smtClean="0"/>
+              <a:t>A way to </a:t>
+            </a:r>
+            <a:r>
+              <a:rPr lang="en-US" sz="2400" dirty="0" err="1" smtClean="0"/>
+              <a:t>visualise</a:t>
+            </a:r>
+            <a:r>
+              <a:rPr lang="en-US" sz="2400" dirty="0" smtClean="0"/>
+              <a:t> as much of the network state as possible</a:t>
+            </a:r>
+          </a:p>
+          <a:p>
+            <a:pPr marL="457200" indent="-457200">
+              <a:buFont typeface="+mj-lt"/>
+              <a:buAutoNum type="arabicPeriod"/>
+            </a:pPr>
+            <a:r>
+              <a:rPr lang="en-US" sz="2400" dirty="0" smtClean="0"/>
+              <a:t>A way to obtain information on the network state before a property fails to hold</a:t>
+            </a:r>
+            <a:endParaRPr lang="en-US" sz="2400" dirty="0" smtClean="0"/>
           </a:p>
           <a:p>
             <a:endParaRPr lang="en-US" sz="2000" dirty="0"/>
           </a:p>
         </p:txBody>
       </p:sp>
-      <p:pic>
-        <p:nvPicPr>
-          <p:cNvPr id="22" name="Picture 21" descr="CM5000.jpg"/>
-          <p:cNvPicPr>
-            <a:picLocks noChangeAspect="1"/>
-          </p:cNvPicPr>
-          <p:nvPr/>
-        </p:nvPicPr>
-        <p:blipFill rotWithShape="1">
-          <a:blip r:embed="rId3">
-            <a:extLst>
-              <a:ext uri="{28A0092B-C50C-407E-A947-70E740481C1C}">
-                <a14:useLocalDpi xmlns:a14="http://schemas.microsoft.com/office/drawing/2010/main" val="0"/>
-              </a:ext>
-            </a:extLst>
-          </a:blip>
-          <a:srcRect b="5641"/>
-          <a:stretch/>
-        </p:blipFill>
-        <p:spPr>
-          <a:xfrm>
-            <a:off x="15668744" y="8704574"/>
-            <a:ext cx="4963209" cy="2820676"/>
-          </a:xfrm>
-          <a:prstGeom prst="rect">
-            <a:avLst/>
-          </a:prstGeom>
-        </p:spPr>
-      </p:pic>
       <p:sp>
         <p:nvSpPr>
           <p:cNvPr id="23" name="Rounded Rectangle 22"/>
@@ -3408,8 +3415,8 @@
         </p:nvSpPr>
         <p:spPr>
           <a:xfrm>
-            <a:off x="511885" y="6757903"/>
-            <a:ext cx="12120670" cy="5192490"/>
+            <a:off x="540458" y="2591998"/>
+            <a:ext cx="12261141" cy="5451021"/>
           </a:xfrm>
           <a:prstGeom prst="roundRect">
             <a:avLst>
@@ -3446,7 +3453,11 @@
           <a:p>
             <a:r>
               <a:rPr lang="en-US" sz="2400" dirty="0" smtClean="0"/>
-              <a:t>Wireless Sensor </a:t>
+              <a:t>Wireless </a:t>
+            </a:r>
+            <a:r>
+              <a:rPr lang="en-US" sz="2400" dirty="0" smtClean="0"/>
+              <a:t>Sensor </a:t>
             </a:r>
             <a:r>
               <a:rPr lang="en-US" sz="2400" dirty="0"/>
@@ -3495,13 +3506,13 @@
           <p:nvPr>
             <p:extLst>
               <p:ext uri="{D42A27DB-BD31-4B8C-83A1-F6EECF244321}">
-                <p14:modId xmlns:p14="http://schemas.microsoft.com/office/powerpoint/2010/main" val="25431280"/>
+                <p14:modId xmlns:p14="http://schemas.microsoft.com/office/powerpoint/2010/main" val="461952381"/>
               </p:ext>
             </p:extLst>
           </p:nvPr>
         </p:nvGraphicFramePr>
         <p:xfrm>
-          <a:off x="6775129" y="13720568"/>
+          <a:off x="6775129" y="14165542"/>
           <a:ext cx="5132539" cy="2774114"/>
         </p:xfrm>
         <a:graphic>
@@ -3744,8 +3755,8 @@
         </p:nvSpPr>
         <p:spPr>
           <a:xfrm>
-            <a:off x="30096319" y="21877448"/>
-            <a:ext cx="12143475" cy="4932000"/>
+            <a:off x="30096319" y="22078950"/>
+            <a:ext cx="12143475" cy="4730498"/>
           </a:xfrm>
           <a:prstGeom prst="roundRect">
             <a:avLst>
@@ -3780,13 +3791,178 @@
                   <a:schemeClr val="bg1"/>
                 </a:solidFill>
               </a:rPr>
-              <a:t>Second Term Plan</a:t>
+              <a:t>Second Term </a:t>
+            </a:r>
+            <a:r>
+              <a:rPr lang="en-US" sz="4800" b="1" dirty="0" smtClean="0">
+                <a:solidFill>
+                  <a:schemeClr val="bg1"/>
+                </a:solidFill>
+              </a:rPr>
+              <a:t>Plan</a:t>
             </a:r>
             <a:endParaRPr lang="en-US" sz="4800" b="1" dirty="0">
               <a:solidFill>
                 <a:schemeClr val="bg1"/>
               </a:solidFill>
             </a:endParaRPr>
+          </a:p>
+          <a:p>
+            <a:endParaRPr lang="en-US" sz="2000" dirty="0" smtClean="0">
+              <a:solidFill>
+                <a:schemeClr val="bg1"/>
+              </a:solidFill>
+            </a:endParaRPr>
+          </a:p>
+          <a:p>
+            <a:pPr marL="457200" indent="-457200">
+              <a:buFont typeface="+mj-lt"/>
+              <a:buAutoNum type="arabicPeriod"/>
+            </a:pPr>
+            <a:r>
+              <a:rPr lang="en-US" sz="2400" dirty="0" smtClean="0">
+                <a:solidFill>
+                  <a:schemeClr val="bg1"/>
+                </a:solidFill>
+              </a:rPr>
+              <a:t>Predicate Specification</a:t>
+            </a:r>
+          </a:p>
+          <a:p>
+            <a:pPr marL="2853111" lvl="1" indent="-514350">
+              <a:buFont typeface="+mj-lt"/>
+              <a:buAutoNum type="romanLcPeriod"/>
+            </a:pPr>
+            <a:r>
+              <a:rPr lang="en-US" sz="2400" dirty="0" smtClean="0">
+                <a:solidFill>
+                  <a:schemeClr val="bg1"/>
+                </a:solidFill>
+              </a:rPr>
+              <a:t>Improve run-time definition and evaluation</a:t>
+            </a:r>
+          </a:p>
+          <a:p>
+            <a:pPr marL="2853111" lvl="1" indent="-514350">
+              <a:buFont typeface="+mj-lt"/>
+              <a:buAutoNum type="romanLcPeriod"/>
+            </a:pPr>
+            <a:r>
+              <a:rPr lang="en-US" sz="2400" dirty="0" smtClean="0">
+                <a:solidFill>
+                  <a:schemeClr val="bg1"/>
+                </a:solidFill>
+              </a:rPr>
+              <a:t>Reduce energy usage</a:t>
+            </a:r>
+          </a:p>
+          <a:p>
+            <a:pPr marL="457200" indent="-457200">
+              <a:buFont typeface="+mj-lt"/>
+              <a:buAutoNum type="arabicPeriod"/>
+            </a:pPr>
+            <a:r>
+              <a:rPr lang="en-US" sz="2400" dirty="0" err="1" smtClean="0">
+                <a:solidFill>
+                  <a:schemeClr val="bg1"/>
+                </a:solidFill>
+              </a:rPr>
+              <a:t>Visualisation</a:t>
+            </a:r>
+            <a:r>
+              <a:rPr lang="en-US" sz="2400" dirty="0" smtClean="0">
+                <a:solidFill>
+                  <a:schemeClr val="bg1"/>
+                </a:solidFill>
+              </a:rPr>
+              <a:t> Tool</a:t>
+            </a:r>
+          </a:p>
+          <a:p>
+            <a:pPr marL="2853111" lvl="1" indent="-514350">
+              <a:buFont typeface="+mj-lt"/>
+              <a:buAutoNum type="romanLcPeriod"/>
+            </a:pPr>
+            <a:r>
+              <a:rPr lang="en-US" sz="2400" dirty="0" smtClean="0">
+                <a:solidFill>
+                  <a:schemeClr val="bg1"/>
+                </a:solidFill>
+              </a:rPr>
+              <a:t>Provide more information</a:t>
+            </a:r>
+          </a:p>
+          <a:p>
+            <a:pPr marL="2853111" lvl="1" indent="-514350">
+              <a:buFont typeface="+mj-lt"/>
+              <a:buAutoNum type="romanLcPeriod"/>
+            </a:pPr>
+            <a:r>
+              <a:rPr lang="en-US" sz="2400" dirty="0" smtClean="0">
+                <a:solidFill>
+                  <a:schemeClr val="bg1"/>
+                </a:solidFill>
+              </a:rPr>
+              <a:t>Better predicate checking integration</a:t>
+            </a:r>
+          </a:p>
+          <a:p>
+            <a:pPr marL="457200" indent="-457200">
+              <a:buFont typeface="+mj-lt"/>
+              <a:buAutoNum type="arabicPeriod"/>
+            </a:pPr>
+            <a:r>
+              <a:rPr lang="en-US" sz="2400" dirty="0" smtClean="0">
+                <a:solidFill>
+                  <a:schemeClr val="bg1"/>
+                </a:solidFill>
+              </a:rPr>
+              <a:t>Performance</a:t>
+            </a:r>
+          </a:p>
+          <a:p>
+            <a:pPr marL="2853111" lvl="1" indent="-514350">
+              <a:buFont typeface="+mj-lt"/>
+              <a:buAutoNum type="romanLcPeriod"/>
+            </a:pPr>
+            <a:r>
+              <a:rPr lang="en-US" sz="2400" dirty="0" smtClean="0">
+                <a:solidFill>
+                  <a:schemeClr val="bg1"/>
+                </a:solidFill>
+              </a:rPr>
+              <a:t>Investigate </a:t>
+            </a:r>
+            <a:r>
+              <a:rPr lang="en-US" sz="2400" u="sng" dirty="0" smtClean="0">
+                <a:solidFill>
+                  <a:schemeClr val="bg1"/>
+                </a:solidFill>
+              </a:rPr>
+              <a:t>where</a:t>
+            </a:r>
+            <a:r>
+              <a:rPr lang="en-US" sz="2400" dirty="0" smtClean="0">
+                <a:solidFill>
+                  <a:schemeClr val="bg1"/>
+                </a:solidFill>
+              </a:rPr>
+              <a:t> the best place to evaluate a predicate is</a:t>
+            </a:r>
+          </a:p>
+          <a:p>
+            <a:pPr marL="2853111" lvl="1" indent="-514350">
+              <a:buFont typeface="+mj-lt"/>
+              <a:buAutoNum type="romanLcPeriod"/>
+            </a:pPr>
+            <a:r>
+              <a:rPr lang="en-US" sz="2400" dirty="0" smtClean="0">
+                <a:solidFill>
+                  <a:schemeClr val="bg1"/>
+                </a:solidFill>
+              </a:rPr>
+              <a:t>Perform performance testing using physical nodes</a:t>
+            </a:r>
           </a:p>
           <a:p>
             <a:pPr marL="457200" indent="-457200">
@@ -3799,167 +3975,6 @@
               </a:solidFill>
             </a:endParaRPr>
           </a:p>
-          <a:p>
-            <a:pPr marL="457200" indent="-457200">
-              <a:buFont typeface="+mj-lt"/>
-              <a:buAutoNum type="arabicPeriod"/>
-            </a:pPr>
-            <a:r>
-              <a:rPr lang="en-US" sz="2400" dirty="0" smtClean="0">
-                <a:solidFill>
-                  <a:schemeClr val="bg1"/>
-                </a:solidFill>
-              </a:rPr>
-              <a:t>Predicate Specification</a:t>
-            </a:r>
-          </a:p>
-          <a:p>
-            <a:pPr marL="2853111" lvl="1" indent="-514350">
-              <a:buFont typeface="+mj-lt"/>
-              <a:buAutoNum type="romanLcPeriod"/>
-            </a:pPr>
-            <a:r>
-              <a:rPr lang="en-US" sz="2400" dirty="0" smtClean="0">
-                <a:solidFill>
-                  <a:schemeClr val="bg1"/>
-                </a:solidFill>
-              </a:rPr>
-              <a:t>Improve run-time definition and evaluation</a:t>
-            </a:r>
-          </a:p>
-          <a:p>
-            <a:pPr marL="2853111" lvl="1" indent="-514350">
-              <a:buFont typeface="+mj-lt"/>
-              <a:buAutoNum type="romanLcPeriod"/>
-            </a:pPr>
-            <a:r>
-              <a:rPr lang="en-US" sz="2400" dirty="0" smtClean="0">
-                <a:solidFill>
-                  <a:schemeClr val="bg1"/>
-                </a:solidFill>
-              </a:rPr>
-              <a:t>Reduce energy usage</a:t>
-            </a:r>
-          </a:p>
-          <a:p>
-            <a:pPr marL="457200" indent="-457200">
-              <a:buFont typeface="+mj-lt"/>
-              <a:buAutoNum type="arabicPeriod"/>
-            </a:pPr>
-            <a:r>
-              <a:rPr lang="en-US" sz="2400" dirty="0" err="1" smtClean="0">
-                <a:solidFill>
-                  <a:schemeClr val="bg1"/>
-                </a:solidFill>
-              </a:rPr>
-              <a:t>Visualisation</a:t>
-            </a:r>
-            <a:r>
-              <a:rPr lang="en-US" sz="2400" dirty="0" smtClean="0">
-                <a:solidFill>
-                  <a:schemeClr val="bg1"/>
-                </a:solidFill>
-              </a:rPr>
-              <a:t> Tool</a:t>
-            </a:r>
-          </a:p>
-          <a:p>
-            <a:pPr marL="2853111" lvl="1" indent="-514350">
-              <a:buFont typeface="+mj-lt"/>
-              <a:buAutoNum type="romanLcPeriod"/>
-            </a:pPr>
-            <a:r>
-              <a:rPr lang="en-US" sz="2400" dirty="0" smtClean="0">
-                <a:solidFill>
-                  <a:schemeClr val="bg1"/>
-                </a:solidFill>
-              </a:rPr>
-              <a:t>Provide more information</a:t>
-            </a:r>
-          </a:p>
-          <a:p>
-            <a:pPr marL="2853111" lvl="1" indent="-514350">
-              <a:buFont typeface="+mj-lt"/>
-              <a:buAutoNum type="romanLcPeriod"/>
-            </a:pPr>
-            <a:r>
-              <a:rPr lang="en-US" sz="2400" dirty="0" smtClean="0">
-                <a:solidFill>
-                  <a:schemeClr val="bg1"/>
-                </a:solidFill>
-              </a:rPr>
-              <a:t>Better predicate checking integration</a:t>
-            </a:r>
-          </a:p>
-          <a:p>
-            <a:pPr marL="457200" indent="-457200">
-              <a:buFont typeface="+mj-lt"/>
-              <a:buAutoNum type="arabicPeriod"/>
-            </a:pPr>
-            <a:r>
-              <a:rPr lang="en-US" sz="2400" dirty="0" smtClean="0">
-                <a:solidFill>
-                  <a:schemeClr val="bg1"/>
-                </a:solidFill>
-              </a:rPr>
-              <a:t>Performance</a:t>
-            </a:r>
-          </a:p>
-          <a:p>
-            <a:pPr marL="2853111" lvl="1" indent="-514350">
-              <a:buFont typeface="+mj-lt"/>
-              <a:buAutoNum type="romanLcPeriod"/>
-            </a:pPr>
-            <a:r>
-              <a:rPr lang="en-US" sz="2400" dirty="0" smtClean="0">
-                <a:solidFill>
-                  <a:schemeClr val="bg1"/>
-                </a:solidFill>
-              </a:rPr>
-              <a:t>Investigate </a:t>
-            </a:r>
-            <a:r>
-              <a:rPr lang="en-US" sz="2400" u="sng" dirty="0" smtClean="0">
-                <a:solidFill>
-                  <a:schemeClr val="bg1"/>
-                </a:solidFill>
-              </a:rPr>
-              <a:t>where</a:t>
-            </a:r>
-            <a:r>
-              <a:rPr lang="en-US" sz="2400" dirty="0" smtClean="0">
-                <a:solidFill>
-                  <a:schemeClr val="bg1"/>
-                </a:solidFill>
-              </a:rPr>
-              <a:t> the best place to evaluate a predicate is</a:t>
-            </a:r>
-          </a:p>
-          <a:p>
-            <a:pPr marL="2853111" lvl="1" indent="-514350">
-              <a:buFont typeface="+mj-lt"/>
-              <a:buAutoNum type="romanLcPeriod"/>
-            </a:pPr>
-            <a:r>
-              <a:rPr lang="en-US" sz="2400" dirty="0" smtClean="0">
-                <a:solidFill>
-                  <a:schemeClr val="bg1"/>
-                </a:solidFill>
-              </a:rPr>
-              <a:t>Perform performance testing using physical nodes</a:t>
-            </a:r>
-          </a:p>
-          <a:p>
-            <a:pPr marL="457200" indent="-457200">
-              <a:buFont typeface="+mj-lt"/>
-              <a:buAutoNum type="arabicPeriod"/>
-            </a:pPr>
-            <a:endParaRPr lang="en-US" sz="2400" dirty="0" smtClean="0">
-              <a:solidFill>
-                <a:schemeClr val="bg1"/>
-              </a:solidFill>
-            </a:endParaRPr>
-          </a:p>
         </p:txBody>
       </p:sp>
       <p:sp>
@@ -3970,8 +3985,8 @@
         </p:nvSpPr>
         <p:spPr>
           <a:xfrm>
-            <a:off x="30096319" y="18377917"/>
-            <a:ext cx="12114900" cy="3215258"/>
+            <a:off x="30096319" y="18519878"/>
+            <a:ext cx="12114900" cy="3073296"/>
           </a:xfrm>
           <a:prstGeom prst="roundRect">
             <a:avLst>
@@ -4100,7 +4115,7 @@
         <p:spPr>
           <a:xfrm>
             <a:off x="517654" y="17945100"/>
-            <a:ext cx="12114901" cy="8864348"/>
+            <a:ext cx="12283945" cy="8864348"/>
           </a:xfrm>
           <a:prstGeom prst="roundRect">
             <a:avLst>
@@ -4125,30 +4140,27 @@
           </a:fontRef>
         </p:style>
         <p:txBody>
-          <a:bodyPr rtlCol="0" anchor="ctr"/>
+          <a:bodyPr rtlCol="0" anchor="t" anchorCtr="0"/>
           <a:lstStyle/>
           <a:p>
             <a:pPr algn="ctr"/>
-            <a:endParaRPr lang="en-US" sz="4800" b="1" dirty="0" smtClean="0"/>
-          </a:p>
-          <a:p>
-            <a:pPr algn="ctr"/>
             <a:r>
               <a:rPr lang="en-US" sz="4800" b="1" dirty="0" smtClean="0"/>
-              <a:t>Predicate </a:t>
-            </a:r>
-            <a:r>
-              <a:rPr lang="en-US" sz="4800" b="1" dirty="0"/>
-              <a:t>Specification</a:t>
-            </a:r>
-          </a:p>
-          <a:p>
+              <a:t>Specifying Predicates</a:t>
+            </a:r>
             <a:endParaRPr lang="en-US" sz="2000" dirty="0"/>
           </a:p>
           <a:p>
+            <a:endParaRPr lang="en-US" sz="2000" dirty="0" smtClean="0"/>
+          </a:p>
+          <a:p>
             <a:r>
               <a:rPr lang="en-US" sz="2000" dirty="0" smtClean="0"/>
-              <a:t>One of the requirements of our project is that we wished to specify predicates to be checked, not just at compile-time, but also at run-time. The main reason is that the needs of a system will change over time.</a:t>
+              <a:t>One </a:t>
+            </a:r>
+            <a:r>
+              <a:rPr lang="en-US" sz="2000" dirty="0" smtClean="0"/>
+              <a:t>of the requirements of our project is that we wished to specify predicates to be checked, not just at compile-time, but also at run-time. The main reason is that the needs of a system will change over time.</a:t>
             </a:r>
           </a:p>
           <a:p>
@@ -4563,385 +4575,6 @@
           </p:txBody>
         </p:sp>
       </p:grpSp>
-      <p:pic>
-        <p:nvPicPr>
-          <p:cNvPr id="1026" name="Picture 2"/>
-          <p:cNvPicPr>
-            <a:picLocks noChangeAspect="1" noChangeArrowheads="1"/>
-          </p:cNvPicPr>
-          <p:nvPr/>
-        </p:nvPicPr>
-        <p:blipFill>
-          <a:blip r:embed="rId4">
-            <a:extLst>
-              <a:ext uri="{28A0092B-C50C-407E-A947-70E740481C1C}">
-                <a14:useLocalDpi xmlns:a14="http://schemas.microsoft.com/office/drawing/2010/main" val="0"/>
-              </a:ext>
-            </a:extLst>
-          </a:blip>
-          <a:srcRect/>
-          <a:stretch>
-            <a:fillRect/>
-          </a:stretch>
-        </p:blipFill>
-        <p:spPr bwMode="auto">
-          <a:xfrm>
-            <a:off x="32531115" y="13086164"/>
-            <a:ext cx="7378635" cy="5082223"/>
-          </a:xfrm>
-          <a:prstGeom prst="rect">
-            <a:avLst/>
-          </a:prstGeom>
-          <a:noFill/>
-          <a:ln>
-            <a:noFill/>
-          </a:ln>
-          <a:effectLst/>
-          <a:extLst>
-            <a:ext uri="{909E8E84-426E-40DD-AFC4-6F175D3DCCD1}">
-              <a14:hiddenFill xmlns:a14="http://schemas.microsoft.com/office/drawing/2010/main">
-                <a:solidFill>
-                  <a:schemeClr val="accent1"/>
-                </a:solidFill>
-              </a14:hiddenFill>
-            </a:ext>
-            <a:ext uri="{91240B29-F687-4F45-9708-019B960494DF}">
-              <a14:hiddenLine xmlns:a14="http://schemas.microsoft.com/office/drawing/2010/main" w="9525">
-                <a:solidFill>
-                  <a:schemeClr val="tx1"/>
-                </a:solidFill>
-                <a:miter lim="800000"/>
-                <a:headEnd/>
-                <a:tailEnd/>
-              </a14:hiddenLine>
-            </a:ext>
-            <a:ext uri="{AF507438-7753-43E0-B8FC-AC1667EBCBE1}">
-              <a14:hiddenEffects xmlns:a14="http://schemas.microsoft.com/office/drawing/2010/main">
-                <a:effectLst>
-                  <a:outerShdw dist="35921" dir="2700000" algn="ctr" rotWithShape="0">
-                    <a:schemeClr val="bg2"/>
-                  </a:outerShdw>
-                </a:effectLst>
-              </a14:hiddenEffects>
-            </a:ext>
-          </a:extLst>
-        </p:spPr>
-      </p:pic>
-      <p:sp>
-        <p:nvSpPr>
-          <p:cNvPr id="27" name="Rounded Rectangle 26"/>
-          <p:cNvSpPr/>
-          <p:nvPr/>
-        </p:nvSpPr>
-        <p:spPr>
-          <a:xfrm>
-            <a:off x="30096318" y="2591999"/>
-            <a:ext cx="12114901" cy="10171853"/>
-          </a:xfrm>
-          <a:prstGeom prst="roundRect">
-            <a:avLst>
-              <a:gd name="adj" fmla="val 7232"/>
-            </a:avLst>
-          </a:prstGeom>
-        </p:spPr>
-        <p:style>
-          <a:lnRef idx="2">
-            <a:schemeClr val="accent1">
-              <a:shade val="50000"/>
-            </a:schemeClr>
-          </a:lnRef>
-          <a:fillRef idx="1">
-            <a:schemeClr val="accent1"/>
-          </a:fillRef>
-          <a:effectRef idx="0">
-            <a:schemeClr val="accent1"/>
-          </a:effectRef>
-          <a:fontRef idx="minor">
-            <a:schemeClr val="lt1"/>
-          </a:fontRef>
-        </p:style>
-        <p:txBody>
-          <a:bodyPr rtlCol="0" anchor="t"/>
-          <a:lstStyle/>
-          <a:p>
-            <a:pPr algn="ctr"/>
-            <a:r>
-              <a:rPr lang="en-US" sz="4800" b="1" dirty="0" smtClean="0"/>
-              <a:t>HSEND</a:t>
-            </a:r>
-          </a:p>
-          <a:p>
-            <a:r>
-              <a:rPr lang="en-US" sz="2000" dirty="0" smtClean="0"/>
-              <a:t>H-SEND </a:t>
-            </a:r>
-            <a:r>
-              <a:rPr lang="en-US" sz="2000" dirty="0"/>
-              <a:t>is a framework for detecting faults in WSNs, designed to </a:t>
-            </a:r>
-            <a:r>
-              <a:rPr lang="en-US" sz="2000" dirty="0" err="1"/>
-              <a:t>minimise</a:t>
-            </a:r>
-            <a:r>
-              <a:rPr lang="en-US" sz="2000" dirty="0"/>
-              <a:t> energy consumption. It differs from related algorithms by being capable of handling very large WSNs. </a:t>
-            </a:r>
-          </a:p>
-          <a:p>
-            <a:endParaRPr lang="en-US" sz="2000" dirty="0"/>
-          </a:p>
-          <a:p>
-            <a:r>
-              <a:rPr lang="en-US" sz="2000" dirty="0"/>
-              <a:t>Our implementation allows the sending of a predicate message </a:t>
-            </a:r>
-            <a:r>
-              <a:rPr lang="en-US" sz="2000" dirty="0" smtClean="0"/>
-              <a:t>from a base station to a target node, </a:t>
-            </a:r>
-            <a:r>
-              <a:rPr lang="en-US" sz="2000" dirty="0"/>
-              <a:t>who will then begin the evaluation process. This can involve several aspects, </a:t>
-            </a:r>
-            <a:r>
-              <a:rPr lang="en-US" sz="2000" dirty="0" smtClean="0"/>
-              <a:t>such as local </a:t>
-            </a:r>
-            <a:r>
-              <a:rPr lang="en-US" sz="2000" dirty="0"/>
-              <a:t>predicate checking, or the evaluation of predicates </a:t>
-            </a:r>
-            <a:r>
-              <a:rPr lang="en-US" sz="2000" dirty="0" smtClean="0"/>
-              <a:t>the require information from multiple nodes. </a:t>
-            </a:r>
-            <a:endParaRPr lang="en-US" sz="2000" dirty="0"/>
-          </a:p>
-          <a:p>
-            <a:endParaRPr lang="en-US" sz="2000" dirty="0"/>
-          </a:p>
-          <a:p>
-            <a:r>
-              <a:rPr lang="en-US" sz="2000" dirty="0" smtClean="0"/>
-              <a:t>With our implementation</a:t>
-            </a:r>
-            <a:r>
-              <a:rPr lang="en-US" sz="2000" dirty="0"/>
-              <a:t>, we </a:t>
-            </a:r>
-            <a:r>
-              <a:rPr lang="en-US" sz="2000" dirty="0" smtClean="0"/>
-              <a:t>initially focused </a:t>
-            </a:r>
-            <a:r>
-              <a:rPr lang="en-US" sz="2000" dirty="0"/>
-              <a:t>on </a:t>
-            </a:r>
-            <a:r>
-              <a:rPr lang="en-US" sz="2000" dirty="0" smtClean="0"/>
-              <a:t>evaluating fixed</a:t>
-            </a:r>
-            <a:r>
-              <a:rPr lang="en-US" sz="2000" dirty="0"/>
-              <a:t>, compile time </a:t>
-            </a:r>
-            <a:r>
-              <a:rPr lang="en-US" sz="2000" dirty="0" smtClean="0"/>
-              <a:t>predicates and reporting the results back to the base station. </a:t>
-            </a:r>
-            <a:r>
-              <a:rPr lang="en-US" sz="2000" dirty="0"/>
-              <a:t>This was further expanded to allow </a:t>
-            </a:r>
-            <a:r>
-              <a:rPr lang="en-US" sz="2000" dirty="0" smtClean="0"/>
-              <a:t>checking of compile-time </a:t>
-            </a:r>
-            <a:r>
-              <a:rPr lang="en-US" sz="2000" dirty="0" smtClean="0"/>
-              <a:t>predicates that require </a:t>
-            </a:r>
-            <a:r>
-              <a:rPr lang="en-US" sz="2000" dirty="0" smtClean="0"/>
-              <a:t>information from </a:t>
-            </a:r>
-            <a:r>
-              <a:rPr lang="en-US" sz="2000" dirty="0" err="1" smtClean="0"/>
-              <a:t>neighbouring</a:t>
-            </a:r>
-            <a:r>
-              <a:rPr lang="en-US" sz="2000" dirty="0" smtClean="0"/>
-              <a:t> nodes. </a:t>
-            </a:r>
-            <a:r>
-              <a:rPr lang="en-US" sz="2000" dirty="0"/>
-              <a:t>Further abstractions of the framework will allow us to specify </a:t>
-            </a:r>
-            <a:r>
-              <a:rPr lang="en-US" sz="2000" dirty="0" smtClean="0"/>
-              <a:t>run-time </a:t>
-            </a:r>
-            <a:r>
-              <a:rPr lang="en-US" sz="2000" dirty="0"/>
-              <a:t>predicates, and have the information relayed using the same underlying network stack.</a:t>
-            </a:r>
-          </a:p>
-          <a:p>
-            <a:endParaRPr lang="en-US" sz="2000" dirty="0"/>
-          </a:p>
-          <a:p>
-            <a:r>
-              <a:rPr lang="en-US" sz="2000" dirty="0"/>
-              <a:t>Further work will involve integrating the message sending with </a:t>
-            </a:r>
-            <a:r>
-              <a:rPr lang="en-US" sz="2000" dirty="0" err="1"/>
-              <a:t>neighbour</a:t>
-            </a:r>
-            <a:r>
-              <a:rPr lang="en-US" sz="2000" dirty="0"/>
-              <a:t> detection algorithms </a:t>
-            </a:r>
-            <a:r>
-              <a:rPr lang="en-US" sz="2000" dirty="0" smtClean="0"/>
-              <a:t>and clustering</a:t>
-            </a:r>
-            <a:r>
-              <a:rPr lang="en-US" sz="2000" dirty="0"/>
-              <a:t> </a:t>
-            </a:r>
-            <a:r>
-              <a:rPr lang="en-US" sz="2000" dirty="0" smtClean="0"/>
-              <a:t>to </a:t>
-            </a:r>
-            <a:r>
-              <a:rPr lang="en-US" sz="2000" dirty="0"/>
-              <a:t>allow for much more efficient message </a:t>
-            </a:r>
-            <a:r>
-              <a:rPr lang="en-US" sz="2000" dirty="0" smtClean="0"/>
-              <a:t>sending. This will involve researching where it is best to evaluate predicates in a network in order to </a:t>
-            </a:r>
-            <a:r>
-              <a:rPr lang="en-US" sz="2000" dirty="0" err="1" smtClean="0"/>
-              <a:t>minimise</a:t>
-            </a:r>
-            <a:r>
-              <a:rPr lang="en-US" sz="2000" dirty="0" smtClean="0"/>
-              <a:t> energy </a:t>
-            </a:r>
-            <a:r>
-              <a:rPr lang="en-US" sz="2000" dirty="0"/>
-              <a:t>and </a:t>
-            </a:r>
-            <a:r>
-              <a:rPr lang="en-US" sz="2000" dirty="0" smtClean="0"/>
-              <a:t>time usage</a:t>
-            </a:r>
-            <a:r>
-              <a:rPr lang="en-US" sz="2000" dirty="0" smtClean="0"/>
-              <a:t>.</a:t>
-            </a:r>
-          </a:p>
-          <a:p>
-            <a:endParaRPr lang="en-US" sz="2000" dirty="0" smtClean="0"/>
-          </a:p>
-          <a:p>
-            <a:r>
-              <a:rPr lang="en-US" sz="4000" b="1" dirty="0" err="1" smtClean="0"/>
-              <a:t>Neighbour</a:t>
-            </a:r>
-            <a:r>
-              <a:rPr lang="en-US" sz="4000" b="1" dirty="0" smtClean="0"/>
-              <a:t> Discovery</a:t>
-            </a:r>
-            <a:endParaRPr lang="en-US" sz="4000" b="1" dirty="0"/>
-          </a:p>
-          <a:p>
-            <a:endParaRPr lang="en-US" sz="2000" dirty="0" smtClean="0"/>
-          </a:p>
-          <a:p>
-            <a:r>
-              <a:rPr lang="en-GB" sz="2000" dirty="0"/>
-              <a:t>A key requirement for a wireless sensor networks is reliably knowing who your neighbours are, this can be useful for a great many applications including among others clustering and predicate evaluation. </a:t>
-            </a:r>
-            <a:endParaRPr lang="en-GB" sz="2000" dirty="0" smtClean="0"/>
-          </a:p>
-          <a:p>
-            <a:endParaRPr lang="en-GB" sz="2000" dirty="0"/>
-          </a:p>
-          <a:p>
-            <a:r>
-              <a:rPr lang="en-GB" sz="2000" dirty="0" err="1" smtClean="0"/>
-              <a:t>Contiki</a:t>
-            </a:r>
-            <a:r>
-              <a:rPr lang="en-GB" sz="2000" dirty="0" smtClean="0"/>
-              <a:t> </a:t>
-            </a:r>
-            <a:r>
-              <a:rPr lang="en-GB" sz="2000" dirty="0"/>
-              <a:t>contains a built in module for neighbour discovery but it only handles half of the problem, </a:t>
-            </a:r>
-            <a:r>
-              <a:rPr lang="en-GB" sz="2000" dirty="0" smtClean="0"/>
-              <a:t>communication. </a:t>
-            </a:r>
-            <a:r>
-              <a:rPr lang="en-GB" sz="2000" dirty="0"/>
-              <a:t>In order for each node to maintain a reliable list of it's </a:t>
-            </a:r>
-            <a:r>
-              <a:rPr lang="en-GB" sz="2000" dirty="0" smtClean="0"/>
-              <a:t>neighbours, </a:t>
-            </a:r>
-            <a:r>
-              <a:rPr lang="en-GB" sz="2000" dirty="0"/>
-              <a:t>we decided to implement a wrapper module around the core </a:t>
-            </a:r>
-            <a:r>
-              <a:rPr lang="en-GB" sz="2000" dirty="0" err="1" smtClean="0"/>
-              <a:t>Contiki</a:t>
-            </a:r>
-            <a:r>
-              <a:rPr lang="en-GB" sz="2000" dirty="0" smtClean="0"/>
-              <a:t> module. Our </a:t>
-            </a:r>
-            <a:r>
-              <a:rPr lang="en-GB" sz="2000" dirty="0"/>
-              <a:t>module maintains a list of neighbour nodes and checks periodically to make sure that no new nodes have joined the network </a:t>
-            </a:r>
-            <a:r>
-              <a:rPr lang="en-GB" sz="2000" dirty="0" smtClean="0"/>
-              <a:t>or that </a:t>
-            </a:r>
-            <a:r>
-              <a:rPr lang="en-GB" sz="2000" dirty="0"/>
-              <a:t>old nodes have left. </a:t>
-            </a:r>
-            <a:endParaRPr lang="en-GB" sz="2000" dirty="0" smtClean="0"/>
-          </a:p>
-          <a:p>
-            <a:endParaRPr lang="en-GB" sz="2000" dirty="0"/>
-          </a:p>
-          <a:p>
-            <a:r>
-              <a:rPr lang="en-GB" sz="2000" dirty="0" smtClean="0"/>
-              <a:t>This module </a:t>
-            </a:r>
-            <a:r>
-              <a:rPr lang="en-GB" sz="2000" dirty="0"/>
-              <a:t>will be used </a:t>
-            </a:r>
-            <a:r>
-              <a:rPr lang="en-GB" sz="2000" dirty="0" smtClean="0"/>
-              <a:t>as part of our underlying network stack with applications in n-hop predicate evaluation and network visualisation.</a:t>
-            </a:r>
-            <a:endParaRPr lang="en-US" sz="2000" dirty="0"/>
-          </a:p>
-        </p:txBody>
-      </p:sp>
       <p:sp>
         <p:nvSpPr>
           <p:cNvPr id="28" name="Rounded Rectangle 27"/>
@@ -4950,7 +4583,7 @@
         </p:nvSpPr>
         <p:spPr>
           <a:xfrm>
-            <a:off x="14203440" y="2591999"/>
+            <a:off x="14166864" y="2591999"/>
             <a:ext cx="14518836" cy="5451021"/>
           </a:xfrm>
           <a:prstGeom prst="roundRect">
@@ -4986,11 +4619,7 @@
             </a:r>
             <a:r>
               <a:rPr lang="en-US" sz="4800" b="1" dirty="0"/>
-              <a:t> </a:t>
-            </a:r>
-            <a:r>
-              <a:rPr lang="en-US" sz="4800" b="1" dirty="0"/>
-              <a:t>and Interface Tool</a:t>
+              <a:t> and Interface Tool</a:t>
             </a:r>
           </a:p>
           <a:p>
@@ -5097,7 +4726,7 @@
         </p:nvGrpSpPr>
         <p:grpSpPr>
           <a:xfrm>
-            <a:off x="14203440" y="12244099"/>
+            <a:off x="14166864" y="12244099"/>
             <a:ext cx="14518836" cy="14565349"/>
             <a:chOff x="13798302" y="12137087"/>
             <a:chExt cx="14518836" cy="14672361"/>
@@ -5204,7 +4833,6 @@
                 <a:rPr lang="en-US" sz="4000" b="1" dirty="0" smtClean="0"/>
                 <a:t>Clustering</a:t>
               </a:r>
-              <a:endParaRPr lang="en-US" sz="4000" b="1" dirty="0" smtClean="0"/>
             </a:p>
             <a:p>
               <a:endParaRPr lang="en-GB" sz="2000" dirty="0" smtClean="0"/>
@@ -5302,7 +4930,7 @@
             <p:nvPr/>
           </p:nvPicPr>
           <p:blipFill>
-            <a:blip r:embed="rId5">
+            <a:blip r:embed="rId3">
               <a:extLst>
                 <a:ext uri="{28A0092B-C50C-407E-A947-70E740481C1C}">
                   <a14:useLocalDpi xmlns:a14="http://schemas.microsoft.com/office/drawing/2010/main" val="0"/>
@@ -5451,7 +5079,7 @@
             <p:nvPr/>
           </p:nvPicPr>
           <p:blipFill>
-            <a:blip r:embed="rId6">
+            <a:blip r:embed="rId4">
               <a:extLst>
                 <a:ext uri="{28A0092B-C50C-407E-A947-70E740481C1C}">
                   <a14:useLocalDpi xmlns:a14="http://schemas.microsoft.com/office/drawing/2010/main" val="0"/>
@@ -5473,45 +5101,698 @@
           </p:spPr>
         </p:pic>
       </p:grpSp>
+      <p:sp>
+        <p:nvSpPr>
+          <p:cNvPr id="27" name="Rounded Rectangle 26"/>
+          <p:cNvSpPr/>
+          <p:nvPr/>
+        </p:nvSpPr>
+        <p:spPr>
+          <a:xfrm>
+            <a:off x="30096317" y="2591999"/>
+            <a:ext cx="12114901" cy="15219751"/>
+          </a:xfrm>
+          <a:prstGeom prst="roundRect">
+            <a:avLst>
+              <a:gd name="adj" fmla="val 7232"/>
+            </a:avLst>
+          </a:prstGeom>
+        </p:spPr>
+        <p:style>
+          <a:lnRef idx="2">
+            <a:schemeClr val="accent1">
+              <a:shade val="50000"/>
+            </a:schemeClr>
+          </a:lnRef>
+          <a:fillRef idx="1">
+            <a:schemeClr val="accent1"/>
+          </a:fillRef>
+          <a:effectRef idx="0">
+            <a:schemeClr val="accent1"/>
+          </a:effectRef>
+          <a:fontRef idx="minor">
+            <a:schemeClr val="lt1"/>
+          </a:fontRef>
+        </p:style>
+        <p:txBody>
+          <a:bodyPr rtlCol="0" anchor="t"/>
+          <a:lstStyle/>
+          <a:p>
+            <a:pPr algn="ctr"/>
+            <a:r>
+              <a:rPr lang="en-US" sz="4800" b="1" dirty="0" smtClean="0"/>
+              <a:t>HSEND</a:t>
+            </a:r>
+          </a:p>
+          <a:p>
+            <a:endParaRPr lang="en-US" sz="2000" dirty="0" smtClean="0"/>
+          </a:p>
+          <a:p>
+            <a:r>
+              <a:rPr lang="en-US" sz="2000" dirty="0" smtClean="0"/>
+              <a:t>H-SEND </a:t>
+            </a:r>
+            <a:r>
+              <a:rPr lang="en-US" sz="2000" dirty="0"/>
+              <a:t>is a framework for detecting faults in WSNs, designed to </a:t>
+            </a:r>
+            <a:r>
+              <a:rPr lang="en-US" sz="2000" dirty="0" err="1"/>
+              <a:t>minimise</a:t>
+            </a:r>
+            <a:r>
+              <a:rPr lang="en-US" sz="2000" dirty="0"/>
+              <a:t> energy consumption. It differs from related algorithms by being capable of handling very large WSNs. </a:t>
+            </a:r>
+          </a:p>
+          <a:p>
+            <a:endParaRPr lang="en-US" sz="2000" dirty="0"/>
+          </a:p>
+          <a:p>
+            <a:r>
+              <a:rPr lang="en-US" sz="2000" dirty="0"/>
+              <a:t>Our implementation allows the sending of a predicate message </a:t>
+            </a:r>
+            <a:r>
+              <a:rPr lang="en-US" sz="2000" dirty="0" smtClean="0"/>
+              <a:t>from a base station to a target node, </a:t>
+            </a:r>
+            <a:r>
+              <a:rPr lang="en-US" sz="2000" dirty="0"/>
+              <a:t>who will then begin the evaluation process. This can involve several aspects, </a:t>
+            </a:r>
+            <a:r>
+              <a:rPr lang="en-US" sz="2000" dirty="0" smtClean="0"/>
+              <a:t>such as local </a:t>
+            </a:r>
+            <a:r>
+              <a:rPr lang="en-US" sz="2000" dirty="0"/>
+              <a:t>predicate checking, or the evaluation of predicates </a:t>
+            </a:r>
+            <a:r>
+              <a:rPr lang="en-US" sz="2000" dirty="0" smtClean="0"/>
+              <a:t>the require information from multiple nodes. </a:t>
+            </a:r>
+            <a:endParaRPr lang="en-US" sz="2000" dirty="0"/>
+          </a:p>
+          <a:p>
+            <a:endParaRPr lang="en-US" sz="2000" dirty="0"/>
+          </a:p>
+          <a:p>
+            <a:r>
+              <a:rPr lang="en-US" sz="2000" dirty="0" smtClean="0"/>
+              <a:t>With our implementation</a:t>
+            </a:r>
+            <a:r>
+              <a:rPr lang="en-US" sz="2000" dirty="0"/>
+              <a:t>, we </a:t>
+            </a:r>
+            <a:r>
+              <a:rPr lang="en-US" sz="2000" dirty="0" smtClean="0"/>
+              <a:t>initially focused </a:t>
+            </a:r>
+            <a:r>
+              <a:rPr lang="en-US" sz="2000" dirty="0"/>
+              <a:t>on </a:t>
+            </a:r>
+            <a:r>
+              <a:rPr lang="en-US" sz="2000" dirty="0" smtClean="0"/>
+              <a:t>evaluating fixed</a:t>
+            </a:r>
+            <a:r>
+              <a:rPr lang="en-US" sz="2000" dirty="0"/>
+              <a:t>, compile time </a:t>
+            </a:r>
+            <a:r>
+              <a:rPr lang="en-US" sz="2000" dirty="0" smtClean="0"/>
+              <a:t>predicates and reporting the results back to the base station. </a:t>
+            </a:r>
+            <a:r>
+              <a:rPr lang="en-US" sz="2000" dirty="0"/>
+              <a:t>This was further expanded to allow </a:t>
+            </a:r>
+            <a:r>
+              <a:rPr lang="en-US" sz="2000" dirty="0" smtClean="0"/>
+              <a:t>checking of compile-time predicates that require information from </a:t>
+            </a:r>
+            <a:r>
+              <a:rPr lang="en-US" sz="2000" dirty="0" err="1" smtClean="0"/>
+              <a:t>neighbouring</a:t>
+            </a:r>
+            <a:r>
+              <a:rPr lang="en-US" sz="2000" dirty="0" smtClean="0"/>
+              <a:t> nodes. </a:t>
+            </a:r>
+            <a:r>
+              <a:rPr lang="en-US" sz="2000" dirty="0"/>
+              <a:t>Further abstractions of the framework will allow us to specify </a:t>
+            </a:r>
+            <a:r>
+              <a:rPr lang="en-US" sz="2000" dirty="0" smtClean="0"/>
+              <a:t>run-time </a:t>
+            </a:r>
+            <a:r>
+              <a:rPr lang="en-US" sz="2000" dirty="0"/>
+              <a:t>predicates, and have the information relayed using the same underlying network stack.</a:t>
+            </a:r>
+          </a:p>
+          <a:p>
+            <a:endParaRPr lang="en-US" sz="2000" dirty="0"/>
+          </a:p>
+          <a:p>
+            <a:r>
+              <a:rPr lang="en-US" sz="2000" dirty="0"/>
+              <a:t>Further work will involve integrating the message sending with </a:t>
+            </a:r>
+            <a:r>
+              <a:rPr lang="en-US" sz="2000" dirty="0" err="1"/>
+              <a:t>neighbour</a:t>
+            </a:r>
+            <a:r>
+              <a:rPr lang="en-US" sz="2000" dirty="0"/>
+              <a:t> detection algorithms </a:t>
+            </a:r>
+            <a:r>
+              <a:rPr lang="en-US" sz="2000" dirty="0" smtClean="0"/>
+              <a:t>and clustering</a:t>
+            </a:r>
+            <a:r>
+              <a:rPr lang="en-US" sz="2000" dirty="0"/>
+              <a:t> </a:t>
+            </a:r>
+            <a:r>
+              <a:rPr lang="en-US" sz="2000" dirty="0" smtClean="0"/>
+              <a:t>to </a:t>
+            </a:r>
+            <a:r>
+              <a:rPr lang="en-US" sz="2000" dirty="0"/>
+              <a:t>allow for much more efficient message </a:t>
+            </a:r>
+            <a:r>
+              <a:rPr lang="en-US" sz="2000" dirty="0" smtClean="0"/>
+              <a:t>sending. This will involve researching where it is best to evaluate predicates in a network in order to </a:t>
+            </a:r>
+            <a:r>
+              <a:rPr lang="en-US" sz="2000" dirty="0" err="1" smtClean="0"/>
+              <a:t>minimise</a:t>
+            </a:r>
+            <a:r>
+              <a:rPr lang="en-US" sz="2000" dirty="0" smtClean="0"/>
+              <a:t> energy </a:t>
+            </a:r>
+            <a:r>
+              <a:rPr lang="en-US" sz="2000" dirty="0"/>
+              <a:t>and </a:t>
+            </a:r>
+            <a:r>
+              <a:rPr lang="en-US" sz="2000" dirty="0" smtClean="0"/>
+              <a:t>time usage.</a:t>
+            </a:r>
+          </a:p>
+          <a:p>
+            <a:endParaRPr lang="en-US" sz="2000" dirty="0" smtClean="0"/>
+          </a:p>
+          <a:p>
+            <a:pPr algn="ctr"/>
+            <a:r>
+              <a:rPr lang="en-US" sz="4800" b="1" dirty="0" err="1" smtClean="0"/>
+              <a:t>Neighbour</a:t>
+            </a:r>
+            <a:r>
+              <a:rPr lang="en-US" sz="4800" b="1" dirty="0" smtClean="0"/>
+              <a:t> Discovery</a:t>
+            </a:r>
+            <a:endParaRPr lang="en-US" sz="4800" b="1" dirty="0"/>
+          </a:p>
+          <a:p>
+            <a:endParaRPr lang="en-US" sz="2000" dirty="0" smtClean="0"/>
+          </a:p>
+          <a:p>
+            <a:r>
+              <a:rPr lang="en-GB" sz="2000" dirty="0"/>
+              <a:t>A key requirement for a wireless sensor networks is reliably knowing who your neighbours are, this can be useful for a great many applications including among others clustering and predicate evaluation. </a:t>
+            </a:r>
+            <a:endParaRPr lang="en-GB" sz="2000" dirty="0" smtClean="0"/>
+          </a:p>
+          <a:p>
+            <a:endParaRPr lang="en-GB" sz="2000" dirty="0"/>
+          </a:p>
+          <a:p>
+            <a:r>
+              <a:rPr lang="en-GB" sz="2000" dirty="0" err="1" smtClean="0"/>
+              <a:t>Contiki</a:t>
+            </a:r>
+            <a:r>
+              <a:rPr lang="en-GB" sz="2000" dirty="0" smtClean="0"/>
+              <a:t> </a:t>
+            </a:r>
+            <a:r>
+              <a:rPr lang="en-GB" sz="2000" dirty="0"/>
+              <a:t>contains a built in module for neighbour discovery but it only handles half of the problem, </a:t>
+            </a:r>
+            <a:r>
+              <a:rPr lang="en-GB" sz="2000" dirty="0" smtClean="0"/>
+              <a:t>communication. </a:t>
+            </a:r>
+            <a:r>
+              <a:rPr lang="en-GB" sz="2000" dirty="0"/>
+              <a:t>In order for each node to maintain a reliable list of it's </a:t>
+            </a:r>
+            <a:r>
+              <a:rPr lang="en-GB" sz="2000" dirty="0" smtClean="0"/>
+              <a:t>neighbours, </a:t>
+            </a:r>
+            <a:r>
+              <a:rPr lang="en-GB" sz="2000" dirty="0"/>
+              <a:t>we decided to implement a wrapper module around the core </a:t>
+            </a:r>
+            <a:r>
+              <a:rPr lang="en-GB" sz="2000" dirty="0" err="1" smtClean="0"/>
+              <a:t>Contiki</a:t>
+            </a:r>
+            <a:r>
+              <a:rPr lang="en-GB" sz="2000" dirty="0" smtClean="0"/>
+              <a:t> module. Our </a:t>
+            </a:r>
+            <a:r>
+              <a:rPr lang="en-GB" sz="2000" dirty="0"/>
+              <a:t>module maintains a list of neighbour nodes and checks periodically to make sure that no new nodes have joined the network </a:t>
+            </a:r>
+            <a:r>
+              <a:rPr lang="en-GB" sz="2000" dirty="0" smtClean="0"/>
+              <a:t>or that </a:t>
+            </a:r>
+            <a:r>
+              <a:rPr lang="en-GB" sz="2000" dirty="0"/>
+              <a:t>old nodes have left. </a:t>
+            </a:r>
+            <a:endParaRPr lang="en-GB" sz="2000" dirty="0" smtClean="0"/>
+          </a:p>
+          <a:p>
+            <a:endParaRPr lang="en-GB" sz="2000" dirty="0"/>
+          </a:p>
+        </p:txBody>
+      </p:sp>
       <p:pic>
         <p:nvPicPr>
-          <p:cNvPr id="11" name="Picture 2" descr="http://www.advanticsys.com/wiki/images/6/6e/Ud1000.jpg"/>
+          <p:cNvPr id="1026" name="Picture 2"/>
           <p:cNvPicPr>
             <a:picLocks noChangeAspect="1" noChangeArrowheads="1"/>
           </p:cNvPicPr>
           <p:nvPr/>
         </p:nvPicPr>
-        <p:blipFill rotWithShape="1">
-          <a:blip r:embed="rId7">
+        <p:blipFill>
+          <a:blip r:embed="rId5">
             <a:extLst>
               <a:ext uri="{28A0092B-C50C-407E-A947-70E740481C1C}">
                 <a14:useLocalDpi xmlns:a14="http://schemas.microsoft.com/office/drawing/2010/main" val="0"/>
               </a:ext>
             </a:extLst>
           </a:blip>
-          <a:srcRect b="5178"/>
-          <a:stretch/>
+          <a:srcRect/>
+          <a:stretch>
+            <a:fillRect/>
+          </a:stretch>
         </p:blipFill>
         <p:spPr bwMode="auto">
           <a:xfrm>
-            <a:off x="22242617" y="8704574"/>
-            <a:ext cx="4940129" cy="2820676"/>
+            <a:off x="34417302" y="12244099"/>
+            <a:ext cx="7378635" cy="5082223"/>
           </a:xfrm>
           <a:prstGeom prst="rect">
             <a:avLst/>
           </a:prstGeom>
           <a:noFill/>
+          <a:ln>
+            <a:noFill/>
+          </a:ln>
+          <a:effectLst/>
           <a:extLst>
             <a:ext uri="{909E8E84-426E-40DD-AFC4-6F175D3DCCD1}">
               <a14:hiddenFill xmlns:a14="http://schemas.microsoft.com/office/drawing/2010/main">
                 <a:solidFill>
-                  <a:srgbClr val="FFFFFF"/>
+                  <a:schemeClr val="accent1"/>
                 </a:solidFill>
               </a14:hiddenFill>
+            </a:ext>
+            <a:ext uri="{91240B29-F687-4F45-9708-019B960494DF}">
+              <a14:hiddenLine xmlns:a14="http://schemas.microsoft.com/office/drawing/2010/main" w="9525">
+                <a:solidFill>
+                  <a:schemeClr val="tx1"/>
+                </a:solidFill>
+                <a:miter lim="800000"/>
+                <a:headEnd/>
+                <a:tailEnd/>
+              </a14:hiddenLine>
+            </a:ext>
+            <a:ext uri="{AF507438-7753-43E0-B8FC-AC1667EBCBE1}">
+              <a14:hiddenEffects xmlns:a14="http://schemas.microsoft.com/office/drawing/2010/main">
+                <a:effectLst>
+                  <a:outerShdw dist="35921" dir="2700000" algn="ctr" rotWithShape="0">
+                    <a:schemeClr val="bg2"/>
+                  </a:outerShdw>
+                </a:effectLst>
+              </a14:hiddenEffects>
             </a:ext>
           </a:extLst>
         </p:spPr>
       </p:pic>
+      <p:sp>
+        <p:nvSpPr>
+          <p:cNvPr id="8" name="TextBox 7"/>
+          <p:cNvSpPr txBox="1"/>
+          <p:nvPr/>
+        </p:nvSpPr>
+        <p:spPr>
+          <a:xfrm>
+            <a:off x="30331682" y="12169914"/>
+            <a:ext cx="4085620" cy="5324535"/>
+          </a:xfrm>
+          <a:prstGeom prst="rect">
+            <a:avLst/>
+          </a:prstGeom>
+          <a:noFill/>
+        </p:spPr>
+        <p:txBody>
+          <a:bodyPr wrap="square" rtlCol="0">
+            <a:spAutoFit/>
+          </a:bodyPr>
+          <a:lstStyle/>
+          <a:p>
+            <a:r>
+              <a:rPr lang="en-GB" sz="2000" dirty="0">
+                <a:solidFill>
+                  <a:schemeClr val="bg1"/>
+                </a:solidFill>
+              </a:rPr>
+              <a:t>This module will be used as part of our </a:t>
+            </a:r>
+            <a:r>
+              <a:rPr lang="en-GB" sz="2000" dirty="0" smtClean="0">
+                <a:solidFill>
+                  <a:schemeClr val="bg1"/>
+                </a:solidFill>
+              </a:rPr>
+              <a:t>debugging API where it will be used to implement </a:t>
+            </a:r>
+            <a:r>
+              <a:rPr lang="en-GB" sz="2000" dirty="0">
+                <a:solidFill>
+                  <a:schemeClr val="bg1"/>
+                </a:solidFill>
+              </a:rPr>
+              <a:t>n-hop predicate evaluation and network visualisation</a:t>
+            </a:r>
+            <a:r>
+              <a:rPr lang="en-GB" sz="2000" dirty="0" smtClean="0">
+                <a:solidFill>
+                  <a:schemeClr val="bg1"/>
+                </a:solidFill>
+              </a:rPr>
+              <a:t>.</a:t>
+            </a:r>
+          </a:p>
+          <a:p>
+            <a:endParaRPr lang="en-GB" sz="2000" dirty="0">
+              <a:solidFill>
+                <a:schemeClr val="bg1"/>
+              </a:solidFill>
+            </a:endParaRPr>
+          </a:p>
+          <a:p>
+            <a:r>
+              <a:rPr lang="en-GB" sz="2000" dirty="0" smtClean="0">
+                <a:solidFill>
+                  <a:schemeClr val="bg1"/>
+                </a:solidFill>
+              </a:rPr>
+              <a:t>An example of the algorithm is shown to the right. Here </a:t>
+            </a:r>
+            <a:r>
+              <a:rPr lang="en-GB" sz="2000" b="1" dirty="0" smtClean="0">
+                <a:solidFill>
+                  <a:schemeClr val="bg1"/>
+                </a:solidFill>
+              </a:rPr>
+              <a:t>Node 9</a:t>
+            </a:r>
+            <a:r>
+              <a:rPr lang="en-GB" sz="2000" dirty="0" smtClean="0">
+                <a:solidFill>
+                  <a:schemeClr val="bg1"/>
+                </a:solidFill>
+              </a:rPr>
+              <a:t> has three nodes in its wireless transmission range (</a:t>
+            </a:r>
+            <a:r>
+              <a:rPr lang="en-GB" sz="2000" b="1" dirty="0" smtClean="0">
+                <a:solidFill>
+                  <a:schemeClr val="bg1"/>
+                </a:solidFill>
+              </a:rPr>
+              <a:t>Nodes 6, 8 and 12</a:t>
+            </a:r>
+            <a:r>
+              <a:rPr lang="en-GB" sz="2000" dirty="0" smtClean="0">
+                <a:solidFill>
+                  <a:schemeClr val="bg1"/>
+                </a:solidFill>
+              </a:rPr>
+              <a:t>). The </a:t>
+            </a:r>
+            <a:r>
+              <a:rPr lang="en-GB" sz="2000" dirty="0" err="1" smtClean="0">
+                <a:solidFill>
+                  <a:schemeClr val="bg1"/>
+                </a:solidFill>
+              </a:rPr>
+              <a:t>Contiki</a:t>
+            </a:r>
+            <a:r>
+              <a:rPr lang="en-GB" sz="2000" dirty="0" smtClean="0">
+                <a:solidFill>
+                  <a:schemeClr val="bg1"/>
+                </a:solidFill>
+              </a:rPr>
+              <a:t> API will be used to discover these nodes.</a:t>
+            </a:r>
+          </a:p>
+          <a:p>
+            <a:endParaRPr lang="en-GB" sz="2000" dirty="0" smtClean="0">
+              <a:solidFill>
+                <a:schemeClr val="bg1"/>
+              </a:solidFill>
+            </a:endParaRPr>
+          </a:p>
+          <a:p>
+            <a:r>
+              <a:rPr lang="en-GB" sz="2000" dirty="0" smtClean="0">
+                <a:solidFill>
+                  <a:schemeClr val="bg1"/>
+                </a:solidFill>
+              </a:rPr>
+              <a:t>The grey area shows the range at which </a:t>
+            </a:r>
+            <a:r>
+              <a:rPr lang="en-GB" sz="2000" b="1" dirty="0" smtClean="0">
+                <a:solidFill>
+                  <a:schemeClr val="bg1"/>
+                </a:solidFill>
+              </a:rPr>
+              <a:t>Node 9</a:t>
+            </a:r>
+            <a:r>
+              <a:rPr lang="en-GB" sz="2000" dirty="0" smtClean="0">
+                <a:solidFill>
+                  <a:schemeClr val="bg1"/>
+                </a:solidFill>
+              </a:rPr>
+              <a:t> could interfere with other transmissions. Nodes in the green area can communicate with </a:t>
+            </a:r>
+            <a:r>
+              <a:rPr lang="en-GB" sz="2000" b="1" dirty="0" smtClean="0">
+                <a:solidFill>
+                  <a:schemeClr val="bg1"/>
+                </a:solidFill>
+              </a:rPr>
+              <a:t>Node 9</a:t>
+            </a:r>
+            <a:r>
+              <a:rPr lang="en-GB" sz="2000" dirty="0" smtClean="0">
+                <a:solidFill>
+                  <a:schemeClr val="bg1"/>
+                </a:solidFill>
+              </a:rPr>
+              <a:t>.</a:t>
+            </a:r>
+            <a:endParaRPr lang="en-US" sz="2000" dirty="0">
+              <a:solidFill>
+                <a:schemeClr val="bg1"/>
+              </a:solidFill>
+            </a:endParaRPr>
+          </a:p>
+        </p:txBody>
+      </p:sp>
+      <p:grpSp>
+        <p:nvGrpSpPr>
+          <p:cNvPr id="29" name="Group 28"/>
+          <p:cNvGrpSpPr/>
+          <p:nvPr/>
+        </p:nvGrpSpPr>
+        <p:grpSpPr>
+          <a:xfrm>
+            <a:off x="15632166" y="8557212"/>
+            <a:ext cx="4963209" cy="3239757"/>
+            <a:chOff x="15632167" y="8700117"/>
+            <a:chExt cx="4963209" cy="3239757"/>
+          </a:xfrm>
+        </p:grpSpPr>
+        <p:pic>
+          <p:nvPicPr>
+            <p:cNvPr id="22" name="Picture 21" descr="CM5000.jpg"/>
+            <p:cNvPicPr>
+              <a:picLocks noChangeAspect="1"/>
+            </p:cNvPicPr>
+            <p:nvPr/>
+          </p:nvPicPr>
+          <p:blipFill rotWithShape="1">
+            <a:blip r:embed="rId6">
+              <a:extLst>
+                <a:ext uri="{28A0092B-C50C-407E-A947-70E740481C1C}">
+                  <a14:useLocalDpi xmlns:a14="http://schemas.microsoft.com/office/drawing/2010/main" val="0"/>
+                </a:ext>
+              </a:extLst>
+            </a:blip>
+            <a:srcRect b="5641"/>
+            <a:stretch/>
+          </p:blipFill>
+          <p:spPr>
+            <a:xfrm>
+              <a:off x="15632167" y="8700117"/>
+              <a:ext cx="4963209" cy="2820676"/>
+            </a:xfrm>
+            <a:prstGeom prst="rect">
+              <a:avLst/>
+            </a:prstGeom>
+          </p:spPr>
+        </p:pic>
+        <p:sp>
+          <p:nvSpPr>
+            <p:cNvPr id="9" name="TextBox 8"/>
+            <p:cNvSpPr txBox="1"/>
+            <p:nvPr/>
+          </p:nvSpPr>
+          <p:spPr>
+            <a:xfrm>
+              <a:off x="15632167" y="11539764"/>
+              <a:ext cx="4963209" cy="400110"/>
+            </a:xfrm>
+            <a:prstGeom prst="rect">
+              <a:avLst/>
+            </a:prstGeom>
+            <a:noFill/>
+          </p:spPr>
+          <p:txBody>
+            <a:bodyPr wrap="square" rtlCol="0">
+              <a:spAutoFit/>
+            </a:bodyPr>
+            <a:lstStyle/>
+            <a:p>
+              <a:pPr algn="ctr"/>
+              <a:r>
+                <a:rPr lang="en-GB" sz="2000" dirty="0" smtClean="0"/>
+                <a:t>Figure 1: The sensor node we are using</a:t>
+              </a:r>
+              <a:endParaRPr lang="en-GB" sz="2000" dirty="0"/>
+            </a:p>
+          </p:txBody>
+        </p:sp>
+      </p:grpSp>
+      <p:grpSp>
+        <p:nvGrpSpPr>
+          <p:cNvPr id="31" name="Group 30"/>
+          <p:cNvGrpSpPr/>
+          <p:nvPr/>
+        </p:nvGrpSpPr>
+        <p:grpSpPr>
+          <a:xfrm>
+            <a:off x="22224728" y="8557212"/>
+            <a:ext cx="4963209" cy="3187705"/>
+            <a:chOff x="22206041" y="8704574"/>
+            <a:chExt cx="4963209" cy="3187705"/>
+          </a:xfrm>
+        </p:grpSpPr>
+        <p:pic>
+          <p:nvPicPr>
+            <p:cNvPr id="11" name="Picture 2" descr="http://www.advanticsys.com/wiki/images/6/6e/Ud1000.jpg"/>
+            <p:cNvPicPr>
+              <a:picLocks noChangeAspect="1" noChangeArrowheads="1"/>
+            </p:cNvPicPr>
+            <p:nvPr/>
+          </p:nvPicPr>
+          <p:blipFill rotWithShape="1">
+            <a:blip r:embed="rId7">
+              <a:extLst>
+                <a:ext uri="{28A0092B-C50C-407E-A947-70E740481C1C}">
+                  <a14:useLocalDpi xmlns:a14="http://schemas.microsoft.com/office/drawing/2010/main" val="0"/>
+                </a:ext>
+              </a:extLst>
+            </a:blip>
+            <a:srcRect b="5178"/>
+            <a:stretch/>
+          </p:blipFill>
+          <p:spPr bwMode="auto">
+            <a:xfrm>
+              <a:off x="22206041" y="8704574"/>
+              <a:ext cx="4940129" cy="2820676"/>
+            </a:xfrm>
+            <a:prstGeom prst="rect">
+              <a:avLst/>
+            </a:prstGeom>
+            <a:noFill/>
+            <a:extLst>
+              <a:ext uri="{909E8E84-426E-40DD-AFC4-6F175D3DCCD1}">
+                <a14:hiddenFill xmlns:a14="http://schemas.microsoft.com/office/drawing/2010/main">
+                  <a:solidFill>
+                    <a:srgbClr val="FFFFFF"/>
+                  </a:solidFill>
+                </a14:hiddenFill>
+              </a:ext>
+            </a:extLst>
+          </p:spPr>
+        </p:pic>
+        <p:sp>
+          <p:nvSpPr>
+            <p:cNvPr id="30" name="TextBox 29"/>
+            <p:cNvSpPr txBox="1"/>
+            <p:nvPr/>
+          </p:nvSpPr>
+          <p:spPr>
+            <a:xfrm>
+              <a:off x="22206041" y="11492169"/>
+              <a:ext cx="4963209" cy="400110"/>
+            </a:xfrm>
+            <a:prstGeom prst="rect">
+              <a:avLst/>
+            </a:prstGeom>
+            <a:noFill/>
+          </p:spPr>
+          <p:txBody>
+            <a:bodyPr wrap="square" rtlCol="0">
+              <a:spAutoFit/>
+            </a:bodyPr>
+            <a:lstStyle/>
+            <a:p>
+              <a:pPr algn="ctr"/>
+              <a:r>
+                <a:rPr lang="en-GB" sz="2000" dirty="0" smtClean="0"/>
+                <a:t>Figure 2: The base station interface dongle</a:t>
+              </a:r>
+              <a:endParaRPr lang="en-GB" sz="2000" dirty="0"/>
+            </a:p>
+          </p:txBody>
+        </p:sp>
+      </p:grpSp>
     </p:spTree>
     <p:extLst>
       <p:ext uri="{BB962C8B-B14F-4D97-AF65-F5344CB8AC3E}">
@@ -5853,24 +6134,6 @@
 </file>
 
 <file path=customXml/item1.xml><?xml version="1.0" encoding="utf-8"?>
-<?mso-contentType ?>
-<FormTemplates xmlns="http://schemas.microsoft.com/sharepoint/v3/contenttype/forms">
-  <Display>DocumentLibraryForm</Display>
-  <Edit>DocumentLibraryForm</Edit>
-  <New>DocumentLibraryForm</New>
-</FormTemplates>
-</file>
-
-<file path=customXml/item2.xml><?xml version="1.0" encoding="utf-8"?>
-<p:properties xmlns:p="http://schemas.microsoft.com/office/2006/metadata/properties" xmlns:xsi="http://www.w3.org/2001/XMLSchema-instance" xmlns:pc="http://schemas.microsoft.com/office/infopath/2007/PartnerControls">
-  <documentManagement>
-    <_Version xmlns="http://schemas.microsoft.com/sharepoint/v3/fields" xsi:nil="true"/>
-    <_Status xmlns="http://schemas.microsoft.com/sharepoint/v3/fields">Not Started</_Status>
-  </documentManagement>
-</p:properties>
-</file>
-
-<file path=customXml/item3.xml><?xml version="1.0" encoding="utf-8"?>
 <ct:contentTypeSchema xmlns:ct="http://schemas.microsoft.com/office/2006/metadata/contentType" xmlns:ma="http://schemas.microsoft.com/office/2006/metadata/properties/metaAttributes" ct:_="" ma:_="" ma:contentTypeName="Document" ma:contentTypeID="0x0101000DE64AEEDD9B7A4D93545ACBE97D4615" ma:contentTypeVersion="2" ma:contentTypeDescription="Create a new document." ma:contentTypeScope="" ma:versionID="f49002b78e3a4a71b814eef46a983816">
   <xsd:schema xmlns:xsd="http://www.w3.org/2001/XMLSchema" xmlns:xs="http://www.w3.org/2001/XMLSchema" xmlns:p="http://schemas.microsoft.com/office/2006/metadata/properties" xmlns:ns2="http://schemas.microsoft.com/sharepoint/v3/fields" targetNamespace="http://schemas.microsoft.com/office/2006/metadata/properties" ma:root="true" ma:fieldsID="38f6db2dd0d9a0cf6a8dc37be32b365b" ns2:_="">
     <xsd:import namespace="http://schemas.microsoft.com/sharepoint/v3/fields"/>
@@ -6014,10 +6277,38 @@
 </ct:contentTypeSchema>
 </file>
 
+<file path=customXml/item2.xml><?xml version="1.0" encoding="utf-8"?>
+<p:properties xmlns:p="http://schemas.microsoft.com/office/2006/metadata/properties" xmlns:xsi="http://www.w3.org/2001/XMLSchema-instance" xmlns:pc="http://schemas.microsoft.com/office/infopath/2007/PartnerControls">
+  <documentManagement>
+    <_Version xmlns="http://schemas.microsoft.com/sharepoint/v3/fields" xsi:nil="true"/>
+    <_Status xmlns="http://schemas.microsoft.com/sharepoint/v3/fields">Not Started</_Status>
+  </documentManagement>
+</p:properties>
+</file>
+
+<file path=customXml/item3.xml><?xml version="1.0" encoding="utf-8"?>
+<?mso-contentType ?>
+<FormTemplates xmlns="http://schemas.microsoft.com/sharepoint/v3/contenttype/forms">
+  <Display>DocumentLibraryForm</Display>
+  <Edit>DocumentLibraryForm</Edit>
+  <New>DocumentLibraryForm</New>
+</FormTemplates>
+</file>
+
 <file path=customXml/itemProps1.xml><?xml version="1.0" encoding="utf-8"?>
-<ds:datastoreItem xmlns:ds="http://schemas.openxmlformats.org/officeDocument/2006/customXml" ds:itemID="{87D2A1B0-FF3E-4009-940D-AED0EB70AA20}">
+<ds:datastoreItem xmlns:ds="http://schemas.openxmlformats.org/officeDocument/2006/customXml" ds:itemID="{E4214858-785C-42F7-BE66-6D0E79395FC8}">
   <ds:schemaRefs>
-    <ds:schemaRef ds:uri="http://schemas.microsoft.com/sharepoint/v3/contenttype/forms"/>
+    <ds:schemaRef ds:uri="http://schemas.microsoft.com/office/2006/metadata/contentType"/>
+    <ds:schemaRef ds:uri="http://schemas.microsoft.com/office/2006/metadata/properties/metaAttributes"/>
+    <ds:schemaRef ds:uri="http://www.w3.org/2001/XMLSchema"/>
+    <ds:schemaRef ds:uri="http://schemas.microsoft.com/office/2006/metadata/properties"/>
+    <ds:schemaRef ds:uri="http://schemas.microsoft.com/sharepoint/v3/fields"/>
+    <ds:schemaRef ds:uri="http://schemas.microsoft.com/office/2006/documentManagement/types"/>
+    <ds:schemaRef ds:uri="http://schemas.microsoft.com/office/infopath/2007/PartnerControls"/>
+    <ds:schemaRef ds:uri="http://schemas.openxmlformats.org/package/2006/metadata/core-properties"/>
+    <ds:schemaRef ds:uri="http://purl.org/dc/elements/1.1/"/>
+    <ds:schemaRef ds:uri="http://purl.org/dc/terms/"/>
+    <ds:schemaRef ds:uri="http://schemas.microsoft.com/internal/obd"/>
   </ds:schemaRefs>
 </ds:datastoreItem>
 </file>
@@ -6039,19 +6330,9 @@
 </file>
 
 <file path=customXml/itemProps3.xml><?xml version="1.0" encoding="utf-8"?>
-<ds:datastoreItem xmlns:ds="http://schemas.openxmlformats.org/officeDocument/2006/customXml" ds:itemID="{E4214858-785C-42F7-BE66-6D0E79395FC8}">
+<ds:datastoreItem xmlns:ds="http://schemas.openxmlformats.org/officeDocument/2006/customXml" ds:itemID="{87D2A1B0-FF3E-4009-940D-AED0EB70AA20}">
   <ds:schemaRefs>
-    <ds:schemaRef ds:uri="http://schemas.microsoft.com/office/2006/metadata/contentType"/>
-    <ds:schemaRef ds:uri="http://schemas.microsoft.com/office/2006/metadata/properties/metaAttributes"/>
-    <ds:schemaRef ds:uri="http://www.w3.org/2001/XMLSchema"/>
-    <ds:schemaRef ds:uri="http://schemas.microsoft.com/office/2006/metadata/properties"/>
-    <ds:schemaRef ds:uri="http://schemas.microsoft.com/sharepoint/v3/fields"/>
-    <ds:schemaRef ds:uri="http://schemas.microsoft.com/office/2006/documentManagement/types"/>
-    <ds:schemaRef ds:uri="http://schemas.microsoft.com/office/infopath/2007/PartnerControls"/>
-    <ds:schemaRef ds:uri="http://schemas.openxmlformats.org/package/2006/metadata/core-properties"/>
-    <ds:schemaRef ds:uri="http://purl.org/dc/elements/1.1/"/>
-    <ds:schemaRef ds:uri="http://purl.org/dc/terms/"/>
-    <ds:schemaRef ds:uri="http://schemas.microsoft.com/internal/obd"/>
+    <ds:schemaRef ds:uri="http://schemas.microsoft.com/sharepoint/v3/contenttype/forms"/>
   </ds:schemaRefs>
 </ds:datastoreItem>
 </file>
</xml_diff>

<commit_message>
Change some image styles
</commit_message>
<xml_diff>
--- a/Poster/Poster.pptx
+++ b/Poster/Poster.pptx
@@ -5446,17 +5446,28 @@
         </p:blipFill>
         <p:spPr bwMode="auto">
           <a:xfrm>
-            <a:off x="34417302" y="12244099"/>
+            <a:off x="34437876" y="12318775"/>
             <a:ext cx="7378635" cy="5082223"/>
           </a:xfrm>
-          <a:prstGeom prst="rect">
-            <a:avLst/>
+          <a:prstGeom prst="round2DiagRect">
+            <a:avLst>
+              <a:gd name="adj1" fmla="val 16667"/>
+              <a:gd name="adj2" fmla="val 0"/>
+            </a:avLst>
           </a:prstGeom>
-          <a:noFill/>
-          <a:ln>
-            <a:noFill/>
+          <a:ln w="88900" cap="sq">
+            <a:solidFill>
+              <a:srgbClr val="FFFFFF"/>
+            </a:solidFill>
+            <a:miter lim="800000"/>
           </a:ln>
-          <a:effectLst/>
+          <a:effectLst>
+            <a:outerShdw blurRad="254000" algn="tl" rotWithShape="0">
+              <a:srgbClr val="000000">
+                <a:alpha val="43000"/>
+              </a:srgbClr>
+            </a:outerShdw>
+          </a:effectLst>
           <a:extLst>
             <a:ext uri="{909E8E84-426E-40DD-AFC4-6F175D3DCCD1}">
               <a14:hiddenFill xmlns:a14="http://schemas.microsoft.com/office/drawing/2010/main">
@@ -5496,7 +5507,7 @@
         <p:spPr>
           <a:xfrm>
             <a:off x="30331682" y="12169914"/>
-            <a:ext cx="4085620" cy="5324535"/>
+            <a:ext cx="3920218" cy="5324535"/>
           </a:xfrm>
           <a:prstGeom prst="rect">
             <a:avLst/>
@@ -5531,7 +5542,7 @@
                   <a:schemeClr val="bg1"/>
                 </a:solidFill>
               </a:rPr>
-              <a:t>n-hop predicate evaluation and network visualisation</a:t>
+              <a:t>n-hop predicate evaluation and </a:t>
             </a:r>
             <a:r>
               <a:rPr lang="en-GB" sz="2000" dirty="0" smtClean="0">
@@ -5539,7 +5550,7 @@
                   <a:schemeClr val="bg1"/>
                 </a:solidFill>
               </a:rPr>
-              <a:t>.</a:t>
+              <a:t>visualisation.</a:t>
             </a:r>
           </a:p>
           <a:p>
@@ -5672,9 +5683,9 @@
         <p:grpSpPr>
           <a:xfrm>
             <a:off x="15632166" y="8557212"/>
-            <a:ext cx="4963209" cy="3239757"/>
+            <a:ext cx="4963209" cy="3268785"/>
             <a:chOff x="15632167" y="8700117"/>
-            <a:chExt cx="4963209" cy="3239757"/>
+            <a:chExt cx="4963209" cy="3268785"/>
           </a:xfrm>
         </p:grpSpPr>
         <p:pic>
@@ -5701,9 +5712,39 @@
               <a:off x="15632167" y="8700117"/>
               <a:ext cx="4963209" cy="2820676"/>
             </a:xfrm>
-            <a:prstGeom prst="rect">
+            <a:prstGeom prst="snip2DiagRect">
               <a:avLst/>
             </a:prstGeom>
+            <a:solidFill>
+              <a:srgbClr val="FFFFFF">
+                <a:shade val="85000"/>
+              </a:srgbClr>
+            </a:solidFill>
+            <a:ln w="88900" cap="sq">
+              <a:solidFill>
+                <a:srgbClr val="FFFFFF"/>
+              </a:solidFill>
+              <a:miter lim="800000"/>
+            </a:ln>
+            <a:effectLst>
+              <a:outerShdw blurRad="88900" algn="tl" rotWithShape="0">
+                <a:srgbClr val="000000">
+                  <a:alpha val="45000"/>
+                </a:srgbClr>
+              </a:outerShdw>
+            </a:effectLst>
+            <a:scene3d>
+              <a:camera prst="orthographicFront"/>
+              <a:lightRig rig="twoPt" dir="t">
+                <a:rot lat="0" lon="0" rev="7200000"/>
+              </a:lightRig>
+            </a:scene3d>
+            <a:sp3d>
+              <a:bevelT w="25400" h="19050"/>
+              <a:contourClr>
+                <a:srgbClr val="FFFFFF"/>
+              </a:contourClr>
+            </a:sp3d>
           </p:spPr>
         </p:pic>
         <p:sp>
@@ -5714,7 +5755,7 @@
           </p:nvSpPr>
           <p:spPr>
             <a:xfrm>
-              <a:off x="15632167" y="11539764"/>
+              <a:off x="15632167" y="11568792"/>
               <a:ext cx="4963209" cy="400110"/>
             </a:xfrm>
             <a:prstGeom prst="rect">
@@ -5747,9 +5788,9 @@
         <p:grpSpPr>
           <a:xfrm>
             <a:off x="22224728" y="8557212"/>
-            <a:ext cx="4963209" cy="3187705"/>
+            <a:ext cx="4963209" cy="3245761"/>
             <a:chOff x="22206041" y="8704574"/>
-            <a:chExt cx="4963209" cy="3187705"/>
+            <a:chExt cx="4963209" cy="3245761"/>
           </a:xfrm>
         </p:grpSpPr>
         <p:pic>
@@ -5776,10 +5817,39 @@
               <a:off x="22206041" y="8704574"/>
               <a:ext cx="4940129" cy="2820676"/>
             </a:xfrm>
-            <a:prstGeom prst="rect">
+            <a:prstGeom prst="snip2DiagRect">
               <a:avLst/>
             </a:prstGeom>
-            <a:noFill/>
+            <a:solidFill>
+              <a:srgbClr val="FFFFFF">
+                <a:shade val="85000"/>
+              </a:srgbClr>
+            </a:solidFill>
+            <a:ln w="88900" cap="sq">
+              <a:solidFill>
+                <a:srgbClr val="FFFFFF"/>
+              </a:solidFill>
+              <a:miter lim="800000"/>
+            </a:ln>
+            <a:effectLst>
+              <a:outerShdw blurRad="88900" algn="tl" rotWithShape="0">
+                <a:srgbClr val="000000">
+                  <a:alpha val="45000"/>
+                </a:srgbClr>
+              </a:outerShdw>
+            </a:effectLst>
+            <a:scene3d>
+              <a:camera prst="orthographicFront"/>
+              <a:lightRig rig="twoPt" dir="t">
+                <a:rot lat="0" lon="0" rev="7200000"/>
+              </a:lightRig>
+            </a:scene3d>
+            <a:sp3d>
+              <a:bevelT w="25400" h="19050"/>
+              <a:contourClr>
+                <a:srgbClr val="FFFFFF"/>
+              </a:contourClr>
+            </a:sp3d>
             <a:extLst>
               <a:ext uri="{909E8E84-426E-40DD-AFC4-6F175D3DCCD1}">
                 <a14:hiddenFill xmlns:a14="http://schemas.microsoft.com/office/drawing/2010/main">
@@ -5799,7 +5869,7 @@
           </p:nvSpPr>
           <p:spPr>
             <a:xfrm>
-              <a:off x="22206041" y="11492169"/>
+              <a:off x="22206041" y="11550225"/>
               <a:ext cx="4963209" cy="400110"/>
             </a:xfrm>
             <a:prstGeom prst="rect">

</xml_diff>

<commit_message>
Added more to the poster
</commit_message>
<xml_diff>
--- a/Poster/Poster.pptx
+++ b/Poster/Poster.pptx
@@ -289,7 +289,7 @@
             <a:fld id="{8ACDB3CC-F982-40F9-8DD6-BCC9AFBF44BD}" type="datetime1">
               <a:rPr lang="en-US" smtClean="0"/>
               <a:pPr/>
-              <a:t>11/29/2012</a:t>
+              <a:t>29/11/2012</a:t>
             </a:fld>
             <a:endParaRPr lang="en-US" dirty="0"/>
           </a:p>
@@ -459,7 +459,7 @@
           <a:p>
             <a:fld id="{68C2560D-EC28-3B41-86E8-18F1CE0113B4}" type="datetimeFigureOut">
               <a:rPr lang="en-US" smtClean="0"/>
-              <a:t>11/29/2012</a:t>
+              <a:t>29/11/2012</a:t>
             </a:fld>
             <a:endParaRPr lang="en-US"/>
           </a:p>
@@ -639,7 +639,7 @@
           <a:p>
             <a:fld id="{68C2560D-EC28-3B41-86E8-18F1CE0113B4}" type="datetimeFigureOut">
               <a:rPr lang="en-US" smtClean="0"/>
-              <a:t>11/29/2012</a:t>
+              <a:t>29/11/2012</a:t>
             </a:fld>
             <a:endParaRPr lang="en-US"/>
           </a:p>
@@ -809,7 +809,7 @@
           <a:p>
             <a:fld id="{68C2560D-EC28-3B41-86E8-18F1CE0113B4}" type="datetimeFigureOut">
               <a:rPr lang="en-US" smtClean="0"/>
-              <a:t>11/29/2012</a:t>
+              <a:t>29/11/2012</a:t>
             </a:fld>
             <a:endParaRPr lang="en-US"/>
           </a:p>
@@ -1056,7 +1056,7 @@
             <a:fld id="{4A9E7B99-7C3F-4BC3-B7B8-7E1F8C620B24}" type="datetime1">
               <a:rPr lang="en-US" smtClean="0"/>
               <a:pPr/>
-              <a:t>11/29/2012</a:t>
+              <a:t>29/11/2012</a:t>
             </a:fld>
             <a:endParaRPr lang="en-US"/>
           </a:p>
@@ -1345,7 +1345,7 @@
           <a:p>
             <a:fld id="{68C2560D-EC28-3B41-86E8-18F1CE0113B4}" type="datetimeFigureOut">
               <a:rPr lang="en-US" smtClean="0"/>
-              <a:t>11/29/2012</a:t>
+              <a:t>29/11/2012</a:t>
             </a:fld>
             <a:endParaRPr lang="en-US"/>
           </a:p>
@@ -1767,7 +1767,7 @@
           <a:p>
             <a:fld id="{68C2560D-EC28-3B41-86E8-18F1CE0113B4}" type="datetimeFigureOut">
               <a:rPr lang="en-US" smtClean="0"/>
-              <a:t>11/29/2012</a:t>
+              <a:t>29/11/2012</a:t>
             </a:fld>
             <a:endParaRPr lang="en-US"/>
           </a:p>
@@ -1885,7 +1885,7 @@
           <a:p>
             <a:fld id="{68C2560D-EC28-3B41-86E8-18F1CE0113B4}" type="datetimeFigureOut">
               <a:rPr lang="en-US" smtClean="0"/>
-              <a:t>11/29/2012</a:t>
+              <a:t>29/11/2012</a:t>
             </a:fld>
             <a:endParaRPr lang="en-US"/>
           </a:p>
@@ -1980,7 +1980,7 @@
           <a:p>
             <a:fld id="{68C2560D-EC28-3B41-86E8-18F1CE0113B4}" type="datetimeFigureOut">
               <a:rPr lang="en-US" smtClean="0"/>
-              <a:t>11/29/2012</a:t>
+              <a:t>29/11/2012</a:t>
             </a:fld>
             <a:endParaRPr lang="en-US"/>
           </a:p>
@@ -2257,7 +2257,7 @@
           <a:p>
             <a:fld id="{68C2560D-EC28-3B41-86E8-18F1CE0113B4}" type="datetimeFigureOut">
               <a:rPr lang="en-US" smtClean="0"/>
-              <a:t>11/29/2012</a:t>
+              <a:t>29/11/2012</a:t>
             </a:fld>
             <a:endParaRPr lang="en-US"/>
           </a:p>
@@ -2517,7 +2517,7 @@
           <a:p>
             <a:fld id="{68C2560D-EC28-3B41-86E8-18F1CE0113B4}" type="datetimeFigureOut">
               <a:rPr lang="en-US" smtClean="0"/>
-              <a:t>11/29/2012</a:t>
+              <a:t>29/11/2012</a:t>
             </a:fld>
             <a:endParaRPr lang="en-US"/>
           </a:p>
@@ -2730,7 +2730,7 @@
           <a:p>
             <a:fld id="{68C2560D-EC28-3B41-86E8-18F1CE0113B4}" type="datetimeFigureOut">
               <a:rPr lang="en-US" smtClean="0"/>
-              <a:t>11/29/2012</a:t>
+              <a:t>29/11/2012</a:t>
             </a:fld>
             <a:endParaRPr lang="en-US"/>
           </a:p>
@@ -3166,13 +3166,8 @@
             <a:pPr algn="ctr"/>
             <a:r>
               <a:rPr lang="en-US" sz="4800" b="1" dirty="0" smtClean="0"/>
-              <a:t>Project </a:t>
-            </a:r>
-            <a:r>
-              <a:rPr lang="en-US" sz="4800" b="1" dirty="0" smtClean="0"/>
-              <a:t>Management</a:t>
-            </a:r>
-            <a:endParaRPr lang="en-US" sz="4800" b="1" dirty="0" smtClean="0"/>
+              <a:t>Project Management</a:t>
+            </a:r>
           </a:p>
         </p:txBody>
       </p:sp>
@@ -3324,8 +3319,8 @@
         </p:nvSpPr>
         <p:spPr>
           <a:xfrm>
-            <a:off x="459233" y="8700117"/>
-            <a:ext cx="12342366" cy="3543982"/>
+            <a:off x="459233" y="7569201"/>
+            <a:ext cx="12342366" cy="3390204"/>
           </a:xfrm>
           <a:prstGeom prst="roundRect">
             <a:avLst/>
@@ -3383,12 +3378,20 @@
               <a:t>A way to </a:t>
             </a:r>
             <a:r>
-              <a:rPr lang="en-US" sz="2400" dirty="0" err="1" smtClean="0"/>
+              <a:rPr lang="en-GB" sz="2400" dirty="0" smtClean="0"/>
               <a:t>visualise</a:t>
             </a:r>
             <a:r>
               <a:rPr lang="en-US" sz="2400" dirty="0" smtClean="0"/>
-              <a:t> as much of the network state as possible</a:t>
+              <a:t> </a:t>
+            </a:r>
+            <a:r>
+              <a:rPr lang="en-US" sz="2400" dirty="0"/>
+              <a:t>as </a:t>
+            </a:r>
+            <a:r>
+              <a:rPr lang="en-US" sz="2400" dirty="0" smtClean="0"/>
+              <a:t>much of the network state as possible</a:t>
             </a:r>
           </a:p>
           <a:p>
@@ -3400,7 +3403,6 @@
               <a:rPr lang="en-US" sz="2400" dirty="0" smtClean="0"/>
               <a:t>A way to obtain information on the network state before a property fails to hold</a:t>
             </a:r>
-            <a:endParaRPr lang="en-US" sz="2400" dirty="0" smtClean="0"/>
           </a:p>
           <a:p>
             <a:endParaRPr lang="en-US" sz="2000" dirty="0"/>
@@ -3415,8 +3417,8 @@
         </p:nvSpPr>
         <p:spPr>
           <a:xfrm>
-            <a:off x="540458" y="2591998"/>
-            <a:ext cx="12261141" cy="5451021"/>
+            <a:off x="540458" y="2591999"/>
+            <a:ext cx="12261141" cy="4570802"/>
           </a:xfrm>
           <a:prstGeom prst="roundRect">
             <a:avLst>
@@ -3453,11 +3455,7 @@
           <a:p>
             <a:r>
               <a:rPr lang="en-US" sz="2400" dirty="0" smtClean="0"/>
-              <a:t>Wireless </a:t>
-            </a:r>
-            <a:r>
-              <a:rPr lang="en-US" sz="2400" dirty="0" smtClean="0"/>
-              <a:t>Sensor </a:t>
+              <a:t>Wireless Sensor </a:t>
             </a:r>
             <a:r>
               <a:rPr lang="en-US" sz="2400" dirty="0"/>
@@ -3467,14 +3465,13 @@
               <a:rPr lang="en-US" sz="2400" dirty="0" smtClean="0"/>
               <a:t>etworks (WSNs) are a collection of small computing devices equipped with a radio (for wireless communication), sensors (to get information on the environment) and a battery to power the device. </a:t>
             </a:r>
-          </a:p>
-          <a:p>
-            <a:endParaRPr lang="en-US" sz="2400" dirty="0"/>
-          </a:p>
-          <a:p>
             <a:r>
               <a:rPr lang="en-US" sz="2400" dirty="0" smtClean="0"/>
-              <a:t>As these devices are not attached to the mains power we need to make sure that we do as little energy intensive work (</a:t>
+              <a:t>As </a:t>
+            </a:r>
+            <a:r>
+              <a:rPr lang="en-US" sz="2400" dirty="0" smtClean="0"/>
+              <a:t>these devices are not attached to the mains power we need to make sure that we do as little energy intensive work (</a:t>
             </a:r>
             <a:r>
               <a:rPr lang="en-US" sz="2400" dirty="0" err="1" smtClean="0"/>
@@ -3506,7 +3503,7 @@
           <p:nvPr>
             <p:extLst>
               <p:ext uri="{D42A27DB-BD31-4B8C-83A1-F6EECF244321}">
-                <p14:modId xmlns:p14="http://schemas.microsoft.com/office/powerpoint/2010/main" val="461952381"/>
+                <p14:modId xmlns:p14="http://schemas.microsoft.com/office/powerpoint/2010/main" val="1762993301"/>
               </p:ext>
             </p:extLst>
           </p:nvPr>
@@ -3701,7 +3698,11 @@
                     <a:p>
                       <a:r>
                         <a:rPr lang="en-US" sz="2000" dirty="0" smtClean="0"/>
-                        <a:t>Technical leader</a:t>
+                        <a:t>Technical </a:t>
+                      </a:r>
+                      <a:r>
+                        <a:rPr lang="en-US" sz="2000" dirty="0" smtClean="0"/>
+                        <a:t>Leader</a:t>
                       </a:r>
                       <a:endParaRPr lang="en-US" sz="2000" dirty="0"/>
                     </a:p>
@@ -3791,15 +3792,7 @@
                   <a:schemeClr val="bg1"/>
                 </a:solidFill>
               </a:rPr>
-              <a:t>Second Term </a:t>
-            </a:r>
-            <a:r>
-              <a:rPr lang="en-US" sz="4800" b="1" dirty="0" smtClean="0">
-                <a:solidFill>
-                  <a:schemeClr val="bg1"/>
-                </a:solidFill>
-              </a:rPr>
-              <a:t>Plan</a:t>
+              <a:t>Second Term Plan</a:t>
             </a:r>
             <a:endParaRPr lang="en-US" sz="4800" b="1" dirty="0">
               <a:solidFill>
@@ -4124,8 +4117,8 @@
         </p:nvSpPr>
         <p:spPr>
           <a:xfrm>
-            <a:off x="517654" y="17945100"/>
-            <a:ext cx="12283945" cy="8864348"/>
+            <a:off x="459233" y="18881319"/>
+            <a:ext cx="12283945" cy="7928129"/>
           </a:xfrm>
           <a:prstGeom prst="roundRect">
             <a:avLst>
@@ -4166,11 +4159,7 @@
           <a:p>
             <a:r>
               <a:rPr lang="en-US" sz="2000" dirty="0" smtClean="0"/>
-              <a:t>One </a:t>
-            </a:r>
-            <a:r>
-              <a:rPr lang="en-US" sz="2000" dirty="0" smtClean="0"/>
-              <a:t>of the requirements of our project is that we wished to specify predicates to be checked, not just at compile-time, but also at run-time. The main reason is that the needs of a system will change over time.</a:t>
+              <a:t>One of the requirements of our project is that we wished to specify predicates to be checked, not just at compile-time, but also at run-time. The main reason is that the needs of a system will change over time.</a:t>
             </a:r>
           </a:p>
           <a:p>
@@ -4211,23 +4200,7 @@
             </a:r>
             <a:r>
               <a:rPr lang="en-US" sz="2000" dirty="0" smtClean="0"/>
-              <a:t>) </a:t>
-            </a:r>
-            <a:r>
-              <a:rPr lang="en-US" sz="2000" dirty="0" smtClean="0"/>
-              <a:t>[3] </a:t>
-            </a:r>
-            <a:r>
-              <a:rPr lang="en-US" sz="2000" dirty="0" smtClean="0"/>
-              <a:t>and Wren </a:t>
-            </a:r>
-            <a:r>
-              <a:rPr lang="en-US" sz="2000" dirty="0" smtClean="0"/>
-              <a:t>[2] </a:t>
-            </a:r>
-            <a:r>
-              <a:rPr lang="en-US" sz="2000" dirty="0" smtClean="0"/>
-              <a:t>– were not suitable due to their high resource requirements or lack of desired features.</a:t>
+              <a:t>) [3] and Wren [2] – were not suitable due to their high resource requirements or lack of desired features.</a:t>
             </a:r>
             <a:endParaRPr lang="en-US" sz="2000" dirty="0"/>
           </a:p>
@@ -4273,18 +4246,22 @@
               <a:t>In order to </a:t>
             </a:r>
             <a:r>
-              <a:rPr lang="en-US" sz="2000" dirty="0" err="1"/>
+              <a:rPr lang="en-GB" sz="2000" dirty="0" smtClean="0"/>
               <a:t>realise</a:t>
-            </a:r>
-            <a:r>
-              <a:rPr lang="en-US" sz="2000" dirty="0"/>
-              <a:t> this, we have implemented a parser, assembler and virtual machine. The base application will compile new predicates and transmit the assembled </a:t>
             </a:r>
             <a:r>
               <a:rPr lang="en-US" sz="2000" dirty="0" smtClean="0"/>
               <a:t> </a:t>
             </a:r>
             <a:r>
+              <a:rPr lang="en-US" sz="2000" dirty="0"/>
+              <a:t>this, we have implemented a parser, assembler and virtual machine. The base application will compile new predicates and transmit the assembled </a:t>
+            </a:r>
+            <a:r>
+              <a:rPr lang="en-US" sz="2000" dirty="0" smtClean="0"/>
+              <a:t> </a:t>
+            </a:r>
+            <a:r>
               <a:rPr lang="en-US" sz="2000" dirty="0" err="1" smtClean="0"/>
               <a:t>bytecode</a:t>
             </a:r>
@@ -4303,28 +4280,13 @@
           <a:p>
             <a:r>
               <a:rPr lang="en-US" sz="2000" dirty="0"/>
-              <a:t>As an example of a predicate specified in our language, the following snippet will check no nodes within a two-hop </a:t>
-            </a:r>
-            <a:r>
-              <a:rPr lang="en-US" sz="2000" dirty="0" err="1"/>
-              <a:t>neighbourhood</a:t>
-            </a:r>
-            <a:r>
-              <a:rPr lang="en-US" sz="2000" dirty="0"/>
-              <a:t> have clashing </a:t>
+              <a:t>As an example of a predicate specified in our language, the following snippet will </a:t>
             </a:r>
             <a:r>
               <a:rPr lang="en-US" sz="2000" dirty="0" smtClean="0"/>
-              <a:t>slots. This is a property that should hold in systems using the TDMA</a:t>
-            </a:r>
-            <a:r>
-              <a:rPr lang="en-US" sz="2000" dirty="0"/>
-              <a:t> </a:t>
-            </a:r>
-            <a:r>
-              <a:rPr lang="en-US" sz="2000" dirty="0" smtClean="0"/>
-              <a:t>(time division multiple access) MAC protocol.</a:t>
-            </a:r>
+              <a:t>check that there exists a cluster head within D hops of the current node. This is a predicate that will be used in hierarchical clustering.</a:t>
+            </a:r>
+            <a:endParaRPr lang="en-US" sz="2000" dirty="0" smtClean="0"/>
           </a:p>
           <a:p>
             <a:endParaRPr lang="en-US" sz="2000" dirty="0"/>
@@ -4364,10 +4326,10 @@
         </p:nvGrpSpPr>
         <p:grpSpPr>
           <a:xfrm>
-            <a:off x="847874" y="24700100"/>
-            <a:ext cx="11339038" cy="1600439"/>
+            <a:off x="847874" y="24299990"/>
+            <a:ext cx="11339038" cy="1300232"/>
             <a:chOff x="14562518" y="11856894"/>
-            <a:chExt cx="11339038" cy="1600439"/>
+            <a:chExt cx="11339038" cy="1300232"/>
           </a:xfrm>
         </p:grpSpPr>
         <p:sp>
@@ -4379,7 +4341,7 @@
           <p:spPr>
             <a:xfrm>
               <a:off x="14935812" y="11856894"/>
-              <a:ext cx="5743128" cy="1200329"/>
+              <a:ext cx="5743128" cy="830997"/>
             </a:xfrm>
             <a:prstGeom prst="rect">
               <a:avLst/>
@@ -4403,17 +4365,17 @@
                   <a:latin typeface="Consolas" pitchFamily="49" charset="0"/>
                   <a:cs typeface="Consolas" pitchFamily="49" charset="0"/>
                 </a:rPr>
-                <a:t>using Neighbours(2) as </a:t>
+                <a:t>using Neighbours</a:t>
               </a:r>
               <a:r>
-                <a:rPr lang="en-GB" sz="2400" dirty="0" err="1">
+                <a:rPr lang="en-GB" sz="2400" dirty="0" smtClean="0">
                   <a:solidFill>
                     <a:srgbClr val="FFFF00"/>
                   </a:solidFill>
                   <a:latin typeface="Consolas" pitchFamily="49" charset="0"/>
                   <a:cs typeface="Consolas" pitchFamily="49" charset="0"/>
                 </a:rPr>
-                <a:t>twohopn</a:t>
+                <a:t>(D) </a:t>
               </a:r>
               <a:r>
                 <a:rPr lang="en-GB" sz="2400" dirty="0">
@@ -4423,7 +4385,37 @@
                   <a:latin typeface="Consolas" pitchFamily="49" charset="0"/>
                   <a:cs typeface="Consolas" pitchFamily="49" charset="0"/>
                 </a:rPr>
-                <a:t> in</a:t>
+                <a:t>as </a:t>
+              </a:r>
+              <a:r>
+                <a:rPr lang="en-GB" sz="2400" dirty="0" err="1" smtClean="0">
+                  <a:solidFill>
+                    <a:srgbClr val="FFFF00"/>
+                  </a:solidFill>
+                  <a:latin typeface="Consolas" pitchFamily="49" charset="0"/>
+                  <a:cs typeface="Consolas" pitchFamily="49" charset="0"/>
+                </a:rPr>
+                <a:t>Dhopn</a:t>
+              </a:r>
+              <a:r>
+                <a:rPr lang="en-GB" sz="2400" dirty="0" smtClean="0">
+                  <a:solidFill>
+                    <a:srgbClr val="FFFF00"/>
+                  </a:solidFill>
+                  <a:latin typeface="Consolas" pitchFamily="49" charset="0"/>
+                  <a:cs typeface="Consolas" pitchFamily="49" charset="0"/>
+                </a:rPr>
+                <a:t> </a:t>
+              </a:r>
+              <a:r>
+                <a:rPr lang="en-GB" sz="2400" dirty="0">
+                  <a:solidFill>
+                    <a:srgbClr val="FFFF00"/>
+                  </a:solidFill>
+                  <a:latin typeface="Consolas" pitchFamily="49" charset="0"/>
+                  <a:cs typeface="Consolas" pitchFamily="49" charset="0"/>
+                </a:rPr>
+                <a:t>in</a:t>
               </a:r>
             </a:p>
             <a:p>
@@ -4435,17 +4427,17 @@
                   <a:latin typeface="Consolas" pitchFamily="49" charset="0"/>
                   <a:cs typeface="Consolas" pitchFamily="49" charset="0"/>
                 </a:rPr>
-                <a:t>    @(x : </a:t>
+                <a:t>    </a:t>
               </a:r>
               <a:r>
-                <a:rPr lang="en-GB" sz="2400" dirty="0" err="1">
+                <a:rPr lang="en-GB" sz="2400" dirty="0" smtClean="0">
                   <a:solidFill>
                     <a:srgbClr val="FFFF00"/>
                   </a:solidFill>
                   <a:latin typeface="Consolas" pitchFamily="49" charset="0"/>
                   <a:cs typeface="Consolas" pitchFamily="49" charset="0"/>
                 </a:rPr>
-                <a:t>twohopn</a:t>
+                <a:t>#(</a:t>
               </a:r>
               <a:r>
                 <a:rPr lang="en-GB" sz="2400" dirty="0">
@@ -4455,10 +4447,18 @@
                   <a:latin typeface="Consolas" pitchFamily="49" charset="0"/>
                   <a:cs typeface="Consolas" pitchFamily="49" charset="0"/>
                 </a:rPr>
-                <a:t> ~</a:t>
+                <a:t>x : </a:t>
               </a:r>
-            </a:p>
-            <a:p>
+              <a:r>
+                <a:rPr lang="en-GB" sz="2400" dirty="0" err="1" smtClean="0">
+                  <a:solidFill>
+                    <a:srgbClr val="FFFF00"/>
+                  </a:solidFill>
+                  <a:latin typeface="Consolas" pitchFamily="49" charset="0"/>
+                  <a:cs typeface="Consolas" pitchFamily="49" charset="0"/>
+                </a:rPr>
+                <a:t>Dhopn</a:t>
+              </a:r>
               <a:r>
                 <a:rPr lang="en-GB" sz="2400" dirty="0" smtClean="0">
                   <a:solidFill>
@@ -4467,7 +4467,47 @@
                   <a:latin typeface="Consolas" pitchFamily="49" charset="0"/>
                   <a:cs typeface="Consolas" pitchFamily="49" charset="0"/>
                 </a:rPr>
-                <a:t>        slot(x) != slot(this))</a:t>
+                <a:t> ~ </a:t>
+              </a:r>
+              <a:r>
+                <a:rPr lang="en-GB" sz="2400" dirty="0" err="1" smtClean="0">
+                  <a:solidFill>
+                    <a:srgbClr val="FFFF00"/>
+                  </a:solidFill>
+                  <a:latin typeface="Consolas" pitchFamily="49" charset="0"/>
+                  <a:cs typeface="Consolas" pitchFamily="49" charset="0"/>
+                </a:rPr>
+                <a:t>isCH</a:t>
+              </a:r>
+              <a:r>
+                <a:rPr lang="en-GB" sz="2400" dirty="0" smtClean="0">
+                  <a:solidFill>
+                    <a:srgbClr val="FFFF00"/>
+                  </a:solidFill>
+                  <a:latin typeface="Consolas" pitchFamily="49" charset="0"/>
+                  <a:cs typeface="Consolas" pitchFamily="49" charset="0"/>
+                </a:rPr>
+                <a:t>(</a:t>
+              </a:r>
+              <a:r>
+                <a:rPr lang="en-GB" sz="2400" dirty="0" smtClean="0">
+                  <a:solidFill>
+                    <a:srgbClr val="FFFF00"/>
+                  </a:solidFill>
+                  <a:latin typeface="Consolas" pitchFamily="49" charset="0"/>
+                  <a:cs typeface="Consolas" pitchFamily="49" charset="0"/>
+                </a:rPr>
+                <a:t>x</a:t>
+              </a:r>
+              <a:r>
+                <a:rPr lang="en-GB" sz="2400" dirty="0" smtClean="0">
+                  <a:solidFill>
+                    <a:srgbClr val="FFFF00"/>
+                  </a:solidFill>
+                  <a:latin typeface="Consolas" pitchFamily="49" charset="0"/>
+                  <a:cs typeface="Consolas" pitchFamily="49" charset="0"/>
+                </a:rPr>
+                <a:t>))</a:t>
               </a:r>
               <a:endParaRPr lang="en-US" sz="2400" dirty="0">
                 <a:solidFill>
@@ -4487,8 +4527,8 @@
           </p:nvSpPr>
           <p:spPr>
             <a:xfrm>
-              <a:off x="21236962" y="11856894"/>
-              <a:ext cx="4664594" cy="1200329"/>
+              <a:off x="20678940" y="11856894"/>
+              <a:ext cx="5222616" cy="830997"/>
             </a:xfrm>
             <a:prstGeom prst="rect">
               <a:avLst/>
@@ -4505,14 +4545,14 @@
             <a:lstStyle/>
             <a:p>
               <a:r>
-                <a:rPr lang="en-GB" sz="2400" dirty="0" smtClean="0">
+                <a:rPr lang="en-GB" sz="2400" dirty="0">
                   <a:solidFill>
                     <a:srgbClr val="FFFF00"/>
                   </a:solidFill>
                   <a:latin typeface="Consolas" pitchFamily="49" charset="0"/>
                   <a:cs typeface="Consolas" pitchFamily="49" charset="0"/>
                 </a:rPr>
-                <a:t>∀x </a:t>
+                <a:t>∃x </a:t>
               </a:r>
               <a:r>
                 <a:rPr lang="el-GR" sz="2400" dirty="0" smtClean="0">
@@ -4532,10 +4572,8 @@
                   <a:latin typeface="Consolas" pitchFamily="49" charset="0"/>
                   <a:cs typeface="Consolas" pitchFamily="49" charset="0"/>
                 </a:rPr>
-                <a:t> Neighbours(2) ⋅ </a:t>
+                <a:t> Neighbours</a:t>
               </a:r>
-            </a:p>
-            <a:p>
               <a:r>
                 <a:rPr lang="en-GB" sz="2400" dirty="0" smtClean="0">
                   <a:solidFill>
@@ -4544,8 +4582,55 @@
                   <a:latin typeface="Consolas" pitchFamily="49" charset="0"/>
                   <a:cs typeface="Consolas" pitchFamily="49" charset="0"/>
                 </a:rPr>
-                <a:t>    slot(x) ≠ slot(this)</a:t>
+                <a:t>(D) ⋅ </a:t>
               </a:r>
+              <a:r>
+                <a:rPr lang="en-GB" sz="2400" dirty="0" err="1" smtClean="0">
+                  <a:solidFill>
+                    <a:srgbClr val="FFFF00"/>
+                  </a:solidFill>
+                  <a:latin typeface="Consolas" pitchFamily="49" charset="0"/>
+                  <a:cs typeface="Consolas" pitchFamily="49" charset="0"/>
+                </a:rPr>
+                <a:t>isCH</a:t>
+              </a:r>
+              <a:r>
+                <a:rPr lang="en-GB" sz="2400" dirty="0" smtClean="0">
+                  <a:solidFill>
+                    <a:srgbClr val="FFFF00"/>
+                  </a:solidFill>
+                  <a:latin typeface="Consolas" pitchFamily="49" charset="0"/>
+                  <a:cs typeface="Consolas" pitchFamily="49" charset="0"/>
+                </a:rPr>
+                <a:t>(</a:t>
+              </a:r>
+              <a:r>
+                <a:rPr lang="en-GB" sz="2400" dirty="0" smtClean="0">
+                  <a:solidFill>
+                    <a:srgbClr val="FFFF00"/>
+                  </a:solidFill>
+                  <a:latin typeface="Consolas" pitchFamily="49" charset="0"/>
+                  <a:cs typeface="Consolas" pitchFamily="49" charset="0"/>
+                </a:rPr>
+                <a:t>x</a:t>
+              </a:r>
+              <a:r>
+                <a:rPr lang="en-GB" sz="2400" dirty="0" smtClean="0">
+                  <a:solidFill>
+                    <a:srgbClr val="FFFF00"/>
+                  </a:solidFill>
+                  <a:latin typeface="Consolas" pitchFamily="49" charset="0"/>
+                  <a:cs typeface="Consolas" pitchFamily="49" charset="0"/>
+                </a:rPr>
+                <a:t>)</a:t>
+              </a:r>
+              <a:endParaRPr lang="en-GB" sz="2400" dirty="0" smtClean="0">
+                <a:solidFill>
+                  <a:srgbClr val="FFFF00"/>
+                </a:solidFill>
+                <a:latin typeface="Consolas" pitchFamily="49" charset="0"/>
+                <a:cs typeface="Consolas" pitchFamily="49" charset="0"/>
+              </a:endParaRPr>
             </a:p>
             <a:p>
               <a:endParaRPr lang="en-GB" sz="2400" dirty="0">
@@ -4566,7 +4651,7 @@
           </p:nvSpPr>
           <p:spPr>
             <a:xfrm>
-              <a:off x="14562518" y="13057223"/>
+              <a:off x="14562518" y="12757016"/>
               <a:ext cx="11339038" cy="400110"/>
             </a:xfrm>
             <a:prstGeom prst="rect">
@@ -4609,8 +4694,8 @@
         </p:nvSpPr>
         <p:spPr>
           <a:xfrm>
-            <a:off x="14166864" y="2591999"/>
-            <a:ext cx="14518836" cy="5451021"/>
+            <a:off x="14166864" y="2592001"/>
+            <a:ext cx="14518836" cy="3842442"/>
           </a:xfrm>
           <a:prstGeom prst="roundRect">
             <a:avLst>
@@ -4666,20 +4751,15 @@
             </a:r>
             <a:r>
               <a:rPr lang="en-GB" sz="2000" dirty="0"/>
-              <a:t>control our project, which will run on a computer and interface with the base station. It's main features will be predicate creation and deployment, and network visualisation</a:t>
+              <a:t>control our project, which will run on a computer and interface with the base station. It's main features will be predicate creation and deployment, and network </a:t>
             </a:r>
             <a:r>
               <a:rPr lang="en-GB" sz="2000" dirty="0" smtClean="0"/>
-              <a:t>.</a:t>
-            </a:r>
-          </a:p>
-          <a:p>
-            <a:endParaRPr lang="en-US" sz="2000" dirty="0"/>
-          </a:p>
-          <a:p>
+              <a:t>visualisation. Monitoring </a:t>
+            </a:r>
             <a:r>
               <a:rPr lang="en-GB" sz="2000" dirty="0"/>
-              <a:t>Monitoring a new predicate will simply involve writing </a:t>
+              <a:t>a new predicate will simply involve writing </a:t>
             </a:r>
             <a:r>
               <a:rPr lang="en-GB" sz="2000" dirty="0" smtClean="0"/>
@@ -4716,21 +4796,15 @@
             </a:r>
             <a:r>
               <a:rPr lang="en-GB" sz="2000" dirty="0"/>
-              <a:t/>
-            </a:r>
-            <a:br>
+              <a:t> </a:t>
+            </a:r>
+            <a:r>
+              <a:rPr lang="en-GB" sz="2000" dirty="0" smtClean="0"/>
+              <a:t>The </a:t>
+            </a:r>
+            <a:r>
               <a:rPr lang="en-GB" sz="2000" dirty="0"/>
-            </a:br>
-            <a:r>
-              <a:rPr lang="en-GB" sz="2000" dirty="0"/>
-              <a:t/>
-            </a:r>
-            <a:br>
-              <a:rPr lang="en-GB" sz="2000" dirty="0"/>
-            </a:br>
-            <a:r>
-              <a:rPr lang="en-GB" sz="2000" dirty="0"/>
-              <a:t>The second will be a network graph, </a:t>
+              <a:t>second will be a network graph, </a:t>
             </a:r>
             <a:r>
               <a:rPr lang="en-GB" sz="2000" dirty="0" smtClean="0"/>
@@ -4752,9 +4826,9 @@
         </p:nvGrpSpPr>
         <p:grpSpPr>
           <a:xfrm>
-            <a:off x="14166864" y="12244099"/>
-            <a:ext cx="14518836" cy="14565349"/>
-            <a:chOff x="13798302" y="12137087"/>
+            <a:off x="14167183" y="13989409"/>
+            <a:ext cx="14518836" cy="12884889"/>
+            <a:chOff x="13843115" y="12995734"/>
             <a:chExt cx="14518836" cy="14672361"/>
           </a:xfrm>
         </p:grpSpPr>
@@ -4766,7 +4840,7 @@
           </p:nvSpPr>
           <p:spPr>
             <a:xfrm>
-              <a:off x="13798302" y="12137087"/>
+              <a:off x="13843115" y="12995734"/>
               <a:ext cx="14518836" cy="14672361"/>
             </a:xfrm>
             <a:prstGeom prst="roundRect">
@@ -4852,7 +4926,7 @@
               <a:endParaRPr lang="en-US" sz="2000" b="1" dirty="0" smtClean="0"/>
             </a:p>
             <a:p>
-              <a:endParaRPr lang="en-US" sz="4000" b="1" dirty="0" smtClean="0"/>
+              <a:endParaRPr lang="en-US" sz="2000" b="1" dirty="0" smtClean="0"/>
             </a:p>
             <a:p>
               <a:r>
@@ -4884,11 +4958,7 @@
               </a:r>
               <a:r>
                 <a:rPr lang="en-GB" sz="2000" dirty="0" smtClean="0"/>
-                <a:t>) [1], </a:t>
-              </a:r>
-              <a:r>
-                <a:rPr lang="en-GB" sz="2000" dirty="0" smtClean="0"/>
-                <a:t>we devised </a:t>
+                <a:t>) [1], we devised </a:t>
               </a:r>
               <a:r>
                 <a:rPr lang="en-GB" sz="2000" dirty="0"/>
@@ -4896,7 +4966,7 @@
               </a:r>
               <a:r>
                 <a:rPr lang="en-GB" sz="2000" dirty="0" smtClean="0"/>
-                <a:t>networks (cf. the diagram below), </a:t>
+                <a:t>networks, </a:t>
               </a:r>
               <a:r>
                 <a:rPr lang="en-GB" sz="2000" dirty="0"/>
@@ -4912,20 +4982,20 @@
                 <a:t>The basic clustering algorithm simply elects all nodes within radio range of the sink as </a:t>
               </a:r>
               <a:r>
-                <a:rPr lang="en-GB" sz="2000" dirty="0" err="1" smtClean="0"/>
-                <a:t>clusterheads</a:t>
+                <a:rPr lang="en-GB" sz="2000" dirty="0" smtClean="0"/>
+                <a:t>cluster-heads </a:t>
               </a:r>
               <a:r>
                 <a:rPr lang="en-GB" sz="2000" dirty="0" smtClean="0"/>
-                <a:t> (CHs); all other nodes send data to their closest CH which application-dependent processing before forwarding them on to the sink. Hierarchical clustering extends this by specifying some depth D such that, if the shortest discovered route to a node’s CH is D hops, that node becomes a </a:t>
-              </a:r>
-              <a:r>
-                <a:rPr lang="en-GB" sz="2000" dirty="0" err="1" smtClean="0"/>
-                <a:t>clusterhead</a:t>
+                <a:t>(CHs); all other nodes send data to their closest CH which application-dependent processing before forwarding them on to the sink. Hierarchical clustering extends this by specifying some depth D such that, if the shortest discovered route to a node’s CH is D hops, that node becomes a </a:t>
               </a:r>
               <a:r>
                 <a:rPr lang="en-GB" sz="2000" dirty="0" smtClean="0"/>
-                <a:t> itself.</a:t>
+                <a:t>cluster-head </a:t>
+              </a:r>
+              <a:r>
+                <a:rPr lang="en-GB" sz="2000" dirty="0" smtClean="0"/>
+                <a:t>itself.</a:t>
               </a:r>
             </a:p>
             <a:p>
@@ -4942,12 +5012,6 @@
             </a:p>
             <a:p>
               <a:endParaRPr lang="en-US" sz="4000" b="1" dirty="0"/>
-            </a:p>
-            <a:p>
-              <a:endParaRPr lang="en-US" sz="4000" b="1" dirty="0" smtClean="0"/>
-            </a:p>
-            <a:p>
-              <a:endParaRPr lang="en-US" sz="4000" b="1" dirty="0" smtClean="0"/>
             </a:p>
           </p:txBody>
         </p:sp>
@@ -4973,7 +5037,7 @@
           </p:blipFill>
           <p:spPr>
             <a:xfrm>
-              <a:off x="23169074" y="14657347"/>
+              <a:off x="23169074" y="15714664"/>
               <a:ext cx="4736584" cy="4756533"/>
             </a:xfrm>
             <a:prstGeom prst="rect">
@@ -4989,7 +5053,7 @@
           </p:nvSpPr>
           <p:spPr>
             <a:xfrm>
-              <a:off x="14058900" y="15904429"/>
+              <a:off x="14058900" y="16887548"/>
               <a:ext cx="8950154" cy="2554545"/>
             </a:xfrm>
             <a:prstGeom prst="rect">
@@ -5054,8 +5118,8 @@
           </p:nvSpPr>
           <p:spPr>
             <a:xfrm>
-              <a:off x="14058900" y="22858722"/>
-              <a:ext cx="4741777" cy="3170099"/>
+              <a:off x="14058899" y="24327382"/>
+              <a:ext cx="5377744" cy="2573313"/>
             </a:xfrm>
             <a:prstGeom prst="rect">
               <a:avLst/>
@@ -5077,12 +5141,12 @@
                 <a:t>In both cases, nodes will either send sensor data to their </a:t>
               </a:r>
               <a:r>
-                <a:rPr lang="en-US" sz="2000" dirty="0" err="1" smtClean="0">
+                <a:rPr lang="en-US" sz="2000" dirty="0" smtClean="0">
                   <a:solidFill>
                     <a:schemeClr val="bg1"/>
                   </a:solidFill>
                 </a:rPr>
-                <a:t>clusterhead</a:t>
+                <a:t>cluster-head</a:t>
               </a:r>
               <a:r>
                 <a:rPr lang="en-US" sz="2000" dirty="0" smtClean="0">
@@ -5090,7 +5154,15 @@
                     <a:schemeClr val="bg1"/>
                   </a:solidFill>
                 </a:rPr>
-                <a:t>, where aggregates and application predicates will be evaluated (e.g. average temperature over a cluster’s area), or send the information requested by a predicate message (for example, checking that no node has two CHs). In accordance with the desire for energy efficiency, we also plan to test energy usage on the clustered network in Term 2.</a:t>
+                <a:t>, where aggregates and application predicates will be evaluated (e.g. average temperature over a cluster’s area), or send the information requested by a predicate message (for example, checking that no node has two CHs)</a:t>
+              </a:r>
+              <a:r>
+                <a:rPr lang="en-US" sz="2000" dirty="0" smtClean="0">
+                  <a:solidFill>
+                    <a:schemeClr val="bg1"/>
+                  </a:solidFill>
+                </a:rPr>
+                <a:t>.</a:t>
               </a:r>
               <a:endParaRPr lang="en-US" sz="2000" dirty="0">
                 <a:solidFill>
@@ -5122,8 +5194,8 @@
           </p:blipFill>
           <p:spPr>
             <a:xfrm>
-              <a:off x="18847543" y="22709400"/>
-              <a:ext cx="9355295" cy="3975100"/>
+              <a:off x="20108368" y="24323917"/>
+              <a:ext cx="6711007" cy="2851532"/>
             </a:xfrm>
             <a:prstGeom prst="rect">
               <a:avLst/>
@@ -5469,31 +5541,12 @@
             </a:outerShdw>
           </a:effectLst>
           <a:extLst>
-            <a:ext uri="{909E8E84-426E-40DD-AFC4-6F175D3DCCD1}">
+            <a:ext uri="{909E8E84-426E-40dd-AFC4-6F175D3DCCD1}">
               <a14:hiddenFill xmlns:a14="http://schemas.microsoft.com/office/drawing/2010/main">
                 <a:solidFill>
                   <a:schemeClr val="accent1"/>
                 </a:solidFill>
               </a14:hiddenFill>
-            </a:ext>
-            <a:ext uri="{91240B29-F687-4F45-9708-019B960494DF}">
-              <a14:hiddenLine xmlns:a14="http://schemas.microsoft.com/office/drawing/2010/main" w="9525">
-                <a:solidFill>
-                  <a:schemeClr val="tx1"/>
-                </a:solidFill>
-                <a:miter lim="800000"/>
-                <a:headEnd/>
-                <a:tailEnd/>
-              </a14:hiddenLine>
-            </a:ext>
-            <a:ext uri="{AF507438-7753-43E0-B8FC-AC1667EBCBE1}">
-              <a14:hiddenEffects xmlns:a14="http://schemas.microsoft.com/office/drawing/2010/main">
-                <a:effectLst>
-                  <a:outerShdw dist="35921" dir="2700000" algn="ctr" rotWithShape="0">
-                    <a:schemeClr val="bg2"/>
-                  </a:outerShdw>
-                </a:effectLst>
-              </a14:hiddenEffects>
             </a:ext>
           </a:extLst>
         </p:spPr>
@@ -5677,13 +5730,15 @@
       <p:grpSp>
         <p:nvGrpSpPr>
           <p:cNvPr id="29" name="Group 28"/>
-          <p:cNvGrpSpPr/>
+          <p:cNvGrpSpPr>
+            <a:grpSpLocks noChangeAspect="1"/>
+          </p:cNvGrpSpPr>
           <p:nvPr/>
         </p:nvGrpSpPr>
         <p:grpSpPr>
           <a:xfrm>
-            <a:off x="15632166" y="8557212"/>
-            <a:ext cx="4963209" cy="3268785"/>
+            <a:off x="15632167" y="10718425"/>
+            <a:ext cx="4392590" cy="2892974"/>
             <a:chOff x="15632167" y="8700117"/>
             <a:chExt cx="4963209" cy="3268785"/>
           </a:xfrm>
@@ -5782,15 +5837,17 @@
       <p:grpSp>
         <p:nvGrpSpPr>
           <p:cNvPr id="31" name="Group 30"/>
-          <p:cNvGrpSpPr/>
+          <p:cNvGrpSpPr>
+            <a:grpSpLocks noChangeAspect="1"/>
+          </p:cNvGrpSpPr>
           <p:nvPr/>
         </p:nvGrpSpPr>
         <p:grpSpPr>
           <a:xfrm>
-            <a:off x="22224728" y="8557212"/>
-            <a:ext cx="4963209" cy="3245761"/>
-            <a:chOff x="22206041" y="8704574"/>
-            <a:chExt cx="4963209" cy="3245761"/>
+            <a:off x="22224727" y="10726052"/>
+            <a:ext cx="4376881" cy="2909590"/>
+            <a:chOff x="22206039" y="8704574"/>
+            <a:chExt cx="4963209" cy="3299360"/>
           </a:xfrm>
         </p:grpSpPr>
         <p:pic>
@@ -5850,15 +5907,7 @@
                 <a:srgbClr val="FFFFFF"/>
               </a:contourClr>
             </a:sp3d>
-            <a:extLst>
-              <a:ext uri="{909E8E84-426E-40DD-AFC4-6F175D3DCCD1}">
-                <a14:hiddenFill xmlns:a14="http://schemas.microsoft.com/office/drawing/2010/main">
-                  <a:solidFill>
-                    <a:srgbClr val="FFFFFF"/>
-                  </a:solidFill>
-                </a14:hiddenFill>
-              </a:ext>
-            </a:extLst>
+            <a:extLst/>
           </p:spPr>
         </p:pic>
         <p:sp>
@@ -5869,8 +5918,8 @@
           </p:nvSpPr>
           <p:spPr>
             <a:xfrm>
-              <a:off x="22206041" y="11550225"/>
-              <a:ext cx="4963209" cy="400110"/>
+              <a:off x="22206039" y="11550225"/>
+              <a:ext cx="4963209" cy="453709"/>
             </a:xfrm>
             <a:prstGeom prst="rect">
               <a:avLst/>
@@ -5886,7 +5935,11 @@
               <a:pPr algn="ctr"/>
               <a:r>
                 <a:rPr lang="en-GB" sz="2000" dirty="0" smtClean="0"/>
-                <a:t>Figure 2: The base station interface dongle</a:t>
+                <a:t>Figure 2: The base station </a:t>
+              </a:r>
+              <a:r>
+                <a:rPr lang="en-GB" sz="2000" dirty="0" smtClean="0"/>
+                <a:t>dongle</a:t>
               </a:r>
               <a:endParaRPr lang="en-GB" sz="2000" dirty="0"/>
             </a:p>
@@ -6155,11 +6208,6 @@
               </a:rPr>
               <a:t>. Technical report, SICS publications database [http://eprints.sics.se/perl/oai2] (Sweden), 2006.</a:t>
             </a:r>
-            <a:endParaRPr lang="en-GB" sz="2000" dirty="0">
-              <a:solidFill>
-                <a:schemeClr val="bg1"/>
-              </a:solidFill>
-            </a:endParaRPr>
           </a:p>
         </p:txBody>
       </p:sp>
@@ -6326,6 +6374,106 @@
                 <a:schemeClr val="bg1"/>
               </a:solidFill>
             </a:endParaRPr>
+          </a:p>
+        </p:txBody>
+      </p:sp>
+      <p:sp>
+        <p:nvSpPr>
+          <p:cNvPr id="35" name="Rounded Rectangle 34"/>
+          <p:cNvSpPr/>
+          <p:nvPr/>
+        </p:nvSpPr>
+        <p:spPr>
+          <a:xfrm>
+            <a:off x="14166864" y="6857760"/>
+            <a:ext cx="14518836" cy="3555876"/>
+          </a:xfrm>
+          <a:prstGeom prst="roundRect">
+            <a:avLst>
+              <a:gd name="adj" fmla="val 9463"/>
+            </a:avLst>
+          </a:prstGeom>
+        </p:spPr>
+        <p:style>
+          <a:lnRef idx="2">
+            <a:schemeClr val="accent1">
+              <a:shade val="50000"/>
+            </a:schemeClr>
+          </a:lnRef>
+          <a:fillRef idx="1">
+            <a:schemeClr val="accent1"/>
+          </a:fillRef>
+          <a:effectRef idx="0">
+            <a:schemeClr val="accent1"/>
+          </a:effectRef>
+          <a:fontRef idx="minor">
+            <a:schemeClr val="lt1"/>
+          </a:fontRef>
+        </p:style>
+        <p:txBody>
+          <a:bodyPr rtlCol="0" anchor="t"/>
+          <a:lstStyle/>
+          <a:p>
+            <a:pPr algn="ctr"/>
+            <a:r>
+              <a:rPr lang="en-US" sz="4800" b="1" dirty="0" smtClean="0"/>
+              <a:t>Testing and Integration</a:t>
+            </a:r>
+            <a:endParaRPr lang="en-US" sz="2000" dirty="0" smtClean="0"/>
+          </a:p>
+          <a:p>
+            <a:endParaRPr lang="en-US" sz="2000" dirty="0" smtClean="0"/>
+          </a:p>
+          <a:p>
+            <a:r>
+              <a:rPr lang="en-US" sz="2000" dirty="0" smtClean="0"/>
+              <a:t>In order to test our implementations we are using the </a:t>
+            </a:r>
+            <a:r>
+              <a:rPr lang="en-US" sz="2000" dirty="0" err="1" smtClean="0"/>
+              <a:t>Contiki</a:t>
+            </a:r>
+            <a:r>
+              <a:rPr lang="en-US" sz="2000" dirty="0" smtClean="0"/>
+              <a:t> simulation tool </a:t>
+            </a:r>
+            <a:r>
+              <a:rPr lang="en-US" sz="2000" dirty="0" err="1" smtClean="0"/>
+              <a:t>Cooja</a:t>
+            </a:r>
+            <a:r>
+              <a:rPr lang="en-US" sz="2000" dirty="0" smtClean="0"/>
+              <a:t> [7]. We considered using </a:t>
+            </a:r>
+            <a:r>
+              <a:rPr lang="en-US" sz="2000" dirty="0" err="1" smtClean="0"/>
+              <a:t>TinyOS</a:t>
+            </a:r>
+            <a:r>
+              <a:rPr lang="en-US" sz="2000" dirty="0" smtClean="0"/>
+              <a:t>, however found that </a:t>
+            </a:r>
+            <a:r>
+              <a:rPr lang="en-US" sz="2000" dirty="0" err="1" smtClean="0"/>
+              <a:t>Contiki</a:t>
+            </a:r>
+            <a:r>
+              <a:rPr lang="en-US" sz="2000" dirty="0" smtClean="0"/>
+              <a:t> was more modern, and had better documentation of its APIs. Unfortunately, simulators can not simulate real world environments hence the need to test on physical hardware to evaluate algorithm performance, and network conditions. Simulators are, however, useful for testing large scale networks.</a:t>
+            </a:r>
+          </a:p>
+          <a:p>
+            <a:endParaRPr lang="en-US" sz="2000" dirty="0"/>
+          </a:p>
+          <a:p>
+            <a:r>
+              <a:rPr lang="en-US" sz="2000" dirty="0" smtClean="0"/>
+              <a:t>There is a need to bridge the gap between a desktop application, and the networked nodes. This can be done with the use of a dongle to act as a base station, allowing the desktop application to receive data form the network, and send out new predicates to be evaluated. </a:t>
+            </a:r>
+            <a:endParaRPr lang="en-US" sz="2000" dirty="0"/>
+          </a:p>
+          <a:p>
+            <a:endParaRPr lang="en-US" sz="2000" dirty="0"/>
           </a:p>
         </p:txBody>
       </p:sp>
@@ -6342,7 +6490,7 @@
   <p:timing>
     <p:tnLst>
       <p:par>
-        <p:cTn id="1" dur="indefinite" restart="never" nodeType="tmRoot"/>
+        <p:cTn xmlns:p14="http://schemas.microsoft.com/office/powerpoint/2010/main" id="1" dur="indefinite" restart="never" nodeType="tmRoot"/>
       </p:par>
     </p:tnLst>
   </p:timing>
@@ -6670,6 +6818,24 @@
 </file>
 
 <file path=customXml/item1.xml><?xml version="1.0" encoding="utf-8"?>
+<p:properties xmlns:p="http://schemas.microsoft.com/office/2006/metadata/properties" xmlns:xsi="http://www.w3.org/2001/XMLSchema-instance" xmlns:pc="http://schemas.microsoft.com/office/infopath/2007/PartnerControls">
+  <documentManagement>
+    <_Version xmlns="http://schemas.microsoft.com/sharepoint/v3/fields" xsi:nil="true"/>
+    <_Status xmlns="http://schemas.microsoft.com/sharepoint/v3/fields">Not Started</_Status>
+  </documentManagement>
+</p:properties>
+</file>
+
+<file path=customXml/item2.xml><?xml version="1.0" encoding="utf-8"?>
+<?mso-contentType ?>
+<FormTemplates xmlns="http://schemas.microsoft.com/sharepoint/v3/contenttype/forms">
+  <Display>DocumentLibraryForm</Display>
+  <Edit>DocumentLibraryForm</Edit>
+  <New>DocumentLibraryForm</New>
+</FormTemplates>
+</file>
+
+<file path=customXml/item3.xml><?xml version="1.0" encoding="utf-8"?>
 <ct:contentTypeSchema xmlns:ct="http://schemas.microsoft.com/office/2006/metadata/contentType" xmlns:ma="http://schemas.microsoft.com/office/2006/metadata/properties/metaAttributes" ct:_="" ma:_="" ma:contentTypeName="Document" ma:contentTypeID="0x0101000DE64AEEDD9B7A4D93545ACBE97D4615" ma:contentTypeVersion="2" ma:contentTypeDescription="Create a new document." ma:contentTypeScope="" ma:versionID="f49002b78e3a4a71b814eef46a983816">
   <xsd:schema xmlns:xsd="http://www.w3.org/2001/XMLSchema" xmlns:xs="http://www.w3.org/2001/XMLSchema" xmlns:p="http://schemas.microsoft.com/office/2006/metadata/properties" xmlns:ns2="http://schemas.microsoft.com/sharepoint/v3/fields" targetNamespace="http://schemas.microsoft.com/office/2006/metadata/properties" ma:root="true" ma:fieldsID="38f6db2dd0d9a0cf6a8dc37be32b365b" ns2:_="">
     <xsd:import namespace="http://schemas.microsoft.com/sharepoint/v3/fields"/>
@@ -6813,25 +6979,31 @@
 </ct:contentTypeSchema>
 </file>
 
-<file path=customXml/item2.xml><?xml version="1.0" encoding="utf-8"?>
-<p:properties xmlns:p="http://schemas.microsoft.com/office/2006/metadata/properties" xmlns:xsi="http://www.w3.org/2001/XMLSchema-instance" xmlns:pc="http://schemas.microsoft.com/office/infopath/2007/PartnerControls">
-  <documentManagement>
-    <_Version xmlns="http://schemas.microsoft.com/sharepoint/v3/fields" xsi:nil="true"/>
-    <_Status xmlns="http://schemas.microsoft.com/sharepoint/v3/fields">Not Started</_Status>
-  </documentManagement>
-</p:properties>
+<file path=customXml/itemProps1.xml><?xml version="1.0" encoding="utf-8"?>
+<ds:datastoreItem xmlns:ds="http://schemas.openxmlformats.org/officeDocument/2006/customXml" ds:itemID="{7B6F2769-7194-4217-93D3-3AF3A4742282}">
+  <ds:schemaRefs>
+    <ds:schemaRef ds:uri="http://schemas.microsoft.com/sharepoint/v3/fields"/>
+    <ds:schemaRef ds:uri="http://purl.org/dc/terms/"/>
+    <ds:schemaRef ds:uri="http://purl.org/dc/elements/1.1/"/>
+    <ds:schemaRef ds:uri="http://www.w3.org/XML/1998/namespace"/>
+    <ds:schemaRef ds:uri="http://schemas.openxmlformats.org/package/2006/metadata/core-properties"/>
+    <ds:schemaRef ds:uri="http://purl.org/dc/dcmitype/"/>
+    <ds:schemaRef ds:uri="http://schemas.microsoft.com/office/2006/documentManagement/types"/>
+    <ds:schemaRef ds:uri="http://schemas.microsoft.com/office/infopath/2007/PartnerControls"/>
+    <ds:schemaRef ds:uri="http://schemas.microsoft.com/office/2006/metadata/properties"/>
+  </ds:schemaRefs>
+</ds:datastoreItem>
 </file>
 
-<file path=customXml/item3.xml><?xml version="1.0" encoding="utf-8"?>
-<?mso-contentType ?>
-<FormTemplates xmlns="http://schemas.microsoft.com/sharepoint/v3/contenttype/forms">
-  <Display>DocumentLibraryForm</Display>
-  <Edit>DocumentLibraryForm</Edit>
-  <New>DocumentLibraryForm</New>
-</FormTemplates>
+<file path=customXml/itemProps2.xml><?xml version="1.0" encoding="utf-8"?>
+<ds:datastoreItem xmlns:ds="http://schemas.openxmlformats.org/officeDocument/2006/customXml" ds:itemID="{87D2A1B0-FF3E-4009-940D-AED0EB70AA20}">
+  <ds:schemaRefs>
+    <ds:schemaRef ds:uri="http://schemas.microsoft.com/sharepoint/v3/contenttype/forms"/>
+  </ds:schemaRefs>
+</ds:datastoreItem>
 </file>
 
-<file path=customXml/itemProps1.xml><?xml version="1.0" encoding="utf-8"?>
+<file path=customXml/itemProps3.xml><?xml version="1.0" encoding="utf-8"?>
 <ds:datastoreItem xmlns:ds="http://schemas.openxmlformats.org/officeDocument/2006/customXml" ds:itemID="{E4214858-785C-42F7-BE66-6D0E79395FC8}">
   <ds:schemaRefs>
     <ds:schemaRef ds:uri="http://schemas.microsoft.com/office/2006/metadata/contentType"/>
@@ -6847,28 +7019,4 @@
     <ds:schemaRef ds:uri="http://schemas.microsoft.com/internal/obd"/>
   </ds:schemaRefs>
 </ds:datastoreItem>
-</file>
-
-<file path=customXml/itemProps2.xml><?xml version="1.0" encoding="utf-8"?>
-<ds:datastoreItem xmlns:ds="http://schemas.openxmlformats.org/officeDocument/2006/customXml" ds:itemID="{7B6F2769-7194-4217-93D3-3AF3A4742282}">
-  <ds:schemaRefs>
-    <ds:schemaRef ds:uri="http://schemas.microsoft.com/sharepoint/v3/fields"/>
-    <ds:schemaRef ds:uri="http://purl.org/dc/terms/"/>
-    <ds:schemaRef ds:uri="http://purl.org/dc/elements/1.1/"/>
-    <ds:schemaRef ds:uri="http://www.w3.org/XML/1998/namespace"/>
-    <ds:schemaRef ds:uri="http://schemas.openxmlformats.org/package/2006/metadata/core-properties"/>
-    <ds:schemaRef ds:uri="http://purl.org/dc/dcmitype/"/>
-    <ds:schemaRef ds:uri="http://schemas.microsoft.com/office/2006/documentManagement/types"/>
-    <ds:schemaRef ds:uri="http://schemas.microsoft.com/office/infopath/2007/PartnerControls"/>
-    <ds:schemaRef ds:uri="http://schemas.microsoft.com/office/2006/metadata/properties"/>
-  </ds:schemaRefs>
-</ds:datastoreItem>
-</file>
-
-<file path=customXml/itemProps3.xml><?xml version="1.0" encoding="utf-8"?>
-<ds:datastoreItem xmlns:ds="http://schemas.openxmlformats.org/officeDocument/2006/customXml" ds:itemID="{87D2A1B0-FF3E-4009-940D-AED0EB70AA20}">
-  <ds:schemaRefs>
-    <ds:schemaRef ds:uri="http://schemas.microsoft.com/sharepoint/v3/contenttype/forms"/>
-  </ds:schemaRefs>
-</ds:datastoreItem>
 </file>
</xml_diff>